<commit_message>
Presentation: preliminary version of lifecycle part
</commit_message>
<xml_diff>
--- a/Presentation/Presentation.pptx
+++ b/Presentation/Presentation.pptx
@@ -7,15 +7,20 @@
     <p:sldMasterId id="2147483681" r:id="rId3"/>
   </p:sldMasterIdLst>
   <p:notesMasterIdLst>
-    <p:notesMasterId r:id="rId10"/>
+    <p:notesMasterId r:id="rId15"/>
   </p:notesMasterIdLst>
   <p:sldIdLst>
     <p:sldId id="256" r:id="rId4"/>
     <p:sldId id="268" r:id="rId5"/>
     <p:sldId id="304" r:id="rId6"/>
     <p:sldId id="305" r:id="rId7"/>
-    <p:sldId id="287" r:id="rId8"/>
-    <p:sldId id="258" r:id="rId9"/>
+    <p:sldId id="306" r:id="rId8"/>
+    <p:sldId id="307" r:id="rId9"/>
+    <p:sldId id="308" r:id="rId10"/>
+    <p:sldId id="309" r:id="rId11"/>
+    <p:sldId id="310" r:id="rId12"/>
+    <p:sldId id="287" r:id="rId13"/>
+    <p:sldId id="258" r:id="rId14"/>
   </p:sldIdLst>
   <p:sldSz cx="9144000" cy="6858000" type="screen4x3"/>
   <p:notesSz cx="9906000" cy="6794500"/>
@@ -596,6 +601,107 @@
 </p:notes>
 </file>
 
+<file path=ppt/notesSlides/notesSlide10.xml><?xml version="1.0" encoding="utf-8"?>
+<p:notes xmlns:a="http://schemas.openxmlformats.org/drawingml/2006/main" xmlns:r="http://schemas.openxmlformats.org/officeDocument/2006/relationships" xmlns:p="http://schemas.openxmlformats.org/presentationml/2006/main">
+  <p:cSld>
+    <p:spTree>
+      <p:nvGrpSpPr>
+        <p:cNvPr id="1" name=""/>
+        <p:cNvGrpSpPr/>
+        <p:nvPr/>
+      </p:nvGrpSpPr>
+      <p:grpSpPr>
+        <a:xfrm>
+          <a:off x="0" y="0"/>
+          <a:ext cx="0" cy="0"/>
+          <a:chOff x="0" y="0"/>
+          <a:chExt cx="0" cy="0"/>
+        </a:xfrm>
+      </p:grpSpPr>
+      <p:sp>
+        <p:nvSpPr>
+          <p:cNvPr id="2" name="Segnaposto immagine diapositiva 1"/>
+          <p:cNvSpPr>
+            <a:spLocks noGrp="1" noRot="1" noChangeAspect="1"/>
+          </p:cNvSpPr>
+          <p:nvPr>
+            <p:ph type="sldImg"/>
+          </p:nvPr>
+        </p:nvSpPr>
+        <p:spPr/>
+      </p:sp>
+      <p:sp>
+        <p:nvSpPr>
+          <p:cNvPr id="3" name="Segnaposto note 2"/>
+          <p:cNvSpPr>
+            <a:spLocks noGrp="1"/>
+          </p:cNvSpPr>
+          <p:nvPr>
+            <p:ph type="body" idx="1"/>
+          </p:nvPr>
+        </p:nvSpPr>
+        <p:spPr/>
+        <p:txBody>
+          <a:bodyPr/>
+          <a:lstStyle/>
+          <a:p>
+            <a:pPr marL="0" marR="0" indent="0" algn="l" defTabSz="457200" rtl="0" eaLnBrk="1" fontAlgn="auto" latinLnBrk="0" hangingPunct="1">
+              <a:lnSpc>
+                <a:spcPct val="100000"/>
+              </a:lnSpc>
+              <a:spcBef>
+                <a:spcPts val="0"/>
+              </a:spcBef>
+              <a:spcAft>
+                <a:spcPts val="0"/>
+              </a:spcAft>
+              <a:buClrTx/>
+              <a:buSzTx/>
+              <a:buFontTx/>
+              <a:buNone/>
+              <a:tabLst/>
+              <a:defRPr/>
+            </a:pPr>
+            <a:endParaRPr lang="it-IT" b="0" dirty="0"/>
+          </a:p>
+        </p:txBody>
+      </p:sp>
+      <p:sp>
+        <p:nvSpPr>
+          <p:cNvPr id="4" name="Segnaposto numero diapositiva 3"/>
+          <p:cNvSpPr>
+            <a:spLocks noGrp="1"/>
+          </p:cNvSpPr>
+          <p:nvPr>
+            <p:ph type="sldNum" sz="quarter" idx="10"/>
+          </p:nvPr>
+        </p:nvSpPr>
+        <p:spPr/>
+        <p:txBody>
+          <a:bodyPr/>
+          <a:lstStyle/>
+          <a:p>
+            <a:fld id="{E73CFAA4-C87D-1545-9F8E-F35BF2220A99}" type="slidenum">
+              <a:rPr lang="it-IT" smtClean="0"/>
+              <a:t>10</a:t>
+            </a:fld>
+            <a:endParaRPr lang="it-IT"/>
+          </a:p>
+        </p:txBody>
+      </p:sp>
+    </p:spTree>
+    <p:extLst>
+      <p:ext uri="{BB962C8B-B14F-4D97-AF65-F5344CB8AC3E}">
+        <p14:creationId xmlns:p14="http://schemas.microsoft.com/office/powerpoint/2010/main" val="2864582512"/>
+      </p:ext>
+    </p:extLst>
+  </p:cSld>
+  <p:clrMapOvr>
+    <a:masterClrMapping/>
+  </p:clrMapOvr>
+</p:notes>
+</file>
+
 <file path=ppt/notesSlides/notesSlide2.xml><?xml version="1.0" encoding="utf-8"?>
 <p:notes xmlns:a="http://schemas.openxmlformats.org/drawingml/2006/main" xmlns:r="http://schemas.openxmlformats.org/officeDocument/2006/relationships" xmlns:p="http://schemas.openxmlformats.org/presentationml/2006/main">
   <p:cSld>
@@ -911,24 +1017,7 @@
           <a:bodyPr/>
           <a:lstStyle/>
           <a:p>
-            <a:pPr marL="0" marR="0" indent="0" algn="l" defTabSz="457200" rtl="0" eaLnBrk="1" fontAlgn="auto" latinLnBrk="0" hangingPunct="1">
-              <a:lnSpc>
-                <a:spcPct val="100000"/>
-              </a:lnSpc>
-              <a:spcBef>
-                <a:spcPts val="0"/>
-              </a:spcBef>
-              <a:spcAft>
-                <a:spcPts val="0"/>
-              </a:spcAft>
-              <a:buClrTx/>
-              <a:buSzTx/>
-              <a:buFontTx/>
-              <a:buNone/>
-              <a:tabLst/>
-              <a:defRPr/>
-            </a:pPr>
-            <a:endParaRPr lang="it-IT" b="0" dirty="0"/>
+            <a:endParaRPr lang="it-IT" sz="1200" b="0" dirty="0"/>
           </a:p>
         </p:txBody>
       </p:sp>
@@ -958,7 +1047,343 @@
     </p:spTree>
     <p:extLst>
       <p:ext uri="{BB962C8B-B14F-4D97-AF65-F5344CB8AC3E}">
-        <p14:creationId xmlns:p14="http://schemas.microsoft.com/office/powerpoint/2010/main" val="2864582512"/>
+        <p14:creationId xmlns:p14="http://schemas.microsoft.com/office/powerpoint/2010/main" val="2402633798"/>
+      </p:ext>
+    </p:extLst>
+  </p:cSld>
+  <p:clrMapOvr>
+    <a:masterClrMapping/>
+  </p:clrMapOvr>
+</p:notes>
+</file>
+
+<file path=ppt/notesSlides/notesSlide6.xml><?xml version="1.0" encoding="utf-8"?>
+<p:notes xmlns:a="http://schemas.openxmlformats.org/drawingml/2006/main" xmlns:r="http://schemas.openxmlformats.org/officeDocument/2006/relationships" xmlns:p="http://schemas.openxmlformats.org/presentationml/2006/main">
+  <p:cSld>
+    <p:spTree>
+      <p:nvGrpSpPr>
+        <p:cNvPr id="1" name=""/>
+        <p:cNvGrpSpPr/>
+        <p:nvPr/>
+      </p:nvGrpSpPr>
+      <p:grpSpPr>
+        <a:xfrm>
+          <a:off x="0" y="0"/>
+          <a:ext cx="0" cy="0"/>
+          <a:chOff x="0" y="0"/>
+          <a:chExt cx="0" cy="0"/>
+        </a:xfrm>
+      </p:grpSpPr>
+      <p:sp>
+        <p:nvSpPr>
+          <p:cNvPr id="2" name="Segnaposto immagine diapositiva 1"/>
+          <p:cNvSpPr>
+            <a:spLocks noGrp="1" noRot="1" noChangeAspect="1"/>
+          </p:cNvSpPr>
+          <p:nvPr>
+            <p:ph type="sldImg"/>
+          </p:nvPr>
+        </p:nvSpPr>
+        <p:spPr/>
+      </p:sp>
+      <p:sp>
+        <p:nvSpPr>
+          <p:cNvPr id="3" name="Segnaposto note 2"/>
+          <p:cNvSpPr>
+            <a:spLocks noGrp="1"/>
+          </p:cNvSpPr>
+          <p:nvPr>
+            <p:ph type="body" idx="1"/>
+          </p:nvPr>
+        </p:nvSpPr>
+        <p:spPr/>
+        <p:txBody>
+          <a:bodyPr/>
+          <a:lstStyle/>
+          <a:p>
+            <a:endParaRPr lang="it-IT" sz="1200" b="0" dirty="0"/>
+          </a:p>
+        </p:txBody>
+      </p:sp>
+      <p:sp>
+        <p:nvSpPr>
+          <p:cNvPr id="4" name="Segnaposto numero diapositiva 3"/>
+          <p:cNvSpPr>
+            <a:spLocks noGrp="1"/>
+          </p:cNvSpPr>
+          <p:nvPr>
+            <p:ph type="sldNum" sz="quarter" idx="10"/>
+          </p:nvPr>
+        </p:nvSpPr>
+        <p:spPr/>
+        <p:txBody>
+          <a:bodyPr/>
+          <a:lstStyle/>
+          <a:p>
+            <a:fld id="{E73CFAA4-C87D-1545-9F8E-F35BF2220A99}" type="slidenum">
+              <a:rPr lang="it-IT" smtClean="0"/>
+              <a:t>6</a:t>
+            </a:fld>
+            <a:endParaRPr lang="it-IT"/>
+          </a:p>
+        </p:txBody>
+      </p:sp>
+    </p:spTree>
+    <p:extLst>
+      <p:ext uri="{BB962C8B-B14F-4D97-AF65-F5344CB8AC3E}">
+        <p14:creationId xmlns:p14="http://schemas.microsoft.com/office/powerpoint/2010/main" val="1352063720"/>
+      </p:ext>
+    </p:extLst>
+  </p:cSld>
+  <p:clrMapOvr>
+    <a:masterClrMapping/>
+  </p:clrMapOvr>
+</p:notes>
+</file>
+
+<file path=ppt/notesSlides/notesSlide7.xml><?xml version="1.0" encoding="utf-8"?>
+<p:notes xmlns:a="http://schemas.openxmlformats.org/drawingml/2006/main" xmlns:r="http://schemas.openxmlformats.org/officeDocument/2006/relationships" xmlns:p="http://schemas.openxmlformats.org/presentationml/2006/main">
+  <p:cSld>
+    <p:spTree>
+      <p:nvGrpSpPr>
+        <p:cNvPr id="1" name=""/>
+        <p:cNvGrpSpPr/>
+        <p:nvPr/>
+      </p:nvGrpSpPr>
+      <p:grpSpPr>
+        <a:xfrm>
+          <a:off x="0" y="0"/>
+          <a:ext cx="0" cy="0"/>
+          <a:chOff x="0" y="0"/>
+          <a:chExt cx="0" cy="0"/>
+        </a:xfrm>
+      </p:grpSpPr>
+      <p:sp>
+        <p:nvSpPr>
+          <p:cNvPr id="2" name="Segnaposto immagine diapositiva 1"/>
+          <p:cNvSpPr>
+            <a:spLocks noGrp="1" noRot="1" noChangeAspect="1"/>
+          </p:cNvSpPr>
+          <p:nvPr>
+            <p:ph type="sldImg"/>
+          </p:nvPr>
+        </p:nvSpPr>
+        <p:spPr/>
+      </p:sp>
+      <p:sp>
+        <p:nvSpPr>
+          <p:cNvPr id="3" name="Segnaposto note 2"/>
+          <p:cNvSpPr>
+            <a:spLocks noGrp="1"/>
+          </p:cNvSpPr>
+          <p:nvPr>
+            <p:ph type="body" idx="1"/>
+          </p:nvPr>
+        </p:nvSpPr>
+        <p:spPr/>
+        <p:txBody>
+          <a:bodyPr/>
+          <a:lstStyle/>
+          <a:p>
+            <a:endParaRPr lang="it-IT" sz="1200" b="0" dirty="0"/>
+          </a:p>
+        </p:txBody>
+      </p:sp>
+      <p:sp>
+        <p:nvSpPr>
+          <p:cNvPr id="4" name="Segnaposto numero diapositiva 3"/>
+          <p:cNvSpPr>
+            <a:spLocks noGrp="1"/>
+          </p:cNvSpPr>
+          <p:nvPr>
+            <p:ph type="sldNum" sz="quarter" idx="10"/>
+          </p:nvPr>
+        </p:nvSpPr>
+        <p:spPr/>
+        <p:txBody>
+          <a:bodyPr/>
+          <a:lstStyle/>
+          <a:p>
+            <a:fld id="{E73CFAA4-C87D-1545-9F8E-F35BF2220A99}" type="slidenum">
+              <a:rPr lang="it-IT" smtClean="0"/>
+              <a:t>7</a:t>
+            </a:fld>
+            <a:endParaRPr lang="it-IT"/>
+          </a:p>
+        </p:txBody>
+      </p:sp>
+    </p:spTree>
+    <p:extLst>
+      <p:ext uri="{BB962C8B-B14F-4D97-AF65-F5344CB8AC3E}">
+        <p14:creationId xmlns:p14="http://schemas.microsoft.com/office/powerpoint/2010/main" val="3266635012"/>
+      </p:ext>
+    </p:extLst>
+  </p:cSld>
+  <p:clrMapOvr>
+    <a:masterClrMapping/>
+  </p:clrMapOvr>
+</p:notes>
+</file>
+
+<file path=ppt/notesSlides/notesSlide8.xml><?xml version="1.0" encoding="utf-8"?>
+<p:notes xmlns:a="http://schemas.openxmlformats.org/drawingml/2006/main" xmlns:r="http://schemas.openxmlformats.org/officeDocument/2006/relationships" xmlns:p="http://schemas.openxmlformats.org/presentationml/2006/main">
+  <p:cSld>
+    <p:spTree>
+      <p:nvGrpSpPr>
+        <p:cNvPr id="1" name=""/>
+        <p:cNvGrpSpPr/>
+        <p:nvPr/>
+      </p:nvGrpSpPr>
+      <p:grpSpPr>
+        <a:xfrm>
+          <a:off x="0" y="0"/>
+          <a:ext cx="0" cy="0"/>
+          <a:chOff x="0" y="0"/>
+          <a:chExt cx="0" cy="0"/>
+        </a:xfrm>
+      </p:grpSpPr>
+      <p:sp>
+        <p:nvSpPr>
+          <p:cNvPr id="2" name="Segnaposto immagine diapositiva 1"/>
+          <p:cNvSpPr>
+            <a:spLocks noGrp="1" noRot="1" noChangeAspect="1"/>
+          </p:cNvSpPr>
+          <p:nvPr>
+            <p:ph type="sldImg"/>
+          </p:nvPr>
+        </p:nvSpPr>
+        <p:spPr/>
+      </p:sp>
+      <p:sp>
+        <p:nvSpPr>
+          <p:cNvPr id="3" name="Segnaposto note 2"/>
+          <p:cNvSpPr>
+            <a:spLocks noGrp="1"/>
+          </p:cNvSpPr>
+          <p:nvPr>
+            <p:ph type="body" idx="1"/>
+          </p:nvPr>
+        </p:nvSpPr>
+        <p:spPr/>
+        <p:txBody>
+          <a:bodyPr/>
+          <a:lstStyle/>
+          <a:p>
+            <a:endParaRPr lang="it-IT" sz="1200" b="0" dirty="0"/>
+          </a:p>
+        </p:txBody>
+      </p:sp>
+      <p:sp>
+        <p:nvSpPr>
+          <p:cNvPr id="4" name="Segnaposto numero diapositiva 3"/>
+          <p:cNvSpPr>
+            <a:spLocks noGrp="1"/>
+          </p:cNvSpPr>
+          <p:nvPr>
+            <p:ph type="sldNum" sz="quarter" idx="10"/>
+          </p:nvPr>
+        </p:nvSpPr>
+        <p:spPr/>
+        <p:txBody>
+          <a:bodyPr/>
+          <a:lstStyle/>
+          <a:p>
+            <a:fld id="{E73CFAA4-C87D-1545-9F8E-F35BF2220A99}" type="slidenum">
+              <a:rPr lang="it-IT" smtClean="0"/>
+              <a:t>8</a:t>
+            </a:fld>
+            <a:endParaRPr lang="it-IT"/>
+          </a:p>
+        </p:txBody>
+      </p:sp>
+    </p:spTree>
+    <p:extLst>
+      <p:ext uri="{BB962C8B-B14F-4D97-AF65-F5344CB8AC3E}">
+        <p14:creationId xmlns:p14="http://schemas.microsoft.com/office/powerpoint/2010/main" val="4051313801"/>
+      </p:ext>
+    </p:extLst>
+  </p:cSld>
+  <p:clrMapOvr>
+    <a:masterClrMapping/>
+  </p:clrMapOvr>
+</p:notes>
+</file>
+
+<file path=ppt/notesSlides/notesSlide9.xml><?xml version="1.0" encoding="utf-8"?>
+<p:notes xmlns:a="http://schemas.openxmlformats.org/drawingml/2006/main" xmlns:r="http://schemas.openxmlformats.org/officeDocument/2006/relationships" xmlns:p="http://schemas.openxmlformats.org/presentationml/2006/main">
+  <p:cSld>
+    <p:spTree>
+      <p:nvGrpSpPr>
+        <p:cNvPr id="1" name=""/>
+        <p:cNvGrpSpPr/>
+        <p:nvPr/>
+      </p:nvGrpSpPr>
+      <p:grpSpPr>
+        <a:xfrm>
+          <a:off x="0" y="0"/>
+          <a:ext cx="0" cy="0"/>
+          <a:chOff x="0" y="0"/>
+          <a:chExt cx="0" cy="0"/>
+        </a:xfrm>
+      </p:grpSpPr>
+      <p:sp>
+        <p:nvSpPr>
+          <p:cNvPr id="2" name="Segnaposto immagine diapositiva 1"/>
+          <p:cNvSpPr>
+            <a:spLocks noGrp="1" noRot="1" noChangeAspect="1"/>
+          </p:cNvSpPr>
+          <p:nvPr>
+            <p:ph type="sldImg"/>
+          </p:nvPr>
+        </p:nvSpPr>
+        <p:spPr/>
+      </p:sp>
+      <p:sp>
+        <p:nvSpPr>
+          <p:cNvPr id="3" name="Segnaposto note 2"/>
+          <p:cNvSpPr>
+            <a:spLocks noGrp="1"/>
+          </p:cNvSpPr>
+          <p:nvPr>
+            <p:ph type="body" idx="1"/>
+          </p:nvPr>
+        </p:nvSpPr>
+        <p:spPr/>
+        <p:txBody>
+          <a:bodyPr/>
+          <a:lstStyle/>
+          <a:p>
+            <a:endParaRPr lang="it-IT" sz="1200" b="0" dirty="0"/>
+          </a:p>
+        </p:txBody>
+      </p:sp>
+      <p:sp>
+        <p:nvSpPr>
+          <p:cNvPr id="4" name="Segnaposto numero diapositiva 3"/>
+          <p:cNvSpPr>
+            <a:spLocks noGrp="1"/>
+          </p:cNvSpPr>
+          <p:nvPr>
+            <p:ph type="sldNum" sz="quarter" idx="10"/>
+          </p:nvPr>
+        </p:nvSpPr>
+        <p:spPr/>
+        <p:txBody>
+          <a:bodyPr/>
+          <a:lstStyle/>
+          <a:p>
+            <a:fld id="{E73CFAA4-C87D-1545-9F8E-F35BF2220A99}" type="slidenum">
+              <a:rPr lang="it-IT" smtClean="0"/>
+              <a:t>9</a:t>
+            </a:fld>
+            <a:endParaRPr lang="it-IT"/>
+          </a:p>
+        </p:txBody>
+      </p:sp>
+    </p:spTree>
+    <p:extLst>
+      <p:ext uri="{BB962C8B-B14F-4D97-AF65-F5344CB8AC3E}">
+        <p14:creationId xmlns:p14="http://schemas.microsoft.com/office/powerpoint/2010/main" val="3049663898"/>
       </p:ext>
     </p:extLst>
   </p:cSld>
@@ -4444,21 +4869,8 @@
                   <a:srgbClr val="000000"/>
                 </a:solidFill>
               </a:rPr>
-              <a:t> Simone Graziussi </a:t>
-            </a:r>
-            <a:r>
-              <a:rPr lang="it-IT" sz="1400" dirty="0">
-                <a:solidFill>
-                  <a:srgbClr val="000000"/>
-                </a:solidFill>
-              </a:rPr>
-              <a:t>(836897)</a:t>
-            </a:r>
-            <a:endParaRPr lang="it-IT" dirty="0">
-              <a:solidFill>
-                <a:srgbClr val="000000"/>
-              </a:solidFill>
-            </a:endParaRPr>
+              <a:t> Simone Graziussi (836897)</a:t>
+            </a:r>
           </a:p>
           <a:p>
             <a:pPr marL="0" indent="0">
@@ -4660,6 +5072,630 @@
     </mc:Choice>
     <mc:Fallback xmlns="">
       <p:transition xmlns:p14="http://schemas.microsoft.com/office/powerpoint/2010/main" spd="slow" advTm="19458"/>
+    </mc:Fallback>
+  </mc:AlternateContent>
+</p:sld>
+</file>
+
+<file path=ppt/slides/slide10.xml><?xml version="1.0" encoding="utf-8"?>
+<p:sld xmlns:a="http://schemas.openxmlformats.org/drawingml/2006/main" xmlns:r="http://schemas.openxmlformats.org/officeDocument/2006/relationships" xmlns:p="http://schemas.openxmlformats.org/presentationml/2006/main">
+  <p:cSld>
+    <p:spTree>
+      <p:nvGrpSpPr>
+        <p:cNvPr id="1" name=""/>
+        <p:cNvGrpSpPr/>
+        <p:nvPr/>
+      </p:nvGrpSpPr>
+      <p:grpSpPr>
+        <a:xfrm>
+          <a:off x="0" y="0"/>
+          <a:ext cx="0" cy="0"/>
+          <a:chOff x="0" y="0"/>
+          <a:chExt cx="0" cy="0"/>
+        </a:xfrm>
+      </p:grpSpPr>
+      <p:sp>
+        <p:nvSpPr>
+          <p:cNvPr id="2" name="Segnaposto testo 1"/>
+          <p:cNvSpPr>
+            <a:spLocks noGrp="1"/>
+          </p:cNvSpPr>
+          <p:nvPr>
+            <p:ph type="body" sz="quarter" idx="10"/>
+          </p:nvPr>
+        </p:nvSpPr>
+        <p:spPr/>
+        <p:txBody>
+          <a:bodyPr/>
+          <a:lstStyle/>
+          <a:p>
+            <a:r>
+              <a:rPr lang="it-IT" dirty="0"/>
+              <a:t>Conclusioni</a:t>
+            </a:r>
+          </a:p>
+        </p:txBody>
+      </p:sp>
+      <p:pic>
+        <p:nvPicPr>
+          <p:cNvPr id="4" name="Picture 3"/>
+          <p:cNvPicPr>
+            <a:picLocks noChangeAspect="1" noChangeArrowheads="1"/>
+          </p:cNvPicPr>
+          <p:nvPr/>
+        </p:nvPicPr>
+        <p:blipFill>
+          <a:blip r:embed="rId4" cstate="print">
+            <a:extLst>
+              <a:ext uri="{28A0092B-C50C-407E-A947-70E740481C1C}">
+                <a14:useLocalDpi xmlns:a14="http://schemas.microsoft.com/office/drawing/2010/main" val="0"/>
+              </a:ext>
+            </a:extLst>
+          </a:blip>
+          <a:srcRect/>
+          <a:stretch>
+            <a:fillRect/>
+          </a:stretch>
+        </p:blipFill>
+        <p:spPr bwMode="auto">
+          <a:xfrm>
+            <a:off x="4139933" y="3422267"/>
+            <a:ext cx="3178592" cy="3059371"/>
+          </a:xfrm>
+          <a:prstGeom prst="rect">
+            <a:avLst/>
+          </a:prstGeom>
+          <a:noFill/>
+          <a:ln>
+            <a:noFill/>
+          </a:ln>
+          <a:extLst>
+            <a:ext uri="{909E8E84-426E-40dd-AFC4-6F175D3DCCD1}">
+              <a14:hiddenFill xmlns:a14="http://schemas.microsoft.com/office/drawing/2010/main" xmlns="">
+                <a:solidFill>
+                  <a:schemeClr val="accent1"/>
+                </a:solidFill>
+              </a14:hiddenFill>
+            </a:ext>
+            <a:ext uri="{91240B29-F687-4f45-9708-019B960494DF}">
+              <a14:hiddenLine xmlns:a14="http://schemas.microsoft.com/office/drawing/2010/main" xmlns="" w="9525">
+                <a:solidFill>
+                  <a:schemeClr val="tx1"/>
+                </a:solidFill>
+                <a:miter lim="800000"/>
+                <a:headEnd/>
+                <a:tailEnd/>
+              </a14:hiddenLine>
+            </a:ext>
+          </a:extLst>
+        </p:spPr>
+      </p:pic>
+      <p:sp>
+        <p:nvSpPr>
+          <p:cNvPr id="6" name="CasellaDiTesto 5"/>
+          <p:cNvSpPr txBox="1"/>
+          <p:nvPr/>
+        </p:nvSpPr>
+        <p:spPr>
+          <a:xfrm>
+            <a:off x="1791468" y="1646095"/>
+            <a:ext cx="5561065" cy="1269578"/>
+          </a:xfrm>
+          <a:prstGeom prst="rect">
+            <a:avLst/>
+          </a:prstGeom>
+          <a:noFill/>
+        </p:spPr>
+        <p:txBody>
+          <a:bodyPr wrap="square" rtlCol="0">
+            <a:spAutoFit/>
+          </a:bodyPr>
+          <a:lstStyle/>
+          <a:p>
+            <a:pPr marL="285750" indent="-285750">
+              <a:spcBef>
+                <a:spcPts val="0"/>
+              </a:spcBef>
+              <a:spcAft>
+                <a:spcPts val="500"/>
+              </a:spcAft>
+              <a:buFont typeface="Arial" panose="020B0604020202020204" pitchFamily="34" charset="0"/>
+              <a:buChar char="•"/>
+            </a:pPr>
+            <a:r>
+              <a:rPr lang="it-IT" sz="1600" dirty="0"/>
+              <a:t>Risultato1</a:t>
+            </a:r>
+          </a:p>
+          <a:p>
+            <a:pPr marL="285750" indent="-285750">
+              <a:spcBef>
+                <a:spcPts val="0"/>
+              </a:spcBef>
+              <a:spcAft>
+                <a:spcPts val="500"/>
+              </a:spcAft>
+              <a:buFont typeface="Arial" panose="020B0604020202020204" pitchFamily="34" charset="0"/>
+              <a:buChar char="•"/>
+            </a:pPr>
+            <a:r>
+              <a:rPr lang="it-IT" sz="1600" dirty="0"/>
+              <a:t>Risultato2</a:t>
+            </a:r>
+          </a:p>
+          <a:p>
+            <a:pPr marL="285750" indent="-285750">
+              <a:spcBef>
+                <a:spcPts val="0"/>
+              </a:spcBef>
+              <a:spcAft>
+                <a:spcPts val="500"/>
+              </a:spcAft>
+              <a:buFont typeface="Arial" panose="020B0604020202020204" pitchFamily="34" charset="0"/>
+              <a:buChar char="•"/>
+            </a:pPr>
+            <a:r>
+              <a:rPr lang="it-IT" sz="1600" dirty="0"/>
+              <a:t>Risultato3</a:t>
+            </a:r>
+          </a:p>
+          <a:p>
+            <a:pPr marL="285750" indent="-285750">
+              <a:spcBef>
+                <a:spcPts val="0"/>
+              </a:spcBef>
+              <a:spcAft>
+                <a:spcPts val="500"/>
+              </a:spcAft>
+              <a:buFont typeface="Arial" panose="020B0604020202020204" pitchFamily="34" charset="0"/>
+              <a:buChar char="•"/>
+            </a:pPr>
+            <a:r>
+              <a:rPr lang="it-IT" sz="1600" dirty="0"/>
+              <a:t>Risultato4</a:t>
+            </a:r>
+          </a:p>
+        </p:txBody>
+      </p:sp>
+      <p:sp useBgFill="1">
+        <p:nvSpPr>
+          <p:cNvPr id="9" name="CasellaDiTesto 8"/>
+          <p:cNvSpPr txBox="1"/>
+          <p:nvPr/>
+        </p:nvSpPr>
+        <p:spPr>
+          <a:xfrm>
+            <a:off x="3326538" y="1103225"/>
+            <a:ext cx="2490925" cy="400110"/>
+          </a:xfrm>
+          <a:prstGeom prst="rect">
+            <a:avLst/>
+          </a:prstGeom>
+        </p:spPr>
+        <p:style>
+          <a:lnRef idx="2">
+            <a:schemeClr val="accent1"/>
+          </a:lnRef>
+          <a:fillRef idx="1">
+            <a:schemeClr val="lt1"/>
+          </a:fillRef>
+          <a:effectRef idx="0">
+            <a:schemeClr val="accent1"/>
+          </a:effectRef>
+          <a:fontRef idx="minor">
+            <a:schemeClr val="dk1"/>
+          </a:fontRef>
+        </p:style>
+        <p:txBody>
+          <a:bodyPr wrap="square" rtlCol="0">
+            <a:spAutoFit/>
+          </a:bodyPr>
+          <a:lstStyle/>
+          <a:p>
+            <a:pPr algn="ctr"/>
+            <a:r>
+              <a:rPr lang="it-IT" sz="2000" dirty="0"/>
+              <a:t>Risultati Scientifici</a:t>
+            </a:r>
+          </a:p>
+        </p:txBody>
+      </p:sp>
+      <p:sp>
+        <p:nvSpPr>
+          <p:cNvPr id="10" name="CasellaDiTesto 9"/>
+          <p:cNvSpPr txBox="1"/>
+          <p:nvPr/>
+        </p:nvSpPr>
+        <p:spPr>
+          <a:xfrm>
+            <a:off x="1649008" y="4854818"/>
+            <a:ext cx="2490925" cy="707886"/>
+          </a:xfrm>
+          <a:prstGeom prst="rect">
+            <a:avLst/>
+          </a:prstGeom>
+        </p:spPr>
+        <p:style>
+          <a:lnRef idx="2">
+            <a:schemeClr val="accent1"/>
+          </a:lnRef>
+          <a:fillRef idx="1">
+            <a:schemeClr val="lt1"/>
+          </a:fillRef>
+          <a:effectRef idx="0">
+            <a:schemeClr val="accent1"/>
+          </a:effectRef>
+          <a:fontRef idx="minor">
+            <a:schemeClr val="dk1"/>
+          </a:fontRef>
+        </p:style>
+        <p:txBody>
+          <a:bodyPr wrap="square" rtlCol="0">
+            <a:spAutoFit/>
+          </a:bodyPr>
+          <a:lstStyle/>
+          <a:p>
+            <a:pPr algn="ctr"/>
+            <a:r>
+              <a:rPr lang="it-IT" sz="2000" dirty="0"/>
+              <a:t>Risultati Industriali</a:t>
+            </a:r>
+          </a:p>
+          <a:p>
+            <a:pPr algn="ctr"/>
+            <a:r>
+              <a:rPr lang="it-IT" sz="2000" dirty="0"/>
+              <a:t>e/o Sviluppi Futuri</a:t>
+            </a:r>
+          </a:p>
+        </p:txBody>
+      </p:sp>
+      <p:sp>
+        <p:nvSpPr>
+          <p:cNvPr id="16" name="CasellaDiTesto 15"/>
+          <p:cNvSpPr txBox="1"/>
+          <p:nvPr/>
+        </p:nvSpPr>
+        <p:spPr>
+          <a:xfrm rot="21433596">
+            <a:off x="4498471" y="4124244"/>
+            <a:ext cx="2465271" cy="1933863"/>
+          </a:xfrm>
+          <a:prstGeom prst="rect">
+            <a:avLst/>
+          </a:prstGeom>
+          <a:noFill/>
+        </p:spPr>
+        <p:txBody>
+          <a:bodyPr wrap="square" rtlCol="0">
+            <a:spAutoFit/>
+          </a:bodyPr>
+          <a:lstStyle/>
+          <a:p>
+            <a:pPr marL="285750" indent="-285750">
+              <a:spcBef>
+                <a:spcPts val="0"/>
+              </a:spcBef>
+              <a:spcAft>
+                <a:spcPts val="1000"/>
+              </a:spcAft>
+              <a:buFont typeface="Arial" panose="020B0604020202020204" pitchFamily="34" charset="0"/>
+              <a:buChar char="•"/>
+            </a:pPr>
+            <a:r>
+              <a:rPr lang="it-IT" sz="1600" dirty="0"/>
+              <a:t>Risultato1</a:t>
+            </a:r>
+          </a:p>
+          <a:p>
+            <a:pPr>
+              <a:spcBef>
+                <a:spcPts val="0"/>
+              </a:spcBef>
+              <a:spcAft>
+                <a:spcPts val="1000"/>
+              </a:spcAft>
+            </a:pPr>
+            <a:endParaRPr lang="it-IT" sz="1000" dirty="0"/>
+          </a:p>
+          <a:p>
+            <a:pPr marL="285750" indent="-285750">
+              <a:spcBef>
+                <a:spcPts val="0"/>
+              </a:spcBef>
+              <a:spcAft>
+                <a:spcPts val="1000"/>
+              </a:spcAft>
+              <a:buFont typeface="Arial" panose="020B0604020202020204" pitchFamily="34" charset="0"/>
+              <a:buChar char="•"/>
+            </a:pPr>
+            <a:r>
+              <a:rPr lang="it-IT" sz="1600" dirty="0"/>
+              <a:t>Risultato2</a:t>
+            </a:r>
+          </a:p>
+          <a:p>
+            <a:pPr>
+              <a:spcBef>
+                <a:spcPts val="0"/>
+              </a:spcBef>
+              <a:spcAft>
+                <a:spcPts val="1000"/>
+              </a:spcAft>
+            </a:pPr>
+            <a:endParaRPr lang="it-IT" sz="1000" dirty="0"/>
+          </a:p>
+          <a:p>
+            <a:pPr marL="285750" indent="-285750">
+              <a:spcBef>
+                <a:spcPts val="0"/>
+              </a:spcBef>
+              <a:spcAft>
+                <a:spcPts val="1000"/>
+              </a:spcAft>
+              <a:buFont typeface="Arial" panose="020B0604020202020204" pitchFamily="34" charset="0"/>
+              <a:buChar char="•"/>
+            </a:pPr>
+            <a:r>
+              <a:rPr lang="it-IT" sz="1600" dirty="0"/>
+              <a:t>Risultato3</a:t>
+            </a:r>
+          </a:p>
+          <a:p>
+            <a:pPr>
+              <a:spcBef>
+                <a:spcPts val="0"/>
+              </a:spcBef>
+              <a:spcAft>
+                <a:spcPts val="1000"/>
+              </a:spcAft>
+            </a:pPr>
+            <a:endParaRPr lang="it-IT" sz="1000" dirty="0"/>
+          </a:p>
+        </p:txBody>
+      </p:sp>
+    </p:spTree>
+    <p:custDataLst>
+      <p:tags r:id="rId1"/>
+    </p:custDataLst>
+    <p:extLst>
+      <p:ext uri="{BB962C8B-B14F-4D97-AF65-F5344CB8AC3E}">
+        <p14:creationId xmlns:p14="http://schemas.microsoft.com/office/powerpoint/2010/main" val="1562047360"/>
+      </p:ext>
+    </p:extLst>
+  </p:cSld>
+  <p:clrMapOvr>
+    <a:masterClrMapping/>
+  </p:clrMapOvr>
+  <mc:AlternateContent xmlns:mc="http://schemas.openxmlformats.org/markup-compatibility/2006" xmlns:p14="http://schemas.microsoft.com/office/powerpoint/2010/main">
+    <mc:Choice Requires="p14">
+      <p:transition spd="slow" p14:dur="2000" advTm="9545"/>
+    </mc:Choice>
+    <mc:Fallback xmlns="">
+      <p:transition xmlns:p14="http://schemas.microsoft.com/office/powerpoint/2010/main" spd="slow" advTm="9545"/>
+    </mc:Fallback>
+  </mc:AlternateContent>
+  <p:timing>
+    <p:tnLst>
+      <p:par>
+        <p:cTn id="1" dur="indefinite" restart="never" nodeType="tmRoot">
+          <p:childTnLst>
+            <p:seq concurrent="1" nextAc="seek">
+              <p:cTn id="2" dur="indefinite" nodeType="mainSeq">
+                <p:childTnLst>
+                  <p:par>
+                    <p:cTn id="3" fill="hold">
+                      <p:stCondLst>
+                        <p:cond delay="indefinite"/>
+                      </p:stCondLst>
+                      <p:childTnLst>
+                        <p:par>
+                          <p:cTn id="4" fill="hold">
+                            <p:stCondLst>
+                              <p:cond delay="0"/>
+                            </p:stCondLst>
+                            <p:childTnLst>
+                              <p:par>
+                                <p:cTn id="5" presetID="1" presetClass="entr" presetSubtype="0" fill="hold" grpId="0" nodeType="clickEffect">
+                                  <p:stCondLst>
+                                    <p:cond delay="0"/>
+                                  </p:stCondLst>
+                                  <p:childTnLst>
+                                    <p:set>
+                                      <p:cBhvr>
+                                        <p:cTn id="6" dur="1" fill="hold">
+                                          <p:stCondLst>
+                                            <p:cond delay="0"/>
+                                          </p:stCondLst>
+                                        </p:cTn>
+                                        <p:tgtEl>
+                                          <p:spTgt spid="16"/>
+                                        </p:tgtEl>
+                                        <p:attrNameLst>
+                                          <p:attrName>style.visibility</p:attrName>
+                                        </p:attrNameLst>
+                                      </p:cBhvr>
+                                      <p:to>
+                                        <p:strVal val="visible"/>
+                                      </p:to>
+                                    </p:set>
+                                  </p:childTnLst>
+                                </p:cTn>
+                              </p:par>
+                              <p:par>
+                                <p:cTn id="7" presetID="1" presetClass="entr" presetSubtype="0" fill="hold" nodeType="withEffect">
+                                  <p:stCondLst>
+                                    <p:cond delay="0"/>
+                                  </p:stCondLst>
+                                  <p:childTnLst>
+                                    <p:set>
+                                      <p:cBhvr>
+                                        <p:cTn id="8" dur="1" fill="hold">
+                                          <p:stCondLst>
+                                            <p:cond delay="0"/>
+                                          </p:stCondLst>
+                                        </p:cTn>
+                                        <p:tgtEl>
+                                          <p:spTgt spid="4"/>
+                                        </p:tgtEl>
+                                        <p:attrNameLst>
+                                          <p:attrName>style.visibility</p:attrName>
+                                        </p:attrNameLst>
+                                      </p:cBhvr>
+                                      <p:to>
+                                        <p:strVal val="visible"/>
+                                      </p:to>
+                                    </p:set>
+                                  </p:childTnLst>
+                                </p:cTn>
+                              </p:par>
+                              <p:par>
+                                <p:cTn id="9" presetID="1" presetClass="entr" presetSubtype="0" fill="hold" grpId="0" nodeType="withEffect">
+                                  <p:stCondLst>
+                                    <p:cond delay="0"/>
+                                  </p:stCondLst>
+                                  <p:childTnLst>
+                                    <p:set>
+                                      <p:cBhvr>
+                                        <p:cTn id="10" dur="1" fill="hold">
+                                          <p:stCondLst>
+                                            <p:cond delay="0"/>
+                                          </p:stCondLst>
+                                        </p:cTn>
+                                        <p:tgtEl>
+                                          <p:spTgt spid="10"/>
+                                        </p:tgtEl>
+                                        <p:attrNameLst>
+                                          <p:attrName>style.visibility</p:attrName>
+                                        </p:attrNameLst>
+                                      </p:cBhvr>
+                                      <p:to>
+                                        <p:strVal val="visible"/>
+                                      </p:to>
+                                    </p:set>
+                                  </p:childTnLst>
+                                </p:cTn>
+                              </p:par>
+                            </p:childTnLst>
+                          </p:cTn>
+                        </p:par>
+                      </p:childTnLst>
+                    </p:cTn>
+                  </p:par>
+                </p:childTnLst>
+              </p:cTn>
+              <p:prevCondLst>
+                <p:cond evt="onPrev" delay="0">
+                  <p:tgtEl>
+                    <p:sldTgt/>
+                  </p:tgtEl>
+                </p:cond>
+              </p:prevCondLst>
+              <p:nextCondLst>
+                <p:cond evt="onNext" delay="0">
+                  <p:tgtEl>
+                    <p:sldTgt/>
+                  </p:tgtEl>
+                </p:cond>
+              </p:nextCondLst>
+            </p:seq>
+          </p:childTnLst>
+        </p:cTn>
+      </p:par>
+    </p:tnLst>
+    <p:bldLst>
+      <p:bldP spid="10" grpId="0" animBg="1"/>
+      <p:bldP spid="16" grpId="0"/>
+    </p:bldLst>
+  </p:timing>
+</p:sld>
+</file>
+
+<file path=ppt/slides/slide11.xml><?xml version="1.0" encoding="utf-8"?>
+<p:sld xmlns:a="http://schemas.openxmlformats.org/drawingml/2006/main" xmlns:r="http://schemas.openxmlformats.org/officeDocument/2006/relationships" xmlns:p="http://schemas.openxmlformats.org/presentationml/2006/main">
+  <p:cSld>
+    <p:spTree>
+      <p:nvGrpSpPr>
+        <p:cNvPr id="1" name=""/>
+        <p:cNvGrpSpPr/>
+        <p:nvPr/>
+      </p:nvGrpSpPr>
+      <p:grpSpPr>
+        <a:xfrm>
+          <a:off x="0" y="0"/>
+          <a:ext cx="0" cy="0"/>
+          <a:chOff x="0" y="0"/>
+          <a:chExt cx="0" cy="0"/>
+        </a:xfrm>
+      </p:grpSpPr>
+      <p:pic>
+        <p:nvPicPr>
+          <p:cNvPr id="5" name="Immagine 4" descr="logoPoliMi.png"/>
+          <p:cNvPicPr>
+            <a:picLocks noChangeAspect="1"/>
+          </p:cNvPicPr>
+          <p:nvPr/>
+        </p:nvPicPr>
+        <p:blipFill>
+          <a:blip r:embed="rId2" cstate="email">
+            <a:extLst>
+              <a:ext uri="{28A0092B-C50C-407E-A947-70E740481C1C}">
+                <a14:useLocalDpi xmlns:a14="http://schemas.microsoft.com/office/drawing/2010/main" val="0"/>
+              </a:ext>
+            </a:extLst>
+          </a:blip>
+          <a:stretch>
+            <a:fillRect/>
+          </a:stretch>
+        </p:blipFill>
+        <p:spPr>
+          <a:xfrm>
+            <a:off x="3534078" y="2499218"/>
+            <a:ext cx="2075845" cy="2075845"/>
+          </a:xfrm>
+          <a:prstGeom prst="rect">
+            <a:avLst/>
+          </a:prstGeom>
+        </p:spPr>
+      </p:pic>
+      <p:sp>
+        <p:nvSpPr>
+          <p:cNvPr id="7" name="Segnaposto testo 6"/>
+          <p:cNvSpPr>
+            <a:spLocks noGrp="1"/>
+          </p:cNvSpPr>
+          <p:nvPr>
+            <p:ph type="body" sz="quarter" idx="10"/>
+          </p:nvPr>
+        </p:nvSpPr>
+        <p:spPr/>
+        <p:txBody>
+          <a:bodyPr/>
+          <a:lstStyle/>
+          <a:p>
+            <a:r>
+              <a:rPr lang="it-IT" dirty="0"/>
+              <a:t>FINE</a:t>
+            </a:r>
+          </a:p>
+        </p:txBody>
+      </p:sp>
+    </p:spTree>
+    <p:extLst>
+      <p:ext uri="{BB962C8B-B14F-4D97-AF65-F5344CB8AC3E}">
+        <p14:creationId xmlns:p14="http://schemas.microsoft.com/office/powerpoint/2010/main" val="1982816369"/>
+      </p:ext>
+    </p:extLst>
+  </p:cSld>
+  <p:clrMapOvr>
+    <a:masterClrMapping/>
+  </p:clrMapOvr>
+  <mc:AlternateContent xmlns:mc="http://schemas.openxmlformats.org/markup-compatibility/2006" xmlns:p14="http://schemas.microsoft.com/office/powerpoint/2010/main">
+    <mc:Choice Requires="p14">
+      <p:transition spd="slow" p14:dur="2000" advTm="5275"/>
+    </mc:Choice>
+    <mc:Fallback xmlns="">
+      <p:transition xmlns:p14="http://schemas.microsoft.com/office/powerpoint/2010/main" spd="slow" advTm="5275"/>
     </mc:Fallback>
   </mc:AlternateContent>
 </p:sld>
@@ -5772,16 +6808,46 @@
           </a:p>
         </p:txBody>
       </p:sp>
+      <p:pic>
+        <p:nvPicPr>
+          <p:cNvPr id="5" name="Picture 4"/>
+          <p:cNvPicPr>
+            <a:picLocks noChangeAspect="1"/>
+          </p:cNvPicPr>
+          <p:nvPr/>
+        </p:nvPicPr>
+        <p:blipFill>
+          <a:blip r:embed="rId4">
+            <a:extLst>
+              <a:ext uri="{28A0092B-C50C-407E-A947-70E740481C1C}">
+                <a14:useLocalDpi xmlns:a14="http://schemas.microsoft.com/office/drawing/2010/main" val="0"/>
+              </a:ext>
+            </a:extLst>
+          </a:blip>
+          <a:stretch>
+            <a:fillRect/>
+          </a:stretch>
+        </p:blipFill>
+        <p:spPr>
+          <a:xfrm>
+            <a:off x="834765" y="2537717"/>
+            <a:ext cx="7885118" cy="3513762"/>
+          </a:xfrm>
+          <a:prstGeom prst="rect">
+            <a:avLst/>
+          </a:prstGeom>
+        </p:spPr>
+      </p:pic>
       <p:sp>
         <p:nvSpPr>
-          <p:cNvPr id="3" name="CasellaDiTesto 2"/>
+          <p:cNvPr id="6" name="CasellaDiTesto 9"/>
           <p:cNvSpPr txBox="1"/>
           <p:nvPr/>
         </p:nvSpPr>
         <p:spPr>
           <a:xfrm>
-            <a:off x="3555661" y="3244334"/>
-            <a:ext cx="1249060" cy="369332"/>
+            <a:off x="299798" y="1185506"/>
+            <a:ext cx="7642125" cy="1200329"/>
           </a:xfrm>
           <a:prstGeom prst="rect">
             <a:avLst/>
@@ -5789,15 +6855,41 @@
           <a:noFill/>
         </p:spPr>
         <p:txBody>
-          <a:bodyPr wrap="none" rtlCol="0">
+          <a:bodyPr wrap="square" rtlCol="0">
             <a:spAutoFit/>
           </a:bodyPr>
           <a:lstStyle/>
           <a:p>
-            <a:r>
-              <a:rPr lang="it-IT" dirty="0"/>
-              <a:t>Contenuto</a:t>
-            </a:r>
+            <a:pPr marL="285750" indent="-285750">
+              <a:buFont typeface="Arial"/>
+              <a:buChar char="•"/>
+            </a:pPr>
+            <a:r>
+              <a:rPr lang="it-IT" sz="2400" dirty="0"/>
+              <a:t>Activity e </a:t>
+            </a:r>
+            <a:r>
+              <a:rPr lang="it-IT" sz="2400" dirty="0" err="1"/>
+              <a:t>Fragment</a:t>
+            </a:r>
+            <a:endParaRPr lang="it-IT" sz="2400" dirty="0"/>
+          </a:p>
+          <a:p>
+            <a:pPr marL="285750" indent="-285750">
+              <a:buFont typeface="Arial"/>
+              <a:buChar char="•"/>
+            </a:pPr>
+            <a:r>
+              <a:rPr lang="it-IT" sz="2400" dirty="0"/>
+              <a:t>Diversi stadi di funzionamento</a:t>
+            </a:r>
+          </a:p>
+          <a:p>
+            <a:pPr marL="285750" indent="-285750">
+              <a:buFont typeface="Arial"/>
+              <a:buChar char="•"/>
+            </a:pPr>
+            <a:endParaRPr lang="it-IT" sz="2400" dirty="0"/>
           </a:p>
         </p:txBody>
       </p:sp>
@@ -5859,75 +6951,21 @@
           <a:p>
             <a:r>
               <a:rPr lang="it-IT" dirty="0"/>
-              <a:t>Conclusioni</a:t>
+              <a:t>Gestione del Lifecycle</a:t>
             </a:r>
           </a:p>
         </p:txBody>
       </p:sp>
-      <p:pic>
-        <p:nvPicPr>
-          <p:cNvPr id="4" name="Picture 3"/>
-          <p:cNvPicPr>
-            <a:picLocks noChangeAspect="1" noChangeArrowheads="1"/>
-          </p:cNvPicPr>
-          <p:nvPr/>
-        </p:nvPicPr>
-        <p:blipFill>
-          <a:blip r:embed="rId4" cstate="print">
-            <a:extLst>
-              <a:ext uri="{28A0092B-C50C-407E-A947-70E740481C1C}">
-                <a14:useLocalDpi xmlns:a14="http://schemas.microsoft.com/office/drawing/2010/main" val="0"/>
-              </a:ext>
-            </a:extLst>
-          </a:blip>
-          <a:srcRect/>
-          <a:stretch>
-            <a:fillRect/>
-          </a:stretch>
-        </p:blipFill>
-        <p:spPr bwMode="auto">
-          <a:xfrm>
-            <a:off x="4139933" y="3422267"/>
-            <a:ext cx="3178592" cy="3059371"/>
-          </a:xfrm>
-          <a:prstGeom prst="rect">
-            <a:avLst/>
-          </a:prstGeom>
-          <a:noFill/>
-          <a:ln>
-            <a:noFill/>
-          </a:ln>
-          <a:extLst>
-            <a:ext uri="{909E8E84-426E-40dd-AFC4-6F175D3DCCD1}">
-              <a14:hiddenFill xmlns:a14="http://schemas.microsoft.com/office/drawing/2010/main" xmlns="">
-                <a:solidFill>
-                  <a:schemeClr val="accent1"/>
-                </a:solidFill>
-              </a14:hiddenFill>
-            </a:ext>
-            <a:ext uri="{91240B29-F687-4f45-9708-019B960494DF}">
-              <a14:hiddenLine xmlns:a14="http://schemas.microsoft.com/office/drawing/2010/main" xmlns="" w="9525">
-                <a:solidFill>
-                  <a:schemeClr val="tx1"/>
-                </a:solidFill>
-                <a:miter lim="800000"/>
-                <a:headEnd/>
-                <a:tailEnd/>
-              </a14:hiddenLine>
-            </a:ext>
-          </a:extLst>
-        </p:spPr>
-      </p:pic>
       <p:sp>
         <p:nvSpPr>
-          <p:cNvPr id="6" name="CasellaDiTesto 5"/>
+          <p:cNvPr id="6" name="CasellaDiTesto 9"/>
           <p:cNvSpPr txBox="1"/>
           <p:nvPr/>
         </p:nvSpPr>
         <p:spPr>
           <a:xfrm>
-            <a:off x="1791468" y="1646095"/>
-            <a:ext cx="5561065" cy="1269578"/>
+            <a:off x="299798" y="1185506"/>
+            <a:ext cx="7642125" cy="3416320"/>
           </a:xfrm>
           <a:prstGeom prst="rect">
             <a:avLst/>
@@ -5941,264 +6979,83 @@
           <a:lstStyle/>
           <a:p>
             <a:pPr marL="285750" indent="-285750">
-              <a:spcBef>
-                <a:spcPts val="0"/>
-              </a:spcBef>
-              <a:spcAft>
-                <a:spcPts val="500"/>
-              </a:spcAft>
-              <a:buFont typeface="Arial" panose="020B0604020202020204" pitchFamily="34" charset="0"/>
+              <a:buFont typeface="Arial"/>
               <a:buChar char="•"/>
             </a:pPr>
             <a:r>
-              <a:rPr lang="it-IT" sz="1600" dirty="0"/>
-              <a:t>Risultato1</a:t>
-            </a:r>
-          </a:p>
-          <a:p>
-            <a:pPr marL="285750" indent="-285750">
-              <a:spcBef>
-                <a:spcPts val="0"/>
-              </a:spcBef>
-              <a:spcAft>
-                <a:spcPts val="500"/>
-              </a:spcAft>
-              <a:buFont typeface="Arial" panose="020B0604020202020204" pitchFamily="34" charset="0"/>
+              <a:rPr lang="it-IT" sz="2400" dirty="0"/>
+              <a:t>Evitare spreco di risorse</a:t>
+            </a:r>
+          </a:p>
+          <a:p>
+            <a:pPr marL="742950" lvl="1" indent="-285750">
+              <a:buFont typeface="Arial"/>
               <a:buChar char="•"/>
             </a:pPr>
             <a:r>
-              <a:rPr lang="it-IT" sz="1600" dirty="0"/>
-              <a:t>Risultato2</a:t>
+              <a:rPr lang="it-IT" sz="2400" dirty="0"/>
+              <a:t>es. sensori</a:t>
             </a:r>
           </a:p>
           <a:p>
             <a:pPr marL="285750" indent="-285750">
-              <a:spcBef>
-                <a:spcPts val="0"/>
-              </a:spcBef>
-              <a:spcAft>
-                <a:spcPts val="500"/>
-              </a:spcAft>
-              <a:buFont typeface="Arial" panose="020B0604020202020204" pitchFamily="34" charset="0"/>
+              <a:buFont typeface="Arial"/>
               <a:buChar char="•"/>
             </a:pPr>
             <a:r>
-              <a:rPr lang="it-IT" sz="1600" dirty="0"/>
-              <a:t>Risultato3</a:t>
-            </a:r>
-          </a:p>
-          <a:p>
-            <a:pPr marL="285750" indent="-285750">
-              <a:spcBef>
-                <a:spcPts val="0"/>
-              </a:spcBef>
-              <a:spcAft>
-                <a:spcPts val="500"/>
-              </a:spcAft>
-              <a:buFont typeface="Arial" panose="020B0604020202020204" pitchFamily="34" charset="0"/>
+              <a:rPr lang="it-IT" sz="2400" dirty="0"/>
+              <a:t>Fermare l’esecuzione se l’utente lascia l’applicazione</a:t>
+            </a:r>
+          </a:p>
+          <a:p>
+            <a:pPr marL="742950" lvl="1" indent="-285750">
+              <a:buFont typeface="Arial"/>
               <a:buChar char="•"/>
             </a:pPr>
             <a:r>
-              <a:rPr lang="it-IT" sz="1600" dirty="0"/>
-              <a:t>Risultato4</a:t>
-            </a:r>
-          </a:p>
-        </p:txBody>
-      </p:sp>
-      <p:sp useBgFill="1">
-        <p:nvSpPr>
-          <p:cNvPr id="9" name="CasellaDiTesto 8"/>
-          <p:cNvSpPr txBox="1"/>
-          <p:nvPr/>
-        </p:nvSpPr>
-        <p:spPr>
-          <a:xfrm>
-            <a:off x="3326538" y="1103225"/>
-            <a:ext cx="2490925" cy="400110"/>
-          </a:xfrm>
-          <a:prstGeom prst="rect">
-            <a:avLst/>
-          </a:prstGeom>
-        </p:spPr>
-        <p:style>
-          <a:lnRef idx="2">
-            <a:schemeClr val="accent1"/>
-          </a:lnRef>
-          <a:fillRef idx="1">
-            <a:schemeClr val="lt1"/>
-          </a:fillRef>
-          <a:effectRef idx="0">
-            <a:schemeClr val="accent1"/>
-          </a:effectRef>
-          <a:fontRef idx="minor">
-            <a:schemeClr val="dk1"/>
-          </a:fontRef>
-        </p:style>
-        <p:txBody>
-          <a:bodyPr wrap="square" rtlCol="0">
-            <a:spAutoFit/>
-          </a:bodyPr>
-          <a:lstStyle/>
-          <a:p>
-            <a:pPr algn="ctr"/>
-            <a:r>
-              <a:rPr lang="it-IT" sz="2000" dirty="0"/>
-              <a:t>Risultati Scientifici</a:t>
-            </a:r>
-          </a:p>
-        </p:txBody>
-      </p:sp>
-      <p:sp>
-        <p:nvSpPr>
-          <p:cNvPr id="10" name="CasellaDiTesto 9"/>
-          <p:cNvSpPr txBox="1"/>
-          <p:nvPr/>
-        </p:nvSpPr>
-        <p:spPr>
-          <a:xfrm>
-            <a:off x="1649008" y="4854818"/>
-            <a:ext cx="2490925" cy="707886"/>
-          </a:xfrm>
-          <a:prstGeom prst="rect">
-            <a:avLst/>
-          </a:prstGeom>
-        </p:spPr>
-        <p:style>
-          <a:lnRef idx="2">
-            <a:schemeClr val="accent1"/>
-          </a:lnRef>
-          <a:fillRef idx="1">
-            <a:schemeClr val="lt1"/>
-          </a:fillRef>
-          <a:effectRef idx="0">
-            <a:schemeClr val="accent1"/>
-          </a:effectRef>
-          <a:fontRef idx="minor">
-            <a:schemeClr val="dk1"/>
-          </a:fontRef>
-        </p:style>
-        <p:txBody>
-          <a:bodyPr wrap="square" rtlCol="0">
-            <a:spAutoFit/>
-          </a:bodyPr>
-          <a:lstStyle/>
-          <a:p>
-            <a:pPr algn="ctr"/>
-            <a:r>
-              <a:rPr lang="it-IT" sz="2000" dirty="0"/>
-              <a:t>Risultati Industriali</a:t>
-            </a:r>
-          </a:p>
-          <a:p>
-            <a:pPr algn="ctr"/>
-            <a:r>
-              <a:rPr lang="it-IT" sz="2000" dirty="0"/>
-              <a:t>e/o Sviluppi Futuri</a:t>
-            </a:r>
-          </a:p>
-        </p:txBody>
-      </p:sp>
-      <p:sp>
-        <p:nvSpPr>
-          <p:cNvPr id="16" name="CasellaDiTesto 15"/>
-          <p:cNvSpPr txBox="1"/>
-          <p:nvPr/>
-        </p:nvSpPr>
-        <p:spPr>
-          <a:xfrm rot="21433596">
-            <a:off x="4498471" y="4124244"/>
-            <a:ext cx="2465271" cy="1933863"/>
-          </a:xfrm>
-          <a:prstGeom prst="rect">
-            <a:avLst/>
-          </a:prstGeom>
-          <a:noFill/>
-        </p:spPr>
-        <p:txBody>
-          <a:bodyPr wrap="square" rtlCol="0">
-            <a:spAutoFit/>
-          </a:bodyPr>
-          <a:lstStyle/>
+              <a:rPr lang="it-IT" sz="2400" dirty="0"/>
+              <a:t>es. gioco si ferma se arriva una chiamata</a:t>
+            </a:r>
+          </a:p>
           <a:p>
             <a:pPr marL="285750" indent="-285750">
-              <a:spcBef>
-                <a:spcPts val="0"/>
-              </a:spcBef>
-              <a:spcAft>
-                <a:spcPts val="1000"/>
-              </a:spcAft>
-              <a:buFont typeface="Arial" panose="020B0604020202020204" pitchFamily="34" charset="0"/>
+              <a:buFont typeface="Arial"/>
               <a:buChar char="•"/>
             </a:pPr>
             <a:r>
-              <a:rPr lang="it-IT" sz="1600" dirty="0"/>
-              <a:t>Risultato1</a:t>
-            </a:r>
-          </a:p>
-          <a:p>
-            <a:pPr>
-              <a:spcBef>
-                <a:spcPts val="0"/>
-              </a:spcBef>
-              <a:spcAft>
-                <a:spcPts val="1000"/>
-              </a:spcAft>
-            </a:pPr>
-            <a:endParaRPr lang="it-IT" sz="1000" dirty="0"/>
-          </a:p>
-          <a:p>
-            <a:pPr marL="285750" indent="-285750">
-              <a:spcBef>
-                <a:spcPts val="0"/>
-              </a:spcBef>
-              <a:spcAft>
-                <a:spcPts val="1000"/>
-              </a:spcAft>
-              <a:buFont typeface="Arial" panose="020B0604020202020204" pitchFamily="34" charset="0"/>
+              <a:rPr lang="it-IT" sz="2400" dirty="0"/>
+              <a:t>Mantenere lo stato se l’utente lascia l’applicazione </a:t>
+            </a:r>
+          </a:p>
+          <a:p>
+            <a:pPr marL="742950" lvl="1" indent="-285750">
+              <a:buFont typeface="Arial"/>
               <a:buChar char="•"/>
             </a:pPr>
             <a:r>
-              <a:rPr lang="it-IT" sz="1600" dirty="0"/>
-              <a:t>Risultato2</a:t>
-            </a:r>
-          </a:p>
-          <a:p>
-            <a:pPr>
-              <a:spcBef>
-                <a:spcPts val="0"/>
-              </a:spcBef>
-              <a:spcAft>
-                <a:spcPts val="1000"/>
-              </a:spcAft>
-            </a:pPr>
-            <a:endParaRPr lang="it-IT" sz="1000" dirty="0"/>
+              <a:rPr lang="it-IT" sz="2400" dirty="0"/>
+              <a:t>es. messaggio scritto parzialmente</a:t>
+            </a:r>
           </a:p>
           <a:p>
             <a:pPr marL="285750" indent="-285750">
-              <a:spcBef>
-                <a:spcPts val="0"/>
-              </a:spcBef>
-              <a:spcAft>
-                <a:spcPts val="1000"/>
-              </a:spcAft>
-              <a:buFont typeface="Arial" panose="020B0604020202020204" pitchFamily="34" charset="0"/>
+              <a:buFont typeface="Arial"/>
               <a:buChar char="•"/>
             </a:pPr>
             <a:r>
-              <a:rPr lang="it-IT" sz="1600" dirty="0"/>
-              <a:t>Risultato3</a:t>
-            </a:r>
-          </a:p>
-          <a:p>
-            <a:pPr>
-              <a:spcBef>
-                <a:spcPts val="0"/>
-              </a:spcBef>
-              <a:spcAft>
-                <a:spcPts val="1000"/>
-              </a:spcAft>
+              <a:rPr lang="it-IT" sz="2400" dirty="0"/>
+              <a:t>Adattarsi ai cambi di configurazione</a:t>
+            </a:r>
+          </a:p>
+          <a:p>
+            <a:pPr marL="742950" lvl="1" indent="-285750">
+              <a:buFont typeface="Arial"/>
+              <a:buChar char="•"/>
             </a:pPr>
-            <a:endParaRPr lang="it-IT" sz="1000" dirty="0"/>
+            <a:r>
+              <a:rPr lang="it-IT" sz="2400" dirty="0"/>
+              <a:t>es. rotazione</a:t>
+            </a:r>
           </a:p>
         </p:txBody>
       </p:sp>
@@ -6208,7 +7065,7 @@
     </p:custDataLst>
     <p:extLst>
       <p:ext uri="{BB962C8B-B14F-4D97-AF65-F5344CB8AC3E}">
-        <p14:creationId xmlns:p14="http://schemas.microsoft.com/office/powerpoint/2010/main" val="1562047360"/>
+        <p14:creationId xmlns:p14="http://schemas.microsoft.com/office/powerpoint/2010/main" val="2826281153"/>
       </p:ext>
     </p:extLst>
   </p:cSld>
@@ -6217,145 +7074,12 @@
   </p:clrMapOvr>
   <mc:AlternateContent xmlns:mc="http://schemas.openxmlformats.org/markup-compatibility/2006" xmlns:p14="http://schemas.microsoft.com/office/powerpoint/2010/main">
     <mc:Choice Requires="p14">
-      <p:transition spd="slow" p14:dur="2000" advTm="9545"/>
+      <p:transition spd="slow" p14:dur="2000" advTm="51149"/>
     </mc:Choice>
     <mc:Fallback xmlns="">
-      <p:transition xmlns:p14="http://schemas.microsoft.com/office/powerpoint/2010/main" spd="slow" advTm="9545"/>
+      <p:transition xmlns:p14="http://schemas.microsoft.com/office/powerpoint/2010/main" spd="slow" advTm="51149"/>
     </mc:Fallback>
   </mc:AlternateContent>
-  <p:timing>
-    <p:tnLst>
-      <p:par>
-        <p:cTn id="1" dur="indefinite" restart="never" nodeType="tmRoot">
-          <p:childTnLst>
-            <p:seq concurrent="1" nextAc="seek">
-              <p:cTn id="2" dur="indefinite" nodeType="mainSeq">
-                <p:childTnLst>
-                  <p:par>
-                    <p:cTn id="3" fill="hold">
-                      <p:stCondLst>
-                        <p:cond delay="indefinite"/>
-                      </p:stCondLst>
-                      <p:childTnLst>
-                        <p:par>
-                          <p:cTn id="4" fill="hold">
-                            <p:stCondLst>
-                              <p:cond delay="0"/>
-                            </p:stCondLst>
-                            <p:childTnLst>
-                              <p:par>
-                                <p:cTn id="5" presetID="1" presetClass="entr" presetSubtype="0" fill="hold" grpId="0" nodeType="clickEffect">
-                                  <p:stCondLst>
-                                    <p:cond delay="0"/>
-                                  </p:stCondLst>
-                                  <p:childTnLst>
-                                    <p:set>
-                                      <p:cBhvr>
-                                        <p:cTn id="6" dur="1" fill="hold">
-                                          <p:stCondLst>
-                                            <p:cond delay="0"/>
-                                          </p:stCondLst>
-                                        </p:cTn>
-                                        <p:tgtEl>
-                                          <p:spTgt spid="16"/>
-                                        </p:tgtEl>
-                                        <p:attrNameLst>
-                                          <p:attrName>style.visibility</p:attrName>
-                                        </p:attrNameLst>
-                                      </p:cBhvr>
-                                      <p:to>
-                                        <p:strVal val="visible"/>
-                                      </p:to>
-                                    </p:set>
-                                  </p:childTnLst>
-                                </p:cTn>
-                              </p:par>
-                              <p:par>
-                                <p:cTn id="7" presetID="1" presetClass="entr" presetSubtype="0" fill="hold" nodeType="withEffect">
-                                  <p:stCondLst>
-                                    <p:cond delay="0"/>
-                                  </p:stCondLst>
-                                  <p:childTnLst>
-                                    <p:set>
-                                      <p:cBhvr>
-                                        <p:cTn id="8" dur="1" fill="hold">
-                                          <p:stCondLst>
-                                            <p:cond delay="0"/>
-                                          </p:stCondLst>
-                                        </p:cTn>
-                                        <p:tgtEl>
-                                          <p:spTgt spid="4"/>
-                                        </p:tgtEl>
-                                        <p:attrNameLst>
-                                          <p:attrName>style.visibility</p:attrName>
-                                        </p:attrNameLst>
-                                      </p:cBhvr>
-                                      <p:to>
-                                        <p:strVal val="visible"/>
-                                      </p:to>
-                                    </p:set>
-                                  </p:childTnLst>
-                                </p:cTn>
-                              </p:par>
-                              <p:par>
-                                <p:cTn id="9" presetID="1" presetClass="entr" presetSubtype="0" fill="hold" grpId="0" nodeType="withEffect">
-                                  <p:stCondLst>
-                                    <p:cond delay="0"/>
-                                  </p:stCondLst>
-                                  <p:childTnLst>
-                                    <p:set>
-                                      <p:cBhvr>
-                                        <p:cTn id="10" dur="1" fill="hold">
-                                          <p:stCondLst>
-                                            <p:cond delay="0"/>
-                                          </p:stCondLst>
-                                        </p:cTn>
-                                        <p:tgtEl>
-                                          <p:spTgt spid="10"/>
-                                        </p:tgtEl>
-                                        <p:attrNameLst>
-                                          <p:attrName>style.visibility</p:attrName>
-                                        </p:attrNameLst>
-                                      </p:cBhvr>
-                                      <p:to>
-                                        <p:strVal val="visible"/>
-                                      </p:to>
-                                    </p:set>
-                                  </p:childTnLst>
-                                </p:cTn>
-                              </p:par>
-                            </p:childTnLst>
-                          </p:cTn>
-                        </p:par>
-                      </p:childTnLst>
-                    </p:cTn>
-                  </p:par>
-                </p:childTnLst>
-              </p:cTn>
-              <p:prevCondLst>
-                <p:cond evt="onPrev" delay="0">
-                  <p:tgtEl>
-                    <p:sldTgt/>
-                  </p:tgtEl>
-                </p:cond>
-              </p:prevCondLst>
-              <p:nextCondLst>
-                <p:cond evt="onNext" delay="0">
-                  <p:tgtEl>
-                    <p:sldTgt/>
-                  </p:tgtEl>
-                </p:cond>
-              </p:nextCondLst>
-            </p:seq>
-          </p:childTnLst>
-        </p:cTn>
-      </p:par>
-    </p:tnLst>
-    <p:bldLst>
-      <p:bldP spid="10" grpId="0" animBg="1"/>
-      <p:bldP spid="16" grpId="0"/>
-    </p:bldLst>
-  </p:timing>
 </p:sld>
 </file>
 
@@ -6376,16 +7100,284 @@
           <a:chExt cx="0" cy="0"/>
         </a:xfrm>
       </p:grpSpPr>
+      <p:sp>
+        <p:nvSpPr>
+          <p:cNvPr id="2" name="Segnaposto testo 1"/>
+          <p:cNvSpPr>
+            <a:spLocks noGrp="1"/>
+          </p:cNvSpPr>
+          <p:nvPr>
+            <p:ph type="body" sz="quarter" idx="10"/>
+          </p:nvPr>
+        </p:nvSpPr>
+        <p:spPr/>
+        <p:txBody>
+          <a:bodyPr/>
+          <a:lstStyle/>
+          <a:p>
+            <a:r>
+              <a:rPr lang="it-IT" dirty="0"/>
+              <a:t>Controlli Statici per Lifecycle</a:t>
+            </a:r>
+          </a:p>
+        </p:txBody>
+      </p:sp>
+      <p:sp>
+        <p:nvSpPr>
+          <p:cNvPr id="6" name="CasellaDiTesto 9"/>
+          <p:cNvSpPr txBox="1"/>
+          <p:nvPr/>
+        </p:nvSpPr>
+        <p:spPr>
+          <a:xfrm>
+            <a:off x="299798" y="1185506"/>
+            <a:ext cx="7642125" cy="4154984"/>
+          </a:xfrm>
+          <a:prstGeom prst="rect">
+            <a:avLst/>
+          </a:prstGeom>
+          <a:noFill/>
+        </p:spPr>
+        <p:txBody>
+          <a:bodyPr wrap="square" rtlCol="0">
+            <a:spAutoFit/>
+          </a:bodyPr>
+          <a:lstStyle/>
+          <a:p>
+            <a:pPr marL="285750" indent="-285750">
+              <a:buFont typeface="Arial"/>
+              <a:buChar char="•"/>
+            </a:pPr>
+            <a:r>
+              <a:rPr lang="it-IT" sz="2400" dirty="0"/>
+              <a:t>Analisi statica del codice per controllare la gestione di componenti in base al lifecycle</a:t>
+            </a:r>
+          </a:p>
+          <a:p>
+            <a:pPr marL="285750" indent="-285750">
+              <a:buFont typeface="Arial"/>
+              <a:buChar char="•"/>
+            </a:pPr>
+            <a:r>
+              <a:rPr lang="it-IT" sz="2400" dirty="0"/>
+              <a:t>Esempio: Broadcast </a:t>
+            </a:r>
+            <a:r>
+              <a:rPr lang="it-IT" sz="2400" dirty="0" err="1"/>
+              <a:t>Receiver</a:t>
+            </a:r>
+            <a:endParaRPr lang="it-IT" sz="2400" dirty="0"/>
+          </a:p>
+          <a:p>
+            <a:pPr marL="742950" lvl="1" indent="-285750">
+              <a:buFont typeface="Arial"/>
+              <a:buChar char="•"/>
+            </a:pPr>
+            <a:r>
+              <a:rPr lang="it-IT" sz="2400" dirty="0"/>
+              <a:t>Rilascio: il metodo </a:t>
+            </a:r>
+            <a:r>
+              <a:rPr lang="it-IT" sz="2400" dirty="0" err="1">
+                <a:latin typeface="Courier New" panose="02070309020205020404" pitchFamily="49" charset="0"/>
+                <a:cs typeface="Courier New" panose="02070309020205020404" pitchFamily="49" charset="0"/>
+              </a:rPr>
+              <a:t>unregisterReceiver</a:t>
+            </a:r>
+            <a:r>
+              <a:rPr lang="it-IT" sz="2400" dirty="0">
+                <a:latin typeface="Courier New" panose="02070309020205020404" pitchFamily="49" charset="0"/>
+                <a:cs typeface="Courier New" panose="02070309020205020404" pitchFamily="49" charset="0"/>
+              </a:rPr>
+              <a:t>()</a:t>
+            </a:r>
+            <a:r>
+              <a:rPr lang="it-IT" sz="2400" dirty="0"/>
+              <a:t> è da chiamare sempre dopo </a:t>
+            </a:r>
+            <a:r>
+              <a:rPr lang="it-IT" sz="2400" dirty="0" err="1">
+                <a:latin typeface="Courier New" panose="02070309020205020404" pitchFamily="49" charset="0"/>
+                <a:cs typeface="Courier New" panose="02070309020205020404" pitchFamily="49" charset="0"/>
+              </a:rPr>
+              <a:t>registerReceiver</a:t>
+            </a:r>
+            <a:r>
+              <a:rPr lang="it-IT" sz="2400" dirty="0">
+                <a:latin typeface="Courier New" panose="02070309020205020404" pitchFamily="49" charset="0"/>
+                <a:cs typeface="Courier New" panose="02070309020205020404" pitchFamily="49" charset="0"/>
+              </a:rPr>
+              <a:t>()</a:t>
+            </a:r>
+            <a:r>
+              <a:rPr lang="it-IT" sz="2400" dirty="0"/>
+              <a:t>, ma non durante </a:t>
+            </a:r>
+            <a:r>
+              <a:rPr lang="it-IT" sz="2400" dirty="0" err="1">
+                <a:latin typeface="Courier New" panose="02070309020205020404" pitchFamily="49" charset="0"/>
+                <a:cs typeface="Courier New" panose="02070309020205020404" pitchFamily="49" charset="0"/>
+              </a:rPr>
+              <a:t>onSaveInstanceState</a:t>
+            </a:r>
+            <a:r>
+              <a:rPr lang="it-IT" sz="2400" dirty="0">
+                <a:latin typeface="Courier New" panose="02070309020205020404" pitchFamily="49" charset="0"/>
+                <a:cs typeface="Courier New" panose="02070309020205020404" pitchFamily="49" charset="0"/>
+              </a:rPr>
+              <a:t>()</a:t>
+            </a:r>
+          </a:p>
+          <a:p>
+            <a:pPr marL="742950" lvl="1" indent="-285750">
+              <a:buFont typeface="Arial"/>
+              <a:buChar char="•"/>
+            </a:pPr>
+            <a:r>
+              <a:rPr lang="it-IT" sz="2400" dirty="0"/>
+              <a:t>Best </a:t>
+            </a:r>
+            <a:r>
+              <a:rPr lang="it-IT" sz="2400" dirty="0" err="1"/>
+              <a:t>Practice</a:t>
+            </a:r>
+            <a:r>
+              <a:rPr lang="it-IT" sz="2400" dirty="0"/>
+              <a:t>: durante </a:t>
+            </a:r>
+            <a:r>
+              <a:rPr lang="it-IT" sz="2400" dirty="0" err="1">
+                <a:latin typeface="Courier New" panose="02070309020205020404" pitchFamily="49" charset="0"/>
+                <a:cs typeface="Courier New" panose="02070309020205020404" pitchFamily="49" charset="0"/>
+              </a:rPr>
+              <a:t>onStart</a:t>
+            </a:r>
+            <a:r>
+              <a:rPr lang="it-IT" sz="2400" dirty="0">
+                <a:latin typeface="Courier New" panose="02070309020205020404" pitchFamily="49" charset="0"/>
+                <a:cs typeface="Courier New" panose="02070309020205020404" pitchFamily="49" charset="0"/>
+              </a:rPr>
+              <a:t>()</a:t>
+            </a:r>
+            <a:r>
+              <a:rPr lang="it-IT" sz="2400" dirty="0"/>
+              <a:t> e </a:t>
+            </a:r>
+            <a:r>
+              <a:rPr lang="it-IT" sz="2400" dirty="0" err="1">
+                <a:latin typeface="Courier New" panose="02070309020205020404" pitchFamily="49" charset="0"/>
+                <a:cs typeface="Courier New" panose="02070309020205020404" pitchFamily="49" charset="0"/>
+              </a:rPr>
+              <a:t>onStop</a:t>
+            </a:r>
+            <a:r>
+              <a:rPr lang="it-IT" sz="2400" dirty="0">
+                <a:latin typeface="Courier New" panose="02070309020205020404" pitchFamily="49" charset="0"/>
+                <a:cs typeface="Courier New" panose="02070309020205020404" pitchFamily="49" charset="0"/>
+              </a:rPr>
+              <a:t>()</a:t>
+            </a:r>
+          </a:p>
+          <a:p>
+            <a:pPr marL="742950" lvl="1" indent="-285750">
+              <a:buFont typeface="Arial"/>
+              <a:buChar char="•"/>
+            </a:pPr>
+            <a:r>
+              <a:rPr lang="it-IT" sz="2400" dirty="0"/>
+              <a:t>Doppia Acquisizione: in questo caso non causa problemi, ma utile controllare il doppio rilascio</a:t>
+            </a:r>
+          </a:p>
+          <a:p>
+            <a:pPr marL="285750" indent="-285750">
+              <a:buFont typeface="Arial"/>
+              <a:buChar char="•"/>
+            </a:pPr>
+            <a:r>
+              <a:rPr lang="it-IT" sz="2400" dirty="0"/>
+              <a:t>Controlli implementati con </a:t>
+            </a:r>
+            <a:r>
+              <a:rPr lang="it-IT" sz="2400" dirty="0" err="1"/>
+              <a:t>Lint</a:t>
+            </a:r>
+            <a:endParaRPr lang="it-IT" sz="2400" dirty="0"/>
+          </a:p>
+        </p:txBody>
+      </p:sp>
+    </p:spTree>
+    <p:custDataLst>
+      <p:tags r:id="rId1"/>
+    </p:custDataLst>
+    <p:extLst>
+      <p:ext uri="{BB962C8B-B14F-4D97-AF65-F5344CB8AC3E}">
+        <p14:creationId xmlns:p14="http://schemas.microsoft.com/office/powerpoint/2010/main" val="754294630"/>
+      </p:ext>
+    </p:extLst>
+  </p:cSld>
+  <p:clrMapOvr>
+    <a:masterClrMapping/>
+  </p:clrMapOvr>
+  <mc:AlternateContent xmlns:mc="http://schemas.openxmlformats.org/markup-compatibility/2006" xmlns:p14="http://schemas.microsoft.com/office/powerpoint/2010/main">
+    <mc:Choice Requires="p14">
+      <p:transition spd="slow" p14:dur="2000" advTm="51149"/>
+    </mc:Choice>
+    <mc:Fallback xmlns="">
+      <p:transition xmlns:p14="http://schemas.microsoft.com/office/powerpoint/2010/main" spd="slow" advTm="51149"/>
+    </mc:Fallback>
+  </mc:AlternateContent>
+</p:sld>
+</file>
+
+<file path=ppt/slides/slide7.xml><?xml version="1.0" encoding="utf-8"?>
+<p:sld xmlns:a="http://schemas.openxmlformats.org/drawingml/2006/main" xmlns:r="http://schemas.openxmlformats.org/officeDocument/2006/relationships" xmlns:p="http://schemas.openxmlformats.org/presentationml/2006/main">
+  <p:cSld>
+    <p:spTree>
+      <p:nvGrpSpPr>
+        <p:cNvPr id="1" name=""/>
+        <p:cNvGrpSpPr/>
+        <p:nvPr/>
+      </p:nvGrpSpPr>
+      <p:grpSpPr>
+        <a:xfrm>
+          <a:off x="0" y="0"/>
+          <a:ext cx="0" cy="0"/>
+          <a:chOff x="0" y="0"/>
+          <a:chExt cx="0" cy="0"/>
+        </a:xfrm>
+      </p:grpSpPr>
+      <p:sp>
+        <p:nvSpPr>
+          <p:cNvPr id="2" name="Segnaposto testo 1"/>
+          <p:cNvSpPr>
+            <a:spLocks noGrp="1"/>
+          </p:cNvSpPr>
+          <p:nvPr>
+            <p:ph type="body" sz="quarter" idx="10"/>
+          </p:nvPr>
+        </p:nvSpPr>
+        <p:spPr/>
+        <p:txBody>
+          <a:bodyPr/>
+          <a:lstStyle/>
+          <a:p>
+            <a:r>
+              <a:rPr lang="it-IT" dirty="0"/>
+              <a:t>Controlli Statici per Lifecycle - Valutazione</a:t>
+            </a:r>
+          </a:p>
+        </p:txBody>
+      </p:sp>
       <p:pic>
         <p:nvPicPr>
-          <p:cNvPr id="5" name="Immagine 4" descr="logoPoliMi.png"/>
+          <p:cNvPr id="5" name="Picture 4"/>
           <p:cNvPicPr>
             <a:picLocks noChangeAspect="1"/>
           </p:cNvPicPr>
           <p:nvPr/>
         </p:nvPicPr>
         <p:blipFill>
-          <a:blip r:embed="rId2" cstate="email">
+          <a:blip r:embed="rId4" cstate="email">
             <a:extLst>
               <a:ext uri="{28A0092B-C50C-407E-A947-70E740481C1C}">
                 <a14:useLocalDpi xmlns:a14="http://schemas.microsoft.com/office/drawing/2010/main" val="0"/>
@@ -6398,17 +7390,93 @@
         </p:blipFill>
         <p:spPr>
           <a:xfrm>
-            <a:off x="3534078" y="2499218"/>
-            <a:ext cx="2075845" cy="2075845"/>
+            <a:off x="95246" y="923248"/>
+            <a:ext cx="7741027" cy="3001480"/>
           </a:xfrm>
           <a:prstGeom prst="rect">
             <a:avLst/>
           </a:prstGeom>
         </p:spPr>
       </p:pic>
+      <p:pic>
+        <p:nvPicPr>
+          <p:cNvPr id="7" name="Picture 6"/>
+          <p:cNvPicPr>
+            <a:picLocks noChangeAspect="1"/>
+          </p:cNvPicPr>
+          <p:nvPr/>
+        </p:nvPicPr>
+        <p:blipFill>
+          <a:blip r:embed="rId5" cstate="email">
+            <a:extLst>
+              <a:ext uri="{28A0092B-C50C-407E-A947-70E740481C1C}">
+                <a14:useLocalDpi xmlns:a14="http://schemas.microsoft.com/office/drawing/2010/main" val="0"/>
+              </a:ext>
+            </a:extLst>
+          </a:blip>
+          <a:stretch>
+            <a:fillRect/>
+          </a:stretch>
+        </p:blipFill>
+        <p:spPr>
+          <a:xfrm>
+            <a:off x="1154856" y="2582140"/>
+            <a:ext cx="7861704" cy="3810196"/>
+          </a:xfrm>
+          <a:prstGeom prst="rect">
+            <a:avLst/>
+          </a:prstGeom>
+          <a:ln w="38100">
+            <a:solidFill>
+              <a:schemeClr val="bg1"/>
+            </a:solidFill>
+          </a:ln>
+        </p:spPr>
+      </p:pic>
+    </p:spTree>
+    <p:custDataLst>
+      <p:tags r:id="rId1"/>
+    </p:custDataLst>
+    <p:extLst>
+      <p:ext uri="{BB962C8B-B14F-4D97-AF65-F5344CB8AC3E}">
+        <p14:creationId xmlns:p14="http://schemas.microsoft.com/office/powerpoint/2010/main" val="2242182758"/>
+      </p:ext>
+    </p:extLst>
+  </p:cSld>
+  <p:clrMapOvr>
+    <a:masterClrMapping/>
+  </p:clrMapOvr>
+  <mc:AlternateContent xmlns:mc="http://schemas.openxmlformats.org/markup-compatibility/2006" xmlns:p14="http://schemas.microsoft.com/office/powerpoint/2010/main">
+    <mc:Choice Requires="p14">
+      <p:transition spd="slow" p14:dur="2000" advTm="51149"/>
+    </mc:Choice>
+    <mc:Fallback xmlns="">
+      <p:transition xmlns:p14="http://schemas.microsoft.com/office/powerpoint/2010/main" spd="slow" advTm="51149"/>
+    </mc:Fallback>
+  </mc:AlternateContent>
+</p:sld>
+</file>
+
+<file path=ppt/slides/slide8.xml><?xml version="1.0" encoding="utf-8"?>
+<p:sld xmlns:a="http://schemas.openxmlformats.org/drawingml/2006/main" xmlns:r="http://schemas.openxmlformats.org/officeDocument/2006/relationships" xmlns:p="http://schemas.openxmlformats.org/presentationml/2006/main">
+  <p:cSld>
+    <p:spTree>
+      <p:nvGrpSpPr>
+        <p:cNvPr id="1" name=""/>
+        <p:cNvGrpSpPr/>
+        <p:nvPr/>
+      </p:nvGrpSpPr>
+      <p:grpSpPr>
+        <a:xfrm>
+          <a:off x="0" y="0"/>
+          <a:ext cx="0" cy="0"/>
+          <a:chOff x="0" y="0"/>
+          <a:chExt cx="0" cy="0"/>
+        </a:xfrm>
+      </p:grpSpPr>
       <p:sp>
         <p:nvSpPr>
-          <p:cNvPr id="7" name="Segnaposto testo 6"/>
+          <p:cNvPr id="2" name="Segnaposto testo 1"/>
           <p:cNvSpPr>
             <a:spLocks noGrp="1"/>
           </p:cNvSpPr>
@@ -6423,15 +7491,143 @@
           <a:p>
             <a:r>
               <a:rPr lang="it-IT" dirty="0"/>
-              <a:t>FINE</a:t>
-            </a:r>
+              <a:t>Test Dinamici per Lifecycle</a:t>
+            </a:r>
+          </a:p>
+        </p:txBody>
+      </p:sp>
+      <p:sp>
+        <p:nvSpPr>
+          <p:cNvPr id="6" name="CasellaDiTesto 9"/>
+          <p:cNvSpPr txBox="1"/>
+          <p:nvPr/>
+        </p:nvSpPr>
+        <p:spPr>
+          <a:xfrm>
+            <a:off x="299798" y="1185506"/>
+            <a:ext cx="7642125" cy="3785652"/>
+          </a:xfrm>
+          <a:prstGeom prst="rect">
+            <a:avLst/>
+          </a:prstGeom>
+          <a:noFill/>
+        </p:spPr>
+        <p:txBody>
+          <a:bodyPr wrap="square" rtlCol="0">
+            <a:spAutoFit/>
+          </a:bodyPr>
+          <a:lstStyle/>
+          <a:p>
+            <a:pPr marL="285750" indent="-285750">
+              <a:buFont typeface="Arial"/>
+              <a:buChar char="•"/>
+            </a:pPr>
+            <a:r>
+              <a:rPr lang="it-IT" sz="2400" dirty="0"/>
+              <a:t>Analisi dinamica dell’applicazione</a:t>
+            </a:r>
+          </a:p>
+          <a:p>
+            <a:pPr marL="285750" indent="-285750">
+              <a:buFont typeface="Arial"/>
+              <a:buChar char="•"/>
+            </a:pPr>
+            <a:r>
+              <a:rPr lang="it-IT" sz="2400" dirty="0"/>
+              <a:t>Libreria che fornisce test per il lifecycle</a:t>
+            </a:r>
+          </a:p>
+          <a:p>
+            <a:pPr marL="285750" indent="-285750">
+              <a:buFont typeface="Arial"/>
+              <a:buChar char="•"/>
+            </a:pPr>
+            <a:r>
+              <a:rPr lang="it-IT" sz="2400" dirty="0"/>
+              <a:t>Lo sviluppatore definisce solo dei </a:t>
+            </a:r>
+            <a:r>
+              <a:rPr lang="it-IT" sz="2400" dirty="0" err="1"/>
+              <a:t>callback</a:t>
+            </a:r>
+            <a:r>
+              <a:rPr lang="it-IT" sz="2400" dirty="0"/>
+              <a:t>, il resto delle transizioni del ciclo di vita è gestito dalla libreria</a:t>
+            </a:r>
+          </a:p>
+          <a:p>
+            <a:pPr marL="285750" indent="-285750">
+              <a:buFont typeface="Arial"/>
+              <a:buChar char="•"/>
+            </a:pPr>
+            <a:r>
+              <a:rPr lang="it-IT" sz="2400" dirty="0"/>
+              <a:t>Disponibile per</a:t>
+            </a:r>
+          </a:p>
+          <a:p>
+            <a:pPr marL="742950" lvl="1" indent="-285750">
+              <a:buFont typeface="Arial"/>
+              <a:buChar char="•"/>
+            </a:pPr>
+            <a:r>
+              <a:rPr lang="it-IT" sz="2400" dirty="0"/>
+              <a:t>Unit Testing tramite </a:t>
+            </a:r>
+            <a:r>
+              <a:rPr lang="it-IT" sz="2400" dirty="0" err="1"/>
+              <a:t>Instrumentation</a:t>
+            </a:r>
+            <a:endParaRPr lang="it-IT" sz="2400" dirty="0"/>
+          </a:p>
+          <a:p>
+            <a:pPr marL="742950" lvl="1" indent="-285750">
+              <a:buFont typeface="Arial"/>
+              <a:buChar char="•"/>
+            </a:pPr>
+            <a:r>
+              <a:rPr lang="it-IT" sz="2400" dirty="0"/>
+              <a:t>UI Testing con Android Espresso</a:t>
+            </a:r>
+          </a:p>
+          <a:p>
+            <a:pPr marL="742950" lvl="1" indent="-285750">
+              <a:buFont typeface="Arial"/>
+              <a:buChar char="•"/>
+            </a:pPr>
+            <a:r>
+              <a:rPr lang="it-IT" sz="2400" dirty="0"/>
+              <a:t>Unit Testing tramite </a:t>
+            </a:r>
+            <a:r>
+              <a:rPr lang="it-IT" sz="2400" dirty="0" err="1"/>
+              <a:t>Robolectric</a:t>
+            </a:r>
+            <a:endParaRPr lang="it-IT" sz="2400" dirty="0"/>
+          </a:p>
+          <a:p>
+            <a:pPr marL="742950" lvl="1" indent="-285750">
+              <a:buFont typeface="Arial"/>
+              <a:buChar char="•"/>
+            </a:pPr>
+            <a:endParaRPr lang="it-IT" sz="2400" dirty="0"/>
+          </a:p>
+          <a:p>
+            <a:pPr marL="742950" lvl="1" indent="-285750">
+              <a:buFont typeface="Arial"/>
+              <a:buChar char="•"/>
+            </a:pPr>
+            <a:endParaRPr lang="it-IT" sz="2400" dirty="0"/>
           </a:p>
         </p:txBody>
       </p:sp>
     </p:spTree>
+    <p:custDataLst>
+      <p:tags r:id="rId1"/>
+    </p:custDataLst>
     <p:extLst>
       <p:ext uri="{BB962C8B-B14F-4D97-AF65-F5344CB8AC3E}">
-        <p14:creationId xmlns:p14="http://schemas.microsoft.com/office/powerpoint/2010/main" val="1982816369"/>
+        <p14:creationId xmlns:p14="http://schemas.microsoft.com/office/powerpoint/2010/main" val="2179240936"/>
       </p:ext>
     </p:extLst>
   </p:cSld>
@@ -6440,10 +7636,353 @@
   </p:clrMapOvr>
   <mc:AlternateContent xmlns:mc="http://schemas.openxmlformats.org/markup-compatibility/2006" xmlns:p14="http://schemas.microsoft.com/office/powerpoint/2010/main">
     <mc:Choice Requires="p14">
-      <p:transition spd="slow" p14:dur="2000" advTm="5275"/>
+      <p:transition spd="slow" p14:dur="2000" advTm="51149"/>
     </mc:Choice>
     <mc:Fallback xmlns="">
-      <p:transition xmlns:p14="http://schemas.microsoft.com/office/powerpoint/2010/main" spd="slow" advTm="5275"/>
+      <p:transition xmlns:p14="http://schemas.microsoft.com/office/powerpoint/2010/main" spd="slow" advTm="51149"/>
+    </mc:Fallback>
+  </mc:AlternateContent>
+</p:sld>
+</file>
+
+<file path=ppt/slides/slide9.xml><?xml version="1.0" encoding="utf-8"?>
+<p:sld xmlns:a="http://schemas.openxmlformats.org/drawingml/2006/main" xmlns:r="http://schemas.openxmlformats.org/officeDocument/2006/relationships" xmlns:p="http://schemas.openxmlformats.org/presentationml/2006/main">
+  <p:cSld>
+    <p:spTree>
+      <p:nvGrpSpPr>
+        <p:cNvPr id="1" name=""/>
+        <p:cNvGrpSpPr/>
+        <p:nvPr/>
+      </p:nvGrpSpPr>
+      <p:grpSpPr>
+        <a:xfrm>
+          <a:off x="0" y="0"/>
+          <a:ext cx="0" cy="0"/>
+          <a:chOff x="0" y="0"/>
+          <a:chExt cx="0" cy="0"/>
+        </a:xfrm>
+      </p:grpSpPr>
+      <p:sp>
+        <p:nvSpPr>
+          <p:cNvPr id="2" name="Segnaposto testo 1"/>
+          <p:cNvSpPr>
+            <a:spLocks noGrp="1"/>
+          </p:cNvSpPr>
+          <p:nvPr>
+            <p:ph type="body" sz="quarter" idx="10"/>
+          </p:nvPr>
+        </p:nvSpPr>
+        <p:spPr/>
+        <p:txBody>
+          <a:bodyPr/>
+          <a:lstStyle/>
+          <a:p>
+            <a:r>
+              <a:rPr lang="it-IT" dirty="0"/>
+              <a:t>Test Dinamici per Lifecycle - Valutazione</a:t>
+            </a:r>
+          </a:p>
+        </p:txBody>
+      </p:sp>
+      <p:pic>
+        <p:nvPicPr>
+          <p:cNvPr id="3" name="Picture 2"/>
+          <p:cNvPicPr>
+            <a:picLocks noChangeAspect="1"/>
+          </p:cNvPicPr>
+          <p:nvPr/>
+        </p:nvPicPr>
+        <p:blipFill>
+          <a:blip r:embed="rId4"/>
+          <a:stretch>
+            <a:fillRect/>
+          </a:stretch>
+        </p:blipFill>
+        <p:spPr>
+          <a:xfrm>
+            <a:off x="82085" y="924407"/>
+            <a:ext cx="6386265" cy="5507215"/>
+          </a:xfrm>
+          <a:prstGeom prst="rect">
+            <a:avLst/>
+          </a:prstGeom>
+        </p:spPr>
+      </p:pic>
+      <p:sp>
+        <p:nvSpPr>
+          <p:cNvPr id="8" name="CasellaDiTesto 7"/>
+          <p:cNvSpPr txBox="1"/>
+          <p:nvPr/>
+        </p:nvSpPr>
+        <p:spPr>
+          <a:xfrm>
+            <a:off x="6707149" y="1245044"/>
+            <a:ext cx="2105102" cy="830997"/>
+          </a:xfrm>
+          <a:prstGeom prst="rect">
+            <a:avLst/>
+          </a:prstGeom>
+          <a:noFill/>
+        </p:spPr>
+        <p:txBody>
+          <a:bodyPr wrap="square" rtlCol="0">
+            <a:spAutoFit/>
+          </a:bodyPr>
+          <a:lstStyle/>
+          <a:p>
+            <a:r>
+              <a:rPr lang="it-IT" sz="1600" b="1" dirty="0"/>
+              <a:t>Test per </a:t>
+            </a:r>
+            <a:r>
+              <a:rPr lang="it-IT" sz="1600" b="1" dirty="0" err="1"/>
+              <a:t>WordPress</a:t>
+            </a:r>
+            <a:r>
+              <a:rPr lang="it-IT" sz="1600" b="1" dirty="0"/>
+              <a:t> definito in Espresso</a:t>
+            </a:r>
+          </a:p>
+        </p:txBody>
+      </p:sp>
+      <p:cxnSp>
+        <p:nvCxnSpPr>
+          <p:cNvPr id="9" name="Connettore 2 5"/>
+          <p:cNvCxnSpPr/>
+          <p:nvPr/>
+        </p:nvCxnSpPr>
+        <p:spPr>
+          <a:xfrm flipH="1" flipV="1">
+            <a:off x="3637052" y="1077277"/>
+            <a:ext cx="3070097" cy="335534"/>
+          </a:xfrm>
+          <a:prstGeom prst="straightConnector1">
+            <a:avLst/>
+          </a:prstGeom>
+          <a:ln>
+            <a:solidFill>
+              <a:schemeClr val="accent1">
+                <a:lumMod val="40000"/>
+                <a:lumOff val="60000"/>
+              </a:schemeClr>
+            </a:solidFill>
+            <a:tailEnd type="arrow"/>
+          </a:ln>
+        </p:spPr>
+        <p:style>
+          <a:lnRef idx="2">
+            <a:schemeClr val="accent1"/>
+          </a:lnRef>
+          <a:fillRef idx="0">
+            <a:schemeClr val="accent1"/>
+          </a:fillRef>
+          <a:effectRef idx="1">
+            <a:schemeClr val="accent1"/>
+          </a:effectRef>
+          <a:fontRef idx="minor">
+            <a:schemeClr val="tx1"/>
+          </a:fontRef>
+        </p:style>
+      </p:cxnSp>
+      <p:sp>
+        <p:nvSpPr>
+          <p:cNvPr id="12" name="CasellaDiTesto 7"/>
+          <p:cNvSpPr txBox="1"/>
+          <p:nvPr/>
+        </p:nvSpPr>
+        <p:spPr>
+          <a:xfrm>
+            <a:off x="6769644" y="4214305"/>
+            <a:ext cx="2105102" cy="830997"/>
+          </a:xfrm>
+          <a:prstGeom prst="rect">
+            <a:avLst/>
+          </a:prstGeom>
+          <a:noFill/>
+        </p:spPr>
+        <p:txBody>
+          <a:bodyPr wrap="square" rtlCol="0">
+            <a:spAutoFit/>
+          </a:bodyPr>
+          <a:lstStyle/>
+          <a:p>
+            <a:r>
+              <a:rPr lang="it-IT" sz="1600" b="1" dirty="0"/>
+              <a:t>Azioni e controlli standard di Espresso</a:t>
+            </a:r>
+          </a:p>
+        </p:txBody>
+      </p:sp>
+      <p:cxnSp>
+        <p:nvCxnSpPr>
+          <p:cNvPr id="13" name="Connettore 2 5"/>
+          <p:cNvCxnSpPr/>
+          <p:nvPr/>
+        </p:nvCxnSpPr>
+        <p:spPr>
+          <a:xfrm flipH="1" flipV="1">
+            <a:off x="5825447" y="4214305"/>
+            <a:ext cx="944197" cy="121390"/>
+          </a:xfrm>
+          <a:prstGeom prst="straightConnector1">
+            <a:avLst/>
+          </a:prstGeom>
+          <a:ln>
+            <a:solidFill>
+              <a:schemeClr val="accent1">
+                <a:lumMod val="40000"/>
+                <a:lumOff val="60000"/>
+              </a:schemeClr>
+            </a:solidFill>
+            <a:tailEnd type="arrow"/>
+          </a:ln>
+        </p:spPr>
+        <p:style>
+          <a:lnRef idx="2">
+            <a:schemeClr val="accent1"/>
+          </a:lnRef>
+          <a:fillRef idx="0">
+            <a:schemeClr val="accent1"/>
+          </a:fillRef>
+          <a:effectRef idx="1">
+            <a:schemeClr val="accent1"/>
+          </a:effectRef>
+          <a:fontRef idx="minor">
+            <a:schemeClr val="tx1"/>
+          </a:fontRef>
+        </p:style>
+      </p:cxnSp>
+      <p:cxnSp>
+        <p:nvCxnSpPr>
+          <p:cNvPr id="16" name="Connettore 2 5"/>
+          <p:cNvCxnSpPr/>
+          <p:nvPr/>
+        </p:nvCxnSpPr>
+        <p:spPr>
+          <a:xfrm flipH="1">
+            <a:off x="6234060" y="4799080"/>
+            <a:ext cx="535584" cy="868405"/>
+          </a:xfrm>
+          <a:prstGeom prst="straightConnector1">
+            <a:avLst/>
+          </a:prstGeom>
+          <a:ln>
+            <a:solidFill>
+              <a:schemeClr val="accent1">
+                <a:lumMod val="40000"/>
+                <a:lumOff val="60000"/>
+              </a:schemeClr>
+            </a:solidFill>
+            <a:tailEnd type="arrow"/>
+          </a:ln>
+        </p:spPr>
+        <p:style>
+          <a:lnRef idx="2">
+            <a:schemeClr val="accent1"/>
+          </a:lnRef>
+          <a:fillRef idx="0">
+            <a:schemeClr val="accent1"/>
+          </a:fillRef>
+          <a:effectRef idx="1">
+            <a:schemeClr val="accent1"/>
+          </a:effectRef>
+          <a:fontRef idx="minor">
+            <a:schemeClr val="tx1"/>
+          </a:fontRef>
+        </p:style>
+      </p:cxnSp>
+      <p:sp>
+        <p:nvSpPr>
+          <p:cNvPr id="20" name="CasellaDiTesto 7"/>
+          <p:cNvSpPr txBox="1"/>
+          <p:nvPr/>
+        </p:nvSpPr>
+        <p:spPr>
+          <a:xfrm>
+            <a:off x="6707149" y="2514903"/>
+            <a:ext cx="2105102" cy="830997"/>
+          </a:xfrm>
+          <a:prstGeom prst="rect">
+            <a:avLst/>
+          </a:prstGeom>
+          <a:noFill/>
+        </p:spPr>
+        <p:txBody>
+          <a:bodyPr wrap="square" rtlCol="0">
+            <a:spAutoFit/>
+          </a:bodyPr>
+          <a:lstStyle/>
+          <a:p>
+            <a:r>
+              <a:rPr lang="it-IT" sz="1600" b="1" dirty="0"/>
+              <a:t>Lo sviluppatore deve solo definire un </a:t>
+            </a:r>
+            <a:r>
+              <a:rPr lang="it-IT" sz="1600" b="1" dirty="0" err="1"/>
+              <a:t>callback</a:t>
+            </a:r>
+            <a:endParaRPr lang="it-IT" sz="1600" b="1" dirty="0"/>
+          </a:p>
+        </p:txBody>
+      </p:sp>
+      <p:cxnSp>
+        <p:nvCxnSpPr>
+          <p:cNvPr id="21" name="Connettore 2 5"/>
+          <p:cNvCxnSpPr/>
+          <p:nvPr/>
+        </p:nvCxnSpPr>
+        <p:spPr>
+          <a:xfrm flipH="1" flipV="1">
+            <a:off x="3548899" y="1802537"/>
+            <a:ext cx="3070098" cy="756529"/>
+          </a:xfrm>
+          <a:prstGeom prst="straightConnector1">
+            <a:avLst/>
+          </a:prstGeom>
+          <a:ln>
+            <a:solidFill>
+              <a:schemeClr val="accent1">
+                <a:lumMod val="40000"/>
+                <a:lumOff val="60000"/>
+              </a:schemeClr>
+            </a:solidFill>
+            <a:tailEnd type="arrow"/>
+          </a:ln>
+        </p:spPr>
+        <p:style>
+          <a:lnRef idx="2">
+            <a:schemeClr val="accent1"/>
+          </a:lnRef>
+          <a:fillRef idx="0">
+            <a:schemeClr val="accent1"/>
+          </a:fillRef>
+          <a:effectRef idx="1">
+            <a:schemeClr val="accent1"/>
+          </a:effectRef>
+          <a:fontRef idx="minor">
+            <a:schemeClr val="tx1"/>
+          </a:fontRef>
+        </p:style>
+      </p:cxnSp>
+    </p:spTree>
+    <p:custDataLst>
+      <p:tags r:id="rId1"/>
+    </p:custDataLst>
+    <p:extLst>
+      <p:ext uri="{BB962C8B-B14F-4D97-AF65-F5344CB8AC3E}">
+        <p14:creationId xmlns:p14="http://schemas.microsoft.com/office/powerpoint/2010/main" val="357759139"/>
+      </p:ext>
+    </p:extLst>
+  </p:cSld>
+  <p:clrMapOvr>
+    <a:masterClrMapping/>
+  </p:clrMapOvr>
+  <mc:AlternateContent xmlns:mc="http://schemas.openxmlformats.org/markup-compatibility/2006" xmlns:p14="http://schemas.microsoft.com/office/powerpoint/2010/main">
+    <mc:Choice Requires="p14">
+      <p:transition spd="slow" p14:dur="2000" advTm="51149"/>
+    </mc:Choice>
+    <mc:Fallback xmlns="">
+      <p:transition xmlns:p14="http://schemas.microsoft.com/office/powerpoint/2010/main" spd="slow" advTm="51149"/>
     </mc:Fallback>
   </mc:AlternateContent>
 </p:sld>
@@ -6462,6 +8001,36 @@
 </file>
 
 <file path=ppt/tags/tag3.xml><?xml version="1.0" encoding="utf-8"?>
+<p:tagLst xmlns:a="http://schemas.openxmlformats.org/drawingml/2006/main" xmlns:r="http://schemas.openxmlformats.org/officeDocument/2006/relationships" xmlns:p="http://schemas.openxmlformats.org/presentationml/2006/main">
+  <p:tag name="TIMING" val="|27.6"/>
+</p:tagLst>
+</file>
+
+<file path=ppt/tags/tag4.xml><?xml version="1.0" encoding="utf-8"?>
+<p:tagLst xmlns:a="http://schemas.openxmlformats.org/drawingml/2006/main" xmlns:r="http://schemas.openxmlformats.org/officeDocument/2006/relationships" xmlns:p="http://schemas.openxmlformats.org/presentationml/2006/main">
+  <p:tag name="TIMING" val="|27.6"/>
+</p:tagLst>
+</file>
+
+<file path=ppt/tags/tag5.xml><?xml version="1.0" encoding="utf-8"?>
+<p:tagLst xmlns:a="http://schemas.openxmlformats.org/drawingml/2006/main" xmlns:r="http://schemas.openxmlformats.org/officeDocument/2006/relationships" xmlns:p="http://schemas.openxmlformats.org/presentationml/2006/main">
+  <p:tag name="TIMING" val="|27.6"/>
+</p:tagLst>
+</file>
+
+<file path=ppt/tags/tag6.xml><?xml version="1.0" encoding="utf-8"?>
+<p:tagLst xmlns:a="http://schemas.openxmlformats.org/drawingml/2006/main" xmlns:r="http://schemas.openxmlformats.org/officeDocument/2006/relationships" xmlns:p="http://schemas.openxmlformats.org/presentationml/2006/main">
+  <p:tag name="TIMING" val="|27.6"/>
+</p:tagLst>
+</file>
+
+<file path=ppt/tags/tag7.xml><?xml version="1.0" encoding="utf-8"?>
+<p:tagLst xmlns:a="http://schemas.openxmlformats.org/drawingml/2006/main" xmlns:r="http://schemas.openxmlformats.org/officeDocument/2006/relationships" xmlns:p="http://schemas.openxmlformats.org/presentationml/2006/main">
+  <p:tag name="TIMING" val="|27.6"/>
+</p:tagLst>
+</file>
+
+<file path=ppt/tags/tag8.xml><?xml version="1.0" encoding="utf-8"?>
 <p:tagLst xmlns:a="http://schemas.openxmlformats.org/drawingml/2006/main" xmlns:r="http://schemas.openxmlformats.org/officeDocument/2006/relationships" xmlns:p="http://schemas.openxmlformats.org/presentationml/2006/main">
   <p:tag name="TIMING" val="|36.5"/>
 </p:tagLst>

</xml_diff>

<commit_message>
Presentation: preliminary version of events part
</commit_message>
<xml_diff>
--- a/Presentation/Presentation.pptx
+++ b/Presentation/Presentation.pptx
@@ -7,7 +7,7 @@
     <p:sldMasterId id="2147483681" r:id="rId3"/>
   </p:sldMasterIdLst>
   <p:notesMasterIdLst>
-    <p:notesMasterId r:id="rId15"/>
+    <p:notesMasterId r:id="rId25"/>
   </p:notesMasterIdLst>
   <p:sldIdLst>
     <p:sldId id="256" r:id="rId4"/>
@@ -19,8 +19,18 @@
     <p:sldId id="308" r:id="rId10"/>
     <p:sldId id="309" r:id="rId11"/>
     <p:sldId id="310" r:id="rId12"/>
-    <p:sldId id="287" r:id="rId13"/>
-    <p:sldId id="258" r:id="rId14"/>
+    <p:sldId id="311" r:id="rId13"/>
+    <p:sldId id="312" r:id="rId14"/>
+    <p:sldId id="313" r:id="rId15"/>
+    <p:sldId id="317" r:id="rId16"/>
+    <p:sldId id="314" r:id="rId17"/>
+    <p:sldId id="315" r:id="rId18"/>
+    <p:sldId id="320" r:id="rId19"/>
+    <p:sldId id="318" r:id="rId20"/>
+    <p:sldId id="319" r:id="rId21"/>
+    <p:sldId id="321" r:id="rId22"/>
+    <p:sldId id="287" r:id="rId23"/>
+    <p:sldId id="258" r:id="rId24"/>
   </p:sldIdLst>
   <p:sldSz cx="9144000" cy="6858000" type="screen4x3"/>
   <p:notesSz cx="9906000" cy="6794500"/>
@@ -250,7 +260,7 @@
           <a:p>
             <a:fld id="{0A055084-1CB9-CF40-93F3-663EB9ADEB9C}" type="datetimeFigureOut">
               <a:rPr lang="it-IT" smtClean="0"/>
-              <a:t>05/09/2016</a:t>
+              <a:t>07/09/2016</a:t>
             </a:fld>
             <a:endParaRPr lang="it-IT"/>
           </a:p>
@@ -645,24 +655,7 @@
           <a:bodyPr/>
           <a:lstStyle/>
           <a:p>
-            <a:pPr marL="0" marR="0" indent="0" algn="l" defTabSz="457200" rtl="0" eaLnBrk="1" fontAlgn="auto" latinLnBrk="0" hangingPunct="1">
-              <a:lnSpc>
-                <a:spcPct val="100000"/>
-              </a:lnSpc>
-              <a:spcBef>
-                <a:spcPts val="0"/>
-              </a:spcBef>
-              <a:spcAft>
-                <a:spcPts val="0"/>
-              </a:spcAft>
-              <a:buClrTx/>
-              <a:buSzTx/>
-              <a:buFontTx/>
-              <a:buNone/>
-              <a:tabLst/>
-              <a:defRPr/>
-            </a:pPr>
-            <a:endParaRPr lang="it-IT" b="0" dirty="0"/>
+            <a:endParaRPr lang="it-IT" baseline="0" dirty="0"/>
           </a:p>
         </p:txBody>
       </p:sp>
@@ -692,7 +685,763 @@
     </p:spTree>
     <p:extLst>
       <p:ext uri="{BB962C8B-B14F-4D97-AF65-F5344CB8AC3E}">
-        <p14:creationId xmlns:p14="http://schemas.microsoft.com/office/powerpoint/2010/main" val="2864582512"/>
+        <p14:creationId xmlns:p14="http://schemas.microsoft.com/office/powerpoint/2010/main" val="4220072421"/>
+      </p:ext>
+    </p:extLst>
+  </p:cSld>
+  <p:clrMapOvr>
+    <a:masterClrMapping/>
+  </p:clrMapOvr>
+</p:notes>
+</file>
+
+<file path=ppt/notesSlides/notesSlide11.xml><?xml version="1.0" encoding="utf-8"?>
+<p:notes xmlns:a="http://schemas.openxmlformats.org/drawingml/2006/main" xmlns:r="http://schemas.openxmlformats.org/officeDocument/2006/relationships" xmlns:p="http://schemas.openxmlformats.org/presentationml/2006/main">
+  <p:cSld>
+    <p:spTree>
+      <p:nvGrpSpPr>
+        <p:cNvPr id="1" name=""/>
+        <p:cNvGrpSpPr/>
+        <p:nvPr/>
+      </p:nvGrpSpPr>
+      <p:grpSpPr>
+        <a:xfrm>
+          <a:off x="0" y="0"/>
+          <a:ext cx="0" cy="0"/>
+          <a:chOff x="0" y="0"/>
+          <a:chExt cx="0" cy="0"/>
+        </a:xfrm>
+      </p:grpSpPr>
+      <p:sp>
+        <p:nvSpPr>
+          <p:cNvPr id="2" name="Segnaposto immagine diapositiva 1"/>
+          <p:cNvSpPr>
+            <a:spLocks noGrp="1" noRot="1" noChangeAspect="1"/>
+          </p:cNvSpPr>
+          <p:nvPr>
+            <p:ph type="sldImg"/>
+          </p:nvPr>
+        </p:nvSpPr>
+        <p:spPr/>
+      </p:sp>
+      <p:sp>
+        <p:nvSpPr>
+          <p:cNvPr id="3" name="Segnaposto note 2"/>
+          <p:cNvSpPr>
+            <a:spLocks noGrp="1"/>
+          </p:cNvSpPr>
+          <p:nvPr>
+            <p:ph type="body" idx="1"/>
+          </p:nvPr>
+        </p:nvSpPr>
+        <p:spPr/>
+        <p:txBody>
+          <a:bodyPr/>
+          <a:lstStyle/>
+          <a:p>
+            <a:endParaRPr lang="it-IT" sz="1200" b="0" dirty="0"/>
+          </a:p>
+        </p:txBody>
+      </p:sp>
+      <p:sp>
+        <p:nvSpPr>
+          <p:cNvPr id="4" name="Segnaposto numero diapositiva 3"/>
+          <p:cNvSpPr>
+            <a:spLocks noGrp="1"/>
+          </p:cNvSpPr>
+          <p:nvPr>
+            <p:ph type="sldNum" sz="quarter" idx="10"/>
+          </p:nvPr>
+        </p:nvSpPr>
+        <p:spPr/>
+        <p:txBody>
+          <a:bodyPr/>
+          <a:lstStyle/>
+          <a:p>
+            <a:fld id="{E73CFAA4-C87D-1545-9F8E-F35BF2220A99}" type="slidenum">
+              <a:rPr lang="it-IT" smtClean="0"/>
+              <a:t>11</a:t>
+            </a:fld>
+            <a:endParaRPr lang="it-IT"/>
+          </a:p>
+        </p:txBody>
+      </p:sp>
+    </p:spTree>
+    <p:extLst>
+      <p:ext uri="{BB962C8B-B14F-4D97-AF65-F5344CB8AC3E}">
+        <p14:creationId xmlns:p14="http://schemas.microsoft.com/office/powerpoint/2010/main" val="99441689"/>
+      </p:ext>
+    </p:extLst>
+  </p:cSld>
+  <p:clrMapOvr>
+    <a:masterClrMapping/>
+  </p:clrMapOvr>
+</p:notes>
+</file>
+
+<file path=ppt/notesSlides/notesSlide12.xml><?xml version="1.0" encoding="utf-8"?>
+<p:notes xmlns:a="http://schemas.openxmlformats.org/drawingml/2006/main" xmlns:r="http://schemas.openxmlformats.org/officeDocument/2006/relationships" xmlns:p="http://schemas.openxmlformats.org/presentationml/2006/main">
+  <p:cSld>
+    <p:spTree>
+      <p:nvGrpSpPr>
+        <p:cNvPr id="1" name=""/>
+        <p:cNvGrpSpPr/>
+        <p:nvPr/>
+      </p:nvGrpSpPr>
+      <p:grpSpPr>
+        <a:xfrm>
+          <a:off x="0" y="0"/>
+          <a:ext cx="0" cy="0"/>
+          <a:chOff x="0" y="0"/>
+          <a:chExt cx="0" cy="0"/>
+        </a:xfrm>
+      </p:grpSpPr>
+      <p:sp>
+        <p:nvSpPr>
+          <p:cNvPr id="2" name="Segnaposto immagine diapositiva 1"/>
+          <p:cNvSpPr>
+            <a:spLocks noGrp="1" noRot="1" noChangeAspect="1"/>
+          </p:cNvSpPr>
+          <p:nvPr>
+            <p:ph type="sldImg"/>
+          </p:nvPr>
+        </p:nvSpPr>
+        <p:spPr/>
+      </p:sp>
+      <p:sp>
+        <p:nvSpPr>
+          <p:cNvPr id="3" name="Segnaposto note 2"/>
+          <p:cNvSpPr>
+            <a:spLocks noGrp="1"/>
+          </p:cNvSpPr>
+          <p:nvPr>
+            <p:ph type="body" idx="1"/>
+          </p:nvPr>
+        </p:nvSpPr>
+        <p:spPr/>
+        <p:txBody>
+          <a:bodyPr/>
+          <a:lstStyle/>
+          <a:p>
+            <a:endParaRPr lang="it-IT" sz="1200" b="0" dirty="0"/>
+          </a:p>
+        </p:txBody>
+      </p:sp>
+      <p:sp>
+        <p:nvSpPr>
+          <p:cNvPr id="4" name="Segnaposto numero diapositiva 3"/>
+          <p:cNvSpPr>
+            <a:spLocks noGrp="1"/>
+          </p:cNvSpPr>
+          <p:nvPr>
+            <p:ph type="sldNum" sz="quarter" idx="10"/>
+          </p:nvPr>
+        </p:nvSpPr>
+        <p:spPr/>
+        <p:txBody>
+          <a:bodyPr/>
+          <a:lstStyle/>
+          <a:p>
+            <a:fld id="{E73CFAA4-C87D-1545-9F8E-F35BF2220A99}" type="slidenum">
+              <a:rPr lang="it-IT" smtClean="0"/>
+              <a:t>12</a:t>
+            </a:fld>
+            <a:endParaRPr lang="it-IT"/>
+          </a:p>
+        </p:txBody>
+      </p:sp>
+    </p:spTree>
+    <p:extLst>
+      <p:ext uri="{BB962C8B-B14F-4D97-AF65-F5344CB8AC3E}">
+        <p14:creationId xmlns:p14="http://schemas.microsoft.com/office/powerpoint/2010/main" val="425608585"/>
+      </p:ext>
+    </p:extLst>
+  </p:cSld>
+  <p:clrMapOvr>
+    <a:masterClrMapping/>
+  </p:clrMapOvr>
+</p:notes>
+</file>
+
+<file path=ppt/notesSlides/notesSlide13.xml><?xml version="1.0" encoding="utf-8"?>
+<p:notes xmlns:a="http://schemas.openxmlformats.org/drawingml/2006/main" xmlns:r="http://schemas.openxmlformats.org/officeDocument/2006/relationships" xmlns:p="http://schemas.openxmlformats.org/presentationml/2006/main">
+  <p:cSld>
+    <p:spTree>
+      <p:nvGrpSpPr>
+        <p:cNvPr id="1" name=""/>
+        <p:cNvGrpSpPr/>
+        <p:nvPr/>
+      </p:nvGrpSpPr>
+      <p:grpSpPr>
+        <a:xfrm>
+          <a:off x="0" y="0"/>
+          <a:ext cx="0" cy="0"/>
+          <a:chOff x="0" y="0"/>
+          <a:chExt cx="0" cy="0"/>
+        </a:xfrm>
+      </p:grpSpPr>
+      <p:sp>
+        <p:nvSpPr>
+          <p:cNvPr id="2" name="Segnaposto immagine diapositiva 1"/>
+          <p:cNvSpPr>
+            <a:spLocks noGrp="1" noRot="1" noChangeAspect="1"/>
+          </p:cNvSpPr>
+          <p:nvPr>
+            <p:ph type="sldImg"/>
+          </p:nvPr>
+        </p:nvSpPr>
+        <p:spPr/>
+      </p:sp>
+      <p:sp>
+        <p:nvSpPr>
+          <p:cNvPr id="3" name="Segnaposto note 2"/>
+          <p:cNvSpPr>
+            <a:spLocks noGrp="1"/>
+          </p:cNvSpPr>
+          <p:nvPr>
+            <p:ph type="body" idx="1"/>
+          </p:nvPr>
+        </p:nvSpPr>
+        <p:spPr/>
+        <p:txBody>
+          <a:bodyPr/>
+          <a:lstStyle/>
+          <a:p>
+            <a:endParaRPr lang="it-IT" sz="1200" b="0" dirty="0"/>
+          </a:p>
+        </p:txBody>
+      </p:sp>
+      <p:sp>
+        <p:nvSpPr>
+          <p:cNvPr id="4" name="Segnaposto numero diapositiva 3"/>
+          <p:cNvSpPr>
+            <a:spLocks noGrp="1"/>
+          </p:cNvSpPr>
+          <p:nvPr>
+            <p:ph type="sldNum" sz="quarter" idx="10"/>
+          </p:nvPr>
+        </p:nvSpPr>
+        <p:spPr/>
+        <p:txBody>
+          <a:bodyPr/>
+          <a:lstStyle/>
+          <a:p>
+            <a:fld id="{E73CFAA4-C87D-1545-9F8E-F35BF2220A99}" type="slidenum">
+              <a:rPr lang="it-IT" smtClean="0"/>
+              <a:t>13</a:t>
+            </a:fld>
+            <a:endParaRPr lang="it-IT"/>
+          </a:p>
+        </p:txBody>
+      </p:sp>
+    </p:spTree>
+    <p:extLst>
+      <p:ext uri="{BB962C8B-B14F-4D97-AF65-F5344CB8AC3E}">
+        <p14:creationId xmlns:p14="http://schemas.microsoft.com/office/powerpoint/2010/main" val="561244320"/>
+      </p:ext>
+    </p:extLst>
+  </p:cSld>
+  <p:clrMapOvr>
+    <a:masterClrMapping/>
+  </p:clrMapOvr>
+</p:notes>
+</file>
+
+<file path=ppt/notesSlides/notesSlide14.xml><?xml version="1.0" encoding="utf-8"?>
+<p:notes xmlns:a="http://schemas.openxmlformats.org/drawingml/2006/main" xmlns:r="http://schemas.openxmlformats.org/officeDocument/2006/relationships" xmlns:p="http://schemas.openxmlformats.org/presentationml/2006/main">
+  <p:cSld>
+    <p:spTree>
+      <p:nvGrpSpPr>
+        <p:cNvPr id="1" name=""/>
+        <p:cNvGrpSpPr/>
+        <p:nvPr/>
+      </p:nvGrpSpPr>
+      <p:grpSpPr>
+        <a:xfrm>
+          <a:off x="0" y="0"/>
+          <a:ext cx="0" cy="0"/>
+          <a:chOff x="0" y="0"/>
+          <a:chExt cx="0" cy="0"/>
+        </a:xfrm>
+      </p:grpSpPr>
+      <p:sp>
+        <p:nvSpPr>
+          <p:cNvPr id="2" name="Segnaposto immagine diapositiva 1"/>
+          <p:cNvSpPr>
+            <a:spLocks noGrp="1" noRot="1" noChangeAspect="1"/>
+          </p:cNvSpPr>
+          <p:nvPr>
+            <p:ph type="sldImg"/>
+          </p:nvPr>
+        </p:nvSpPr>
+        <p:spPr/>
+      </p:sp>
+      <p:sp>
+        <p:nvSpPr>
+          <p:cNvPr id="3" name="Segnaposto note 2"/>
+          <p:cNvSpPr>
+            <a:spLocks noGrp="1"/>
+          </p:cNvSpPr>
+          <p:nvPr>
+            <p:ph type="body" idx="1"/>
+          </p:nvPr>
+        </p:nvSpPr>
+        <p:spPr/>
+        <p:txBody>
+          <a:bodyPr/>
+          <a:lstStyle/>
+          <a:p>
+            <a:endParaRPr lang="it-IT" sz="1200" b="0" dirty="0"/>
+          </a:p>
+        </p:txBody>
+      </p:sp>
+      <p:sp>
+        <p:nvSpPr>
+          <p:cNvPr id="4" name="Segnaposto numero diapositiva 3"/>
+          <p:cNvSpPr>
+            <a:spLocks noGrp="1"/>
+          </p:cNvSpPr>
+          <p:nvPr>
+            <p:ph type="sldNum" sz="quarter" idx="10"/>
+          </p:nvPr>
+        </p:nvSpPr>
+        <p:spPr/>
+        <p:txBody>
+          <a:bodyPr/>
+          <a:lstStyle/>
+          <a:p>
+            <a:fld id="{E73CFAA4-C87D-1545-9F8E-F35BF2220A99}" type="slidenum">
+              <a:rPr lang="it-IT" smtClean="0"/>
+              <a:t>14</a:t>
+            </a:fld>
+            <a:endParaRPr lang="it-IT"/>
+          </a:p>
+        </p:txBody>
+      </p:sp>
+    </p:spTree>
+    <p:extLst>
+      <p:ext uri="{BB962C8B-B14F-4D97-AF65-F5344CB8AC3E}">
+        <p14:creationId xmlns:p14="http://schemas.microsoft.com/office/powerpoint/2010/main" val="181371689"/>
+      </p:ext>
+    </p:extLst>
+  </p:cSld>
+  <p:clrMapOvr>
+    <a:masterClrMapping/>
+  </p:clrMapOvr>
+</p:notes>
+</file>
+
+<file path=ppt/notesSlides/notesSlide15.xml><?xml version="1.0" encoding="utf-8"?>
+<p:notes xmlns:a="http://schemas.openxmlformats.org/drawingml/2006/main" xmlns:r="http://schemas.openxmlformats.org/officeDocument/2006/relationships" xmlns:p="http://schemas.openxmlformats.org/presentationml/2006/main">
+  <p:cSld>
+    <p:spTree>
+      <p:nvGrpSpPr>
+        <p:cNvPr id="1" name=""/>
+        <p:cNvGrpSpPr/>
+        <p:nvPr/>
+      </p:nvGrpSpPr>
+      <p:grpSpPr>
+        <a:xfrm>
+          <a:off x="0" y="0"/>
+          <a:ext cx="0" cy="0"/>
+          <a:chOff x="0" y="0"/>
+          <a:chExt cx="0" cy="0"/>
+        </a:xfrm>
+      </p:grpSpPr>
+      <p:sp>
+        <p:nvSpPr>
+          <p:cNvPr id="2" name="Segnaposto immagine diapositiva 1"/>
+          <p:cNvSpPr>
+            <a:spLocks noGrp="1" noRot="1" noChangeAspect="1"/>
+          </p:cNvSpPr>
+          <p:nvPr>
+            <p:ph type="sldImg"/>
+          </p:nvPr>
+        </p:nvSpPr>
+        <p:spPr/>
+      </p:sp>
+      <p:sp>
+        <p:nvSpPr>
+          <p:cNvPr id="3" name="Segnaposto note 2"/>
+          <p:cNvSpPr>
+            <a:spLocks noGrp="1"/>
+          </p:cNvSpPr>
+          <p:nvPr>
+            <p:ph type="body" idx="1"/>
+          </p:nvPr>
+        </p:nvSpPr>
+        <p:spPr/>
+        <p:txBody>
+          <a:bodyPr/>
+          <a:lstStyle/>
+          <a:p>
+            <a:endParaRPr lang="it-IT" sz="1200" b="0" dirty="0"/>
+          </a:p>
+        </p:txBody>
+      </p:sp>
+      <p:sp>
+        <p:nvSpPr>
+          <p:cNvPr id="4" name="Segnaposto numero diapositiva 3"/>
+          <p:cNvSpPr>
+            <a:spLocks noGrp="1"/>
+          </p:cNvSpPr>
+          <p:nvPr>
+            <p:ph type="sldNum" sz="quarter" idx="10"/>
+          </p:nvPr>
+        </p:nvSpPr>
+        <p:spPr/>
+        <p:txBody>
+          <a:bodyPr/>
+          <a:lstStyle/>
+          <a:p>
+            <a:fld id="{E73CFAA4-C87D-1545-9F8E-F35BF2220A99}" type="slidenum">
+              <a:rPr lang="it-IT" smtClean="0"/>
+              <a:t>15</a:t>
+            </a:fld>
+            <a:endParaRPr lang="it-IT"/>
+          </a:p>
+        </p:txBody>
+      </p:sp>
+    </p:spTree>
+    <p:extLst>
+      <p:ext uri="{BB962C8B-B14F-4D97-AF65-F5344CB8AC3E}">
+        <p14:creationId xmlns:p14="http://schemas.microsoft.com/office/powerpoint/2010/main" val="38993079"/>
+      </p:ext>
+    </p:extLst>
+  </p:cSld>
+  <p:clrMapOvr>
+    <a:masterClrMapping/>
+  </p:clrMapOvr>
+</p:notes>
+</file>
+
+<file path=ppt/notesSlides/notesSlide16.xml><?xml version="1.0" encoding="utf-8"?>
+<p:notes xmlns:a="http://schemas.openxmlformats.org/drawingml/2006/main" xmlns:r="http://schemas.openxmlformats.org/officeDocument/2006/relationships" xmlns:p="http://schemas.openxmlformats.org/presentationml/2006/main">
+  <p:cSld>
+    <p:spTree>
+      <p:nvGrpSpPr>
+        <p:cNvPr id="1" name=""/>
+        <p:cNvGrpSpPr/>
+        <p:nvPr/>
+      </p:nvGrpSpPr>
+      <p:grpSpPr>
+        <a:xfrm>
+          <a:off x="0" y="0"/>
+          <a:ext cx="0" cy="0"/>
+          <a:chOff x="0" y="0"/>
+          <a:chExt cx="0" cy="0"/>
+        </a:xfrm>
+      </p:grpSpPr>
+      <p:sp>
+        <p:nvSpPr>
+          <p:cNvPr id="2" name="Segnaposto immagine diapositiva 1"/>
+          <p:cNvSpPr>
+            <a:spLocks noGrp="1" noRot="1" noChangeAspect="1"/>
+          </p:cNvSpPr>
+          <p:nvPr>
+            <p:ph type="sldImg"/>
+          </p:nvPr>
+        </p:nvSpPr>
+        <p:spPr/>
+      </p:sp>
+      <p:sp>
+        <p:nvSpPr>
+          <p:cNvPr id="3" name="Segnaposto note 2"/>
+          <p:cNvSpPr>
+            <a:spLocks noGrp="1"/>
+          </p:cNvSpPr>
+          <p:nvPr>
+            <p:ph type="body" idx="1"/>
+          </p:nvPr>
+        </p:nvSpPr>
+        <p:spPr/>
+        <p:txBody>
+          <a:bodyPr/>
+          <a:lstStyle/>
+          <a:p>
+            <a:endParaRPr lang="it-IT" sz="1200" b="0" dirty="0"/>
+          </a:p>
+        </p:txBody>
+      </p:sp>
+      <p:sp>
+        <p:nvSpPr>
+          <p:cNvPr id="4" name="Segnaposto numero diapositiva 3"/>
+          <p:cNvSpPr>
+            <a:spLocks noGrp="1"/>
+          </p:cNvSpPr>
+          <p:nvPr>
+            <p:ph type="sldNum" sz="quarter" idx="10"/>
+          </p:nvPr>
+        </p:nvSpPr>
+        <p:spPr/>
+        <p:txBody>
+          <a:bodyPr/>
+          <a:lstStyle/>
+          <a:p>
+            <a:fld id="{E73CFAA4-C87D-1545-9F8E-F35BF2220A99}" type="slidenum">
+              <a:rPr lang="it-IT" smtClean="0"/>
+              <a:t>16</a:t>
+            </a:fld>
+            <a:endParaRPr lang="it-IT"/>
+          </a:p>
+        </p:txBody>
+      </p:sp>
+    </p:spTree>
+    <p:extLst>
+      <p:ext uri="{BB962C8B-B14F-4D97-AF65-F5344CB8AC3E}">
+        <p14:creationId xmlns:p14="http://schemas.microsoft.com/office/powerpoint/2010/main" val="3633357949"/>
+      </p:ext>
+    </p:extLst>
+  </p:cSld>
+  <p:clrMapOvr>
+    <a:masterClrMapping/>
+  </p:clrMapOvr>
+</p:notes>
+</file>
+
+<file path=ppt/notesSlides/notesSlide17.xml><?xml version="1.0" encoding="utf-8"?>
+<p:notes xmlns:a="http://schemas.openxmlformats.org/drawingml/2006/main" xmlns:r="http://schemas.openxmlformats.org/officeDocument/2006/relationships" xmlns:p="http://schemas.openxmlformats.org/presentationml/2006/main">
+  <p:cSld>
+    <p:spTree>
+      <p:nvGrpSpPr>
+        <p:cNvPr id="1" name=""/>
+        <p:cNvGrpSpPr/>
+        <p:nvPr/>
+      </p:nvGrpSpPr>
+      <p:grpSpPr>
+        <a:xfrm>
+          <a:off x="0" y="0"/>
+          <a:ext cx="0" cy="0"/>
+          <a:chOff x="0" y="0"/>
+          <a:chExt cx="0" cy="0"/>
+        </a:xfrm>
+      </p:grpSpPr>
+      <p:sp>
+        <p:nvSpPr>
+          <p:cNvPr id="2" name="Segnaposto immagine diapositiva 1"/>
+          <p:cNvSpPr>
+            <a:spLocks noGrp="1" noRot="1" noChangeAspect="1"/>
+          </p:cNvSpPr>
+          <p:nvPr>
+            <p:ph type="sldImg"/>
+          </p:nvPr>
+        </p:nvSpPr>
+        <p:spPr/>
+      </p:sp>
+      <p:sp>
+        <p:nvSpPr>
+          <p:cNvPr id="3" name="Segnaposto note 2"/>
+          <p:cNvSpPr>
+            <a:spLocks noGrp="1"/>
+          </p:cNvSpPr>
+          <p:nvPr>
+            <p:ph type="body" idx="1"/>
+          </p:nvPr>
+        </p:nvSpPr>
+        <p:spPr/>
+        <p:txBody>
+          <a:bodyPr/>
+          <a:lstStyle/>
+          <a:p>
+            <a:endParaRPr lang="it-IT" sz="1200" b="0" dirty="0"/>
+          </a:p>
+        </p:txBody>
+      </p:sp>
+      <p:sp>
+        <p:nvSpPr>
+          <p:cNvPr id="4" name="Segnaposto numero diapositiva 3"/>
+          <p:cNvSpPr>
+            <a:spLocks noGrp="1"/>
+          </p:cNvSpPr>
+          <p:nvPr>
+            <p:ph type="sldNum" sz="quarter" idx="10"/>
+          </p:nvPr>
+        </p:nvSpPr>
+        <p:spPr/>
+        <p:txBody>
+          <a:bodyPr/>
+          <a:lstStyle/>
+          <a:p>
+            <a:fld id="{E73CFAA4-C87D-1545-9F8E-F35BF2220A99}" type="slidenum">
+              <a:rPr lang="it-IT" smtClean="0"/>
+              <a:t>17</a:t>
+            </a:fld>
+            <a:endParaRPr lang="it-IT"/>
+          </a:p>
+        </p:txBody>
+      </p:sp>
+    </p:spTree>
+    <p:extLst>
+      <p:ext uri="{BB962C8B-B14F-4D97-AF65-F5344CB8AC3E}">
+        <p14:creationId xmlns:p14="http://schemas.microsoft.com/office/powerpoint/2010/main" val="4016828837"/>
+      </p:ext>
+    </p:extLst>
+  </p:cSld>
+  <p:clrMapOvr>
+    <a:masterClrMapping/>
+  </p:clrMapOvr>
+</p:notes>
+</file>
+
+<file path=ppt/notesSlides/notesSlide18.xml><?xml version="1.0" encoding="utf-8"?>
+<p:notes xmlns:a="http://schemas.openxmlformats.org/drawingml/2006/main" xmlns:r="http://schemas.openxmlformats.org/officeDocument/2006/relationships" xmlns:p="http://schemas.openxmlformats.org/presentationml/2006/main">
+  <p:cSld>
+    <p:spTree>
+      <p:nvGrpSpPr>
+        <p:cNvPr id="1" name=""/>
+        <p:cNvGrpSpPr/>
+        <p:nvPr/>
+      </p:nvGrpSpPr>
+      <p:grpSpPr>
+        <a:xfrm>
+          <a:off x="0" y="0"/>
+          <a:ext cx="0" cy="0"/>
+          <a:chOff x="0" y="0"/>
+          <a:chExt cx="0" cy="0"/>
+        </a:xfrm>
+      </p:grpSpPr>
+      <p:sp>
+        <p:nvSpPr>
+          <p:cNvPr id="2" name="Segnaposto immagine diapositiva 1"/>
+          <p:cNvSpPr>
+            <a:spLocks noGrp="1" noRot="1" noChangeAspect="1"/>
+          </p:cNvSpPr>
+          <p:nvPr>
+            <p:ph type="sldImg"/>
+          </p:nvPr>
+        </p:nvSpPr>
+        <p:spPr/>
+      </p:sp>
+      <p:sp>
+        <p:nvSpPr>
+          <p:cNvPr id="3" name="Segnaposto note 2"/>
+          <p:cNvSpPr>
+            <a:spLocks noGrp="1"/>
+          </p:cNvSpPr>
+          <p:nvPr>
+            <p:ph type="body" idx="1"/>
+          </p:nvPr>
+        </p:nvSpPr>
+        <p:spPr/>
+        <p:txBody>
+          <a:bodyPr/>
+          <a:lstStyle/>
+          <a:p>
+            <a:endParaRPr lang="it-IT" sz="1200" b="0" dirty="0"/>
+          </a:p>
+        </p:txBody>
+      </p:sp>
+      <p:sp>
+        <p:nvSpPr>
+          <p:cNvPr id="4" name="Segnaposto numero diapositiva 3"/>
+          <p:cNvSpPr>
+            <a:spLocks noGrp="1"/>
+          </p:cNvSpPr>
+          <p:nvPr>
+            <p:ph type="sldNum" sz="quarter" idx="10"/>
+          </p:nvPr>
+        </p:nvSpPr>
+        <p:spPr/>
+        <p:txBody>
+          <a:bodyPr/>
+          <a:lstStyle/>
+          <a:p>
+            <a:fld id="{E73CFAA4-C87D-1545-9F8E-F35BF2220A99}" type="slidenum">
+              <a:rPr lang="it-IT" smtClean="0"/>
+              <a:t>18</a:t>
+            </a:fld>
+            <a:endParaRPr lang="it-IT"/>
+          </a:p>
+        </p:txBody>
+      </p:sp>
+    </p:spTree>
+    <p:extLst>
+      <p:ext uri="{BB962C8B-B14F-4D97-AF65-F5344CB8AC3E}">
+        <p14:creationId xmlns:p14="http://schemas.microsoft.com/office/powerpoint/2010/main" val="3493436445"/>
+      </p:ext>
+    </p:extLst>
+  </p:cSld>
+  <p:clrMapOvr>
+    <a:masterClrMapping/>
+  </p:clrMapOvr>
+</p:notes>
+</file>
+
+<file path=ppt/notesSlides/notesSlide19.xml><?xml version="1.0" encoding="utf-8"?>
+<p:notes xmlns:a="http://schemas.openxmlformats.org/drawingml/2006/main" xmlns:r="http://schemas.openxmlformats.org/officeDocument/2006/relationships" xmlns:p="http://schemas.openxmlformats.org/presentationml/2006/main">
+  <p:cSld>
+    <p:spTree>
+      <p:nvGrpSpPr>
+        <p:cNvPr id="1" name=""/>
+        <p:cNvGrpSpPr/>
+        <p:nvPr/>
+      </p:nvGrpSpPr>
+      <p:grpSpPr>
+        <a:xfrm>
+          <a:off x="0" y="0"/>
+          <a:ext cx="0" cy="0"/>
+          <a:chOff x="0" y="0"/>
+          <a:chExt cx="0" cy="0"/>
+        </a:xfrm>
+      </p:grpSpPr>
+      <p:sp>
+        <p:nvSpPr>
+          <p:cNvPr id="2" name="Segnaposto immagine diapositiva 1"/>
+          <p:cNvSpPr>
+            <a:spLocks noGrp="1" noRot="1" noChangeAspect="1"/>
+          </p:cNvSpPr>
+          <p:nvPr>
+            <p:ph type="sldImg"/>
+          </p:nvPr>
+        </p:nvSpPr>
+        <p:spPr/>
+      </p:sp>
+      <p:sp>
+        <p:nvSpPr>
+          <p:cNvPr id="3" name="Segnaposto note 2"/>
+          <p:cNvSpPr>
+            <a:spLocks noGrp="1"/>
+          </p:cNvSpPr>
+          <p:nvPr>
+            <p:ph type="body" idx="1"/>
+          </p:nvPr>
+        </p:nvSpPr>
+        <p:spPr/>
+        <p:txBody>
+          <a:bodyPr/>
+          <a:lstStyle/>
+          <a:p>
+            <a:endParaRPr lang="it-IT" baseline="0" dirty="0"/>
+          </a:p>
+        </p:txBody>
+      </p:sp>
+      <p:sp>
+        <p:nvSpPr>
+          <p:cNvPr id="4" name="Segnaposto numero diapositiva 3"/>
+          <p:cNvSpPr>
+            <a:spLocks noGrp="1"/>
+          </p:cNvSpPr>
+          <p:nvPr>
+            <p:ph type="sldNum" sz="quarter" idx="10"/>
+          </p:nvPr>
+        </p:nvSpPr>
+        <p:spPr/>
+        <p:txBody>
+          <a:bodyPr/>
+          <a:lstStyle/>
+          <a:p>
+            <a:fld id="{E73CFAA4-C87D-1545-9F8E-F35BF2220A99}" type="slidenum">
+              <a:rPr lang="it-IT" smtClean="0"/>
+              <a:t>19</a:t>
+            </a:fld>
+            <a:endParaRPr lang="it-IT"/>
+          </a:p>
+        </p:txBody>
+      </p:sp>
+    </p:spTree>
+    <p:extLst>
+      <p:ext uri="{BB962C8B-B14F-4D97-AF65-F5344CB8AC3E}">
+        <p14:creationId xmlns:p14="http://schemas.microsoft.com/office/powerpoint/2010/main" val="1607655172"/>
       </p:ext>
     </p:extLst>
   </p:cSld>
@@ -796,6 +1545,107 @@
     <p:extLst>
       <p:ext uri="{BB962C8B-B14F-4D97-AF65-F5344CB8AC3E}">
         <p14:creationId xmlns:p14="http://schemas.microsoft.com/office/powerpoint/2010/main" val="2759415330"/>
+      </p:ext>
+    </p:extLst>
+  </p:cSld>
+  <p:clrMapOvr>
+    <a:masterClrMapping/>
+  </p:clrMapOvr>
+</p:notes>
+</file>
+
+<file path=ppt/notesSlides/notesSlide20.xml><?xml version="1.0" encoding="utf-8"?>
+<p:notes xmlns:a="http://schemas.openxmlformats.org/drawingml/2006/main" xmlns:r="http://schemas.openxmlformats.org/officeDocument/2006/relationships" xmlns:p="http://schemas.openxmlformats.org/presentationml/2006/main">
+  <p:cSld>
+    <p:spTree>
+      <p:nvGrpSpPr>
+        <p:cNvPr id="1" name=""/>
+        <p:cNvGrpSpPr/>
+        <p:nvPr/>
+      </p:nvGrpSpPr>
+      <p:grpSpPr>
+        <a:xfrm>
+          <a:off x="0" y="0"/>
+          <a:ext cx="0" cy="0"/>
+          <a:chOff x="0" y="0"/>
+          <a:chExt cx="0" cy="0"/>
+        </a:xfrm>
+      </p:grpSpPr>
+      <p:sp>
+        <p:nvSpPr>
+          <p:cNvPr id="2" name="Segnaposto immagine diapositiva 1"/>
+          <p:cNvSpPr>
+            <a:spLocks noGrp="1" noRot="1" noChangeAspect="1"/>
+          </p:cNvSpPr>
+          <p:nvPr>
+            <p:ph type="sldImg"/>
+          </p:nvPr>
+        </p:nvSpPr>
+        <p:spPr/>
+      </p:sp>
+      <p:sp>
+        <p:nvSpPr>
+          <p:cNvPr id="3" name="Segnaposto note 2"/>
+          <p:cNvSpPr>
+            <a:spLocks noGrp="1"/>
+          </p:cNvSpPr>
+          <p:nvPr>
+            <p:ph type="body" idx="1"/>
+          </p:nvPr>
+        </p:nvSpPr>
+        <p:spPr/>
+        <p:txBody>
+          <a:bodyPr/>
+          <a:lstStyle/>
+          <a:p>
+            <a:pPr marL="0" marR="0" indent="0" algn="l" defTabSz="457200" rtl="0" eaLnBrk="1" fontAlgn="auto" latinLnBrk="0" hangingPunct="1">
+              <a:lnSpc>
+                <a:spcPct val="100000"/>
+              </a:lnSpc>
+              <a:spcBef>
+                <a:spcPts val="0"/>
+              </a:spcBef>
+              <a:spcAft>
+                <a:spcPts val="0"/>
+              </a:spcAft>
+              <a:buClrTx/>
+              <a:buSzTx/>
+              <a:buFontTx/>
+              <a:buNone/>
+              <a:tabLst/>
+              <a:defRPr/>
+            </a:pPr>
+            <a:endParaRPr lang="it-IT" b="0" dirty="0"/>
+          </a:p>
+        </p:txBody>
+      </p:sp>
+      <p:sp>
+        <p:nvSpPr>
+          <p:cNvPr id="4" name="Segnaposto numero diapositiva 3"/>
+          <p:cNvSpPr>
+            <a:spLocks noGrp="1"/>
+          </p:cNvSpPr>
+          <p:nvPr>
+            <p:ph type="sldNum" sz="quarter" idx="10"/>
+          </p:nvPr>
+        </p:nvSpPr>
+        <p:spPr/>
+        <p:txBody>
+          <a:bodyPr/>
+          <a:lstStyle/>
+          <a:p>
+            <a:fld id="{E73CFAA4-C87D-1545-9F8E-F35BF2220A99}" type="slidenum">
+              <a:rPr lang="it-IT" smtClean="0"/>
+              <a:t>20</a:t>
+            </a:fld>
+            <a:endParaRPr lang="it-IT"/>
+          </a:p>
+        </p:txBody>
+      </p:sp>
+    </p:spTree>
+    <p:extLst>
+      <p:ext uri="{BB962C8B-B14F-4D97-AF65-F5344CB8AC3E}">
+        <p14:creationId xmlns:p14="http://schemas.microsoft.com/office/powerpoint/2010/main" val="2864582512"/>
       </p:ext>
     </p:extLst>
   </p:cSld>
@@ -5111,356 +5961,104 @@
           <a:p>
             <a:r>
               <a:rPr lang="it-IT" dirty="0"/>
-              <a:t>Conclusioni</a:t>
-            </a:r>
-          </a:p>
-        </p:txBody>
-      </p:sp>
-      <p:pic>
-        <p:nvPicPr>
-          <p:cNvPr id="4" name="Picture 3"/>
-          <p:cNvPicPr>
-            <a:picLocks noChangeAspect="1" noChangeArrowheads="1"/>
-          </p:cNvPicPr>
-          <p:nvPr/>
-        </p:nvPicPr>
-        <p:blipFill>
-          <a:blip r:embed="rId4" cstate="print">
-            <a:extLst>
-              <a:ext uri="{28A0092B-C50C-407E-A947-70E740481C1C}">
-                <a14:useLocalDpi xmlns:a14="http://schemas.microsoft.com/office/drawing/2010/main" val="0"/>
-              </a:ext>
-            </a:extLst>
-          </a:blip>
-          <a:srcRect/>
-          <a:stretch>
-            <a:fillRect/>
-          </a:stretch>
-        </p:blipFill>
-        <p:spPr bwMode="auto">
+              <a:t>Sommario</a:t>
+            </a:r>
+          </a:p>
+        </p:txBody>
+      </p:sp>
+      <p:sp>
+        <p:nvSpPr>
+          <p:cNvPr id="3" name="Segnaposto testo 2"/>
+          <p:cNvSpPr>
+            <a:spLocks noGrp="1"/>
+          </p:cNvSpPr>
+          <p:nvPr>
+            <p:ph type="body" sz="quarter" idx="11"/>
+          </p:nvPr>
+        </p:nvSpPr>
+        <p:spPr>
           <a:xfrm>
-            <a:off x="4139933" y="3422267"/>
-            <a:ext cx="3178592" cy="3059371"/>
+            <a:off x="603250" y="1671651"/>
+            <a:ext cx="7937501" cy="3514698"/>
           </a:xfrm>
-          <a:prstGeom prst="rect">
-            <a:avLst/>
-          </a:prstGeom>
-          <a:noFill/>
-          <a:ln>
-            <a:noFill/>
-          </a:ln>
-          <a:extLst>
-            <a:ext uri="{909E8E84-426E-40dd-AFC4-6F175D3DCCD1}">
-              <a14:hiddenFill xmlns:a14="http://schemas.microsoft.com/office/drawing/2010/main" xmlns="">
-                <a:solidFill>
-                  <a:schemeClr val="accent1"/>
-                </a:solidFill>
-              </a14:hiddenFill>
-            </a:ext>
-            <a:ext uri="{91240B29-F687-4f45-9708-019B960494DF}">
-              <a14:hiddenLine xmlns:a14="http://schemas.microsoft.com/office/drawing/2010/main" xmlns="" w="9525">
+        </p:spPr>
+        <p:txBody>
+          <a:bodyPr/>
+          <a:lstStyle/>
+          <a:p>
+            <a:pPr marL="457200" indent="-457200">
+              <a:lnSpc>
+                <a:spcPct val="140000"/>
+              </a:lnSpc>
+              <a:buFont typeface="Arial"/>
+              <a:buChar char="•"/>
+            </a:pPr>
+            <a:r>
+              <a:rPr lang="it-IT" sz="2800" dirty="0">
                 <a:solidFill>
                   <a:schemeClr val="tx1"/>
                 </a:solidFill>
-                <a:miter lim="800000"/>
-                <a:headEnd/>
-                <a:tailEnd/>
-              </a14:hiddenLine>
-            </a:ext>
-          </a:extLst>
-        </p:spPr>
-      </p:pic>
-      <p:sp>
-        <p:nvSpPr>
-          <p:cNvPr id="6" name="CasellaDiTesto 5"/>
-          <p:cNvSpPr txBox="1"/>
-          <p:nvPr/>
-        </p:nvSpPr>
-        <p:spPr>
-          <a:xfrm>
-            <a:off x="1791468" y="1646095"/>
-            <a:ext cx="5561065" cy="1269578"/>
-          </a:xfrm>
-          <a:prstGeom prst="rect">
-            <a:avLst/>
-          </a:prstGeom>
-          <a:noFill/>
-        </p:spPr>
-        <p:txBody>
-          <a:bodyPr wrap="square" rtlCol="0">
-            <a:spAutoFit/>
-          </a:bodyPr>
-          <a:lstStyle/>
-          <a:p>
-            <a:pPr marL="285750" indent="-285750">
-              <a:spcBef>
-                <a:spcPts val="0"/>
-              </a:spcBef>
-              <a:spcAft>
-                <a:spcPts val="500"/>
-              </a:spcAft>
-              <a:buFont typeface="Arial" panose="020B0604020202020204" pitchFamily="34" charset="0"/>
+              </a:rPr>
+              <a:t>Introduzione e Obiettivi del Lavoro</a:t>
+            </a:r>
+          </a:p>
+          <a:p>
+            <a:pPr marL="457200" indent="-457200">
+              <a:lnSpc>
+                <a:spcPct val="140000"/>
+              </a:lnSpc>
+              <a:buFont typeface="Arial"/>
               <a:buChar char="•"/>
             </a:pPr>
             <a:r>
-              <a:rPr lang="it-IT" sz="1600" dirty="0"/>
-              <a:t>Risultato1</a:t>
-            </a:r>
-          </a:p>
-          <a:p>
-            <a:pPr marL="285750" indent="-285750">
-              <a:spcBef>
-                <a:spcPts val="0"/>
-              </a:spcBef>
-              <a:spcAft>
-                <a:spcPts val="500"/>
-              </a:spcAft>
-              <a:buFont typeface="Arial" panose="020B0604020202020204" pitchFamily="34" charset="0"/>
+              <a:rPr lang="it-IT" sz="2800" dirty="0">
+                <a:solidFill>
+                  <a:schemeClr val="tx1"/>
+                </a:solidFill>
+              </a:rPr>
+              <a:t>Testing per Lifecycle</a:t>
+            </a:r>
+          </a:p>
+          <a:p>
+            <a:pPr marL="457200" indent="-457200">
+              <a:lnSpc>
+                <a:spcPct val="140000"/>
+              </a:lnSpc>
+              <a:buFont typeface="Arial"/>
               <a:buChar char="•"/>
             </a:pPr>
             <a:r>
-              <a:rPr lang="it-IT" sz="1600" dirty="0"/>
-              <a:t>Risultato2</a:t>
-            </a:r>
-          </a:p>
-          <a:p>
-            <a:pPr marL="285750" indent="-285750">
-              <a:spcBef>
-                <a:spcPts val="0"/>
-              </a:spcBef>
-              <a:spcAft>
-                <a:spcPts val="500"/>
-              </a:spcAft>
-              <a:buFont typeface="Arial" panose="020B0604020202020204" pitchFamily="34" charset="0"/>
+              <a:rPr lang="it-IT" sz="2800" b="1" dirty="0">
+                <a:solidFill>
+                  <a:srgbClr val="1F497D"/>
+                </a:solidFill>
+              </a:rPr>
+              <a:t>Testing basato sugli Eventi</a:t>
+            </a:r>
+          </a:p>
+          <a:p>
+            <a:pPr marL="457200" indent="-457200">
+              <a:lnSpc>
+                <a:spcPct val="140000"/>
+              </a:lnSpc>
+              <a:buFont typeface="Arial"/>
               <a:buChar char="•"/>
             </a:pPr>
             <a:r>
-              <a:rPr lang="it-IT" sz="1600" dirty="0"/>
-              <a:t>Risultato3</a:t>
-            </a:r>
-          </a:p>
-          <a:p>
-            <a:pPr marL="285750" indent="-285750">
-              <a:spcBef>
-                <a:spcPts val="0"/>
-              </a:spcBef>
-              <a:spcAft>
-                <a:spcPts val="500"/>
-              </a:spcAft>
-              <a:buFont typeface="Arial" panose="020B0604020202020204" pitchFamily="34" charset="0"/>
-              <a:buChar char="•"/>
-            </a:pPr>
-            <a:r>
-              <a:rPr lang="it-IT" sz="1600" dirty="0"/>
-              <a:t>Risultato4</a:t>
-            </a:r>
-          </a:p>
-        </p:txBody>
-      </p:sp>
-      <p:sp useBgFill="1">
-        <p:nvSpPr>
-          <p:cNvPr id="9" name="CasellaDiTesto 8"/>
-          <p:cNvSpPr txBox="1"/>
-          <p:nvPr/>
-        </p:nvSpPr>
-        <p:spPr>
-          <a:xfrm>
-            <a:off x="3326538" y="1103225"/>
-            <a:ext cx="2490925" cy="400110"/>
-          </a:xfrm>
-          <a:prstGeom prst="rect">
-            <a:avLst/>
-          </a:prstGeom>
-        </p:spPr>
-        <p:style>
-          <a:lnRef idx="2">
-            <a:schemeClr val="accent1"/>
-          </a:lnRef>
-          <a:fillRef idx="1">
-            <a:schemeClr val="lt1"/>
-          </a:fillRef>
-          <a:effectRef idx="0">
-            <a:schemeClr val="accent1"/>
-          </a:effectRef>
-          <a:fontRef idx="minor">
-            <a:schemeClr val="dk1"/>
-          </a:fontRef>
-        </p:style>
-        <p:txBody>
-          <a:bodyPr wrap="square" rtlCol="0">
-            <a:spAutoFit/>
-          </a:bodyPr>
-          <a:lstStyle/>
-          <a:p>
-            <a:pPr algn="ctr"/>
-            <a:r>
-              <a:rPr lang="it-IT" sz="2000" dirty="0"/>
-              <a:t>Risultati Scientifici</a:t>
-            </a:r>
-          </a:p>
-        </p:txBody>
-      </p:sp>
-      <p:sp>
-        <p:nvSpPr>
-          <p:cNvPr id="10" name="CasellaDiTesto 9"/>
-          <p:cNvSpPr txBox="1"/>
-          <p:nvPr/>
-        </p:nvSpPr>
-        <p:spPr>
-          <a:xfrm>
-            <a:off x="1649008" y="4854818"/>
-            <a:ext cx="2490925" cy="707886"/>
-          </a:xfrm>
-          <a:prstGeom prst="rect">
-            <a:avLst/>
-          </a:prstGeom>
-        </p:spPr>
-        <p:style>
-          <a:lnRef idx="2">
-            <a:schemeClr val="accent1"/>
-          </a:lnRef>
-          <a:fillRef idx="1">
-            <a:schemeClr val="lt1"/>
-          </a:fillRef>
-          <a:effectRef idx="0">
-            <a:schemeClr val="accent1"/>
-          </a:effectRef>
-          <a:fontRef idx="minor">
-            <a:schemeClr val="dk1"/>
-          </a:fontRef>
-        </p:style>
-        <p:txBody>
-          <a:bodyPr wrap="square" rtlCol="0">
-            <a:spAutoFit/>
-          </a:bodyPr>
-          <a:lstStyle/>
-          <a:p>
-            <a:pPr algn="ctr"/>
-            <a:r>
-              <a:rPr lang="it-IT" sz="2000" dirty="0"/>
-              <a:t>Risultati Industriali</a:t>
-            </a:r>
-          </a:p>
-          <a:p>
-            <a:pPr algn="ctr"/>
-            <a:r>
-              <a:rPr lang="it-IT" sz="2000" dirty="0"/>
-              <a:t>e/o Sviluppi Futuri</a:t>
-            </a:r>
-          </a:p>
-        </p:txBody>
-      </p:sp>
-      <p:sp>
-        <p:nvSpPr>
-          <p:cNvPr id="16" name="CasellaDiTesto 15"/>
-          <p:cNvSpPr txBox="1"/>
-          <p:nvPr/>
-        </p:nvSpPr>
-        <p:spPr>
-          <a:xfrm rot="21433596">
-            <a:off x="4498471" y="4124244"/>
-            <a:ext cx="2465271" cy="1933863"/>
-          </a:xfrm>
-          <a:prstGeom prst="rect">
-            <a:avLst/>
-          </a:prstGeom>
-          <a:noFill/>
-        </p:spPr>
-        <p:txBody>
-          <a:bodyPr wrap="square" rtlCol="0">
-            <a:spAutoFit/>
-          </a:bodyPr>
-          <a:lstStyle/>
-          <a:p>
-            <a:pPr marL="285750" indent="-285750">
-              <a:spcBef>
-                <a:spcPts val="0"/>
-              </a:spcBef>
-              <a:spcAft>
-                <a:spcPts val="1000"/>
-              </a:spcAft>
-              <a:buFont typeface="Arial" panose="020B0604020202020204" pitchFamily="34" charset="0"/>
-              <a:buChar char="•"/>
-            </a:pPr>
-            <a:r>
-              <a:rPr lang="it-IT" sz="1600" dirty="0"/>
-              <a:t>Risultato1</a:t>
-            </a:r>
-          </a:p>
-          <a:p>
-            <a:pPr>
-              <a:spcBef>
-                <a:spcPts val="0"/>
-              </a:spcBef>
-              <a:spcAft>
-                <a:spcPts val="1000"/>
-              </a:spcAft>
-            </a:pPr>
-            <a:endParaRPr lang="it-IT" sz="1000" dirty="0"/>
-          </a:p>
-          <a:p>
-            <a:pPr marL="285750" indent="-285750">
-              <a:spcBef>
-                <a:spcPts val="0"/>
-              </a:spcBef>
-              <a:spcAft>
-                <a:spcPts val="1000"/>
-              </a:spcAft>
-              <a:buFont typeface="Arial" panose="020B0604020202020204" pitchFamily="34" charset="0"/>
-              <a:buChar char="•"/>
-            </a:pPr>
-            <a:r>
-              <a:rPr lang="it-IT" sz="1600" dirty="0"/>
-              <a:t>Risultato2</a:t>
-            </a:r>
-          </a:p>
-          <a:p>
-            <a:pPr>
-              <a:spcBef>
-                <a:spcPts val="0"/>
-              </a:spcBef>
-              <a:spcAft>
-                <a:spcPts val="1000"/>
-              </a:spcAft>
-            </a:pPr>
-            <a:endParaRPr lang="it-IT" sz="1000" dirty="0"/>
-          </a:p>
-          <a:p>
-            <a:pPr marL="285750" indent="-285750">
-              <a:spcBef>
-                <a:spcPts val="0"/>
-              </a:spcBef>
-              <a:spcAft>
-                <a:spcPts val="1000"/>
-              </a:spcAft>
-              <a:buFont typeface="Arial" panose="020B0604020202020204" pitchFamily="34" charset="0"/>
-              <a:buChar char="•"/>
-            </a:pPr>
-            <a:r>
-              <a:rPr lang="it-IT" sz="1600" dirty="0"/>
-              <a:t>Risultato3</a:t>
-            </a:r>
-          </a:p>
-          <a:p>
-            <a:pPr>
-              <a:spcBef>
-                <a:spcPts val="0"/>
-              </a:spcBef>
-              <a:spcAft>
-                <a:spcPts val="1000"/>
-              </a:spcAft>
-            </a:pPr>
-            <a:endParaRPr lang="it-IT" sz="1000" dirty="0"/>
+              <a:rPr lang="it-IT" sz="2800" dirty="0">
+                <a:solidFill>
+                  <a:schemeClr val="tx1"/>
+                </a:solidFill>
+              </a:rPr>
+              <a:t>Conclusioni</a:t>
+            </a:r>
           </a:p>
         </p:txBody>
       </p:sp>
     </p:spTree>
-    <p:custDataLst>
-      <p:tags r:id="rId1"/>
-    </p:custDataLst>
     <p:extLst>
       <p:ext uri="{BB962C8B-B14F-4D97-AF65-F5344CB8AC3E}">
-        <p14:creationId xmlns:p14="http://schemas.microsoft.com/office/powerpoint/2010/main" val="1562047360"/>
+        <p14:creationId xmlns:p14="http://schemas.microsoft.com/office/powerpoint/2010/main" val="3169131952"/>
       </p:ext>
     </p:extLst>
   </p:cSld>
@@ -5469,145 +6067,12 @@
   </p:clrMapOvr>
   <mc:AlternateContent xmlns:mc="http://schemas.openxmlformats.org/markup-compatibility/2006" xmlns:p14="http://schemas.microsoft.com/office/powerpoint/2010/main">
     <mc:Choice Requires="p14">
-      <p:transition spd="slow" p14:dur="2000" advTm="9545"/>
+      <p:transition spd="slow" p14:dur="2000" advTm="25932"/>
     </mc:Choice>
     <mc:Fallback xmlns="">
-      <p:transition xmlns:p14="http://schemas.microsoft.com/office/powerpoint/2010/main" spd="slow" advTm="9545"/>
+      <p:transition xmlns:p14="http://schemas.microsoft.com/office/powerpoint/2010/main" spd="slow" advTm="25932"/>
     </mc:Fallback>
   </mc:AlternateContent>
-  <p:timing>
-    <p:tnLst>
-      <p:par>
-        <p:cTn id="1" dur="indefinite" restart="never" nodeType="tmRoot">
-          <p:childTnLst>
-            <p:seq concurrent="1" nextAc="seek">
-              <p:cTn id="2" dur="indefinite" nodeType="mainSeq">
-                <p:childTnLst>
-                  <p:par>
-                    <p:cTn id="3" fill="hold">
-                      <p:stCondLst>
-                        <p:cond delay="indefinite"/>
-                      </p:stCondLst>
-                      <p:childTnLst>
-                        <p:par>
-                          <p:cTn id="4" fill="hold">
-                            <p:stCondLst>
-                              <p:cond delay="0"/>
-                            </p:stCondLst>
-                            <p:childTnLst>
-                              <p:par>
-                                <p:cTn id="5" presetID="1" presetClass="entr" presetSubtype="0" fill="hold" grpId="0" nodeType="clickEffect">
-                                  <p:stCondLst>
-                                    <p:cond delay="0"/>
-                                  </p:stCondLst>
-                                  <p:childTnLst>
-                                    <p:set>
-                                      <p:cBhvr>
-                                        <p:cTn id="6" dur="1" fill="hold">
-                                          <p:stCondLst>
-                                            <p:cond delay="0"/>
-                                          </p:stCondLst>
-                                        </p:cTn>
-                                        <p:tgtEl>
-                                          <p:spTgt spid="16"/>
-                                        </p:tgtEl>
-                                        <p:attrNameLst>
-                                          <p:attrName>style.visibility</p:attrName>
-                                        </p:attrNameLst>
-                                      </p:cBhvr>
-                                      <p:to>
-                                        <p:strVal val="visible"/>
-                                      </p:to>
-                                    </p:set>
-                                  </p:childTnLst>
-                                </p:cTn>
-                              </p:par>
-                              <p:par>
-                                <p:cTn id="7" presetID="1" presetClass="entr" presetSubtype="0" fill="hold" nodeType="withEffect">
-                                  <p:stCondLst>
-                                    <p:cond delay="0"/>
-                                  </p:stCondLst>
-                                  <p:childTnLst>
-                                    <p:set>
-                                      <p:cBhvr>
-                                        <p:cTn id="8" dur="1" fill="hold">
-                                          <p:stCondLst>
-                                            <p:cond delay="0"/>
-                                          </p:stCondLst>
-                                        </p:cTn>
-                                        <p:tgtEl>
-                                          <p:spTgt spid="4"/>
-                                        </p:tgtEl>
-                                        <p:attrNameLst>
-                                          <p:attrName>style.visibility</p:attrName>
-                                        </p:attrNameLst>
-                                      </p:cBhvr>
-                                      <p:to>
-                                        <p:strVal val="visible"/>
-                                      </p:to>
-                                    </p:set>
-                                  </p:childTnLst>
-                                </p:cTn>
-                              </p:par>
-                              <p:par>
-                                <p:cTn id="9" presetID="1" presetClass="entr" presetSubtype="0" fill="hold" grpId="0" nodeType="withEffect">
-                                  <p:stCondLst>
-                                    <p:cond delay="0"/>
-                                  </p:stCondLst>
-                                  <p:childTnLst>
-                                    <p:set>
-                                      <p:cBhvr>
-                                        <p:cTn id="10" dur="1" fill="hold">
-                                          <p:stCondLst>
-                                            <p:cond delay="0"/>
-                                          </p:stCondLst>
-                                        </p:cTn>
-                                        <p:tgtEl>
-                                          <p:spTgt spid="10"/>
-                                        </p:tgtEl>
-                                        <p:attrNameLst>
-                                          <p:attrName>style.visibility</p:attrName>
-                                        </p:attrNameLst>
-                                      </p:cBhvr>
-                                      <p:to>
-                                        <p:strVal val="visible"/>
-                                      </p:to>
-                                    </p:set>
-                                  </p:childTnLst>
-                                </p:cTn>
-                              </p:par>
-                            </p:childTnLst>
-                          </p:cTn>
-                        </p:par>
-                      </p:childTnLst>
-                    </p:cTn>
-                  </p:par>
-                </p:childTnLst>
-              </p:cTn>
-              <p:prevCondLst>
-                <p:cond evt="onPrev" delay="0">
-                  <p:tgtEl>
-                    <p:sldTgt/>
-                  </p:tgtEl>
-                </p:cond>
-              </p:prevCondLst>
-              <p:nextCondLst>
-                <p:cond evt="onNext" delay="0">
-                  <p:tgtEl>
-                    <p:sldTgt/>
-                  </p:tgtEl>
-                </p:cond>
-              </p:nextCondLst>
-            </p:seq>
-          </p:childTnLst>
-        </p:cTn>
-      </p:par>
-    </p:tnLst>
-    <p:bldLst>
-      <p:bldP spid="10" grpId="0" animBg="1"/>
-      <p:bldP spid="16" grpId="0"/>
-    </p:bldLst>
-  </p:timing>
 </p:sld>
 </file>
 
@@ -5628,16 +6093,422 @@
           <a:chExt cx="0" cy="0"/>
         </a:xfrm>
       </p:grpSpPr>
+      <p:sp>
+        <p:nvSpPr>
+          <p:cNvPr id="2" name="Segnaposto testo 1"/>
+          <p:cNvSpPr>
+            <a:spLocks noGrp="1"/>
+          </p:cNvSpPr>
+          <p:nvPr>
+            <p:ph type="body" sz="quarter" idx="10"/>
+          </p:nvPr>
+        </p:nvSpPr>
+        <p:spPr/>
+        <p:txBody>
+          <a:bodyPr/>
+          <a:lstStyle/>
+          <a:p>
+            <a:r>
+              <a:rPr lang="it-IT" dirty="0"/>
+              <a:t>Eventi in Android</a:t>
+            </a:r>
+          </a:p>
+        </p:txBody>
+      </p:sp>
+      <p:sp>
+        <p:nvSpPr>
+          <p:cNvPr id="6" name="CasellaDiTesto 9"/>
+          <p:cNvSpPr txBox="1"/>
+          <p:nvPr/>
+        </p:nvSpPr>
+        <p:spPr>
+          <a:xfrm>
+            <a:off x="299798" y="1185506"/>
+            <a:ext cx="7642125" cy="3416320"/>
+          </a:xfrm>
+          <a:prstGeom prst="rect">
+            <a:avLst/>
+          </a:prstGeom>
+          <a:noFill/>
+        </p:spPr>
+        <p:txBody>
+          <a:bodyPr wrap="square" rtlCol="0">
+            <a:spAutoFit/>
+          </a:bodyPr>
+          <a:lstStyle/>
+          <a:p>
+            <a:pPr marL="285750" indent="-285750">
+              <a:buFont typeface="Arial"/>
+              <a:buChar char="•"/>
+            </a:pPr>
+            <a:r>
+              <a:rPr lang="it-IT" sz="2400" dirty="0"/>
+              <a:t>Applicazioni mobili caratterizzate da centinaia di eventi</a:t>
+            </a:r>
+          </a:p>
+          <a:p>
+            <a:pPr marL="742950" lvl="1" indent="-285750">
+              <a:buFont typeface="Arial"/>
+              <a:buChar char="•"/>
+            </a:pPr>
+            <a:r>
+              <a:rPr lang="it-IT" sz="2400" dirty="0"/>
+              <a:t>es. sensori, richieste/risposte via internet, click sul </a:t>
+            </a:r>
+            <a:r>
+              <a:rPr lang="it-IT" sz="2400" dirty="0" err="1"/>
+              <a:t>touchscreen</a:t>
+            </a:r>
+            <a:r>
+              <a:rPr lang="it-IT" sz="2400" dirty="0"/>
+              <a:t>, lifecycle, ecc. </a:t>
+            </a:r>
+          </a:p>
+          <a:p>
+            <a:pPr marL="285750" indent="-285750">
+              <a:buFont typeface="Arial"/>
+              <a:buChar char="•"/>
+            </a:pPr>
+            <a:r>
+              <a:rPr lang="it-IT" sz="2400" dirty="0"/>
+              <a:t>Spesso gestiti da diversi </a:t>
+            </a:r>
+            <a:r>
+              <a:rPr lang="it-IT" sz="2400" dirty="0" err="1"/>
+              <a:t>thread</a:t>
+            </a:r>
+            <a:r>
+              <a:rPr lang="it-IT" sz="2400" dirty="0"/>
+              <a:t>, e quindi concorrenti</a:t>
+            </a:r>
+          </a:p>
+          <a:p>
+            <a:pPr marL="285750" indent="-285750">
+              <a:buFont typeface="Arial"/>
+              <a:buChar char="•"/>
+            </a:pPr>
+            <a:r>
+              <a:rPr lang="it-IT" sz="2400" dirty="0"/>
+              <a:t>Se registrati in un ordine inaspettato, possono causare problemi</a:t>
+            </a:r>
+          </a:p>
+          <a:p>
+            <a:pPr marL="285750" indent="-285750">
+              <a:buFont typeface="Arial"/>
+              <a:buChar char="•"/>
+            </a:pPr>
+            <a:r>
+              <a:rPr lang="it-IT" sz="2400" dirty="0"/>
+              <a:t>Race </a:t>
+            </a:r>
+            <a:r>
+              <a:rPr lang="it-IT" sz="2400" dirty="0" err="1"/>
+              <a:t>Condition</a:t>
+            </a:r>
+            <a:endParaRPr lang="it-IT" sz="2400" dirty="0"/>
+          </a:p>
+          <a:p>
+            <a:pPr marL="285750" indent="-285750">
+              <a:buFont typeface="Arial"/>
+              <a:buChar char="•"/>
+            </a:pPr>
+            <a:endParaRPr lang="it-IT" sz="2400" dirty="0"/>
+          </a:p>
+        </p:txBody>
+      </p:sp>
+    </p:spTree>
+    <p:custDataLst>
+      <p:tags r:id="rId1"/>
+    </p:custDataLst>
+    <p:extLst>
+      <p:ext uri="{BB962C8B-B14F-4D97-AF65-F5344CB8AC3E}">
+        <p14:creationId xmlns:p14="http://schemas.microsoft.com/office/powerpoint/2010/main" val="1340990243"/>
+      </p:ext>
+    </p:extLst>
+  </p:cSld>
+  <p:clrMapOvr>
+    <a:masterClrMapping/>
+  </p:clrMapOvr>
+  <mc:AlternateContent xmlns:mc="http://schemas.openxmlformats.org/markup-compatibility/2006" xmlns:p14="http://schemas.microsoft.com/office/powerpoint/2010/main">
+    <mc:Choice Requires="p14">
+      <p:transition spd="slow" p14:dur="2000" advTm="51149"/>
+    </mc:Choice>
+    <mc:Fallback xmlns="">
+      <p:transition xmlns:p14="http://schemas.microsoft.com/office/powerpoint/2010/main" spd="slow" advTm="51149"/>
+    </mc:Fallback>
+  </mc:AlternateContent>
+</p:sld>
+</file>
+
+<file path=ppt/slides/slide12.xml><?xml version="1.0" encoding="utf-8"?>
+<p:sld xmlns:a="http://schemas.openxmlformats.org/drawingml/2006/main" xmlns:r="http://schemas.openxmlformats.org/officeDocument/2006/relationships" xmlns:p="http://schemas.openxmlformats.org/presentationml/2006/main">
+  <p:cSld>
+    <p:spTree>
+      <p:nvGrpSpPr>
+        <p:cNvPr id="1" name=""/>
+        <p:cNvGrpSpPr/>
+        <p:nvPr/>
+      </p:nvGrpSpPr>
+      <p:grpSpPr>
+        <a:xfrm>
+          <a:off x="0" y="0"/>
+          <a:ext cx="0" cy="0"/>
+          <a:chOff x="0" y="0"/>
+          <a:chExt cx="0" cy="0"/>
+        </a:xfrm>
+      </p:grpSpPr>
+      <p:sp>
+        <p:nvSpPr>
+          <p:cNvPr id="2" name="Segnaposto testo 1"/>
+          <p:cNvSpPr>
+            <a:spLocks noGrp="1"/>
+          </p:cNvSpPr>
+          <p:nvPr>
+            <p:ph type="body" sz="quarter" idx="10"/>
+          </p:nvPr>
+        </p:nvSpPr>
+        <p:spPr/>
+        <p:txBody>
+          <a:bodyPr/>
+          <a:lstStyle/>
+          <a:p>
+            <a:r>
+              <a:rPr lang="it-IT" dirty="0"/>
+              <a:t>Asserzioni Temporali</a:t>
+            </a:r>
+          </a:p>
+        </p:txBody>
+      </p:sp>
+      <p:sp>
+        <p:nvSpPr>
+          <p:cNvPr id="6" name="CasellaDiTesto 9"/>
+          <p:cNvSpPr txBox="1"/>
+          <p:nvPr/>
+        </p:nvSpPr>
+        <p:spPr>
+          <a:xfrm>
+            <a:off x="299798" y="1185506"/>
+            <a:ext cx="7642125" cy="5262979"/>
+          </a:xfrm>
+          <a:prstGeom prst="rect">
+            <a:avLst/>
+          </a:prstGeom>
+          <a:noFill/>
+        </p:spPr>
+        <p:txBody>
+          <a:bodyPr wrap="square" rtlCol="0">
+            <a:spAutoFit/>
+          </a:bodyPr>
+          <a:lstStyle/>
+          <a:p>
+            <a:pPr marL="285750" indent="-285750">
+              <a:buFont typeface="Arial"/>
+              <a:buChar char="•"/>
+            </a:pPr>
+            <a:r>
+              <a:rPr lang="it-IT" sz="2400" dirty="0"/>
+              <a:t>Eventi sono complessi da testare con le tecnologie disponibili al momento</a:t>
+            </a:r>
+          </a:p>
+          <a:p>
+            <a:pPr marL="285750" indent="-285750">
+              <a:buFont typeface="Arial"/>
+              <a:buChar char="•"/>
+            </a:pPr>
+            <a:r>
+              <a:rPr lang="it-IT" sz="2400" dirty="0"/>
+              <a:t>Soluzione: specificare delle asserzioni temporali per verificare le relazioni tra due o più eventi</a:t>
+            </a:r>
+          </a:p>
+          <a:p>
+            <a:pPr marL="285750" indent="-285750">
+              <a:buFont typeface="Arial"/>
+              <a:buChar char="•"/>
+            </a:pPr>
+            <a:r>
+              <a:rPr lang="it-IT" sz="2400" dirty="0"/>
+              <a:t>Esprimere, sul flusso di eventi generati da un’esecuzione, condizioni di</a:t>
+            </a:r>
+          </a:p>
+          <a:p>
+            <a:pPr marL="742950" lvl="1" indent="-285750">
+              <a:buFont typeface="Arial"/>
+              <a:buChar char="•"/>
+            </a:pPr>
+            <a:r>
+              <a:rPr lang="it-IT" sz="2400" dirty="0"/>
+              <a:t>Esistenza</a:t>
+            </a:r>
+          </a:p>
+          <a:p>
+            <a:pPr marL="742950" lvl="1" indent="-285750">
+              <a:buFont typeface="Arial"/>
+              <a:buChar char="•"/>
+            </a:pPr>
+            <a:r>
+              <a:rPr lang="it-IT" sz="2400" dirty="0"/>
+              <a:t>Ordinamento</a:t>
+            </a:r>
+          </a:p>
+          <a:p>
+            <a:pPr marL="742950" lvl="1" indent="-285750">
+              <a:buFont typeface="Arial"/>
+              <a:buChar char="•"/>
+            </a:pPr>
+            <a:r>
+              <a:rPr lang="it-IT" sz="2400" dirty="0"/>
+              <a:t>Causalità</a:t>
+            </a:r>
+          </a:p>
+          <a:p>
+            <a:pPr marL="742950" lvl="1" indent="-285750">
+              <a:buFont typeface="Arial"/>
+              <a:buChar char="•"/>
+            </a:pPr>
+            <a:r>
+              <a:rPr lang="it-IT" sz="2400" dirty="0"/>
+              <a:t>Quantificazione</a:t>
+            </a:r>
+          </a:p>
+          <a:p>
+            <a:pPr marL="285750" indent="-285750">
+              <a:buFont typeface="Arial"/>
+              <a:buChar char="•"/>
+            </a:pPr>
+            <a:r>
+              <a:rPr lang="it-IT" sz="2400" dirty="0"/>
+              <a:t>Possibilità di correlare più condizioni tramite connettivi logici</a:t>
+            </a:r>
+          </a:p>
+          <a:p>
+            <a:pPr marL="285750" indent="-285750">
+              <a:buFont typeface="Arial"/>
+              <a:buChar char="•"/>
+            </a:pPr>
+            <a:endParaRPr lang="it-IT" sz="2400" dirty="0"/>
+          </a:p>
+          <a:p>
+            <a:pPr marL="285750" indent="-285750">
+              <a:buFont typeface="Arial"/>
+              <a:buChar char="•"/>
+            </a:pPr>
+            <a:endParaRPr lang="it-IT" sz="2400" dirty="0"/>
+          </a:p>
+        </p:txBody>
+      </p:sp>
+    </p:spTree>
+    <p:custDataLst>
+      <p:tags r:id="rId1"/>
+    </p:custDataLst>
+    <p:extLst>
+      <p:ext uri="{BB962C8B-B14F-4D97-AF65-F5344CB8AC3E}">
+        <p14:creationId xmlns:p14="http://schemas.microsoft.com/office/powerpoint/2010/main" val="962440725"/>
+      </p:ext>
+    </p:extLst>
+  </p:cSld>
+  <p:clrMapOvr>
+    <a:masterClrMapping/>
+  </p:clrMapOvr>
+  <mc:AlternateContent xmlns:mc="http://schemas.openxmlformats.org/markup-compatibility/2006" xmlns:p14="http://schemas.microsoft.com/office/powerpoint/2010/main">
+    <mc:Choice Requires="p14">
+      <p:transition spd="slow" p14:dur="2000" advTm="51149"/>
+    </mc:Choice>
+    <mc:Fallback xmlns="">
+      <p:transition xmlns:p14="http://schemas.microsoft.com/office/powerpoint/2010/main" spd="slow" advTm="51149"/>
+    </mc:Fallback>
+  </mc:AlternateContent>
+</p:sld>
+</file>
+
+<file path=ppt/slides/slide13.xml><?xml version="1.0" encoding="utf-8"?>
+<p:sld xmlns:a="http://schemas.openxmlformats.org/drawingml/2006/main" xmlns:r="http://schemas.openxmlformats.org/officeDocument/2006/relationships" xmlns:p="http://schemas.openxmlformats.org/presentationml/2006/main">
+  <p:cSld>
+    <p:spTree>
+      <p:nvGrpSpPr>
+        <p:cNvPr id="1" name=""/>
+        <p:cNvGrpSpPr/>
+        <p:nvPr/>
+      </p:nvGrpSpPr>
+      <p:grpSpPr>
+        <a:xfrm>
+          <a:off x="0" y="0"/>
+          <a:ext cx="0" cy="0"/>
+          <a:chOff x="0" y="0"/>
+          <a:chExt cx="0" cy="0"/>
+        </a:xfrm>
+      </p:grpSpPr>
+      <p:sp>
+        <p:nvSpPr>
+          <p:cNvPr id="2" name="Segnaposto testo 1"/>
+          <p:cNvSpPr>
+            <a:spLocks noGrp="1"/>
+          </p:cNvSpPr>
+          <p:nvPr>
+            <p:ph type="body" sz="quarter" idx="10"/>
+          </p:nvPr>
+        </p:nvSpPr>
+        <p:spPr/>
+        <p:txBody>
+          <a:bodyPr/>
+          <a:lstStyle/>
+          <a:p>
+            <a:r>
+              <a:rPr lang="it-IT" dirty="0"/>
+              <a:t>Asserzioni Temporali - Esempi</a:t>
+            </a:r>
+          </a:p>
+        </p:txBody>
+      </p:sp>
+      <p:sp>
+        <p:nvSpPr>
+          <p:cNvPr id="6" name="CasellaDiTesto 9"/>
+          <p:cNvSpPr txBox="1"/>
+          <p:nvPr/>
+        </p:nvSpPr>
+        <p:spPr>
+          <a:xfrm>
+            <a:off x="299798" y="1185506"/>
+            <a:ext cx="7642125" cy="830997"/>
+          </a:xfrm>
+          <a:prstGeom prst="rect">
+            <a:avLst/>
+          </a:prstGeom>
+          <a:noFill/>
+        </p:spPr>
+        <p:txBody>
+          <a:bodyPr wrap="square" rtlCol="0">
+            <a:spAutoFit/>
+          </a:bodyPr>
+          <a:lstStyle/>
+          <a:p>
+            <a:pPr marL="285750" indent="-285750">
+              <a:buFont typeface="Arial"/>
+              <a:buChar char="•"/>
+            </a:pPr>
+            <a:r>
+              <a:rPr lang="it-IT" sz="2400" dirty="0"/>
+              <a:t>Causalità tra eventi</a:t>
+            </a:r>
+          </a:p>
+          <a:p>
+            <a:pPr marL="285750" indent="-285750">
+              <a:buFont typeface="Arial"/>
+              <a:buChar char="•"/>
+            </a:pPr>
+            <a:endParaRPr lang="it-IT" sz="2400" dirty="0"/>
+          </a:p>
+        </p:txBody>
+      </p:sp>
       <p:pic>
         <p:nvPicPr>
-          <p:cNvPr id="5" name="Immagine 4" descr="logoPoliMi.png"/>
+          <p:cNvPr id="4" name="Picture 3"/>
           <p:cNvPicPr>
             <a:picLocks noChangeAspect="1"/>
           </p:cNvPicPr>
           <p:nvPr/>
         </p:nvPicPr>
         <p:blipFill>
-          <a:blip r:embed="rId2" cstate="email">
+          <a:blip r:embed="rId4" cstate="email">
             <a:extLst>
               <a:ext uri="{28A0092B-C50C-407E-A947-70E740481C1C}">
                 <a14:useLocalDpi xmlns:a14="http://schemas.microsoft.com/office/drawing/2010/main" val="0"/>
@@ -5650,40 +6521,21 @@
         </p:blipFill>
         <p:spPr>
           <a:xfrm>
-            <a:off x="3534078" y="2499218"/>
-            <a:ext cx="2075845" cy="2075845"/>
+            <a:off x="399835" y="2016503"/>
+            <a:ext cx="8344329" cy="3937202"/>
           </a:xfrm>
           <a:prstGeom prst="rect">
             <a:avLst/>
           </a:prstGeom>
         </p:spPr>
       </p:pic>
-      <p:sp>
-        <p:nvSpPr>
-          <p:cNvPr id="7" name="Segnaposto testo 6"/>
-          <p:cNvSpPr>
-            <a:spLocks noGrp="1"/>
-          </p:cNvSpPr>
-          <p:nvPr>
-            <p:ph type="body" sz="quarter" idx="10"/>
-          </p:nvPr>
-        </p:nvSpPr>
-        <p:spPr/>
-        <p:txBody>
-          <a:bodyPr/>
-          <a:lstStyle/>
-          <a:p>
-            <a:r>
-              <a:rPr lang="it-IT" dirty="0"/>
-              <a:t>FINE</a:t>
-            </a:r>
-          </a:p>
-        </p:txBody>
-      </p:sp>
     </p:spTree>
+    <p:custDataLst>
+      <p:tags r:id="rId1"/>
+    </p:custDataLst>
     <p:extLst>
       <p:ext uri="{BB962C8B-B14F-4D97-AF65-F5344CB8AC3E}">
-        <p14:creationId xmlns:p14="http://schemas.microsoft.com/office/powerpoint/2010/main" val="1982816369"/>
+        <p14:creationId xmlns:p14="http://schemas.microsoft.com/office/powerpoint/2010/main" val="4282057751"/>
       </p:ext>
     </p:extLst>
   </p:cSld>
@@ -5692,10 +6544,2120 @@
   </p:clrMapOvr>
   <mc:AlternateContent xmlns:mc="http://schemas.openxmlformats.org/markup-compatibility/2006" xmlns:p14="http://schemas.microsoft.com/office/powerpoint/2010/main">
     <mc:Choice Requires="p14">
-      <p:transition spd="slow" p14:dur="2000" advTm="5275"/>
+      <p:transition spd="slow" p14:dur="2000" advTm="51149"/>
     </mc:Choice>
     <mc:Fallback xmlns="">
-      <p:transition xmlns:p14="http://schemas.microsoft.com/office/powerpoint/2010/main" spd="slow" advTm="5275"/>
+      <p:transition xmlns:p14="http://schemas.microsoft.com/office/powerpoint/2010/main" spd="slow" advTm="51149"/>
+    </mc:Fallback>
+  </mc:AlternateContent>
+</p:sld>
+</file>
+
+<file path=ppt/slides/slide14.xml><?xml version="1.0" encoding="utf-8"?>
+<p:sld xmlns:a="http://schemas.openxmlformats.org/drawingml/2006/main" xmlns:r="http://schemas.openxmlformats.org/officeDocument/2006/relationships" xmlns:p="http://schemas.openxmlformats.org/presentationml/2006/main">
+  <p:cSld>
+    <p:spTree>
+      <p:nvGrpSpPr>
+        <p:cNvPr id="1" name=""/>
+        <p:cNvGrpSpPr/>
+        <p:nvPr/>
+      </p:nvGrpSpPr>
+      <p:grpSpPr>
+        <a:xfrm>
+          <a:off x="0" y="0"/>
+          <a:ext cx="0" cy="0"/>
+          <a:chOff x="0" y="0"/>
+          <a:chExt cx="0" cy="0"/>
+        </a:xfrm>
+      </p:grpSpPr>
+      <p:sp>
+        <p:nvSpPr>
+          <p:cNvPr id="2" name="Segnaposto testo 1"/>
+          <p:cNvSpPr>
+            <a:spLocks noGrp="1"/>
+          </p:cNvSpPr>
+          <p:nvPr>
+            <p:ph type="body" sz="quarter" idx="10"/>
+          </p:nvPr>
+        </p:nvSpPr>
+        <p:spPr/>
+        <p:txBody>
+          <a:bodyPr/>
+          <a:lstStyle/>
+          <a:p>
+            <a:r>
+              <a:rPr lang="it-IT" dirty="0"/>
+              <a:t>Asserzioni Temporali - Esempi</a:t>
+            </a:r>
+          </a:p>
+        </p:txBody>
+      </p:sp>
+      <p:sp>
+        <p:nvSpPr>
+          <p:cNvPr id="6" name="CasellaDiTesto 9"/>
+          <p:cNvSpPr txBox="1"/>
+          <p:nvPr/>
+        </p:nvSpPr>
+        <p:spPr>
+          <a:xfrm>
+            <a:off x="299798" y="1185506"/>
+            <a:ext cx="7642125" cy="830997"/>
+          </a:xfrm>
+          <a:prstGeom prst="rect">
+            <a:avLst/>
+          </a:prstGeom>
+          <a:noFill/>
+        </p:spPr>
+        <p:txBody>
+          <a:bodyPr wrap="square" rtlCol="0">
+            <a:spAutoFit/>
+          </a:bodyPr>
+          <a:lstStyle/>
+          <a:p>
+            <a:pPr marL="285750" indent="-285750">
+              <a:buFont typeface="Arial"/>
+              <a:buChar char="•"/>
+            </a:pPr>
+            <a:r>
+              <a:rPr lang="it-IT" sz="2400" dirty="0"/>
+              <a:t>Ordinamento di eventi di un determinato tipo</a:t>
+            </a:r>
+          </a:p>
+          <a:p>
+            <a:pPr marL="285750" indent="-285750">
+              <a:buFont typeface="Arial"/>
+              <a:buChar char="•"/>
+            </a:pPr>
+            <a:endParaRPr lang="it-IT" sz="2400" dirty="0"/>
+          </a:p>
+        </p:txBody>
+      </p:sp>
+      <p:pic>
+        <p:nvPicPr>
+          <p:cNvPr id="3" name="Picture 2"/>
+          <p:cNvPicPr>
+            <a:picLocks noChangeAspect="1"/>
+          </p:cNvPicPr>
+          <p:nvPr/>
+        </p:nvPicPr>
+        <p:blipFill>
+          <a:blip r:embed="rId4" cstate="email">
+            <a:extLst>
+              <a:ext uri="{28A0092B-C50C-407E-A947-70E740481C1C}">
+                <a14:useLocalDpi xmlns:a14="http://schemas.microsoft.com/office/drawing/2010/main" val="0"/>
+              </a:ext>
+            </a:extLst>
+          </a:blip>
+          <a:stretch>
+            <a:fillRect/>
+          </a:stretch>
+        </p:blipFill>
+        <p:spPr>
+          <a:xfrm>
+            <a:off x="299798" y="2247710"/>
+            <a:ext cx="8447541" cy="3635976"/>
+          </a:xfrm>
+          <a:prstGeom prst="rect">
+            <a:avLst/>
+          </a:prstGeom>
+        </p:spPr>
+      </p:pic>
+    </p:spTree>
+    <p:custDataLst>
+      <p:tags r:id="rId1"/>
+    </p:custDataLst>
+    <p:extLst>
+      <p:ext uri="{BB962C8B-B14F-4D97-AF65-F5344CB8AC3E}">
+        <p14:creationId xmlns:p14="http://schemas.microsoft.com/office/powerpoint/2010/main" val="3589782147"/>
+      </p:ext>
+    </p:extLst>
+  </p:cSld>
+  <p:clrMapOvr>
+    <a:masterClrMapping/>
+  </p:clrMapOvr>
+  <mc:AlternateContent xmlns:mc="http://schemas.openxmlformats.org/markup-compatibility/2006" xmlns:p14="http://schemas.microsoft.com/office/powerpoint/2010/main">
+    <mc:Choice Requires="p14">
+      <p:transition spd="slow" p14:dur="2000" advTm="51149"/>
+    </mc:Choice>
+    <mc:Fallback xmlns="">
+      <p:transition xmlns:p14="http://schemas.microsoft.com/office/powerpoint/2010/main" spd="slow" advTm="51149"/>
+    </mc:Fallback>
+  </mc:AlternateContent>
+</p:sld>
+</file>
+
+<file path=ppt/slides/slide15.xml><?xml version="1.0" encoding="utf-8"?>
+<p:sld xmlns:a="http://schemas.openxmlformats.org/drawingml/2006/main" xmlns:r="http://schemas.openxmlformats.org/officeDocument/2006/relationships" xmlns:p="http://schemas.openxmlformats.org/presentationml/2006/main">
+  <p:cSld>
+    <p:spTree>
+      <p:nvGrpSpPr>
+        <p:cNvPr id="1" name=""/>
+        <p:cNvGrpSpPr/>
+        <p:nvPr/>
+      </p:nvGrpSpPr>
+      <p:grpSpPr>
+        <a:xfrm>
+          <a:off x="0" y="0"/>
+          <a:ext cx="0" cy="0"/>
+          <a:chOff x="0" y="0"/>
+          <a:chExt cx="0" cy="0"/>
+        </a:xfrm>
+      </p:grpSpPr>
+      <p:sp>
+        <p:nvSpPr>
+          <p:cNvPr id="2" name="Segnaposto testo 1"/>
+          <p:cNvSpPr>
+            <a:spLocks noGrp="1"/>
+          </p:cNvSpPr>
+          <p:nvPr>
+            <p:ph type="body" sz="quarter" idx="10"/>
+          </p:nvPr>
+        </p:nvSpPr>
+        <p:spPr/>
+        <p:txBody>
+          <a:bodyPr/>
+          <a:lstStyle/>
+          <a:p>
+            <a:r>
+              <a:rPr lang="it-IT" dirty="0"/>
+              <a:t>Design e Implementazione</a:t>
+            </a:r>
+          </a:p>
+        </p:txBody>
+      </p:sp>
+      <p:sp>
+        <p:nvSpPr>
+          <p:cNvPr id="6" name="CasellaDiTesto 9"/>
+          <p:cNvSpPr txBox="1"/>
+          <p:nvPr/>
+        </p:nvSpPr>
+        <p:spPr>
+          <a:xfrm>
+            <a:off x="101448" y="1226599"/>
+            <a:ext cx="5539064" cy="4893647"/>
+          </a:xfrm>
+          <a:prstGeom prst="rect">
+            <a:avLst/>
+          </a:prstGeom>
+          <a:noFill/>
+        </p:spPr>
+        <p:txBody>
+          <a:bodyPr wrap="square" rtlCol="0">
+            <a:spAutoFit/>
+          </a:bodyPr>
+          <a:lstStyle/>
+          <a:p>
+            <a:pPr marL="285750" indent="-285750">
+              <a:buFont typeface="Arial"/>
+              <a:buChar char="•"/>
+            </a:pPr>
+            <a:r>
+              <a:rPr lang="it-IT" sz="2400" dirty="0"/>
+              <a:t>Interfaccia principale è l’</a:t>
+            </a:r>
+            <a:r>
+              <a:rPr lang="it-IT" sz="2400" dirty="0" err="1"/>
+              <a:t>Event</a:t>
+            </a:r>
+            <a:r>
+              <a:rPr lang="it-IT" sz="2400" dirty="0"/>
+              <a:t> Monitor: lo sviluppatore definisce</a:t>
+            </a:r>
+          </a:p>
+          <a:p>
+            <a:pPr marL="742950" lvl="1" indent="-285750">
+              <a:buFont typeface="Arial"/>
+              <a:buChar char="•"/>
+            </a:pPr>
+            <a:r>
+              <a:rPr lang="it-IT" sz="2400" dirty="0"/>
+              <a:t>Eventi da osservare</a:t>
+            </a:r>
+          </a:p>
+          <a:p>
+            <a:pPr marL="742950" lvl="1" indent="-285750">
+              <a:buFont typeface="Arial"/>
+              <a:buChar char="•"/>
+            </a:pPr>
+            <a:r>
+              <a:rPr lang="it-IT" sz="2400" dirty="0"/>
+              <a:t>Asserzioni temporali da verificare</a:t>
+            </a:r>
+          </a:p>
+          <a:p>
+            <a:pPr marL="742950" lvl="1" indent="-285750">
+              <a:buFont typeface="Arial"/>
+              <a:buChar char="•"/>
+            </a:pPr>
+            <a:r>
+              <a:rPr lang="it-IT" sz="2400" dirty="0"/>
+              <a:t>Come reagire ai risultati delle asserzioni</a:t>
+            </a:r>
+          </a:p>
+          <a:p>
+            <a:pPr marL="285750" indent="-285750">
+              <a:buFont typeface="Arial"/>
+              <a:buChar char="•"/>
+            </a:pPr>
+            <a:r>
+              <a:rPr lang="it-IT" sz="2400" dirty="0"/>
+              <a:t>Ogni </a:t>
+            </a:r>
+            <a:r>
+              <a:rPr lang="it-IT" sz="2400" dirty="0" err="1"/>
+              <a:t>Observable</a:t>
+            </a:r>
+            <a:r>
+              <a:rPr lang="it-IT" sz="2400" dirty="0"/>
+              <a:t> produce uno o più eventi durante l’esecuzione</a:t>
+            </a:r>
+          </a:p>
+          <a:p>
+            <a:pPr marL="285750" indent="-285750">
+              <a:buFont typeface="Arial"/>
+              <a:buChar char="•"/>
+            </a:pPr>
+            <a:r>
+              <a:rPr lang="it-IT" sz="2400" dirty="0"/>
+              <a:t>Ogni </a:t>
+            </a:r>
+            <a:r>
+              <a:rPr lang="it-IT" sz="2400" dirty="0" err="1"/>
+              <a:t>Check</a:t>
+            </a:r>
+            <a:r>
+              <a:rPr lang="it-IT" sz="2400" dirty="0"/>
+              <a:t> specifica un’asserzione temporale e produce un risultato finale</a:t>
+            </a:r>
+          </a:p>
+          <a:p>
+            <a:pPr marL="285750" indent="-285750">
+              <a:buFont typeface="Arial"/>
+              <a:buChar char="•"/>
+            </a:pPr>
+            <a:r>
+              <a:rPr lang="it-IT" sz="2400" dirty="0" err="1"/>
+              <a:t>Tool</a:t>
+            </a:r>
+            <a:r>
+              <a:rPr lang="it-IT" sz="2400" dirty="0"/>
+              <a:t> implementato con la libreria ReactiveX: RxJava e RxAndroid</a:t>
+            </a:r>
+          </a:p>
+        </p:txBody>
+      </p:sp>
+      <p:sp>
+        <p:nvSpPr>
+          <p:cNvPr id="5" name="Rounded Rectangle 4"/>
+          <p:cNvSpPr/>
+          <p:nvPr/>
+        </p:nvSpPr>
+        <p:spPr>
+          <a:xfrm>
+            <a:off x="6670637" y="1582225"/>
+            <a:ext cx="1280160" cy="640080"/>
+          </a:xfrm>
+          <a:prstGeom prst="roundRect">
+            <a:avLst/>
+          </a:prstGeom>
+          <a:solidFill>
+            <a:schemeClr val="accent1">
+              <a:lumMod val="60000"/>
+              <a:lumOff val="40000"/>
+            </a:schemeClr>
+          </a:solidFill>
+        </p:spPr>
+        <p:style>
+          <a:lnRef idx="2">
+            <a:schemeClr val="accent1">
+              <a:shade val="50000"/>
+            </a:schemeClr>
+          </a:lnRef>
+          <a:fillRef idx="1">
+            <a:schemeClr val="accent1"/>
+          </a:fillRef>
+          <a:effectRef idx="0">
+            <a:schemeClr val="accent1"/>
+          </a:effectRef>
+          <a:fontRef idx="minor">
+            <a:schemeClr val="lt1"/>
+          </a:fontRef>
+        </p:style>
+        <p:txBody>
+          <a:bodyPr rtlCol="0" anchor="ctr"/>
+          <a:lstStyle/>
+          <a:p>
+            <a:pPr algn="ctr"/>
+            <a:r>
+              <a:rPr lang="en-US" sz="1700" b="1" dirty="0">
+                <a:solidFill>
+                  <a:schemeClr val="tx2"/>
+                </a:solidFill>
+              </a:rPr>
+              <a:t>Event Monitor</a:t>
+            </a:r>
+          </a:p>
+        </p:txBody>
+      </p:sp>
+      <p:sp>
+        <p:nvSpPr>
+          <p:cNvPr id="7" name="Rounded Rectangle 6"/>
+          <p:cNvSpPr/>
+          <p:nvPr/>
+        </p:nvSpPr>
+        <p:spPr>
+          <a:xfrm>
+            <a:off x="7582615" y="2988069"/>
+            <a:ext cx="1280160" cy="640080"/>
+          </a:xfrm>
+          <a:prstGeom prst="roundRect">
+            <a:avLst/>
+          </a:prstGeom>
+          <a:solidFill>
+            <a:schemeClr val="accent1">
+              <a:lumMod val="60000"/>
+              <a:lumOff val="40000"/>
+            </a:schemeClr>
+          </a:solidFill>
+        </p:spPr>
+        <p:style>
+          <a:lnRef idx="2">
+            <a:schemeClr val="accent1">
+              <a:shade val="50000"/>
+            </a:schemeClr>
+          </a:lnRef>
+          <a:fillRef idx="1">
+            <a:schemeClr val="accent1"/>
+          </a:fillRef>
+          <a:effectRef idx="0">
+            <a:schemeClr val="accent1"/>
+          </a:effectRef>
+          <a:fontRef idx="minor">
+            <a:schemeClr val="lt1"/>
+          </a:fontRef>
+        </p:style>
+        <p:txBody>
+          <a:bodyPr rtlCol="0" anchor="ctr"/>
+          <a:lstStyle/>
+          <a:p>
+            <a:pPr algn="ctr"/>
+            <a:r>
+              <a:rPr lang="en-US" sz="1700" dirty="0">
+                <a:solidFill>
+                  <a:schemeClr val="tx2"/>
+                </a:solidFill>
+              </a:rPr>
+              <a:t>Check</a:t>
+            </a:r>
+          </a:p>
+        </p:txBody>
+      </p:sp>
+      <p:sp>
+        <p:nvSpPr>
+          <p:cNvPr id="8" name="Rounded Rectangle 7"/>
+          <p:cNvSpPr/>
+          <p:nvPr/>
+        </p:nvSpPr>
+        <p:spPr>
+          <a:xfrm>
+            <a:off x="7582615" y="4416286"/>
+            <a:ext cx="1280160" cy="640080"/>
+          </a:xfrm>
+          <a:prstGeom prst="roundRect">
+            <a:avLst/>
+          </a:prstGeom>
+          <a:solidFill>
+            <a:schemeClr val="accent1">
+              <a:lumMod val="60000"/>
+              <a:lumOff val="40000"/>
+            </a:schemeClr>
+          </a:solidFill>
+        </p:spPr>
+        <p:style>
+          <a:lnRef idx="2">
+            <a:schemeClr val="accent1">
+              <a:shade val="50000"/>
+            </a:schemeClr>
+          </a:lnRef>
+          <a:fillRef idx="1">
+            <a:schemeClr val="accent1"/>
+          </a:fillRef>
+          <a:effectRef idx="0">
+            <a:schemeClr val="accent1"/>
+          </a:effectRef>
+          <a:fontRef idx="minor">
+            <a:schemeClr val="lt1"/>
+          </a:fontRef>
+        </p:style>
+        <p:txBody>
+          <a:bodyPr rtlCol="0" anchor="ctr"/>
+          <a:lstStyle/>
+          <a:p>
+            <a:pPr algn="ctr"/>
+            <a:r>
+              <a:rPr lang="en-US" sz="1700" dirty="0">
+                <a:solidFill>
+                  <a:schemeClr val="tx2"/>
+                </a:solidFill>
+              </a:rPr>
+              <a:t>Result</a:t>
+            </a:r>
+          </a:p>
+        </p:txBody>
+      </p:sp>
+      <p:sp>
+        <p:nvSpPr>
+          <p:cNvPr id="9" name="Rounded Rectangle 8"/>
+          <p:cNvSpPr/>
+          <p:nvPr/>
+        </p:nvSpPr>
+        <p:spPr>
+          <a:xfrm>
+            <a:off x="5783636" y="2988069"/>
+            <a:ext cx="1280160" cy="640080"/>
+          </a:xfrm>
+          <a:prstGeom prst="roundRect">
+            <a:avLst/>
+          </a:prstGeom>
+          <a:solidFill>
+            <a:schemeClr val="accent1">
+              <a:lumMod val="60000"/>
+              <a:lumOff val="40000"/>
+            </a:schemeClr>
+          </a:solidFill>
+        </p:spPr>
+        <p:style>
+          <a:lnRef idx="2">
+            <a:schemeClr val="accent1">
+              <a:shade val="50000"/>
+            </a:schemeClr>
+          </a:lnRef>
+          <a:fillRef idx="1">
+            <a:schemeClr val="accent1"/>
+          </a:fillRef>
+          <a:effectRef idx="0">
+            <a:schemeClr val="accent1"/>
+          </a:effectRef>
+          <a:fontRef idx="minor">
+            <a:schemeClr val="lt1"/>
+          </a:fontRef>
+        </p:style>
+        <p:txBody>
+          <a:bodyPr rtlCol="0" anchor="ctr"/>
+          <a:lstStyle/>
+          <a:p>
+            <a:pPr algn="ctr"/>
+            <a:r>
+              <a:rPr lang="en-US" sz="1700" dirty="0">
+                <a:solidFill>
+                  <a:schemeClr val="tx2"/>
+                </a:solidFill>
+              </a:rPr>
+              <a:t>Observable</a:t>
+            </a:r>
+          </a:p>
+        </p:txBody>
+      </p:sp>
+      <p:sp>
+        <p:nvSpPr>
+          <p:cNvPr id="10" name="Rounded Rectangle 9"/>
+          <p:cNvSpPr/>
+          <p:nvPr/>
+        </p:nvSpPr>
+        <p:spPr>
+          <a:xfrm>
+            <a:off x="5783636" y="4416286"/>
+            <a:ext cx="1280160" cy="640080"/>
+          </a:xfrm>
+          <a:prstGeom prst="roundRect">
+            <a:avLst/>
+          </a:prstGeom>
+          <a:solidFill>
+            <a:schemeClr val="accent1">
+              <a:lumMod val="60000"/>
+              <a:lumOff val="40000"/>
+            </a:schemeClr>
+          </a:solidFill>
+        </p:spPr>
+        <p:style>
+          <a:lnRef idx="2">
+            <a:schemeClr val="accent1">
+              <a:shade val="50000"/>
+            </a:schemeClr>
+          </a:lnRef>
+          <a:fillRef idx="1">
+            <a:schemeClr val="accent1"/>
+          </a:fillRef>
+          <a:effectRef idx="0">
+            <a:schemeClr val="accent1"/>
+          </a:effectRef>
+          <a:fontRef idx="minor">
+            <a:schemeClr val="lt1"/>
+          </a:fontRef>
+        </p:style>
+        <p:txBody>
+          <a:bodyPr rtlCol="0" anchor="ctr"/>
+          <a:lstStyle/>
+          <a:p>
+            <a:pPr algn="ctr"/>
+            <a:r>
+              <a:rPr lang="en-US" sz="1700" dirty="0">
+                <a:solidFill>
+                  <a:schemeClr val="tx2"/>
+                </a:solidFill>
+              </a:rPr>
+              <a:t>Event</a:t>
+            </a:r>
+          </a:p>
+        </p:txBody>
+      </p:sp>
+      <p:cxnSp>
+        <p:nvCxnSpPr>
+          <p:cNvPr id="11" name="Curved Connector 10"/>
+          <p:cNvCxnSpPr>
+            <a:stCxn id="9" idx="0"/>
+            <a:endCxn id="5" idx="1"/>
+          </p:cNvCxnSpPr>
+          <p:nvPr/>
+        </p:nvCxnSpPr>
+        <p:spPr>
+          <a:xfrm rot="5400000" flipH="1" flipV="1">
+            <a:off x="6004274" y="2321707"/>
+            <a:ext cx="1085804" cy="246921"/>
+          </a:xfrm>
+          <a:prstGeom prst="curvedConnector2">
+            <a:avLst/>
+          </a:prstGeom>
+          <a:ln>
+            <a:tailEnd type="triangle"/>
+          </a:ln>
+        </p:spPr>
+        <p:style>
+          <a:lnRef idx="1">
+            <a:schemeClr val="accent1"/>
+          </a:lnRef>
+          <a:fillRef idx="0">
+            <a:schemeClr val="accent1"/>
+          </a:fillRef>
+          <a:effectRef idx="0">
+            <a:schemeClr val="accent1"/>
+          </a:effectRef>
+          <a:fontRef idx="minor">
+            <a:schemeClr val="tx1"/>
+          </a:fontRef>
+        </p:style>
+      </p:cxnSp>
+      <p:cxnSp>
+        <p:nvCxnSpPr>
+          <p:cNvPr id="12" name="Curved Connector 11"/>
+          <p:cNvCxnSpPr>
+            <a:stCxn id="5" idx="3"/>
+            <a:endCxn id="7" idx="0"/>
+          </p:cNvCxnSpPr>
+          <p:nvPr/>
+        </p:nvCxnSpPr>
+        <p:spPr>
+          <a:xfrm>
+            <a:off x="7950797" y="1902265"/>
+            <a:ext cx="271898" cy="1085804"/>
+          </a:xfrm>
+          <a:prstGeom prst="curvedConnector2">
+            <a:avLst/>
+          </a:prstGeom>
+          <a:ln>
+            <a:tailEnd type="triangle"/>
+          </a:ln>
+        </p:spPr>
+        <p:style>
+          <a:lnRef idx="1">
+            <a:schemeClr val="accent1"/>
+          </a:lnRef>
+          <a:fillRef idx="0">
+            <a:schemeClr val="accent1"/>
+          </a:fillRef>
+          <a:effectRef idx="0">
+            <a:schemeClr val="accent1"/>
+          </a:effectRef>
+          <a:fontRef idx="minor">
+            <a:schemeClr val="tx1"/>
+          </a:fontRef>
+        </p:style>
+      </p:cxnSp>
+      <p:cxnSp>
+        <p:nvCxnSpPr>
+          <p:cNvPr id="13" name="Straight Arrow Connector 12"/>
+          <p:cNvCxnSpPr>
+            <a:stCxn id="10" idx="0"/>
+            <a:endCxn id="9" idx="2"/>
+          </p:cNvCxnSpPr>
+          <p:nvPr/>
+        </p:nvCxnSpPr>
+        <p:spPr>
+          <a:xfrm flipV="1">
+            <a:off x="6423716" y="3628149"/>
+            <a:ext cx="0" cy="788137"/>
+          </a:xfrm>
+          <a:prstGeom prst="straightConnector1">
+            <a:avLst/>
+          </a:prstGeom>
+          <a:ln>
+            <a:tailEnd type="triangle"/>
+          </a:ln>
+        </p:spPr>
+        <p:style>
+          <a:lnRef idx="1">
+            <a:schemeClr val="accent1"/>
+          </a:lnRef>
+          <a:fillRef idx="0">
+            <a:schemeClr val="accent1"/>
+          </a:fillRef>
+          <a:effectRef idx="0">
+            <a:schemeClr val="accent1"/>
+          </a:effectRef>
+          <a:fontRef idx="minor">
+            <a:schemeClr val="tx1"/>
+          </a:fontRef>
+        </p:style>
+      </p:cxnSp>
+      <p:cxnSp>
+        <p:nvCxnSpPr>
+          <p:cNvPr id="14" name="Straight Arrow Connector 13"/>
+          <p:cNvCxnSpPr>
+            <a:stCxn id="7" idx="2"/>
+            <a:endCxn id="8" idx="0"/>
+          </p:cNvCxnSpPr>
+          <p:nvPr/>
+        </p:nvCxnSpPr>
+        <p:spPr>
+          <a:xfrm>
+            <a:off x="8222695" y="3628149"/>
+            <a:ext cx="0" cy="788137"/>
+          </a:xfrm>
+          <a:prstGeom prst="straightConnector1">
+            <a:avLst/>
+          </a:prstGeom>
+          <a:ln>
+            <a:tailEnd type="triangle"/>
+          </a:ln>
+        </p:spPr>
+        <p:style>
+          <a:lnRef idx="1">
+            <a:schemeClr val="accent1"/>
+          </a:lnRef>
+          <a:fillRef idx="0">
+            <a:schemeClr val="accent1"/>
+          </a:fillRef>
+          <a:effectRef idx="0">
+            <a:schemeClr val="accent1"/>
+          </a:effectRef>
+          <a:fontRef idx="minor">
+            <a:schemeClr val="tx1"/>
+          </a:fontRef>
+        </p:style>
+      </p:cxnSp>
+    </p:spTree>
+    <p:custDataLst>
+      <p:tags r:id="rId1"/>
+    </p:custDataLst>
+    <p:extLst>
+      <p:ext uri="{BB962C8B-B14F-4D97-AF65-F5344CB8AC3E}">
+        <p14:creationId xmlns:p14="http://schemas.microsoft.com/office/powerpoint/2010/main" val="2511094214"/>
+      </p:ext>
+    </p:extLst>
+  </p:cSld>
+  <p:clrMapOvr>
+    <a:masterClrMapping/>
+  </p:clrMapOvr>
+  <mc:AlternateContent xmlns:mc="http://schemas.openxmlformats.org/markup-compatibility/2006" xmlns:p14="http://schemas.microsoft.com/office/powerpoint/2010/main">
+    <mc:Choice Requires="p14">
+      <p:transition spd="slow" p14:dur="2000" advTm="51149"/>
+    </mc:Choice>
+    <mc:Fallback xmlns="">
+      <p:transition xmlns:p14="http://schemas.microsoft.com/office/powerpoint/2010/main" spd="slow" advTm="51149"/>
+    </mc:Fallback>
+  </mc:AlternateContent>
+</p:sld>
+</file>
+
+<file path=ppt/slides/slide16.xml><?xml version="1.0" encoding="utf-8"?>
+<p:sld xmlns:a="http://schemas.openxmlformats.org/drawingml/2006/main" xmlns:r="http://schemas.openxmlformats.org/officeDocument/2006/relationships" xmlns:p="http://schemas.openxmlformats.org/presentationml/2006/main">
+  <p:cSld>
+    <p:spTree>
+      <p:nvGrpSpPr>
+        <p:cNvPr id="1" name=""/>
+        <p:cNvGrpSpPr/>
+        <p:nvPr/>
+      </p:nvGrpSpPr>
+      <p:grpSpPr>
+        <a:xfrm>
+          <a:off x="0" y="0"/>
+          <a:ext cx="0" cy="0"/>
+          <a:chOff x="0" y="0"/>
+          <a:chExt cx="0" cy="0"/>
+        </a:xfrm>
+      </p:grpSpPr>
+      <p:sp>
+        <p:nvSpPr>
+          <p:cNvPr id="2" name="Segnaposto testo 1"/>
+          <p:cNvSpPr>
+            <a:spLocks noGrp="1"/>
+          </p:cNvSpPr>
+          <p:nvPr>
+            <p:ph type="body" sz="quarter" idx="10"/>
+          </p:nvPr>
+        </p:nvSpPr>
+        <p:spPr/>
+        <p:txBody>
+          <a:bodyPr/>
+          <a:lstStyle/>
+          <a:p>
+            <a:r>
+              <a:rPr lang="it-IT" dirty="0"/>
+              <a:t>Valutazione</a:t>
+            </a:r>
+          </a:p>
+        </p:txBody>
+      </p:sp>
+      <p:sp>
+        <p:nvSpPr>
+          <p:cNvPr id="10" name="CasellaDiTesto 9"/>
+          <p:cNvSpPr txBox="1"/>
+          <p:nvPr/>
+        </p:nvSpPr>
+        <p:spPr>
+          <a:xfrm>
+            <a:off x="266699" y="1328484"/>
+            <a:ext cx="8731186" cy="1569660"/>
+          </a:xfrm>
+          <a:prstGeom prst="rect">
+            <a:avLst/>
+          </a:prstGeom>
+          <a:noFill/>
+        </p:spPr>
+        <p:txBody>
+          <a:bodyPr wrap="square" rtlCol="0">
+            <a:spAutoFit/>
+          </a:bodyPr>
+          <a:lstStyle/>
+          <a:p>
+            <a:pPr marL="285750" indent="-285750">
+              <a:buFont typeface="Arial"/>
+              <a:buChar char="•"/>
+            </a:pPr>
+            <a:r>
+              <a:rPr lang="it-IT" sz="2400" dirty="0"/>
+              <a:t>Valutazione della libreria sull’applicazione </a:t>
+            </a:r>
+            <a:r>
+              <a:rPr lang="it-IT" sz="2400" dirty="0" err="1"/>
+              <a:t>WordPress</a:t>
+            </a:r>
+            <a:endParaRPr lang="it-IT" sz="2400" dirty="0"/>
+          </a:p>
+          <a:p>
+            <a:pPr marL="285750" indent="-285750">
+              <a:buFont typeface="Arial"/>
+              <a:buChar char="•"/>
+            </a:pPr>
+            <a:r>
+              <a:rPr lang="it-IT" sz="2400" dirty="0"/>
+              <a:t>Test definiti in Espresso, con l’</a:t>
+            </a:r>
+            <a:r>
+              <a:rPr lang="it-IT" sz="2400" dirty="0" err="1"/>
+              <a:t>Event</a:t>
+            </a:r>
+            <a:r>
+              <a:rPr lang="it-IT" sz="2400" dirty="0"/>
+              <a:t> Monitor eseguito in background</a:t>
+            </a:r>
+          </a:p>
+          <a:p>
+            <a:pPr marL="285750" indent="-285750">
+              <a:buFont typeface="Arial"/>
+              <a:buChar char="•"/>
+            </a:pPr>
+            <a:endParaRPr lang="it-IT" sz="2400" dirty="0"/>
+          </a:p>
+        </p:txBody>
+      </p:sp>
+    </p:spTree>
+    <p:custDataLst>
+      <p:tags r:id="rId1"/>
+    </p:custDataLst>
+    <p:extLst>
+      <p:ext uri="{BB962C8B-B14F-4D97-AF65-F5344CB8AC3E}">
+        <p14:creationId xmlns:p14="http://schemas.microsoft.com/office/powerpoint/2010/main" val="1711009192"/>
+      </p:ext>
+    </p:extLst>
+  </p:cSld>
+  <p:clrMapOvr>
+    <a:masterClrMapping/>
+  </p:clrMapOvr>
+  <mc:AlternateContent xmlns:mc="http://schemas.openxmlformats.org/markup-compatibility/2006" xmlns:p14="http://schemas.microsoft.com/office/powerpoint/2010/main">
+    <mc:Choice Requires="p14">
+      <p:transition spd="slow" p14:dur="2000" advTm="51149"/>
+    </mc:Choice>
+    <mc:Fallback xmlns="">
+      <p:transition xmlns:p14="http://schemas.microsoft.com/office/powerpoint/2010/main" spd="slow" advTm="51149"/>
+    </mc:Fallback>
+  </mc:AlternateContent>
+</p:sld>
+</file>
+
+<file path=ppt/slides/slide17.xml><?xml version="1.0" encoding="utf-8"?>
+<p:sld xmlns:a="http://schemas.openxmlformats.org/drawingml/2006/main" xmlns:r="http://schemas.openxmlformats.org/officeDocument/2006/relationships" xmlns:p="http://schemas.openxmlformats.org/presentationml/2006/main">
+  <p:cSld>
+    <p:spTree>
+      <p:nvGrpSpPr>
+        <p:cNvPr id="1" name=""/>
+        <p:cNvGrpSpPr/>
+        <p:nvPr/>
+      </p:nvGrpSpPr>
+      <p:grpSpPr>
+        <a:xfrm>
+          <a:off x="0" y="0"/>
+          <a:ext cx="0" cy="0"/>
+          <a:chOff x="0" y="0"/>
+          <a:chExt cx="0" cy="0"/>
+        </a:xfrm>
+      </p:grpSpPr>
+      <p:sp>
+        <p:nvSpPr>
+          <p:cNvPr id="2" name="Segnaposto testo 1"/>
+          <p:cNvSpPr>
+            <a:spLocks noGrp="1"/>
+          </p:cNvSpPr>
+          <p:nvPr>
+            <p:ph type="body" sz="quarter" idx="10"/>
+          </p:nvPr>
+        </p:nvSpPr>
+        <p:spPr/>
+        <p:txBody>
+          <a:bodyPr/>
+          <a:lstStyle/>
+          <a:p>
+            <a:r>
+              <a:rPr lang="it-IT" dirty="0"/>
+              <a:t>Valutazione</a:t>
+            </a:r>
+          </a:p>
+        </p:txBody>
+      </p:sp>
+      <p:sp>
+        <p:nvSpPr>
+          <p:cNvPr id="8" name="Rectangle 4"/>
+          <p:cNvSpPr>
+            <a:spLocks noChangeArrowheads="1"/>
+          </p:cNvSpPr>
+          <p:nvPr/>
+        </p:nvSpPr>
+        <p:spPr bwMode="auto">
+          <a:xfrm>
+            <a:off x="266699" y="4123907"/>
+            <a:ext cx="8932333" cy="2308324"/>
+          </a:xfrm>
+          <a:prstGeom prst="rect">
+            <a:avLst/>
+          </a:prstGeom>
+          <a:noFill/>
+          <a:ln>
+            <a:noFill/>
+          </a:ln>
+          <a:effectLst/>
+        </p:spPr>
+        <p:txBody>
+          <a:bodyPr vert="horz" wrap="square" lIns="91440" tIns="45720" rIns="91440" bIns="45720" numCol="1" anchor="ctr" anchorCtr="0" compatLnSpc="1">
+            <a:prstTxWarp prst="textNoShape">
+              <a:avLst/>
+            </a:prstTxWarp>
+            <a:spAutoFit/>
+          </a:bodyPr>
+          <a:lstStyle/>
+          <a:p>
+            <a:pPr marL="0" marR="0" lvl="0" indent="0" algn="l" defTabSz="914400" rtl="0" eaLnBrk="0" fontAlgn="base" latinLnBrk="0" hangingPunct="0">
+              <a:lnSpc>
+                <a:spcPct val="100000"/>
+              </a:lnSpc>
+              <a:spcBef>
+                <a:spcPct val="0"/>
+              </a:spcBef>
+              <a:spcAft>
+                <a:spcPct val="0"/>
+              </a:spcAft>
+              <a:buClrTx/>
+              <a:buSzTx/>
+              <a:buFontTx/>
+              <a:buNone/>
+              <a:tabLst/>
+            </a:pPr>
+            <a:r>
+              <a:rPr kumimoji="0" lang="en-US" altLang="en-US" b="0" i="0" u="none" strike="noStrike" cap="none" normalizeH="0" baseline="0" dirty="0" err="1">
+                <a:ln>
+                  <a:noFill/>
+                </a:ln>
+                <a:effectLst/>
+                <a:latin typeface="Courier New" panose="02070309020205020404" pitchFamily="49" charset="0"/>
+                <a:cs typeface="Courier New" panose="02070309020205020404" pitchFamily="49" charset="0"/>
+              </a:rPr>
+              <a:t>EventMonitor.</a:t>
+            </a:r>
+            <a:r>
+              <a:rPr kumimoji="0" lang="en-US" altLang="en-US" b="0" i="1" u="none" strike="noStrike" cap="none" normalizeH="0" baseline="0" dirty="0" err="1">
+                <a:ln>
+                  <a:noFill/>
+                </a:ln>
+                <a:effectLst/>
+                <a:latin typeface="Courier New" panose="02070309020205020404" pitchFamily="49" charset="0"/>
+                <a:cs typeface="Courier New" panose="02070309020205020404" pitchFamily="49" charset="0"/>
+              </a:rPr>
+              <a:t>getInstance</a:t>
+            </a:r>
+            <a:r>
+              <a:rPr kumimoji="0" lang="en-US" altLang="en-US" b="0" i="0" u="none" strike="noStrike" cap="none" normalizeH="0" baseline="0" dirty="0">
+                <a:ln>
+                  <a:noFill/>
+                </a:ln>
+                <a:effectLst/>
+                <a:latin typeface="Courier New" panose="02070309020205020404" pitchFamily="49" charset="0"/>
+                <a:cs typeface="Courier New" panose="02070309020205020404" pitchFamily="49" charset="0"/>
+              </a:rPr>
+              <a:t>().</a:t>
+            </a:r>
+            <a:r>
+              <a:rPr kumimoji="0" lang="en-US" altLang="en-US" b="0" i="0" u="none" strike="noStrike" cap="none" normalizeH="0" baseline="0" dirty="0" err="1">
+                <a:ln>
+                  <a:noFill/>
+                </a:ln>
+                <a:effectLst/>
+                <a:latin typeface="Courier New" panose="02070309020205020404" pitchFamily="49" charset="0"/>
+                <a:cs typeface="Courier New" panose="02070309020205020404" pitchFamily="49" charset="0"/>
+              </a:rPr>
+              <a:t>checkThat</a:t>
+            </a:r>
+            <a:r>
+              <a:rPr kumimoji="0" lang="en-US" altLang="en-US" b="0" i="0" u="none" strike="noStrike" cap="none" normalizeH="0" baseline="0" dirty="0">
+                <a:ln>
+                  <a:noFill/>
+                </a:ln>
+                <a:effectLst/>
+                <a:latin typeface="Courier New" panose="02070309020205020404" pitchFamily="49" charset="0"/>
+                <a:cs typeface="Courier New" panose="02070309020205020404" pitchFamily="49" charset="0"/>
+              </a:rPr>
+              <a:t>(</a:t>
+            </a:r>
+            <a:br>
+              <a:rPr kumimoji="0" lang="en-US" altLang="en-US" b="0" i="0" u="none" strike="noStrike" cap="none" normalizeH="0" baseline="0" dirty="0">
+                <a:ln>
+                  <a:noFill/>
+                </a:ln>
+                <a:solidFill>
+                  <a:srgbClr val="A9B7C6"/>
+                </a:solidFill>
+                <a:effectLst/>
+                <a:latin typeface="Courier New" panose="02070309020205020404" pitchFamily="49" charset="0"/>
+                <a:cs typeface="Courier New" panose="02070309020205020404" pitchFamily="49" charset="0"/>
+              </a:rPr>
+            </a:br>
+            <a:r>
+              <a:rPr kumimoji="0" lang="en-US" altLang="en-US" b="0" i="0" u="none" strike="noStrike" cap="none" normalizeH="0" baseline="0" dirty="0">
+                <a:ln>
+                  <a:noFill/>
+                </a:ln>
+                <a:solidFill>
+                  <a:srgbClr val="A9B7C6"/>
+                </a:solidFill>
+                <a:effectLst/>
+                <a:latin typeface="Courier New" panose="02070309020205020404" pitchFamily="49" charset="0"/>
+                <a:cs typeface="Courier New" panose="02070309020205020404" pitchFamily="49" charset="0"/>
+              </a:rPr>
+              <a:t>        </a:t>
+            </a:r>
+            <a:r>
+              <a:rPr kumimoji="0" lang="en-US" altLang="en-US" b="0" i="0" u="none" strike="noStrike" cap="none" normalizeH="0" baseline="0" dirty="0">
+                <a:ln>
+                  <a:noFill/>
+                </a:ln>
+                <a:solidFill>
+                  <a:srgbClr val="6A8759"/>
+                </a:solidFill>
+                <a:effectLst/>
+                <a:latin typeface="Courier New" panose="02070309020205020404" pitchFamily="49" charset="0"/>
+                <a:cs typeface="Courier New" panose="02070309020205020404" pitchFamily="49" charset="0"/>
+              </a:rPr>
+              <a:t>"Post content changed after the upload started!"</a:t>
+            </a:r>
+            <a:r>
+              <a:rPr kumimoji="0" lang="en-US" altLang="en-US" b="0" i="0" u="none" strike="noStrike" cap="none" normalizeH="0" baseline="0" dirty="0">
+                <a:ln>
+                  <a:noFill/>
+                </a:ln>
+                <a:solidFill>
+                  <a:srgbClr val="CC7832"/>
+                </a:solidFill>
+                <a:effectLst/>
+                <a:latin typeface="Courier New" panose="02070309020205020404" pitchFamily="49" charset="0"/>
+                <a:cs typeface="Courier New" panose="02070309020205020404" pitchFamily="49" charset="0"/>
+              </a:rPr>
+              <a:t>,</a:t>
+            </a:r>
+            <a:br>
+              <a:rPr kumimoji="0" lang="en-US" altLang="en-US" b="0" i="0" u="none" strike="noStrike" cap="none" normalizeH="0" baseline="0" dirty="0">
+                <a:ln>
+                  <a:noFill/>
+                </a:ln>
+                <a:solidFill>
+                  <a:srgbClr val="CC7832"/>
+                </a:solidFill>
+                <a:effectLst/>
+                <a:latin typeface="Courier New" panose="02070309020205020404" pitchFamily="49" charset="0"/>
+                <a:cs typeface="Courier New" panose="02070309020205020404" pitchFamily="49" charset="0"/>
+              </a:rPr>
+            </a:br>
+            <a:r>
+              <a:rPr kumimoji="0" lang="en-US" altLang="en-US" b="0" i="0" u="none" strike="noStrike" cap="none" normalizeH="0" baseline="0" dirty="0">
+                <a:ln>
+                  <a:noFill/>
+                </a:ln>
+                <a:solidFill>
+                  <a:srgbClr val="CC7832"/>
+                </a:solidFill>
+                <a:effectLst/>
+                <a:latin typeface="Courier New" panose="02070309020205020404" pitchFamily="49" charset="0"/>
+                <a:cs typeface="Courier New" panose="02070309020205020404" pitchFamily="49" charset="0"/>
+              </a:rPr>
+              <a:t>        </a:t>
+            </a:r>
+            <a:r>
+              <a:rPr kumimoji="0" lang="en-US" altLang="en-US" b="0" i="1" u="none" strike="noStrike" cap="none" normalizeH="0" baseline="0" dirty="0" err="1">
+                <a:ln>
+                  <a:noFill/>
+                </a:ln>
+                <a:effectLst/>
+                <a:latin typeface="Courier New" panose="02070309020205020404" pitchFamily="49" charset="0"/>
+                <a:cs typeface="Courier New" panose="02070309020205020404" pitchFamily="49" charset="0"/>
+              </a:rPr>
+              <a:t>providedThat</a:t>
+            </a:r>
+            <a:r>
+              <a:rPr kumimoji="0" lang="en-US" altLang="en-US" b="0" i="0" u="none" strike="noStrike" cap="none" normalizeH="0" baseline="0" dirty="0">
+                <a:ln>
+                  <a:noFill/>
+                </a:ln>
+                <a:effectLst/>
+                <a:latin typeface="Courier New" panose="02070309020205020404" pitchFamily="49" charset="0"/>
+                <a:cs typeface="Courier New" panose="02070309020205020404" pitchFamily="49" charset="0"/>
+              </a:rPr>
+              <a:t>(</a:t>
+            </a:r>
+            <a:br>
+              <a:rPr kumimoji="0" lang="en-US" altLang="en-US" b="0" i="0" u="none" strike="noStrike" cap="none" normalizeH="0" baseline="0" dirty="0">
+                <a:ln>
+                  <a:noFill/>
+                </a:ln>
+                <a:effectLst/>
+                <a:latin typeface="Courier New" panose="02070309020205020404" pitchFamily="49" charset="0"/>
+                <a:cs typeface="Courier New" panose="02070309020205020404" pitchFamily="49" charset="0"/>
+              </a:rPr>
+            </a:br>
+            <a:r>
+              <a:rPr kumimoji="0" lang="en-US" altLang="en-US" b="0" i="0" u="none" strike="noStrike" cap="none" normalizeH="0" baseline="0" dirty="0">
+                <a:ln>
+                  <a:noFill/>
+                </a:ln>
+                <a:effectLst/>
+                <a:latin typeface="Courier New" panose="02070309020205020404" pitchFamily="49" charset="0"/>
+                <a:cs typeface="Courier New" panose="02070309020205020404" pitchFamily="49" charset="0"/>
+              </a:rPr>
+              <a:t>                </a:t>
+            </a:r>
+            <a:r>
+              <a:rPr kumimoji="0" lang="en-US" altLang="en-US" b="0" i="1" u="none" strike="noStrike" cap="none" normalizeH="0" baseline="0" dirty="0" err="1">
+                <a:ln>
+                  <a:noFill/>
+                </a:ln>
+                <a:effectLst/>
+                <a:latin typeface="Courier New" panose="02070309020205020404" pitchFamily="49" charset="0"/>
+                <a:cs typeface="Courier New" panose="02070309020205020404" pitchFamily="49" charset="0"/>
+              </a:rPr>
+              <a:t>existsAnEventThat</a:t>
+            </a:r>
+            <a:r>
+              <a:rPr kumimoji="0" lang="en-US" altLang="en-US" b="0" i="0" u="none" strike="noStrike" cap="none" normalizeH="0" baseline="0" dirty="0">
+                <a:ln>
+                  <a:noFill/>
+                </a:ln>
+                <a:effectLst/>
+                <a:latin typeface="Courier New" panose="02070309020205020404" pitchFamily="49" charset="0"/>
+                <a:cs typeface="Courier New" panose="02070309020205020404" pitchFamily="49" charset="0"/>
+              </a:rPr>
+              <a:t>(</a:t>
+            </a:r>
+            <a:r>
+              <a:rPr kumimoji="0" lang="en-US" altLang="en-US" b="0" i="1" u="none" strike="noStrike" cap="none" normalizeH="0" baseline="0" dirty="0" err="1">
+                <a:ln>
+                  <a:noFill/>
+                </a:ln>
+                <a:effectLst/>
+                <a:latin typeface="Courier New" panose="02070309020205020404" pitchFamily="49" charset="0"/>
+                <a:cs typeface="Courier New" panose="02070309020205020404" pitchFamily="49" charset="0"/>
+              </a:rPr>
+              <a:t>isPostUploadStart</a:t>
+            </a:r>
+            <a:r>
+              <a:rPr kumimoji="0" lang="en-US" altLang="en-US" b="0" i="0" u="none" strike="noStrike" cap="none" normalizeH="0" baseline="0" dirty="0">
+                <a:ln>
+                  <a:noFill/>
+                </a:ln>
+                <a:effectLst/>
+                <a:latin typeface="Courier New" panose="02070309020205020404" pitchFamily="49" charset="0"/>
+                <a:cs typeface="Courier New" panose="02070309020205020404" pitchFamily="49" charset="0"/>
+              </a:rPr>
+              <a:t>()))</a:t>
+            </a:r>
+            <a:br>
+              <a:rPr kumimoji="0" lang="en-US" altLang="en-US" b="0" i="0" u="none" strike="noStrike" cap="none" normalizeH="0" baseline="0" dirty="0">
+                <a:ln>
+                  <a:noFill/>
+                </a:ln>
+                <a:effectLst/>
+                <a:latin typeface="Courier New" panose="02070309020205020404" pitchFamily="49" charset="0"/>
+                <a:cs typeface="Courier New" panose="02070309020205020404" pitchFamily="49" charset="0"/>
+              </a:rPr>
+            </a:br>
+            <a:r>
+              <a:rPr kumimoji="0" lang="en-US" altLang="en-US" b="0" i="0" u="none" strike="noStrike" cap="none" normalizeH="0" baseline="0" dirty="0">
+                <a:ln>
+                  <a:noFill/>
+                </a:ln>
+                <a:effectLst/>
+                <a:latin typeface="Courier New" panose="02070309020205020404" pitchFamily="49" charset="0"/>
+                <a:cs typeface="Courier New" panose="02070309020205020404" pitchFamily="49" charset="0"/>
+              </a:rPr>
+              <a:t>	 .then(</a:t>
+            </a:r>
+            <a:br>
+              <a:rPr kumimoji="0" lang="en-US" altLang="en-US" b="0" i="0" u="none" strike="noStrike" cap="none" normalizeH="0" baseline="0" dirty="0">
+                <a:ln>
+                  <a:noFill/>
+                </a:ln>
+                <a:effectLst/>
+                <a:latin typeface="Courier New" panose="02070309020205020404" pitchFamily="49" charset="0"/>
+                <a:cs typeface="Courier New" panose="02070309020205020404" pitchFamily="49" charset="0"/>
+              </a:rPr>
+            </a:br>
+            <a:r>
+              <a:rPr kumimoji="0" lang="en-US" altLang="en-US" b="0" i="0" u="none" strike="noStrike" cap="none" normalizeH="0" baseline="0" dirty="0">
+                <a:ln>
+                  <a:noFill/>
+                </a:ln>
+                <a:effectLst/>
+                <a:latin typeface="Courier New" panose="02070309020205020404" pitchFamily="49" charset="0"/>
+                <a:cs typeface="Courier New" panose="02070309020205020404" pitchFamily="49" charset="0"/>
+              </a:rPr>
+              <a:t>		</a:t>
+            </a:r>
+            <a:r>
+              <a:rPr kumimoji="0" lang="en-US" altLang="en-US" b="0" i="1" u="none" strike="noStrike" cap="none" normalizeH="0" baseline="0" dirty="0" err="1">
+                <a:ln>
+                  <a:noFill/>
+                </a:ln>
+                <a:effectLst/>
+                <a:latin typeface="Courier New" panose="02070309020205020404" pitchFamily="49" charset="0"/>
+                <a:cs typeface="Courier New" panose="02070309020205020404" pitchFamily="49" charset="0"/>
+              </a:rPr>
+              <a:t>anEventThat</a:t>
+            </a:r>
+            <a:r>
+              <a:rPr kumimoji="0" lang="en-US" altLang="en-US" b="0" i="0" u="none" strike="noStrike" cap="none" normalizeH="0" baseline="0" dirty="0">
+                <a:ln>
+                  <a:noFill/>
+                </a:ln>
+                <a:effectLst/>
+                <a:latin typeface="Courier New" panose="02070309020205020404" pitchFamily="49" charset="0"/>
+                <a:cs typeface="Courier New" panose="02070309020205020404" pitchFamily="49" charset="0"/>
+              </a:rPr>
+              <a:t>(</a:t>
+            </a:r>
+            <a:r>
+              <a:rPr kumimoji="0" lang="en-US" altLang="en-US" b="0" i="1" u="none" strike="noStrike" cap="none" normalizeH="0" baseline="0" dirty="0" err="1">
+                <a:ln>
+                  <a:noFill/>
+                </a:ln>
+                <a:effectLst/>
+                <a:latin typeface="Courier New" panose="02070309020205020404" pitchFamily="49" charset="0"/>
+                <a:cs typeface="Courier New" panose="02070309020205020404" pitchFamily="49" charset="0"/>
+              </a:rPr>
+              <a:t>isPostChange</a:t>
+            </a:r>
+            <a:r>
+              <a:rPr kumimoji="0" lang="en-US" altLang="en-US" b="0" i="0" u="none" strike="noStrike" cap="none" normalizeH="0" baseline="0" dirty="0">
+                <a:ln>
+                  <a:noFill/>
+                </a:ln>
+                <a:effectLst/>
+                <a:latin typeface="Courier New" panose="02070309020205020404" pitchFamily="49" charset="0"/>
+                <a:cs typeface="Courier New" panose="02070309020205020404" pitchFamily="49" charset="0"/>
+              </a:rPr>
+              <a:t>())</a:t>
+            </a:r>
+            <a:br>
+              <a:rPr kumimoji="0" lang="en-US" altLang="en-US" b="0" i="0" u="none" strike="noStrike" cap="none" normalizeH="0" baseline="0" dirty="0">
+                <a:ln>
+                  <a:noFill/>
+                </a:ln>
+                <a:effectLst/>
+                <a:latin typeface="Courier New" panose="02070309020205020404" pitchFamily="49" charset="0"/>
+                <a:cs typeface="Courier New" panose="02070309020205020404" pitchFamily="49" charset="0"/>
+              </a:rPr>
+            </a:br>
+            <a:r>
+              <a:rPr kumimoji="0" lang="en-US" altLang="en-US" b="0" i="0" u="none" strike="noStrike" cap="none" normalizeH="0" baseline="0" dirty="0">
+                <a:ln>
+                  <a:noFill/>
+                </a:ln>
+                <a:effectLst/>
+                <a:latin typeface="Courier New" panose="02070309020205020404" pitchFamily="49" charset="0"/>
+                <a:cs typeface="Courier New" panose="02070309020205020404" pitchFamily="49" charset="0"/>
+              </a:rPr>
+              <a:t>		.</a:t>
+            </a:r>
+            <a:r>
+              <a:rPr kumimoji="0" lang="en-US" altLang="en-US" b="0" i="0" u="none" strike="noStrike" cap="none" normalizeH="0" baseline="0" dirty="0" err="1">
+                <a:ln>
+                  <a:noFill/>
+                </a:ln>
+                <a:effectLst/>
+                <a:latin typeface="Courier New" panose="02070309020205020404" pitchFamily="49" charset="0"/>
+                <a:cs typeface="Courier New" panose="02070309020205020404" pitchFamily="49" charset="0"/>
+              </a:rPr>
+              <a:t>canHappenOnlyBefore</a:t>
+            </a:r>
+            <a:r>
+              <a:rPr kumimoji="0" lang="en-US" altLang="en-US" b="0" i="0" u="none" strike="noStrike" cap="none" normalizeH="0" baseline="0" dirty="0">
+                <a:ln>
+                  <a:noFill/>
+                </a:ln>
+                <a:effectLst/>
+                <a:latin typeface="Courier New" panose="02070309020205020404" pitchFamily="49" charset="0"/>
+                <a:cs typeface="Courier New" panose="02070309020205020404" pitchFamily="49" charset="0"/>
+              </a:rPr>
+              <a:t>(</a:t>
+            </a:r>
+            <a:br>
+              <a:rPr kumimoji="0" lang="en-US" altLang="en-US" b="0" i="0" u="none" strike="noStrike" cap="none" normalizeH="0" baseline="0" dirty="0">
+                <a:ln>
+                  <a:noFill/>
+                </a:ln>
+                <a:effectLst/>
+                <a:latin typeface="Courier New" panose="02070309020205020404" pitchFamily="49" charset="0"/>
+                <a:cs typeface="Courier New" panose="02070309020205020404" pitchFamily="49" charset="0"/>
+              </a:rPr>
+            </a:br>
+            <a:r>
+              <a:rPr lang="en-US" altLang="en-US" dirty="0">
+                <a:latin typeface="Courier New" panose="02070309020205020404" pitchFamily="49" charset="0"/>
+                <a:cs typeface="Courier New" panose="02070309020205020404" pitchFamily="49" charset="0"/>
+              </a:rPr>
+              <a:t>			</a:t>
+            </a:r>
+            <a:r>
+              <a:rPr kumimoji="0" lang="en-US" altLang="en-US" b="0" i="1" u="none" strike="noStrike" cap="none" normalizeH="0" baseline="0" dirty="0" err="1">
+                <a:ln>
+                  <a:noFill/>
+                </a:ln>
+                <a:effectLst/>
+                <a:latin typeface="Courier New" panose="02070309020205020404" pitchFamily="49" charset="0"/>
+                <a:cs typeface="Courier New" panose="02070309020205020404" pitchFamily="49" charset="0"/>
+              </a:rPr>
+              <a:t>anEventThat</a:t>
+            </a:r>
+            <a:r>
+              <a:rPr kumimoji="0" lang="en-US" altLang="en-US" b="0" i="0" u="none" strike="noStrike" cap="none" normalizeH="0" baseline="0" dirty="0">
+                <a:ln>
+                  <a:noFill/>
+                </a:ln>
+                <a:effectLst/>
+                <a:latin typeface="Courier New" panose="02070309020205020404" pitchFamily="49" charset="0"/>
+                <a:cs typeface="Courier New" panose="02070309020205020404" pitchFamily="49" charset="0"/>
+              </a:rPr>
+              <a:t>(</a:t>
+            </a:r>
+            <a:r>
+              <a:rPr kumimoji="0" lang="en-US" altLang="en-US" b="0" i="1" u="none" strike="noStrike" cap="none" normalizeH="0" baseline="0" dirty="0" err="1">
+                <a:ln>
+                  <a:noFill/>
+                </a:ln>
+                <a:effectLst/>
+                <a:latin typeface="Courier New" panose="02070309020205020404" pitchFamily="49" charset="0"/>
+                <a:cs typeface="Courier New" panose="02070309020205020404" pitchFamily="49" charset="0"/>
+              </a:rPr>
+              <a:t>isPostUploadStart</a:t>
+            </a:r>
+            <a:r>
+              <a:rPr kumimoji="0" lang="en-US" altLang="en-US" b="0" i="0" u="none" strike="noStrike" cap="none" normalizeH="0" baseline="0" dirty="0">
+                <a:ln>
+                  <a:noFill/>
+                </a:ln>
+                <a:effectLst/>
+                <a:latin typeface="Courier New" panose="02070309020205020404" pitchFamily="49" charset="0"/>
+                <a:cs typeface="Courier New" panose="02070309020205020404" pitchFamily="49" charset="0"/>
+              </a:rPr>
+              <a:t>()))));</a:t>
+            </a:r>
+            <a:endParaRPr kumimoji="0" lang="en-US" altLang="en-US" b="0" i="0" u="none" strike="noStrike" cap="none" normalizeH="0" baseline="0" dirty="0">
+              <a:ln>
+                <a:noFill/>
+              </a:ln>
+              <a:effectLst/>
+              <a:latin typeface="Arial" panose="020B0604020202020204" pitchFamily="34" charset="0"/>
+            </a:endParaRPr>
+          </a:p>
+        </p:txBody>
+      </p:sp>
+      <p:sp>
+        <p:nvSpPr>
+          <p:cNvPr id="9" name="Rectangle 5"/>
+          <p:cNvSpPr>
+            <a:spLocks noChangeArrowheads="1"/>
+          </p:cNvSpPr>
+          <p:nvPr/>
+        </p:nvSpPr>
+        <p:spPr bwMode="auto">
+          <a:xfrm>
+            <a:off x="266699" y="2073089"/>
+            <a:ext cx="8462434" cy="923330"/>
+          </a:xfrm>
+          <a:prstGeom prst="rect">
+            <a:avLst/>
+          </a:prstGeom>
+          <a:noFill/>
+          <a:ln>
+            <a:noFill/>
+          </a:ln>
+          <a:effectLst/>
+        </p:spPr>
+        <p:txBody>
+          <a:bodyPr vert="horz" wrap="square" lIns="91440" tIns="45720" rIns="91440" bIns="45720" numCol="1" anchor="ctr" anchorCtr="0" compatLnSpc="1">
+            <a:prstTxWarp prst="textNoShape">
+              <a:avLst/>
+            </a:prstTxWarp>
+            <a:spAutoFit/>
+          </a:bodyPr>
+          <a:lstStyle/>
+          <a:p>
+            <a:pPr marL="0" marR="0" lvl="0" indent="0" algn="l" defTabSz="914400" rtl="0" eaLnBrk="0" fontAlgn="base" latinLnBrk="0" hangingPunct="0">
+              <a:lnSpc>
+                <a:spcPct val="100000"/>
+              </a:lnSpc>
+              <a:spcBef>
+                <a:spcPct val="0"/>
+              </a:spcBef>
+              <a:spcAft>
+                <a:spcPct val="0"/>
+              </a:spcAft>
+              <a:buClrTx/>
+              <a:buSzTx/>
+              <a:buFontTx/>
+              <a:buNone/>
+              <a:tabLst/>
+            </a:pPr>
+            <a:r>
+              <a:rPr kumimoji="0" lang="en-US" altLang="en-US" b="0" i="0" u="none" strike="noStrike" cap="none" normalizeH="0" baseline="0" dirty="0" err="1">
+                <a:ln>
+                  <a:noFill/>
+                </a:ln>
+                <a:effectLst/>
+                <a:latin typeface="Courier New" panose="02070309020205020404" pitchFamily="49" charset="0"/>
+                <a:cs typeface="Courier New" panose="02070309020205020404" pitchFamily="49" charset="0"/>
+              </a:rPr>
+              <a:t>EventMonitor.</a:t>
+            </a:r>
+            <a:r>
+              <a:rPr kumimoji="0" lang="en-US" altLang="en-US" b="0" i="1" u="none" strike="noStrike" cap="none" normalizeH="0" baseline="0" dirty="0" err="1">
+                <a:ln>
+                  <a:noFill/>
+                </a:ln>
+                <a:effectLst/>
+                <a:latin typeface="Courier New" panose="02070309020205020404" pitchFamily="49" charset="0"/>
+                <a:cs typeface="Courier New" panose="02070309020205020404" pitchFamily="49" charset="0"/>
+              </a:rPr>
+              <a:t>getInstance</a:t>
+            </a:r>
+            <a:r>
+              <a:rPr kumimoji="0" lang="en-US" altLang="en-US" b="0" i="0" u="none" strike="noStrike" cap="none" normalizeH="0" baseline="0" dirty="0">
+                <a:ln>
+                  <a:noFill/>
+                </a:ln>
+                <a:effectLst/>
+                <a:latin typeface="Courier New" panose="02070309020205020404" pitchFamily="49" charset="0"/>
+                <a:cs typeface="Courier New" panose="02070309020205020404" pitchFamily="49" charset="0"/>
+              </a:rPr>
+              <a:t>().observe(</a:t>
+            </a:r>
+            <a:br>
+              <a:rPr kumimoji="0" lang="en-US" altLang="en-US" b="0" i="0" u="none" strike="noStrike" cap="none" normalizeH="0" baseline="0" dirty="0">
+                <a:ln>
+                  <a:noFill/>
+                </a:ln>
+                <a:effectLst/>
+                <a:latin typeface="Courier New" panose="02070309020205020404" pitchFamily="49" charset="0"/>
+                <a:cs typeface="Courier New" panose="02070309020205020404" pitchFamily="49" charset="0"/>
+              </a:rPr>
+            </a:br>
+            <a:r>
+              <a:rPr kumimoji="0" lang="en-US" altLang="en-US" b="0" i="0" u="none" strike="noStrike" cap="none" normalizeH="0" baseline="0" dirty="0">
+                <a:ln>
+                  <a:noFill/>
+                </a:ln>
+                <a:effectLst/>
+                <a:latin typeface="Courier New" panose="02070309020205020404" pitchFamily="49" charset="0"/>
+                <a:cs typeface="Courier New" panose="02070309020205020404" pitchFamily="49" charset="0"/>
+              </a:rPr>
+              <a:t>        </a:t>
+            </a:r>
+            <a:r>
+              <a:rPr kumimoji="0" lang="en-US" altLang="en-US" b="0" i="0" u="none" strike="noStrike" cap="none" normalizeH="0" baseline="0" dirty="0" err="1">
+                <a:ln>
+                  <a:noFill/>
+                </a:ln>
+                <a:effectLst/>
+                <a:latin typeface="Courier New" panose="02070309020205020404" pitchFamily="49" charset="0"/>
+                <a:cs typeface="Courier New" panose="02070309020205020404" pitchFamily="49" charset="0"/>
+              </a:rPr>
+              <a:t>EventUtils.</a:t>
+            </a:r>
+            <a:r>
+              <a:rPr kumimoji="0" lang="en-US" altLang="en-US" b="0" i="1" u="none" strike="noStrike" cap="none" normalizeH="0" baseline="0" dirty="0" err="1">
+                <a:ln>
+                  <a:noFill/>
+                </a:ln>
+                <a:effectLst/>
+                <a:latin typeface="Courier New" panose="02070309020205020404" pitchFamily="49" charset="0"/>
+                <a:cs typeface="Courier New" panose="02070309020205020404" pitchFamily="49" charset="0"/>
+              </a:rPr>
+              <a:t>postChanges</a:t>
+            </a:r>
+            <a:r>
+              <a:rPr kumimoji="0" lang="en-US" altLang="en-US" b="0" i="0" u="none" strike="noStrike" cap="none" normalizeH="0" baseline="0" dirty="0">
+                <a:ln>
+                  <a:noFill/>
+                </a:ln>
+                <a:effectLst/>
+                <a:latin typeface="Courier New" panose="02070309020205020404" pitchFamily="49" charset="0"/>
+                <a:cs typeface="Courier New" panose="02070309020205020404" pitchFamily="49" charset="0"/>
+              </a:rPr>
+              <a:t>(</a:t>
+            </a:r>
+            <a:r>
+              <a:rPr kumimoji="0" lang="en-US" altLang="en-US" b="0" i="0" u="none" strike="noStrike" cap="none" normalizeH="0" baseline="0" dirty="0" err="1">
+                <a:ln>
+                  <a:noFill/>
+                </a:ln>
+                <a:solidFill>
+                  <a:srgbClr val="9876AA"/>
+                </a:solidFill>
+                <a:effectLst/>
+                <a:latin typeface="Courier New" panose="02070309020205020404" pitchFamily="49" charset="0"/>
+                <a:cs typeface="Courier New" panose="02070309020205020404" pitchFamily="49" charset="0"/>
+              </a:rPr>
+              <a:t>editorTitleView</a:t>
+            </a:r>
+            <a:r>
+              <a:rPr kumimoji="0" lang="en-US" altLang="en-US" b="0" i="0" u="none" strike="noStrike" cap="none" normalizeH="0" baseline="0" dirty="0">
+                <a:ln>
+                  <a:noFill/>
+                </a:ln>
+                <a:effectLst/>
+                <a:latin typeface="Courier New" panose="02070309020205020404" pitchFamily="49" charset="0"/>
+                <a:cs typeface="Courier New" panose="02070309020205020404" pitchFamily="49" charset="0"/>
+              </a:rPr>
+              <a:t>, 						</a:t>
+            </a:r>
+            <a:r>
+              <a:rPr kumimoji="0" lang="en-US" altLang="en-US" b="0" i="0" u="none" strike="noStrike" cap="none" normalizeH="0" dirty="0">
+                <a:ln>
+                  <a:noFill/>
+                </a:ln>
+                <a:effectLst/>
+                <a:latin typeface="Courier New" panose="02070309020205020404" pitchFamily="49" charset="0"/>
+                <a:cs typeface="Courier New" panose="02070309020205020404" pitchFamily="49" charset="0"/>
+              </a:rPr>
+              <a:t>    </a:t>
+            </a:r>
+            <a:r>
+              <a:rPr kumimoji="0" lang="en-US" altLang="en-US" b="0" i="0" u="none" strike="noStrike" cap="none" normalizeH="0" baseline="0" dirty="0" err="1">
+                <a:ln>
+                  <a:noFill/>
+                </a:ln>
+                <a:solidFill>
+                  <a:srgbClr val="9876AA"/>
+                </a:solidFill>
+                <a:effectLst/>
+                <a:latin typeface="Courier New" panose="02070309020205020404" pitchFamily="49" charset="0"/>
+                <a:cs typeface="Courier New" panose="02070309020205020404" pitchFamily="49" charset="0"/>
+              </a:rPr>
+              <a:t>editorContentView</a:t>
+            </a:r>
+            <a:r>
+              <a:rPr kumimoji="0" lang="en-US" altLang="en-US" b="0" i="0" u="none" strike="noStrike" cap="none" normalizeH="0" baseline="0" dirty="0">
+                <a:ln>
+                  <a:noFill/>
+                </a:ln>
+                <a:effectLst/>
+                <a:latin typeface="Courier New" panose="02070309020205020404" pitchFamily="49" charset="0"/>
+                <a:cs typeface="Courier New" panose="02070309020205020404" pitchFamily="49" charset="0"/>
+              </a:rPr>
+              <a:t>));</a:t>
+            </a:r>
+            <a:endParaRPr kumimoji="0" lang="en-US" altLang="en-US" b="0" i="0" u="none" strike="noStrike" cap="none" normalizeH="0" baseline="0" dirty="0">
+              <a:ln>
+                <a:noFill/>
+              </a:ln>
+              <a:solidFill>
+                <a:schemeClr val="tx1"/>
+              </a:solidFill>
+              <a:effectLst/>
+              <a:latin typeface="Arial" panose="020B0604020202020204" pitchFamily="34" charset="0"/>
+            </a:endParaRPr>
+          </a:p>
+        </p:txBody>
+      </p:sp>
+      <p:sp>
+        <p:nvSpPr>
+          <p:cNvPr id="10" name="CasellaDiTesto 9"/>
+          <p:cNvSpPr txBox="1"/>
+          <p:nvPr/>
+        </p:nvSpPr>
+        <p:spPr>
+          <a:xfrm>
+            <a:off x="266699" y="1328484"/>
+            <a:ext cx="8731186" cy="461665"/>
+          </a:xfrm>
+          <a:prstGeom prst="rect">
+            <a:avLst/>
+          </a:prstGeom>
+          <a:noFill/>
+        </p:spPr>
+        <p:txBody>
+          <a:bodyPr wrap="square" rtlCol="0">
+            <a:spAutoFit/>
+          </a:bodyPr>
+          <a:lstStyle/>
+          <a:p>
+            <a:pPr marL="285750" indent="-285750">
+              <a:buFont typeface="Arial"/>
+              <a:buChar char="•"/>
+            </a:pPr>
+            <a:r>
+              <a:rPr lang="it-IT" sz="2400" dirty="0"/>
+              <a:t>Esempio di eventi osservati durante il test</a:t>
+            </a:r>
+          </a:p>
+        </p:txBody>
+      </p:sp>
+      <p:sp>
+        <p:nvSpPr>
+          <p:cNvPr id="12" name="CasellaDiTesto 9"/>
+          <p:cNvSpPr txBox="1"/>
+          <p:nvPr/>
+        </p:nvSpPr>
+        <p:spPr>
+          <a:xfrm>
+            <a:off x="266699" y="3432974"/>
+            <a:ext cx="8731186" cy="461665"/>
+          </a:xfrm>
+          <a:prstGeom prst="rect">
+            <a:avLst/>
+          </a:prstGeom>
+          <a:noFill/>
+        </p:spPr>
+        <p:txBody>
+          <a:bodyPr wrap="square" rtlCol="0">
+            <a:spAutoFit/>
+          </a:bodyPr>
+          <a:lstStyle/>
+          <a:p>
+            <a:pPr marL="285750" indent="-285750">
+              <a:buFont typeface="Arial"/>
+              <a:buChar char="•"/>
+            </a:pPr>
+            <a:r>
+              <a:rPr lang="it-IT" sz="2400" dirty="0"/>
+              <a:t>Esempio di asserzione temporale</a:t>
+            </a:r>
+          </a:p>
+        </p:txBody>
+      </p:sp>
+    </p:spTree>
+    <p:custDataLst>
+      <p:tags r:id="rId1"/>
+    </p:custDataLst>
+    <p:extLst>
+      <p:ext uri="{BB962C8B-B14F-4D97-AF65-F5344CB8AC3E}">
+        <p14:creationId xmlns:p14="http://schemas.microsoft.com/office/powerpoint/2010/main" val="235210943"/>
+      </p:ext>
+    </p:extLst>
+  </p:cSld>
+  <p:clrMapOvr>
+    <a:masterClrMapping/>
+  </p:clrMapOvr>
+  <mc:AlternateContent xmlns:mc="http://schemas.openxmlformats.org/markup-compatibility/2006" xmlns:p14="http://schemas.microsoft.com/office/powerpoint/2010/main">
+    <mc:Choice Requires="p14">
+      <p:transition spd="slow" p14:dur="2000" advTm="51149"/>
+    </mc:Choice>
+    <mc:Fallback xmlns="">
+      <p:transition xmlns:p14="http://schemas.microsoft.com/office/powerpoint/2010/main" spd="slow" advTm="51149"/>
+    </mc:Fallback>
+  </mc:AlternateContent>
+</p:sld>
+</file>
+
+<file path=ppt/slides/slide18.xml><?xml version="1.0" encoding="utf-8"?>
+<p:sld xmlns:a="http://schemas.openxmlformats.org/drawingml/2006/main" xmlns:r="http://schemas.openxmlformats.org/officeDocument/2006/relationships" xmlns:p="http://schemas.openxmlformats.org/presentationml/2006/main">
+  <p:cSld>
+    <p:spTree>
+      <p:nvGrpSpPr>
+        <p:cNvPr id="1" name=""/>
+        <p:cNvGrpSpPr/>
+        <p:nvPr/>
+      </p:nvGrpSpPr>
+      <p:grpSpPr>
+        <a:xfrm>
+          <a:off x="0" y="0"/>
+          <a:ext cx="0" cy="0"/>
+          <a:chOff x="0" y="0"/>
+          <a:chExt cx="0" cy="0"/>
+        </a:xfrm>
+      </p:grpSpPr>
+      <p:sp>
+        <p:nvSpPr>
+          <p:cNvPr id="2" name="Segnaposto testo 1"/>
+          <p:cNvSpPr>
+            <a:spLocks noGrp="1"/>
+          </p:cNvSpPr>
+          <p:nvPr>
+            <p:ph type="body" sz="quarter" idx="10"/>
+          </p:nvPr>
+        </p:nvSpPr>
+        <p:spPr/>
+        <p:txBody>
+          <a:bodyPr/>
+          <a:lstStyle/>
+          <a:p>
+            <a:r>
+              <a:rPr lang="it-IT" dirty="0"/>
+              <a:t>Valutazione</a:t>
+            </a:r>
+          </a:p>
+        </p:txBody>
+      </p:sp>
+      <p:sp>
+        <p:nvSpPr>
+          <p:cNvPr id="9" name="Rectangle 5"/>
+          <p:cNvSpPr>
+            <a:spLocks noChangeArrowheads="1"/>
+          </p:cNvSpPr>
+          <p:nvPr/>
+        </p:nvSpPr>
+        <p:spPr bwMode="auto">
+          <a:xfrm>
+            <a:off x="698499" y="2040043"/>
+            <a:ext cx="8001855" cy="1477328"/>
+          </a:xfrm>
+          <a:prstGeom prst="rect">
+            <a:avLst/>
+          </a:prstGeom>
+          <a:noFill/>
+          <a:ln>
+            <a:noFill/>
+          </a:ln>
+          <a:effectLst/>
+        </p:spPr>
+        <p:txBody>
+          <a:bodyPr vert="horz" wrap="square" lIns="91440" tIns="45720" rIns="91440" bIns="45720" numCol="1" anchor="ctr" anchorCtr="0" compatLnSpc="1">
+            <a:prstTxWarp prst="textNoShape">
+              <a:avLst/>
+            </a:prstTxWarp>
+            <a:spAutoFit/>
+          </a:bodyPr>
+          <a:lstStyle/>
+          <a:p>
+            <a:pPr lvl="0" eaLnBrk="0" hangingPunct="0"/>
+            <a:r>
+              <a:rPr lang="en-US" b="1" dirty="0">
+                <a:latin typeface="Courier New" panose="02070309020205020404" pitchFamily="49" charset="0"/>
+                <a:cs typeface="Courier New" panose="02070309020205020404" pitchFamily="49" charset="0"/>
+              </a:rPr>
+              <a:t>[SUCCESS] </a:t>
+            </a:r>
+            <a:r>
+              <a:rPr lang="en-US" dirty="0">
+                <a:latin typeface="Courier New" panose="02070309020205020404" pitchFamily="49" charset="0"/>
+                <a:cs typeface="Courier New" panose="02070309020205020404" pitchFamily="49" charset="0"/>
+              </a:rPr>
+              <a:t>IF (Exists an event that is post upload start) THEN (Every event that is post change happens before an event that is post upload start)</a:t>
+            </a:r>
+            <a:br>
+              <a:rPr lang="en-US" dirty="0">
+                <a:latin typeface="Courier New" panose="02070309020205020404" pitchFamily="49" charset="0"/>
+                <a:cs typeface="Courier New" panose="02070309020205020404" pitchFamily="49" charset="0"/>
+              </a:rPr>
+            </a:br>
+            <a:r>
+              <a:rPr lang="en-US" b="1" dirty="0">
+                <a:latin typeface="Courier New" panose="02070309020205020404" pitchFamily="49" charset="0"/>
+                <a:cs typeface="Courier New" panose="02070309020205020404" pitchFamily="49" charset="0"/>
+              </a:rPr>
+              <a:t>REPORT</a:t>
+            </a:r>
+            <a:r>
+              <a:rPr lang="en-US" dirty="0">
+                <a:latin typeface="Courier New" panose="02070309020205020404" pitchFamily="49" charset="0"/>
+                <a:cs typeface="Courier New" panose="02070309020205020404" pitchFamily="49" charset="0"/>
+              </a:rPr>
+              <a:t>: Every event that is post change was found before {Post upload start} </a:t>
+            </a:r>
+            <a:endParaRPr kumimoji="0" lang="en-US" altLang="en-US" b="0" u="none" strike="noStrike" cap="none" normalizeH="0" baseline="0" dirty="0">
+              <a:ln>
+                <a:noFill/>
+              </a:ln>
+              <a:solidFill>
+                <a:schemeClr val="tx1"/>
+              </a:solidFill>
+              <a:effectLst/>
+              <a:latin typeface="Courier New" panose="02070309020205020404" pitchFamily="49" charset="0"/>
+              <a:cs typeface="Courier New" panose="02070309020205020404" pitchFamily="49" charset="0"/>
+            </a:endParaRPr>
+          </a:p>
+        </p:txBody>
+      </p:sp>
+      <p:sp>
+        <p:nvSpPr>
+          <p:cNvPr id="3" name="Rectangle 2"/>
+          <p:cNvSpPr/>
+          <p:nvPr/>
+        </p:nvSpPr>
+        <p:spPr>
+          <a:xfrm>
+            <a:off x="698499" y="4373355"/>
+            <a:ext cx="8001855" cy="1754326"/>
+          </a:xfrm>
+          <a:prstGeom prst="rect">
+            <a:avLst/>
+          </a:prstGeom>
+          <a:noFill/>
+          <a:ln>
+            <a:noFill/>
+          </a:ln>
+          <a:effectLst/>
+        </p:spPr>
+        <p:txBody>
+          <a:bodyPr vert="horz" wrap="square" lIns="91440" tIns="45720" rIns="91440" bIns="45720" numCol="1" anchor="ctr" anchorCtr="0" compatLnSpc="1">
+            <a:prstTxWarp prst="textNoShape">
+              <a:avLst/>
+            </a:prstTxWarp>
+            <a:spAutoFit/>
+          </a:bodyPr>
+          <a:lstStyle/>
+          <a:p>
+            <a:pPr eaLnBrk="0" hangingPunct="0"/>
+            <a:r>
+              <a:rPr lang="en-US" b="1" dirty="0">
+                <a:latin typeface="Courier New" panose="02070309020205020404" pitchFamily="49" charset="0"/>
+                <a:cs typeface="Courier New" panose="02070309020205020404" pitchFamily="49" charset="0"/>
+              </a:rPr>
+              <a:t>[FAILURE] </a:t>
+            </a:r>
+            <a:r>
+              <a:rPr lang="en-US" dirty="0">
+                <a:latin typeface="Courier New" panose="02070309020205020404" pitchFamily="49" charset="0"/>
+                <a:cs typeface="Courier New" panose="02070309020205020404" pitchFamily="49" charset="0"/>
+              </a:rPr>
+              <a:t>IF (Exists an event that is post upload start) THEN(Every event that is post change happens before an event that is post upload start)</a:t>
+            </a:r>
+            <a:br>
+              <a:rPr lang="en-US" dirty="0">
+                <a:latin typeface="Courier New" panose="02070309020205020404" pitchFamily="49" charset="0"/>
+                <a:cs typeface="Courier New" panose="02070309020205020404" pitchFamily="49" charset="0"/>
+              </a:rPr>
+            </a:br>
+            <a:r>
+              <a:rPr lang="en-US" b="1" dirty="0">
+                <a:latin typeface="Courier New" panose="02070309020205020404" pitchFamily="49" charset="0"/>
+                <a:cs typeface="Courier New" panose="02070309020205020404" pitchFamily="49" charset="0"/>
+              </a:rPr>
+              <a:t>ERROR</a:t>
+            </a:r>
+            <a:r>
+              <a:rPr lang="en-US" dirty="0">
+                <a:latin typeface="Courier New" panose="02070309020205020404" pitchFamily="49" charset="0"/>
+                <a:cs typeface="Courier New" panose="02070309020205020404" pitchFamily="49" charset="0"/>
+              </a:rPr>
+              <a:t>: Post content changed after the upload started!</a:t>
+            </a:r>
+            <a:br>
+              <a:rPr lang="en-US" dirty="0">
+                <a:latin typeface="Courier New" panose="02070309020205020404" pitchFamily="49" charset="0"/>
+                <a:cs typeface="Courier New" panose="02070309020205020404" pitchFamily="49" charset="0"/>
+              </a:rPr>
+            </a:br>
+            <a:r>
+              <a:rPr lang="en-US" b="1" dirty="0">
+                <a:latin typeface="Courier New" panose="02070309020205020404" pitchFamily="49" charset="0"/>
+                <a:cs typeface="Courier New" panose="02070309020205020404" pitchFamily="49" charset="0"/>
+              </a:rPr>
+              <a:t>REPORT</a:t>
+            </a:r>
+            <a:r>
+              <a:rPr lang="en-US" dirty="0">
+                <a:latin typeface="Courier New" panose="02070309020205020404" pitchFamily="49" charset="0"/>
+                <a:cs typeface="Courier New" panose="02070309020205020404" pitchFamily="49" charset="0"/>
+              </a:rPr>
+              <a:t>: Event {Post change on view 2131820907} was found after every event that is post upload start</a:t>
+            </a:r>
+          </a:p>
+        </p:txBody>
+      </p:sp>
+      <p:sp>
+        <p:nvSpPr>
+          <p:cNvPr id="6" name="CasellaDiTesto 9"/>
+          <p:cNvSpPr txBox="1"/>
+          <p:nvPr/>
+        </p:nvSpPr>
+        <p:spPr>
+          <a:xfrm>
+            <a:off x="237921" y="1485123"/>
+            <a:ext cx="8731186" cy="461665"/>
+          </a:xfrm>
+          <a:prstGeom prst="rect">
+            <a:avLst/>
+          </a:prstGeom>
+          <a:noFill/>
+        </p:spPr>
+        <p:txBody>
+          <a:bodyPr wrap="square" rtlCol="0">
+            <a:spAutoFit/>
+          </a:bodyPr>
+          <a:lstStyle/>
+          <a:p>
+            <a:pPr marL="285750" indent="-285750">
+              <a:buFont typeface="Arial"/>
+              <a:buChar char="•"/>
+            </a:pPr>
+            <a:r>
+              <a:rPr lang="it-IT" sz="2400" dirty="0"/>
+              <a:t>Risultato asserzione temporale</a:t>
+            </a:r>
+          </a:p>
+        </p:txBody>
+      </p:sp>
+      <p:sp>
+        <p:nvSpPr>
+          <p:cNvPr id="7" name="CasellaDiTesto 9"/>
+          <p:cNvSpPr txBox="1"/>
+          <p:nvPr/>
+        </p:nvSpPr>
+        <p:spPr>
+          <a:xfrm>
+            <a:off x="237921" y="3793371"/>
+            <a:ext cx="8731186" cy="461665"/>
+          </a:xfrm>
+          <a:prstGeom prst="rect">
+            <a:avLst/>
+          </a:prstGeom>
+          <a:noFill/>
+        </p:spPr>
+        <p:txBody>
+          <a:bodyPr wrap="square" rtlCol="0">
+            <a:spAutoFit/>
+          </a:bodyPr>
+          <a:lstStyle/>
+          <a:p>
+            <a:pPr marL="285750" indent="-285750">
+              <a:buFont typeface="Arial"/>
+              <a:buChar char="•"/>
+            </a:pPr>
+            <a:r>
+              <a:rPr lang="it-IT" sz="2400" dirty="0"/>
+              <a:t>Risultato della stessa asserzione con fault </a:t>
+            </a:r>
+            <a:r>
+              <a:rPr lang="it-IT" sz="2400" dirty="0" err="1"/>
+              <a:t>seeding</a:t>
+            </a:r>
+            <a:endParaRPr lang="it-IT" sz="2400" dirty="0"/>
+          </a:p>
+        </p:txBody>
+      </p:sp>
+    </p:spTree>
+    <p:custDataLst>
+      <p:tags r:id="rId1"/>
+    </p:custDataLst>
+    <p:extLst>
+      <p:ext uri="{BB962C8B-B14F-4D97-AF65-F5344CB8AC3E}">
+        <p14:creationId xmlns:p14="http://schemas.microsoft.com/office/powerpoint/2010/main" val="572735830"/>
+      </p:ext>
+    </p:extLst>
+  </p:cSld>
+  <p:clrMapOvr>
+    <a:masterClrMapping/>
+  </p:clrMapOvr>
+  <mc:AlternateContent xmlns:mc="http://schemas.openxmlformats.org/markup-compatibility/2006" xmlns:p14="http://schemas.microsoft.com/office/powerpoint/2010/main">
+    <mc:Choice Requires="p14">
+      <p:transition spd="slow" p14:dur="2000" advTm="51149"/>
+    </mc:Choice>
+    <mc:Fallback xmlns="">
+      <p:transition xmlns:p14="http://schemas.microsoft.com/office/powerpoint/2010/main" spd="slow" advTm="51149"/>
+    </mc:Fallback>
+  </mc:AlternateContent>
+</p:sld>
+</file>
+
+<file path=ppt/slides/slide19.xml><?xml version="1.0" encoding="utf-8"?>
+<p:sld xmlns:a="http://schemas.openxmlformats.org/drawingml/2006/main" xmlns:r="http://schemas.openxmlformats.org/officeDocument/2006/relationships" xmlns:p="http://schemas.openxmlformats.org/presentationml/2006/main">
+  <p:cSld>
+    <p:spTree>
+      <p:nvGrpSpPr>
+        <p:cNvPr id="1" name=""/>
+        <p:cNvGrpSpPr/>
+        <p:nvPr/>
+      </p:nvGrpSpPr>
+      <p:grpSpPr>
+        <a:xfrm>
+          <a:off x="0" y="0"/>
+          <a:ext cx="0" cy="0"/>
+          <a:chOff x="0" y="0"/>
+          <a:chExt cx="0" cy="0"/>
+        </a:xfrm>
+      </p:grpSpPr>
+      <p:sp>
+        <p:nvSpPr>
+          <p:cNvPr id="2" name="Segnaposto testo 1"/>
+          <p:cNvSpPr>
+            <a:spLocks noGrp="1"/>
+          </p:cNvSpPr>
+          <p:nvPr>
+            <p:ph type="body" sz="quarter" idx="10"/>
+          </p:nvPr>
+        </p:nvSpPr>
+        <p:spPr/>
+        <p:txBody>
+          <a:bodyPr/>
+          <a:lstStyle/>
+          <a:p>
+            <a:r>
+              <a:rPr lang="it-IT" dirty="0"/>
+              <a:t>Sommario</a:t>
+            </a:r>
+          </a:p>
+        </p:txBody>
+      </p:sp>
+      <p:sp>
+        <p:nvSpPr>
+          <p:cNvPr id="3" name="Segnaposto testo 2"/>
+          <p:cNvSpPr>
+            <a:spLocks noGrp="1"/>
+          </p:cNvSpPr>
+          <p:nvPr>
+            <p:ph type="body" sz="quarter" idx="11"/>
+          </p:nvPr>
+        </p:nvSpPr>
+        <p:spPr>
+          <a:xfrm>
+            <a:off x="603250" y="1671651"/>
+            <a:ext cx="7937501" cy="3514698"/>
+          </a:xfrm>
+        </p:spPr>
+        <p:txBody>
+          <a:bodyPr/>
+          <a:lstStyle/>
+          <a:p>
+            <a:pPr marL="457200" indent="-457200">
+              <a:lnSpc>
+                <a:spcPct val="140000"/>
+              </a:lnSpc>
+              <a:buFont typeface="Arial"/>
+              <a:buChar char="•"/>
+            </a:pPr>
+            <a:r>
+              <a:rPr lang="it-IT" sz="2800" dirty="0">
+                <a:solidFill>
+                  <a:schemeClr val="tx1"/>
+                </a:solidFill>
+              </a:rPr>
+              <a:t>Introduzione e Obiettivi del Lavoro</a:t>
+            </a:r>
+          </a:p>
+          <a:p>
+            <a:pPr marL="457200" indent="-457200">
+              <a:lnSpc>
+                <a:spcPct val="140000"/>
+              </a:lnSpc>
+              <a:buFont typeface="Arial"/>
+              <a:buChar char="•"/>
+            </a:pPr>
+            <a:r>
+              <a:rPr lang="it-IT" sz="2800" dirty="0">
+                <a:solidFill>
+                  <a:schemeClr val="tx1"/>
+                </a:solidFill>
+              </a:rPr>
+              <a:t>Testing per Lifecycle</a:t>
+            </a:r>
+          </a:p>
+          <a:p>
+            <a:pPr marL="457200" indent="-457200">
+              <a:lnSpc>
+                <a:spcPct val="140000"/>
+              </a:lnSpc>
+              <a:buFont typeface="Arial"/>
+              <a:buChar char="•"/>
+            </a:pPr>
+            <a:r>
+              <a:rPr lang="it-IT" sz="2800" dirty="0">
+                <a:solidFill>
+                  <a:schemeClr val="tx1"/>
+                </a:solidFill>
+              </a:rPr>
+              <a:t>Testing basato sugli Eventi</a:t>
+            </a:r>
+          </a:p>
+          <a:p>
+            <a:pPr marL="457200" indent="-457200">
+              <a:lnSpc>
+                <a:spcPct val="140000"/>
+              </a:lnSpc>
+              <a:buFont typeface="Arial"/>
+              <a:buChar char="•"/>
+            </a:pPr>
+            <a:r>
+              <a:rPr lang="it-IT" sz="2800" b="1" dirty="0">
+                <a:solidFill>
+                  <a:srgbClr val="1F497D"/>
+                </a:solidFill>
+              </a:rPr>
+              <a:t>Conclusioni</a:t>
+            </a:r>
+          </a:p>
+        </p:txBody>
+      </p:sp>
+    </p:spTree>
+    <p:extLst>
+      <p:ext uri="{BB962C8B-B14F-4D97-AF65-F5344CB8AC3E}">
+        <p14:creationId xmlns:p14="http://schemas.microsoft.com/office/powerpoint/2010/main" val="1590214199"/>
+      </p:ext>
+    </p:extLst>
+  </p:cSld>
+  <p:clrMapOvr>
+    <a:masterClrMapping/>
+  </p:clrMapOvr>
+  <mc:AlternateContent xmlns:mc="http://schemas.openxmlformats.org/markup-compatibility/2006" xmlns:p14="http://schemas.microsoft.com/office/powerpoint/2010/main">
+    <mc:Choice Requires="p14">
+      <p:transition spd="slow" p14:dur="2000" advTm="25932"/>
+    </mc:Choice>
+    <mc:Fallback xmlns="">
+      <p:transition xmlns:p14="http://schemas.microsoft.com/office/powerpoint/2010/main" spd="slow" advTm="25932"/>
     </mc:Fallback>
   </mc:AlternateContent>
 </p:sld>
@@ -6620,6 +9582,630 @@
 </p:sld>
 </file>
 
+<file path=ppt/slides/slide20.xml><?xml version="1.0" encoding="utf-8"?>
+<p:sld xmlns:a="http://schemas.openxmlformats.org/drawingml/2006/main" xmlns:r="http://schemas.openxmlformats.org/officeDocument/2006/relationships" xmlns:p="http://schemas.openxmlformats.org/presentationml/2006/main">
+  <p:cSld>
+    <p:spTree>
+      <p:nvGrpSpPr>
+        <p:cNvPr id="1" name=""/>
+        <p:cNvGrpSpPr/>
+        <p:nvPr/>
+      </p:nvGrpSpPr>
+      <p:grpSpPr>
+        <a:xfrm>
+          <a:off x="0" y="0"/>
+          <a:ext cx="0" cy="0"/>
+          <a:chOff x="0" y="0"/>
+          <a:chExt cx="0" cy="0"/>
+        </a:xfrm>
+      </p:grpSpPr>
+      <p:sp>
+        <p:nvSpPr>
+          <p:cNvPr id="2" name="Segnaposto testo 1"/>
+          <p:cNvSpPr>
+            <a:spLocks noGrp="1"/>
+          </p:cNvSpPr>
+          <p:nvPr>
+            <p:ph type="body" sz="quarter" idx="10"/>
+          </p:nvPr>
+        </p:nvSpPr>
+        <p:spPr/>
+        <p:txBody>
+          <a:bodyPr/>
+          <a:lstStyle/>
+          <a:p>
+            <a:r>
+              <a:rPr lang="it-IT" dirty="0"/>
+              <a:t>Conclusioni</a:t>
+            </a:r>
+          </a:p>
+        </p:txBody>
+      </p:sp>
+      <p:pic>
+        <p:nvPicPr>
+          <p:cNvPr id="4" name="Picture 3"/>
+          <p:cNvPicPr>
+            <a:picLocks noChangeAspect="1" noChangeArrowheads="1"/>
+          </p:cNvPicPr>
+          <p:nvPr/>
+        </p:nvPicPr>
+        <p:blipFill>
+          <a:blip r:embed="rId4" cstate="print">
+            <a:extLst>
+              <a:ext uri="{28A0092B-C50C-407E-A947-70E740481C1C}">
+                <a14:useLocalDpi xmlns:a14="http://schemas.microsoft.com/office/drawing/2010/main" val="0"/>
+              </a:ext>
+            </a:extLst>
+          </a:blip>
+          <a:srcRect/>
+          <a:stretch>
+            <a:fillRect/>
+          </a:stretch>
+        </p:blipFill>
+        <p:spPr bwMode="auto">
+          <a:xfrm>
+            <a:off x="4139933" y="3422267"/>
+            <a:ext cx="3178592" cy="3059371"/>
+          </a:xfrm>
+          <a:prstGeom prst="rect">
+            <a:avLst/>
+          </a:prstGeom>
+          <a:noFill/>
+          <a:ln>
+            <a:noFill/>
+          </a:ln>
+          <a:extLst>
+            <a:ext uri="{909E8E84-426E-40dd-AFC4-6F175D3DCCD1}">
+              <a14:hiddenFill xmlns:a14="http://schemas.microsoft.com/office/drawing/2010/main" xmlns="">
+                <a:solidFill>
+                  <a:schemeClr val="accent1"/>
+                </a:solidFill>
+              </a14:hiddenFill>
+            </a:ext>
+            <a:ext uri="{91240B29-F687-4f45-9708-019B960494DF}">
+              <a14:hiddenLine xmlns:a14="http://schemas.microsoft.com/office/drawing/2010/main" xmlns="" w="9525">
+                <a:solidFill>
+                  <a:schemeClr val="tx1"/>
+                </a:solidFill>
+                <a:miter lim="800000"/>
+                <a:headEnd/>
+                <a:tailEnd/>
+              </a14:hiddenLine>
+            </a:ext>
+          </a:extLst>
+        </p:spPr>
+      </p:pic>
+      <p:sp>
+        <p:nvSpPr>
+          <p:cNvPr id="6" name="CasellaDiTesto 5"/>
+          <p:cNvSpPr txBox="1"/>
+          <p:nvPr/>
+        </p:nvSpPr>
+        <p:spPr>
+          <a:xfrm>
+            <a:off x="1791468" y="1646095"/>
+            <a:ext cx="5561065" cy="1269578"/>
+          </a:xfrm>
+          <a:prstGeom prst="rect">
+            <a:avLst/>
+          </a:prstGeom>
+          <a:noFill/>
+        </p:spPr>
+        <p:txBody>
+          <a:bodyPr wrap="square" rtlCol="0">
+            <a:spAutoFit/>
+          </a:bodyPr>
+          <a:lstStyle/>
+          <a:p>
+            <a:pPr marL="285750" indent="-285750">
+              <a:spcBef>
+                <a:spcPts val="0"/>
+              </a:spcBef>
+              <a:spcAft>
+                <a:spcPts val="500"/>
+              </a:spcAft>
+              <a:buFont typeface="Arial" panose="020B0604020202020204" pitchFamily="34" charset="0"/>
+              <a:buChar char="•"/>
+            </a:pPr>
+            <a:r>
+              <a:rPr lang="it-IT" sz="1600" dirty="0"/>
+              <a:t>Risultato1</a:t>
+            </a:r>
+          </a:p>
+          <a:p>
+            <a:pPr marL="285750" indent="-285750">
+              <a:spcBef>
+                <a:spcPts val="0"/>
+              </a:spcBef>
+              <a:spcAft>
+                <a:spcPts val="500"/>
+              </a:spcAft>
+              <a:buFont typeface="Arial" panose="020B0604020202020204" pitchFamily="34" charset="0"/>
+              <a:buChar char="•"/>
+            </a:pPr>
+            <a:r>
+              <a:rPr lang="it-IT" sz="1600" dirty="0"/>
+              <a:t>Risultato2</a:t>
+            </a:r>
+          </a:p>
+          <a:p>
+            <a:pPr marL="285750" indent="-285750">
+              <a:spcBef>
+                <a:spcPts val="0"/>
+              </a:spcBef>
+              <a:spcAft>
+                <a:spcPts val="500"/>
+              </a:spcAft>
+              <a:buFont typeface="Arial" panose="020B0604020202020204" pitchFamily="34" charset="0"/>
+              <a:buChar char="•"/>
+            </a:pPr>
+            <a:r>
+              <a:rPr lang="it-IT" sz="1600" dirty="0"/>
+              <a:t>Risultato3</a:t>
+            </a:r>
+          </a:p>
+          <a:p>
+            <a:pPr marL="285750" indent="-285750">
+              <a:spcBef>
+                <a:spcPts val="0"/>
+              </a:spcBef>
+              <a:spcAft>
+                <a:spcPts val="500"/>
+              </a:spcAft>
+              <a:buFont typeface="Arial" panose="020B0604020202020204" pitchFamily="34" charset="0"/>
+              <a:buChar char="•"/>
+            </a:pPr>
+            <a:r>
+              <a:rPr lang="it-IT" sz="1600" dirty="0"/>
+              <a:t>Risultato4</a:t>
+            </a:r>
+          </a:p>
+        </p:txBody>
+      </p:sp>
+      <p:sp useBgFill="1">
+        <p:nvSpPr>
+          <p:cNvPr id="9" name="CasellaDiTesto 8"/>
+          <p:cNvSpPr txBox="1"/>
+          <p:nvPr/>
+        </p:nvSpPr>
+        <p:spPr>
+          <a:xfrm>
+            <a:off x="3326538" y="1103225"/>
+            <a:ext cx="2490925" cy="400110"/>
+          </a:xfrm>
+          <a:prstGeom prst="rect">
+            <a:avLst/>
+          </a:prstGeom>
+        </p:spPr>
+        <p:style>
+          <a:lnRef idx="2">
+            <a:schemeClr val="accent1"/>
+          </a:lnRef>
+          <a:fillRef idx="1">
+            <a:schemeClr val="lt1"/>
+          </a:fillRef>
+          <a:effectRef idx="0">
+            <a:schemeClr val="accent1"/>
+          </a:effectRef>
+          <a:fontRef idx="minor">
+            <a:schemeClr val="dk1"/>
+          </a:fontRef>
+        </p:style>
+        <p:txBody>
+          <a:bodyPr wrap="square" rtlCol="0">
+            <a:spAutoFit/>
+          </a:bodyPr>
+          <a:lstStyle/>
+          <a:p>
+            <a:pPr algn="ctr"/>
+            <a:r>
+              <a:rPr lang="it-IT" sz="2000" dirty="0"/>
+              <a:t>Risultati Scientifici</a:t>
+            </a:r>
+          </a:p>
+        </p:txBody>
+      </p:sp>
+      <p:sp>
+        <p:nvSpPr>
+          <p:cNvPr id="10" name="CasellaDiTesto 9"/>
+          <p:cNvSpPr txBox="1"/>
+          <p:nvPr/>
+        </p:nvSpPr>
+        <p:spPr>
+          <a:xfrm>
+            <a:off x="1649008" y="4854818"/>
+            <a:ext cx="2490925" cy="707886"/>
+          </a:xfrm>
+          <a:prstGeom prst="rect">
+            <a:avLst/>
+          </a:prstGeom>
+        </p:spPr>
+        <p:style>
+          <a:lnRef idx="2">
+            <a:schemeClr val="accent1"/>
+          </a:lnRef>
+          <a:fillRef idx="1">
+            <a:schemeClr val="lt1"/>
+          </a:fillRef>
+          <a:effectRef idx="0">
+            <a:schemeClr val="accent1"/>
+          </a:effectRef>
+          <a:fontRef idx="minor">
+            <a:schemeClr val="dk1"/>
+          </a:fontRef>
+        </p:style>
+        <p:txBody>
+          <a:bodyPr wrap="square" rtlCol="0">
+            <a:spAutoFit/>
+          </a:bodyPr>
+          <a:lstStyle/>
+          <a:p>
+            <a:pPr algn="ctr"/>
+            <a:r>
+              <a:rPr lang="it-IT" sz="2000" dirty="0"/>
+              <a:t>Risultati Industriali</a:t>
+            </a:r>
+          </a:p>
+          <a:p>
+            <a:pPr algn="ctr"/>
+            <a:r>
+              <a:rPr lang="it-IT" sz="2000" dirty="0"/>
+              <a:t>e/o Sviluppi Futuri</a:t>
+            </a:r>
+          </a:p>
+        </p:txBody>
+      </p:sp>
+      <p:sp>
+        <p:nvSpPr>
+          <p:cNvPr id="16" name="CasellaDiTesto 15"/>
+          <p:cNvSpPr txBox="1"/>
+          <p:nvPr/>
+        </p:nvSpPr>
+        <p:spPr>
+          <a:xfrm rot="21433596">
+            <a:off x="4498471" y="4124244"/>
+            <a:ext cx="2465271" cy="1933863"/>
+          </a:xfrm>
+          <a:prstGeom prst="rect">
+            <a:avLst/>
+          </a:prstGeom>
+          <a:noFill/>
+        </p:spPr>
+        <p:txBody>
+          <a:bodyPr wrap="square" rtlCol="0">
+            <a:spAutoFit/>
+          </a:bodyPr>
+          <a:lstStyle/>
+          <a:p>
+            <a:pPr marL="285750" indent="-285750">
+              <a:spcBef>
+                <a:spcPts val="0"/>
+              </a:spcBef>
+              <a:spcAft>
+                <a:spcPts val="1000"/>
+              </a:spcAft>
+              <a:buFont typeface="Arial" panose="020B0604020202020204" pitchFamily="34" charset="0"/>
+              <a:buChar char="•"/>
+            </a:pPr>
+            <a:r>
+              <a:rPr lang="it-IT" sz="1600" dirty="0"/>
+              <a:t>Risultato1</a:t>
+            </a:r>
+          </a:p>
+          <a:p>
+            <a:pPr>
+              <a:spcBef>
+                <a:spcPts val="0"/>
+              </a:spcBef>
+              <a:spcAft>
+                <a:spcPts val="1000"/>
+              </a:spcAft>
+            </a:pPr>
+            <a:endParaRPr lang="it-IT" sz="1000" dirty="0"/>
+          </a:p>
+          <a:p>
+            <a:pPr marL="285750" indent="-285750">
+              <a:spcBef>
+                <a:spcPts val="0"/>
+              </a:spcBef>
+              <a:spcAft>
+                <a:spcPts val="1000"/>
+              </a:spcAft>
+              <a:buFont typeface="Arial" panose="020B0604020202020204" pitchFamily="34" charset="0"/>
+              <a:buChar char="•"/>
+            </a:pPr>
+            <a:r>
+              <a:rPr lang="it-IT" sz="1600" dirty="0"/>
+              <a:t>Risultato2</a:t>
+            </a:r>
+          </a:p>
+          <a:p>
+            <a:pPr>
+              <a:spcBef>
+                <a:spcPts val="0"/>
+              </a:spcBef>
+              <a:spcAft>
+                <a:spcPts val="1000"/>
+              </a:spcAft>
+            </a:pPr>
+            <a:endParaRPr lang="it-IT" sz="1000" dirty="0"/>
+          </a:p>
+          <a:p>
+            <a:pPr marL="285750" indent="-285750">
+              <a:spcBef>
+                <a:spcPts val="0"/>
+              </a:spcBef>
+              <a:spcAft>
+                <a:spcPts val="1000"/>
+              </a:spcAft>
+              <a:buFont typeface="Arial" panose="020B0604020202020204" pitchFamily="34" charset="0"/>
+              <a:buChar char="•"/>
+            </a:pPr>
+            <a:r>
+              <a:rPr lang="it-IT" sz="1600" dirty="0"/>
+              <a:t>Risultato3</a:t>
+            </a:r>
+          </a:p>
+          <a:p>
+            <a:pPr>
+              <a:spcBef>
+                <a:spcPts val="0"/>
+              </a:spcBef>
+              <a:spcAft>
+                <a:spcPts val="1000"/>
+              </a:spcAft>
+            </a:pPr>
+            <a:endParaRPr lang="it-IT" sz="1000" dirty="0"/>
+          </a:p>
+        </p:txBody>
+      </p:sp>
+    </p:spTree>
+    <p:custDataLst>
+      <p:tags r:id="rId1"/>
+    </p:custDataLst>
+    <p:extLst>
+      <p:ext uri="{BB962C8B-B14F-4D97-AF65-F5344CB8AC3E}">
+        <p14:creationId xmlns:p14="http://schemas.microsoft.com/office/powerpoint/2010/main" val="1562047360"/>
+      </p:ext>
+    </p:extLst>
+  </p:cSld>
+  <p:clrMapOvr>
+    <a:masterClrMapping/>
+  </p:clrMapOvr>
+  <mc:AlternateContent xmlns:mc="http://schemas.openxmlformats.org/markup-compatibility/2006" xmlns:p14="http://schemas.microsoft.com/office/powerpoint/2010/main">
+    <mc:Choice Requires="p14">
+      <p:transition spd="slow" p14:dur="2000" advTm="9545"/>
+    </mc:Choice>
+    <mc:Fallback xmlns="">
+      <p:transition xmlns:p14="http://schemas.microsoft.com/office/powerpoint/2010/main" spd="slow" advTm="9545"/>
+    </mc:Fallback>
+  </mc:AlternateContent>
+  <p:timing>
+    <p:tnLst>
+      <p:par>
+        <p:cTn id="1" dur="indefinite" restart="never" nodeType="tmRoot">
+          <p:childTnLst>
+            <p:seq concurrent="1" nextAc="seek">
+              <p:cTn id="2" dur="indefinite" nodeType="mainSeq">
+                <p:childTnLst>
+                  <p:par>
+                    <p:cTn id="3" fill="hold">
+                      <p:stCondLst>
+                        <p:cond delay="indefinite"/>
+                      </p:stCondLst>
+                      <p:childTnLst>
+                        <p:par>
+                          <p:cTn id="4" fill="hold">
+                            <p:stCondLst>
+                              <p:cond delay="0"/>
+                            </p:stCondLst>
+                            <p:childTnLst>
+                              <p:par>
+                                <p:cTn id="5" presetID="1" presetClass="entr" presetSubtype="0" fill="hold" grpId="0" nodeType="clickEffect">
+                                  <p:stCondLst>
+                                    <p:cond delay="0"/>
+                                  </p:stCondLst>
+                                  <p:childTnLst>
+                                    <p:set>
+                                      <p:cBhvr>
+                                        <p:cTn id="6" dur="1" fill="hold">
+                                          <p:stCondLst>
+                                            <p:cond delay="0"/>
+                                          </p:stCondLst>
+                                        </p:cTn>
+                                        <p:tgtEl>
+                                          <p:spTgt spid="16"/>
+                                        </p:tgtEl>
+                                        <p:attrNameLst>
+                                          <p:attrName>style.visibility</p:attrName>
+                                        </p:attrNameLst>
+                                      </p:cBhvr>
+                                      <p:to>
+                                        <p:strVal val="visible"/>
+                                      </p:to>
+                                    </p:set>
+                                  </p:childTnLst>
+                                </p:cTn>
+                              </p:par>
+                              <p:par>
+                                <p:cTn id="7" presetID="1" presetClass="entr" presetSubtype="0" fill="hold" nodeType="withEffect">
+                                  <p:stCondLst>
+                                    <p:cond delay="0"/>
+                                  </p:stCondLst>
+                                  <p:childTnLst>
+                                    <p:set>
+                                      <p:cBhvr>
+                                        <p:cTn id="8" dur="1" fill="hold">
+                                          <p:stCondLst>
+                                            <p:cond delay="0"/>
+                                          </p:stCondLst>
+                                        </p:cTn>
+                                        <p:tgtEl>
+                                          <p:spTgt spid="4"/>
+                                        </p:tgtEl>
+                                        <p:attrNameLst>
+                                          <p:attrName>style.visibility</p:attrName>
+                                        </p:attrNameLst>
+                                      </p:cBhvr>
+                                      <p:to>
+                                        <p:strVal val="visible"/>
+                                      </p:to>
+                                    </p:set>
+                                  </p:childTnLst>
+                                </p:cTn>
+                              </p:par>
+                              <p:par>
+                                <p:cTn id="9" presetID="1" presetClass="entr" presetSubtype="0" fill="hold" grpId="0" nodeType="withEffect">
+                                  <p:stCondLst>
+                                    <p:cond delay="0"/>
+                                  </p:stCondLst>
+                                  <p:childTnLst>
+                                    <p:set>
+                                      <p:cBhvr>
+                                        <p:cTn id="10" dur="1" fill="hold">
+                                          <p:stCondLst>
+                                            <p:cond delay="0"/>
+                                          </p:stCondLst>
+                                        </p:cTn>
+                                        <p:tgtEl>
+                                          <p:spTgt spid="10"/>
+                                        </p:tgtEl>
+                                        <p:attrNameLst>
+                                          <p:attrName>style.visibility</p:attrName>
+                                        </p:attrNameLst>
+                                      </p:cBhvr>
+                                      <p:to>
+                                        <p:strVal val="visible"/>
+                                      </p:to>
+                                    </p:set>
+                                  </p:childTnLst>
+                                </p:cTn>
+                              </p:par>
+                            </p:childTnLst>
+                          </p:cTn>
+                        </p:par>
+                      </p:childTnLst>
+                    </p:cTn>
+                  </p:par>
+                </p:childTnLst>
+              </p:cTn>
+              <p:prevCondLst>
+                <p:cond evt="onPrev" delay="0">
+                  <p:tgtEl>
+                    <p:sldTgt/>
+                  </p:tgtEl>
+                </p:cond>
+              </p:prevCondLst>
+              <p:nextCondLst>
+                <p:cond evt="onNext" delay="0">
+                  <p:tgtEl>
+                    <p:sldTgt/>
+                  </p:tgtEl>
+                </p:cond>
+              </p:nextCondLst>
+            </p:seq>
+          </p:childTnLst>
+        </p:cTn>
+      </p:par>
+    </p:tnLst>
+    <p:bldLst>
+      <p:bldP spid="10" grpId="0" animBg="1"/>
+      <p:bldP spid="16" grpId="0"/>
+    </p:bldLst>
+  </p:timing>
+</p:sld>
+</file>
+
+<file path=ppt/slides/slide21.xml><?xml version="1.0" encoding="utf-8"?>
+<p:sld xmlns:a="http://schemas.openxmlformats.org/drawingml/2006/main" xmlns:r="http://schemas.openxmlformats.org/officeDocument/2006/relationships" xmlns:p="http://schemas.openxmlformats.org/presentationml/2006/main">
+  <p:cSld>
+    <p:spTree>
+      <p:nvGrpSpPr>
+        <p:cNvPr id="1" name=""/>
+        <p:cNvGrpSpPr/>
+        <p:nvPr/>
+      </p:nvGrpSpPr>
+      <p:grpSpPr>
+        <a:xfrm>
+          <a:off x="0" y="0"/>
+          <a:ext cx="0" cy="0"/>
+          <a:chOff x="0" y="0"/>
+          <a:chExt cx="0" cy="0"/>
+        </a:xfrm>
+      </p:grpSpPr>
+      <p:pic>
+        <p:nvPicPr>
+          <p:cNvPr id="5" name="Immagine 4" descr="logoPoliMi.png"/>
+          <p:cNvPicPr>
+            <a:picLocks noChangeAspect="1"/>
+          </p:cNvPicPr>
+          <p:nvPr/>
+        </p:nvPicPr>
+        <p:blipFill>
+          <a:blip r:embed="rId2" cstate="email">
+            <a:extLst>
+              <a:ext uri="{28A0092B-C50C-407E-A947-70E740481C1C}">
+                <a14:useLocalDpi xmlns:a14="http://schemas.microsoft.com/office/drawing/2010/main" val="0"/>
+              </a:ext>
+            </a:extLst>
+          </a:blip>
+          <a:stretch>
+            <a:fillRect/>
+          </a:stretch>
+        </p:blipFill>
+        <p:spPr>
+          <a:xfrm>
+            <a:off x="3534078" y="2499218"/>
+            <a:ext cx="2075845" cy="2075845"/>
+          </a:xfrm>
+          <a:prstGeom prst="rect">
+            <a:avLst/>
+          </a:prstGeom>
+        </p:spPr>
+      </p:pic>
+      <p:sp>
+        <p:nvSpPr>
+          <p:cNvPr id="7" name="Segnaposto testo 6"/>
+          <p:cNvSpPr>
+            <a:spLocks noGrp="1"/>
+          </p:cNvSpPr>
+          <p:nvPr>
+            <p:ph type="body" sz="quarter" idx="10"/>
+          </p:nvPr>
+        </p:nvSpPr>
+        <p:spPr/>
+        <p:txBody>
+          <a:bodyPr/>
+          <a:lstStyle/>
+          <a:p>
+            <a:r>
+              <a:rPr lang="it-IT" dirty="0"/>
+              <a:t>FINE</a:t>
+            </a:r>
+          </a:p>
+        </p:txBody>
+      </p:sp>
+    </p:spTree>
+    <p:extLst>
+      <p:ext uri="{BB962C8B-B14F-4D97-AF65-F5344CB8AC3E}">
+        <p14:creationId xmlns:p14="http://schemas.microsoft.com/office/powerpoint/2010/main" val="1982816369"/>
+      </p:ext>
+    </p:extLst>
+  </p:cSld>
+  <p:clrMapOvr>
+    <a:masterClrMapping/>
+  </p:clrMapOvr>
+  <mc:AlternateContent xmlns:mc="http://schemas.openxmlformats.org/markup-compatibility/2006" xmlns:p14="http://schemas.microsoft.com/office/powerpoint/2010/main">
+    <mc:Choice Requires="p14">
+      <p:transition spd="slow" p14:dur="2000" advTm="5275"/>
+    </mc:Choice>
+    <mc:Fallback xmlns="">
+      <p:transition xmlns:p14="http://schemas.microsoft.com/office/powerpoint/2010/main" spd="slow" advTm="5275"/>
+    </mc:Fallback>
+  </mc:AlternateContent>
+</p:sld>
+</file>
+
 <file path=ppt/slides/slide3.xml><?xml version="1.0" encoding="utf-8"?>
 <p:sld xmlns:a="http://schemas.openxmlformats.org/drawingml/2006/main" xmlns:r="http://schemas.openxmlformats.org/officeDocument/2006/relationships" xmlns:p="http://schemas.openxmlformats.org/presentationml/2006/main">
   <p:cSld>
@@ -7994,6 +11580,48 @@
 </p:tagLst>
 </file>
 
+<file path=ppt/tags/tag10.xml><?xml version="1.0" encoding="utf-8"?>
+<p:tagLst xmlns:a="http://schemas.openxmlformats.org/drawingml/2006/main" xmlns:r="http://schemas.openxmlformats.org/officeDocument/2006/relationships" xmlns:p="http://schemas.openxmlformats.org/presentationml/2006/main">
+  <p:tag name="TIMING" val="|27.6"/>
+</p:tagLst>
+</file>
+
+<file path=ppt/tags/tag11.xml><?xml version="1.0" encoding="utf-8"?>
+<p:tagLst xmlns:a="http://schemas.openxmlformats.org/drawingml/2006/main" xmlns:r="http://schemas.openxmlformats.org/officeDocument/2006/relationships" xmlns:p="http://schemas.openxmlformats.org/presentationml/2006/main">
+  <p:tag name="TIMING" val="|27.6"/>
+</p:tagLst>
+</file>
+
+<file path=ppt/tags/tag12.xml><?xml version="1.0" encoding="utf-8"?>
+<p:tagLst xmlns:a="http://schemas.openxmlformats.org/drawingml/2006/main" xmlns:r="http://schemas.openxmlformats.org/officeDocument/2006/relationships" xmlns:p="http://schemas.openxmlformats.org/presentationml/2006/main">
+  <p:tag name="TIMING" val="|27.6"/>
+</p:tagLst>
+</file>
+
+<file path=ppt/tags/tag13.xml><?xml version="1.0" encoding="utf-8"?>
+<p:tagLst xmlns:a="http://schemas.openxmlformats.org/drawingml/2006/main" xmlns:r="http://schemas.openxmlformats.org/officeDocument/2006/relationships" xmlns:p="http://schemas.openxmlformats.org/presentationml/2006/main">
+  <p:tag name="TIMING" val="|27.6"/>
+</p:tagLst>
+</file>
+
+<file path=ppt/tags/tag14.xml><?xml version="1.0" encoding="utf-8"?>
+<p:tagLst xmlns:a="http://schemas.openxmlformats.org/drawingml/2006/main" xmlns:r="http://schemas.openxmlformats.org/officeDocument/2006/relationships" xmlns:p="http://schemas.openxmlformats.org/presentationml/2006/main">
+  <p:tag name="TIMING" val="|27.6"/>
+</p:tagLst>
+</file>
+
+<file path=ppt/tags/tag15.xml><?xml version="1.0" encoding="utf-8"?>
+<p:tagLst xmlns:a="http://schemas.openxmlformats.org/drawingml/2006/main" xmlns:r="http://schemas.openxmlformats.org/officeDocument/2006/relationships" xmlns:p="http://schemas.openxmlformats.org/presentationml/2006/main">
+  <p:tag name="TIMING" val="|27.6"/>
+</p:tagLst>
+</file>
+
+<file path=ppt/tags/tag16.xml><?xml version="1.0" encoding="utf-8"?>
+<p:tagLst xmlns:a="http://schemas.openxmlformats.org/drawingml/2006/main" xmlns:r="http://schemas.openxmlformats.org/officeDocument/2006/relationships" xmlns:p="http://schemas.openxmlformats.org/presentationml/2006/main">
+  <p:tag name="TIMING" val="|36.5"/>
+</p:tagLst>
+</file>
+
 <file path=ppt/tags/tag2.xml><?xml version="1.0" encoding="utf-8"?>
 <p:tagLst xmlns:a="http://schemas.openxmlformats.org/drawingml/2006/main" xmlns:r="http://schemas.openxmlformats.org/officeDocument/2006/relationships" xmlns:p="http://schemas.openxmlformats.org/presentationml/2006/main">
   <p:tag name="TIMING" val="|27.6"/>
@@ -8032,7 +11660,13 @@
 
 <file path=ppt/tags/tag8.xml><?xml version="1.0" encoding="utf-8"?>
 <p:tagLst xmlns:a="http://schemas.openxmlformats.org/drawingml/2006/main" xmlns:r="http://schemas.openxmlformats.org/officeDocument/2006/relationships" xmlns:p="http://schemas.openxmlformats.org/presentationml/2006/main">
-  <p:tag name="TIMING" val="|36.5"/>
+  <p:tag name="TIMING" val="|27.6"/>
+</p:tagLst>
+</file>
+
+<file path=ppt/tags/tag9.xml><?xml version="1.0" encoding="utf-8"?>
+<p:tagLst xmlns:a="http://schemas.openxmlformats.org/drawingml/2006/main" xmlns:r="http://schemas.openxmlformats.org/officeDocument/2006/relationships" xmlns:p="http://schemas.openxmlformats.org/presentationml/2006/main">
+  <p:tag name="TIMING" val="|27.6"/>
 </p:tagLst>
 </file>
 

</xml_diff>

<commit_message>
Presentation: preliminary version of intro/concl.
</commit_message>
<xml_diff>
--- a/Presentation/Presentation.pptx
+++ b/Presentation/Presentation.pptx
@@ -8704,14 +8704,14 @@
       </p:sp>
       <p:sp>
         <p:nvSpPr>
-          <p:cNvPr id="8" name="CasellaDiTesto 7"/>
+          <p:cNvPr id="16" name="CasellaDiTesto 9"/>
           <p:cNvSpPr txBox="1"/>
           <p:nvPr/>
         </p:nvSpPr>
         <p:spPr>
           <a:xfrm>
-            <a:off x="790027" y="5251965"/>
-            <a:ext cx="2105102" cy="338554"/>
+            <a:off x="299798" y="1185506"/>
+            <a:ext cx="7642125" cy="4893647"/>
           </a:xfrm>
           <a:prstGeom prst="rect">
             <a:avLst/>
@@ -8724,44 +8724,34 @@
           </a:bodyPr>
           <a:lstStyle/>
           <a:p>
-            <a:r>
-              <a:rPr lang="it-IT" sz="1600" b="1" dirty="0"/>
-              <a:t>Struttura ad albero</a:t>
-            </a:r>
-          </a:p>
-        </p:txBody>
-      </p:sp>
-      <p:sp>
-        <p:nvSpPr>
-          <p:cNvPr id="10" name="CasellaDiTesto 9"/>
-          <p:cNvSpPr txBox="1"/>
-          <p:nvPr/>
-        </p:nvSpPr>
-        <p:spPr>
-          <a:xfrm>
-            <a:off x="1964213" y="3287410"/>
-            <a:ext cx="1820308" cy="830997"/>
-          </a:xfrm>
-          <a:prstGeom prst="rect">
-            <a:avLst/>
-          </a:prstGeom>
-          <a:noFill/>
-        </p:spPr>
-        <p:txBody>
-          <a:bodyPr wrap="square" rtlCol="0">
-            <a:spAutoFit/>
-          </a:bodyPr>
-          <a:lstStyle/>
-          <a:p>
             <a:pPr marL="285750" indent="-285750">
               <a:buFont typeface="Arial"/>
               <a:buChar char="•"/>
             </a:pPr>
             <a:r>
-              <a:rPr lang="it-IT" sz="1600" dirty="0"/>
-              <a:t>Testo Item 1</a:t>
-            </a:r>
-            <a:endParaRPr lang="it-IT" sz="1600" b="1" dirty="0"/>
+              <a:rPr lang="it-IT" sz="2400" dirty="0"/>
+              <a:t>I dispositivi mobili sono un ambiente molto dinamico</a:t>
+            </a:r>
+          </a:p>
+          <a:p>
+            <a:pPr marL="742950" lvl="1" indent="-285750">
+              <a:buFont typeface="Arial"/>
+              <a:buChar char="•"/>
+            </a:pPr>
+            <a:r>
+              <a:rPr lang="it-IT" sz="2400" dirty="0"/>
+              <a:t>Continui cambi di applicazione attiva</a:t>
+            </a:r>
+          </a:p>
+          <a:p>
+            <a:pPr marL="742950" lvl="1" indent="-285750">
+              <a:buFont typeface="Arial"/>
+              <a:buChar char="•"/>
+            </a:pPr>
+            <a:r>
+              <a:rPr lang="it-IT" sz="2400" dirty="0"/>
+              <a:t>Centinaia di eventi al secondo (es. click, sensori, ecc.), spesso concorrenti</a:t>
+            </a:r>
           </a:p>
           <a:p>
             <a:pPr marL="285750" indent="-285750">
@@ -8769,8 +8759,8 @@
               <a:buChar char="•"/>
             </a:pPr>
             <a:r>
-              <a:rPr lang="it-IT" sz="1600" dirty="0"/>
-              <a:t>Testo Item 2</a:t>
+              <a:rPr lang="it-IT" sz="2400" dirty="0"/>
+              <a:t>Problema: i meccanismi di testing attuali non permettono una verifica completa della sequenza di eventi generati durante un’esecuzione</a:t>
             </a:r>
           </a:p>
           <a:p>
@@ -8779,782 +8769,36 @@
               <a:buChar char="•"/>
             </a:pPr>
             <a:r>
-              <a:rPr lang="it-IT" sz="1600" dirty="0"/>
-              <a:t>Testo Item 3</a:t>
-            </a:r>
-          </a:p>
-        </p:txBody>
-      </p:sp>
-      <p:cxnSp>
-        <p:nvCxnSpPr>
-          <p:cNvPr id="6" name="Connettore 2 5"/>
-          <p:cNvCxnSpPr>
-            <a:stCxn id="8" idx="3"/>
-            <a:endCxn id="20" idx="1"/>
-          </p:cNvCxnSpPr>
-          <p:nvPr/>
-        </p:nvCxnSpPr>
-        <p:spPr>
-          <a:xfrm flipV="1">
-            <a:off x="2895129" y="5206878"/>
-            <a:ext cx="717684" cy="214364"/>
-          </a:xfrm>
-          <a:prstGeom prst="straightConnector1">
-            <a:avLst/>
-          </a:prstGeom>
-          <a:ln>
-            <a:solidFill>
-              <a:schemeClr val="tx2"/>
-            </a:solidFill>
-            <a:tailEnd type="arrow"/>
-          </a:ln>
-        </p:spPr>
-        <p:style>
-          <a:lnRef idx="2">
-            <a:schemeClr val="accent1"/>
-          </a:lnRef>
-          <a:fillRef idx="0">
-            <a:schemeClr val="accent1"/>
-          </a:fillRef>
-          <a:effectRef idx="1">
-            <a:schemeClr val="accent1"/>
-          </a:effectRef>
-          <a:fontRef idx="minor">
-            <a:schemeClr val="tx1"/>
-          </a:fontRef>
-        </p:style>
-      </p:cxnSp>
-      <p:cxnSp>
-        <p:nvCxnSpPr>
-          <p:cNvPr id="14" name="Connettore 2 13"/>
-          <p:cNvCxnSpPr>
-            <a:stCxn id="8" idx="3"/>
-            <a:endCxn id="21" idx="1"/>
-          </p:cNvCxnSpPr>
-          <p:nvPr/>
-        </p:nvCxnSpPr>
-        <p:spPr>
-          <a:xfrm>
-            <a:off x="2895129" y="5421242"/>
-            <a:ext cx="717684" cy="144960"/>
-          </a:xfrm>
-          <a:prstGeom prst="straightConnector1">
-            <a:avLst/>
-          </a:prstGeom>
-          <a:ln>
-            <a:solidFill>
-              <a:schemeClr val="tx2"/>
-            </a:solidFill>
-            <a:tailEnd type="arrow"/>
-          </a:ln>
-        </p:spPr>
-        <p:style>
-          <a:lnRef idx="2">
-            <a:schemeClr val="accent1"/>
-          </a:lnRef>
-          <a:fillRef idx="0">
-            <a:schemeClr val="accent1"/>
-          </a:fillRef>
-          <a:effectRef idx="1">
-            <a:schemeClr val="accent1"/>
-          </a:effectRef>
-          <a:fontRef idx="minor">
-            <a:schemeClr val="tx1"/>
-          </a:fontRef>
-        </p:style>
-      </p:cxnSp>
-      <p:sp>
-        <p:nvSpPr>
-          <p:cNvPr id="20" name="CasellaDiTesto 19"/>
-          <p:cNvSpPr txBox="1"/>
-          <p:nvPr/>
-        </p:nvSpPr>
-        <p:spPr>
-          <a:xfrm>
-            <a:off x="3612813" y="5037601"/>
-            <a:ext cx="1063011" cy="338554"/>
-          </a:xfrm>
-          <a:prstGeom prst="rect">
-            <a:avLst/>
-          </a:prstGeom>
-          <a:noFill/>
-        </p:spPr>
-        <p:txBody>
-          <a:bodyPr wrap="none" rtlCol="0">
-            <a:spAutoFit/>
-          </a:bodyPr>
-          <a:lstStyle/>
-          <a:p>
-            <a:r>
-              <a:rPr lang="it-IT" sz="1600" dirty="0"/>
-              <a:t>Opzione1</a:t>
-            </a:r>
-          </a:p>
-        </p:txBody>
-      </p:sp>
-      <p:sp>
-        <p:nvSpPr>
-          <p:cNvPr id="21" name="CasellaDiTesto 20"/>
-          <p:cNvSpPr txBox="1"/>
-          <p:nvPr/>
-        </p:nvSpPr>
-        <p:spPr>
-          <a:xfrm>
-            <a:off x="3612813" y="5396925"/>
-            <a:ext cx="1063011" cy="338554"/>
-          </a:xfrm>
-          <a:prstGeom prst="rect">
-            <a:avLst/>
-          </a:prstGeom>
-          <a:noFill/>
-        </p:spPr>
-        <p:txBody>
-          <a:bodyPr wrap="none" rtlCol="0">
-            <a:spAutoFit/>
-          </a:bodyPr>
-          <a:lstStyle/>
-          <a:p>
-            <a:r>
-              <a:rPr lang="it-IT" sz="1600" dirty="0"/>
-              <a:t>Opzione2</a:t>
-            </a:r>
-          </a:p>
-        </p:txBody>
-      </p:sp>
-      <p:sp>
-        <p:nvSpPr>
-          <p:cNvPr id="22" name="CasellaDiTesto 21"/>
-          <p:cNvSpPr txBox="1"/>
-          <p:nvPr/>
-        </p:nvSpPr>
-        <p:spPr>
-          <a:xfrm>
-            <a:off x="5545534" y="5366147"/>
-            <a:ext cx="2699139" cy="369332"/>
-          </a:xfrm>
-          <a:prstGeom prst="rect">
-            <a:avLst/>
-          </a:prstGeom>
-          <a:noFill/>
-        </p:spPr>
-        <p:txBody>
-          <a:bodyPr wrap="none" rtlCol="0">
-            <a:spAutoFit/>
-          </a:bodyPr>
-          <a:lstStyle/>
-          <a:p>
-            <a:r>
-              <a:rPr lang="it-IT" b="1" dirty="0">
-                <a:solidFill>
-                  <a:srgbClr val="1F497D"/>
-                </a:solidFill>
-              </a:rPr>
-              <a:t>Grandezza di Interesse</a:t>
-            </a:r>
-            <a:endParaRPr lang="it-IT" dirty="0">
-              <a:solidFill>
-                <a:srgbClr val="1F497D"/>
-              </a:solidFill>
-            </a:endParaRPr>
-          </a:p>
-        </p:txBody>
-      </p:sp>
-      <p:cxnSp>
-        <p:nvCxnSpPr>
-          <p:cNvPr id="23" name="Connettore 2 22"/>
-          <p:cNvCxnSpPr>
-            <a:stCxn id="21" idx="3"/>
-            <a:endCxn id="22" idx="1"/>
-          </p:cNvCxnSpPr>
-          <p:nvPr/>
-        </p:nvCxnSpPr>
-        <p:spPr>
-          <a:xfrm flipV="1">
-            <a:off x="4675824" y="5550813"/>
-            <a:ext cx="869710" cy="15389"/>
-          </a:xfrm>
-          <a:prstGeom prst="straightConnector1">
-            <a:avLst/>
-          </a:prstGeom>
-          <a:ln>
-            <a:solidFill>
-              <a:schemeClr val="tx2"/>
-            </a:solidFill>
-            <a:tailEnd type="arrow"/>
-          </a:ln>
-        </p:spPr>
-        <p:style>
-          <a:lnRef idx="2">
-            <a:schemeClr val="accent1"/>
-          </a:lnRef>
-          <a:fillRef idx="0">
-            <a:schemeClr val="accent1"/>
-          </a:fillRef>
-          <a:effectRef idx="1">
-            <a:schemeClr val="accent1"/>
-          </a:effectRef>
-          <a:fontRef idx="minor">
-            <a:schemeClr val="tx1"/>
-          </a:fontRef>
-        </p:style>
-      </p:cxnSp>
-      <p:graphicFrame>
-        <p:nvGraphicFramePr>
-          <p:cNvPr id="4" name="Tabella 3"/>
-          <p:cNvGraphicFramePr>
-            <a:graphicFrameLocks noGrp="1"/>
-          </p:cNvGraphicFramePr>
-          <p:nvPr>
-            <p:extLst>
-              <p:ext uri="{D42A27DB-BD31-4B8C-83A1-F6EECF244321}">
-                <p14:modId xmlns:p14="http://schemas.microsoft.com/office/powerpoint/2010/main" val="3770485759"/>
-              </p:ext>
-            </p:extLst>
-          </p:nvPr>
-        </p:nvGraphicFramePr>
-        <p:xfrm>
-          <a:off x="5439014" y="3349942"/>
-          <a:ext cx="2313108" cy="1005840"/>
-        </p:xfrm>
-        <a:graphic>
-          <a:graphicData uri="http://schemas.openxmlformats.org/drawingml/2006/table">
-            <a:tbl>
-              <a:tblPr firstRow="1">
-                <a:tableStyleId>{2D5ABB26-0587-4C30-8999-92F81FD0307C}</a:tableStyleId>
-              </a:tblPr>
-              <a:tblGrid>
-                <a:gridCol w="1246423">
-                  <a:extLst>
-                    <a:ext uri="{9D8B030D-6E8A-4147-A177-3AD203B41FA5}">
-                      <a16:colId xmlns:a16="http://schemas.microsoft.com/office/drawing/2014/main" val="20000"/>
-                    </a:ext>
-                  </a:extLst>
-                </a:gridCol>
-                <a:gridCol w="1066685">
-                  <a:extLst>
-                    <a:ext uri="{9D8B030D-6E8A-4147-A177-3AD203B41FA5}">
-                      <a16:colId xmlns:a16="http://schemas.microsoft.com/office/drawing/2014/main" val="20001"/>
-                    </a:ext>
-                  </a:extLst>
-                </a:gridCol>
-              </a:tblGrid>
-              <a:tr h="254915">
-                <a:tc>
-                  <a:txBody>
-                    <a:bodyPr/>
-                    <a:lstStyle/>
-                    <a:p>
-                      <a:pPr algn="ctr"/>
-                      <a:r>
-                        <a:rPr lang="it-IT" sz="1600" b="1" dirty="0">
-                          <a:solidFill>
-                            <a:schemeClr val="tx2"/>
-                          </a:solidFill>
-                        </a:rPr>
-                        <a:t>Velocità</a:t>
-                      </a:r>
-                    </a:p>
-                  </a:txBody>
-                  <a:tcPr anchor="ctr">
-                    <a:lnL w="12700" cap="flat" cmpd="sng" algn="ctr">
-                      <a:solidFill>
-                        <a:scrgbClr r="0" g="0" b="0"/>
-                      </a:solidFill>
-                      <a:prstDash val="solid"/>
-                      <a:round/>
-                      <a:headEnd type="none" w="med" len="med"/>
-                      <a:tailEnd type="none" w="med" len="med"/>
-                    </a:lnL>
-                    <a:lnR w="12700" cap="flat" cmpd="sng" algn="ctr">
-                      <a:solidFill>
-                        <a:scrgbClr r="0" g="0" b="0"/>
-                      </a:solidFill>
-                      <a:prstDash val="solid"/>
-                      <a:round/>
-                      <a:headEnd type="none" w="med" len="med"/>
-                      <a:tailEnd type="none" w="med" len="med"/>
-                    </a:lnR>
-                    <a:lnT w="12700" cap="flat" cmpd="sng" algn="ctr">
-                      <a:solidFill>
-                        <a:scrgbClr r="0" g="0" b="0"/>
-                      </a:solidFill>
-                      <a:prstDash val="solid"/>
-                      <a:round/>
-                      <a:headEnd type="none" w="med" len="med"/>
-                      <a:tailEnd type="none" w="med" len="med"/>
-                    </a:lnT>
-                    <a:lnB w="12700" cap="flat" cmpd="sng" algn="ctr">
-                      <a:solidFill>
-                        <a:scrgbClr r="0" g="0" b="0"/>
-                      </a:solidFill>
-                      <a:prstDash val="solid"/>
-                      <a:round/>
-                      <a:headEnd type="none" w="med" len="med"/>
-                      <a:tailEnd type="none" w="med" len="med"/>
-                    </a:lnB>
-                  </a:tcPr>
-                </a:tc>
-                <a:tc>
-                  <a:txBody>
-                    <a:bodyPr/>
-                    <a:lstStyle/>
-                    <a:p>
-                      <a:pPr algn="ctr"/>
-                      <a:r>
-                        <a:rPr lang="it-IT" sz="1600" b="1" baseline="0" dirty="0">
-                          <a:solidFill>
-                            <a:schemeClr val="tx2"/>
-                          </a:solidFill>
-                        </a:rPr>
-                        <a:t>Coppia</a:t>
-                      </a:r>
-                      <a:endParaRPr lang="it-IT" sz="1600" b="1" dirty="0">
-                        <a:solidFill>
-                          <a:schemeClr val="tx2"/>
-                        </a:solidFill>
-                      </a:endParaRPr>
-                    </a:p>
-                  </a:txBody>
-                  <a:tcPr anchor="ctr">
-                    <a:lnL w="12700" cap="flat" cmpd="sng" algn="ctr">
-                      <a:solidFill>
-                        <a:scrgbClr r="0" g="0" b="0"/>
-                      </a:solidFill>
-                      <a:prstDash val="solid"/>
-                      <a:round/>
-                      <a:headEnd type="none" w="med" len="med"/>
-                      <a:tailEnd type="none" w="med" len="med"/>
-                    </a:lnL>
-                    <a:lnR w="12700" cap="flat" cmpd="sng" algn="ctr">
-                      <a:solidFill>
-                        <a:scrgbClr r="0" g="0" b="0"/>
-                      </a:solidFill>
-                      <a:prstDash val="solid"/>
-                      <a:round/>
-                      <a:headEnd type="none" w="med" len="med"/>
-                      <a:tailEnd type="none" w="med" len="med"/>
-                    </a:lnR>
-                    <a:lnT w="12700" cap="flat" cmpd="sng" algn="ctr">
-                      <a:solidFill>
-                        <a:scrgbClr r="0" g="0" b="0"/>
-                      </a:solidFill>
-                      <a:prstDash val="solid"/>
-                      <a:round/>
-                      <a:headEnd type="none" w="med" len="med"/>
-                      <a:tailEnd type="none" w="med" len="med"/>
-                    </a:lnT>
-                    <a:lnB w="12700" cap="flat" cmpd="sng" algn="ctr">
-                      <a:solidFill>
-                        <a:scrgbClr r="0" g="0" b="0"/>
-                      </a:solidFill>
-                      <a:prstDash val="solid"/>
-                      <a:round/>
-                      <a:headEnd type="none" w="med" len="med"/>
-                      <a:tailEnd type="none" w="med" len="med"/>
-                    </a:lnB>
-                  </a:tcPr>
-                </a:tc>
-                <a:extLst>
-                  <a:ext uri="{0D108BD9-81ED-4DB2-BD59-A6C34878D82A}">
-                    <a16:rowId xmlns:a16="http://schemas.microsoft.com/office/drawing/2014/main" val="10000"/>
-                  </a:ext>
-                </a:extLst>
-              </a:tr>
-              <a:tr h="256679">
-                <a:tc>
-                  <a:txBody>
-                    <a:bodyPr/>
-                    <a:lstStyle/>
-                    <a:p>
-                      <a:pPr algn="ctr"/>
-                      <a:r>
-                        <a:rPr lang="it-IT" sz="1600" dirty="0"/>
-                        <a:t>150 km/h</a:t>
-                      </a:r>
-                    </a:p>
-                  </a:txBody>
-                  <a:tcPr anchor="ctr">
-                    <a:lnL w="12700" cap="flat" cmpd="sng" algn="ctr">
-                      <a:solidFill>
-                        <a:scrgbClr r="0" g="0" b="0"/>
-                      </a:solidFill>
-                      <a:prstDash val="solid"/>
-                      <a:round/>
-                      <a:headEnd type="none" w="med" len="med"/>
-                      <a:tailEnd type="none" w="med" len="med"/>
-                    </a:lnL>
-                    <a:lnR w="12700" cap="flat" cmpd="sng" algn="ctr">
-                      <a:solidFill>
-                        <a:scrgbClr r="0" g="0" b="0"/>
-                      </a:solidFill>
-                      <a:prstDash val="solid"/>
-                      <a:round/>
-                      <a:headEnd type="none" w="med" len="med"/>
-                      <a:tailEnd type="none" w="med" len="med"/>
-                    </a:lnR>
-                    <a:lnT w="12700" cap="flat" cmpd="sng" algn="ctr">
-                      <a:solidFill>
-                        <a:scrgbClr r="0" g="0" b="0"/>
-                      </a:solidFill>
-                      <a:prstDash val="solid"/>
-                      <a:round/>
-                      <a:headEnd type="none" w="med" len="med"/>
-                      <a:tailEnd type="none" w="med" len="med"/>
-                    </a:lnT>
-                    <a:lnB w="12700" cap="flat" cmpd="sng" algn="ctr">
-                      <a:solidFill>
-                        <a:scrgbClr r="0" g="0" b="0"/>
-                      </a:solidFill>
-                      <a:prstDash val="solid"/>
-                      <a:round/>
-                      <a:headEnd type="none" w="med" len="med"/>
-                      <a:tailEnd type="none" w="med" len="med"/>
-                    </a:lnB>
-                  </a:tcPr>
-                </a:tc>
-                <a:tc>
-                  <a:txBody>
-                    <a:bodyPr/>
-                    <a:lstStyle/>
-                    <a:p>
-                      <a:pPr algn="ctr"/>
-                      <a:r>
-                        <a:rPr lang="it-IT" sz="1600" dirty="0"/>
-                        <a:t>90 Nm</a:t>
-                      </a:r>
-                    </a:p>
-                  </a:txBody>
-                  <a:tcPr anchor="ctr">
-                    <a:lnL w="12700" cap="flat" cmpd="sng" algn="ctr">
-                      <a:solidFill>
-                        <a:scrgbClr r="0" g="0" b="0"/>
-                      </a:solidFill>
-                      <a:prstDash val="solid"/>
-                      <a:round/>
-                      <a:headEnd type="none" w="med" len="med"/>
-                      <a:tailEnd type="none" w="med" len="med"/>
-                    </a:lnL>
-                    <a:lnR w="12700" cap="flat" cmpd="sng" algn="ctr">
-                      <a:solidFill>
-                        <a:scrgbClr r="0" g="0" b="0"/>
-                      </a:solidFill>
-                      <a:prstDash val="solid"/>
-                      <a:round/>
-                      <a:headEnd type="none" w="med" len="med"/>
-                      <a:tailEnd type="none" w="med" len="med"/>
-                    </a:lnR>
-                    <a:lnT w="12700" cap="flat" cmpd="sng" algn="ctr">
-                      <a:solidFill>
-                        <a:scrgbClr r="0" g="0" b="0"/>
-                      </a:solidFill>
-                      <a:prstDash val="solid"/>
-                      <a:round/>
-                      <a:headEnd type="none" w="med" len="med"/>
-                      <a:tailEnd type="none" w="med" len="med"/>
-                    </a:lnT>
-                    <a:lnB w="12700" cap="flat" cmpd="sng" algn="ctr">
-                      <a:solidFill>
-                        <a:scrgbClr r="0" g="0" b="0"/>
-                      </a:solidFill>
-                      <a:prstDash val="solid"/>
-                      <a:round/>
-                      <a:headEnd type="none" w="med" len="med"/>
-                      <a:tailEnd type="none" w="med" len="med"/>
-                    </a:lnB>
-                  </a:tcPr>
-                </a:tc>
-                <a:extLst>
-                  <a:ext uri="{0D108BD9-81ED-4DB2-BD59-A6C34878D82A}">
-                    <a16:rowId xmlns:a16="http://schemas.microsoft.com/office/drawing/2014/main" val="10001"/>
-                  </a:ext>
-                </a:extLst>
-              </a:tr>
-              <a:tr h="269391">
-                <a:tc>
-                  <a:txBody>
-                    <a:bodyPr/>
-                    <a:lstStyle/>
-                    <a:p>
-                      <a:pPr algn="ctr"/>
-                      <a:r>
-                        <a:rPr lang="it-IT" sz="1600" dirty="0"/>
-                        <a:t>300 km/h</a:t>
-                      </a:r>
-                    </a:p>
-                  </a:txBody>
-                  <a:tcPr anchor="ctr">
-                    <a:lnL w="12700" cap="flat" cmpd="sng" algn="ctr">
-                      <a:solidFill>
-                        <a:scrgbClr r="0" g="0" b="0"/>
-                      </a:solidFill>
-                      <a:prstDash val="solid"/>
-                      <a:round/>
-                      <a:headEnd type="none" w="med" len="med"/>
-                      <a:tailEnd type="none" w="med" len="med"/>
-                    </a:lnL>
-                    <a:lnR w="12700" cap="flat" cmpd="sng" algn="ctr">
-                      <a:solidFill>
-                        <a:scrgbClr r="0" g="0" b="0"/>
-                      </a:solidFill>
-                      <a:prstDash val="solid"/>
-                      <a:round/>
-                      <a:headEnd type="none" w="med" len="med"/>
-                      <a:tailEnd type="none" w="med" len="med"/>
-                    </a:lnR>
-                    <a:lnT w="12700" cap="flat" cmpd="sng" algn="ctr">
-                      <a:solidFill>
-                        <a:scrgbClr r="0" g="0" b="0"/>
-                      </a:solidFill>
-                      <a:prstDash val="solid"/>
-                      <a:round/>
-                      <a:headEnd type="none" w="med" len="med"/>
-                      <a:tailEnd type="none" w="med" len="med"/>
-                    </a:lnT>
-                    <a:lnB w="12700" cap="flat" cmpd="sng" algn="ctr">
-                      <a:solidFill>
-                        <a:scrgbClr r="0" g="0" b="0"/>
-                      </a:solidFill>
-                      <a:prstDash val="solid"/>
-                      <a:round/>
-                      <a:headEnd type="none" w="med" len="med"/>
-                      <a:tailEnd type="none" w="med" len="med"/>
-                    </a:lnB>
-                  </a:tcPr>
-                </a:tc>
-                <a:tc>
-                  <a:txBody>
-                    <a:bodyPr/>
-                    <a:lstStyle/>
-                    <a:p>
-                      <a:pPr algn="ctr"/>
-                      <a:r>
-                        <a:rPr lang="it-IT" sz="1600" dirty="0"/>
-                        <a:t>140 Nm</a:t>
-                      </a:r>
-                    </a:p>
-                  </a:txBody>
-                  <a:tcPr anchor="ctr">
-                    <a:lnL w="12700" cap="flat" cmpd="sng" algn="ctr">
-                      <a:solidFill>
-                        <a:scrgbClr r="0" g="0" b="0"/>
-                      </a:solidFill>
-                      <a:prstDash val="solid"/>
-                      <a:round/>
-                      <a:headEnd type="none" w="med" len="med"/>
-                      <a:tailEnd type="none" w="med" len="med"/>
-                    </a:lnL>
-                    <a:lnR w="12700" cap="flat" cmpd="sng" algn="ctr">
-                      <a:solidFill>
-                        <a:scrgbClr r="0" g="0" b="0"/>
-                      </a:solidFill>
-                      <a:prstDash val="solid"/>
-                      <a:round/>
-                      <a:headEnd type="none" w="med" len="med"/>
-                      <a:tailEnd type="none" w="med" len="med"/>
-                    </a:lnR>
-                    <a:lnT w="12700" cap="flat" cmpd="sng" algn="ctr">
-                      <a:solidFill>
-                        <a:scrgbClr r="0" g="0" b="0"/>
-                      </a:solidFill>
-                      <a:prstDash val="solid"/>
-                      <a:round/>
-                      <a:headEnd type="none" w="med" len="med"/>
-                      <a:tailEnd type="none" w="med" len="med"/>
-                    </a:lnT>
-                    <a:lnB w="12700" cap="flat" cmpd="sng" algn="ctr">
-                      <a:solidFill>
-                        <a:scrgbClr r="0" g="0" b="0"/>
-                      </a:solidFill>
-                      <a:prstDash val="solid"/>
-                      <a:round/>
-                      <a:headEnd type="none" w="med" len="med"/>
-                      <a:tailEnd type="none" w="med" len="med"/>
-                    </a:lnB>
-                  </a:tcPr>
-                </a:tc>
-                <a:extLst>
-                  <a:ext uri="{0D108BD9-81ED-4DB2-BD59-A6C34878D82A}">
-                    <a16:rowId xmlns:a16="http://schemas.microsoft.com/office/drawing/2014/main" val="10002"/>
-                  </a:ext>
-                </a:extLst>
-              </a:tr>
-            </a:tbl>
-          </a:graphicData>
-        </a:graphic>
-      </p:graphicFrame>
-      <p:sp>
-        <p:nvSpPr>
-          <p:cNvPr id="18" name="CasellaDiTesto 17"/>
-          <p:cNvSpPr txBox="1"/>
-          <p:nvPr/>
-        </p:nvSpPr>
-        <p:spPr>
-          <a:xfrm>
-            <a:off x="1964213" y="1222194"/>
-            <a:ext cx="1738525" cy="369332"/>
-          </a:xfrm>
-          <a:prstGeom prst="rect">
-            <a:avLst/>
-          </a:prstGeom>
-        </p:spPr>
-        <p:style>
-          <a:lnRef idx="2">
-            <a:schemeClr val="accent1"/>
-          </a:lnRef>
-          <a:fillRef idx="1">
-            <a:schemeClr val="lt1"/>
-          </a:fillRef>
-          <a:effectRef idx="0">
-            <a:schemeClr val="accent1"/>
-          </a:effectRef>
-          <a:fontRef idx="minor">
-            <a:schemeClr val="dk1"/>
-          </a:fontRef>
-        </p:style>
-        <p:txBody>
-          <a:bodyPr wrap="square" rtlCol="0">
-            <a:spAutoFit/>
-          </a:bodyPr>
-          <a:lstStyle/>
-          <a:p>
-            <a:pPr algn="ctr"/>
-            <a:r>
-              <a:rPr lang="it-IT" dirty="0"/>
-              <a:t>Titoletto – 18pt</a:t>
-            </a:r>
-            <a:endParaRPr lang="it-IT" b="1" dirty="0"/>
-          </a:p>
-        </p:txBody>
-      </p:sp>
-      <p:sp>
-        <p:nvSpPr>
-          <p:cNvPr id="19" name="CasellaDiTesto 18"/>
-          <p:cNvSpPr txBox="1"/>
-          <p:nvPr/>
-        </p:nvSpPr>
-        <p:spPr>
-          <a:xfrm>
-            <a:off x="5439015" y="1222194"/>
-            <a:ext cx="1537337" cy="338554"/>
-          </a:xfrm>
-          <a:prstGeom prst="rect">
-            <a:avLst/>
-          </a:prstGeom>
-        </p:spPr>
-        <p:style>
-          <a:lnRef idx="2">
-            <a:schemeClr val="accent1"/>
-          </a:lnRef>
-          <a:fillRef idx="1">
-            <a:schemeClr val="lt1"/>
-          </a:fillRef>
-          <a:effectRef idx="0">
-            <a:schemeClr val="accent1"/>
-          </a:effectRef>
-          <a:fontRef idx="minor">
-            <a:schemeClr val="dk1"/>
-          </a:fontRef>
-        </p:style>
-        <p:txBody>
-          <a:bodyPr wrap="square" rtlCol="0">
-            <a:spAutoFit/>
-          </a:bodyPr>
-          <a:lstStyle/>
-          <a:p>
-            <a:pPr algn="ctr"/>
-            <a:r>
-              <a:rPr lang="it-IT" sz="1600" dirty="0"/>
-              <a:t>Titoletto – 16pt</a:t>
-            </a:r>
-            <a:endParaRPr lang="it-IT" sz="1600" b="1" dirty="0"/>
-          </a:p>
-        </p:txBody>
-      </p:sp>
-      <p:sp>
-        <p:nvSpPr>
-          <p:cNvPr id="25" name="CasellaDiTesto 24"/>
-          <p:cNvSpPr txBox="1"/>
-          <p:nvPr/>
-        </p:nvSpPr>
-        <p:spPr>
-          <a:xfrm>
-            <a:off x="1964213" y="2768756"/>
-            <a:ext cx="1537337" cy="338554"/>
-          </a:xfrm>
-          <a:prstGeom prst="rect">
-            <a:avLst/>
-          </a:prstGeom>
-        </p:spPr>
-        <p:style>
-          <a:lnRef idx="2">
-            <a:schemeClr val="accent1"/>
-          </a:lnRef>
-          <a:fillRef idx="1">
-            <a:schemeClr val="lt1"/>
-          </a:fillRef>
-          <a:effectRef idx="0">
-            <a:schemeClr val="accent1"/>
-          </a:effectRef>
-          <a:fontRef idx="minor">
-            <a:schemeClr val="dk1"/>
-          </a:fontRef>
-        </p:style>
-        <p:txBody>
-          <a:bodyPr wrap="square" rtlCol="0">
-            <a:spAutoFit/>
-          </a:bodyPr>
-          <a:lstStyle/>
-          <a:p>
-            <a:pPr algn="ctr"/>
-            <a:r>
-              <a:rPr lang="it-IT" sz="1600" dirty="0"/>
-              <a:t>Elenco Puntato</a:t>
-            </a:r>
-            <a:endParaRPr lang="it-IT" sz="1600" b="1" dirty="0"/>
-          </a:p>
-        </p:txBody>
-      </p:sp>
-      <p:sp>
-        <p:nvSpPr>
-          <p:cNvPr id="26" name="CasellaDiTesto 25"/>
-          <p:cNvSpPr txBox="1"/>
-          <p:nvPr/>
-        </p:nvSpPr>
-        <p:spPr>
-          <a:xfrm>
-            <a:off x="5439015" y="2768756"/>
-            <a:ext cx="869262" cy="338554"/>
-          </a:xfrm>
-          <a:prstGeom prst="rect">
-            <a:avLst/>
-          </a:prstGeom>
-        </p:spPr>
-        <p:style>
-          <a:lnRef idx="2">
-            <a:schemeClr val="accent1"/>
-          </a:lnRef>
-          <a:fillRef idx="1">
-            <a:schemeClr val="lt1"/>
-          </a:fillRef>
-          <a:effectRef idx="0">
-            <a:schemeClr val="accent1"/>
-          </a:effectRef>
-          <a:fontRef idx="minor">
-            <a:schemeClr val="dk1"/>
-          </a:fontRef>
-        </p:style>
-        <p:txBody>
-          <a:bodyPr wrap="square" rtlCol="0">
-            <a:spAutoFit/>
-          </a:bodyPr>
-          <a:lstStyle/>
-          <a:p>
-            <a:pPr algn="ctr"/>
-            <a:r>
-              <a:rPr lang="it-IT" sz="1600" dirty="0"/>
-              <a:t>Tabella</a:t>
-            </a:r>
-            <a:endParaRPr lang="it-IT" sz="1600" b="1" dirty="0"/>
+              <a:rPr lang="it-IT" sz="2400" dirty="0"/>
+              <a:t>Obiettivi:</a:t>
+            </a:r>
+          </a:p>
+          <a:p>
+            <a:pPr marL="742950" lvl="1" indent="-285750">
+              <a:buFont typeface="Arial"/>
+              <a:buChar char="•"/>
+            </a:pPr>
+            <a:r>
+              <a:rPr lang="it-IT" sz="2400" dirty="0"/>
+              <a:t>Facilitare la gestione di uno dei più importanti gruppi di eventi, le transizioni del ciclo di vita</a:t>
+            </a:r>
+          </a:p>
+          <a:p>
+            <a:pPr marL="742950" lvl="1" indent="-285750">
+              <a:buFont typeface="Arial"/>
+              <a:buChar char="•"/>
+            </a:pPr>
+            <a:r>
+              <a:rPr lang="it-IT" sz="2400" dirty="0"/>
+              <a:t>Permettere di esprimere condizioni sul flusso di eventi in modo immediato</a:t>
+            </a:r>
+          </a:p>
+          <a:p>
+            <a:pPr marL="285750" indent="-285750">
+              <a:buFont typeface="Arial"/>
+              <a:buChar char="•"/>
+            </a:pPr>
+            <a:endParaRPr lang="it-IT" sz="2400" dirty="0"/>
           </a:p>
         </p:txBody>
       </p:sp>
@@ -9621,70 +8865,16 @@
           </a:p>
         </p:txBody>
       </p:sp>
-      <p:pic>
-        <p:nvPicPr>
-          <p:cNvPr id="4" name="Picture 3"/>
-          <p:cNvPicPr>
-            <a:picLocks noChangeAspect="1" noChangeArrowheads="1"/>
-          </p:cNvPicPr>
-          <p:nvPr/>
-        </p:nvPicPr>
-        <p:blipFill>
-          <a:blip r:embed="rId4" cstate="print">
-            <a:extLst>
-              <a:ext uri="{28A0092B-C50C-407E-A947-70E740481C1C}">
-                <a14:useLocalDpi xmlns:a14="http://schemas.microsoft.com/office/drawing/2010/main" val="0"/>
-              </a:ext>
-            </a:extLst>
-          </a:blip>
-          <a:srcRect/>
-          <a:stretch>
-            <a:fillRect/>
-          </a:stretch>
-        </p:blipFill>
-        <p:spPr bwMode="auto">
-          <a:xfrm>
-            <a:off x="4139933" y="3422267"/>
-            <a:ext cx="3178592" cy="3059371"/>
-          </a:xfrm>
-          <a:prstGeom prst="rect">
-            <a:avLst/>
-          </a:prstGeom>
-          <a:noFill/>
-          <a:ln>
-            <a:noFill/>
-          </a:ln>
-          <a:extLst>
-            <a:ext uri="{909E8E84-426E-40dd-AFC4-6F175D3DCCD1}">
-              <a14:hiddenFill xmlns:a14="http://schemas.microsoft.com/office/drawing/2010/main" xmlns="">
-                <a:solidFill>
-                  <a:schemeClr val="accent1"/>
-                </a:solidFill>
-              </a14:hiddenFill>
-            </a:ext>
-            <a:ext uri="{91240B29-F687-4f45-9708-019B960494DF}">
-              <a14:hiddenLine xmlns:a14="http://schemas.microsoft.com/office/drawing/2010/main" xmlns="" w="9525">
-                <a:solidFill>
-                  <a:schemeClr val="tx1"/>
-                </a:solidFill>
-                <a:miter lim="800000"/>
-                <a:headEnd/>
-                <a:tailEnd/>
-              </a14:hiddenLine>
-            </a:ext>
-          </a:extLst>
-        </p:spPr>
-      </p:pic>
-      <p:sp>
-        <p:nvSpPr>
-          <p:cNvPr id="6" name="CasellaDiTesto 5"/>
+      <p:sp>
+        <p:nvSpPr>
+          <p:cNvPr id="8" name="CasellaDiTesto 9"/>
           <p:cNvSpPr txBox="1"/>
           <p:nvPr/>
         </p:nvSpPr>
         <p:spPr>
           <a:xfrm>
-            <a:off x="1791468" y="1646095"/>
-            <a:ext cx="5561065" cy="1269578"/>
+            <a:off x="299798" y="1185506"/>
+            <a:ext cx="7642125" cy="4524315"/>
           </a:xfrm>
           <a:prstGeom prst="rect">
             <a:avLst/>
@@ -9698,264 +8888,68 @@
           <a:lstStyle/>
           <a:p>
             <a:pPr marL="285750" indent="-285750">
-              <a:spcBef>
-                <a:spcPts val="0"/>
-              </a:spcBef>
-              <a:spcAft>
-                <a:spcPts val="500"/>
-              </a:spcAft>
-              <a:buFont typeface="Arial" panose="020B0604020202020204" pitchFamily="34" charset="0"/>
+              <a:buFont typeface="Arial"/>
               <a:buChar char="•"/>
             </a:pPr>
             <a:r>
-              <a:rPr lang="it-IT" sz="1600" dirty="0"/>
-              <a:t>Risultato1</a:t>
-            </a:r>
-          </a:p>
-          <a:p>
-            <a:pPr marL="285750" indent="-285750">
-              <a:spcBef>
-                <a:spcPts val="0"/>
-              </a:spcBef>
-              <a:spcAft>
-                <a:spcPts val="500"/>
-              </a:spcAft>
-              <a:buFont typeface="Arial" panose="020B0604020202020204" pitchFamily="34" charset="0"/>
+              <a:rPr lang="it-IT" sz="2400" dirty="0"/>
+              <a:t>Contributi</a:t>
+            </a:r>
+          </a:p>
+          <a:p>
+            <a:pPr marL="742950" lvl="1" indent="-285750">
+              <a:buFont typeface="Arial"/>
               <a:buChar char="•"/>
             </a:pPr>
             <a:r>
-              <a:rPr lang="it-IT" sz="1600" dirty="0"/>
-              <a:t>Risultato2</a:t>
-            </a:r>
-          </a:p>
-          <a:p>
-            <a:pPr marL="285750" indent="-285750">
-              <a:spcBef>
-                <a:spcPts val="0"/>
-              </a:spcBef>
-              <a:spcAft>
-                <a:spcPts val="500"/>
-              </a:spcAft>
-              <a:buFont typeface="Arial" panose="020B0604020202020204" pitchFamily="34" charset="0"/>
+              <a:rPr lang="it-IT" sz="2400" dirty="0"/>
+              <a:t>Controlli statici per il lifecycle, integrati nell’IDE di sviluppo</a:t>
+            </a:r>
+          </a:p>
+          <a:p>
+            <a:pPr marL="742950" lvl="1" indent="-285750">
+              <a:buFont typeface="Arial"/>
               <a:buChar char="•"/>
             </a:pPr>
             <a:r>
-              <a:rPr lang="it-IT" sz="1600" dirty="0"/>
-              <a:t>Risultato3</a:t>
-            </a:r>
-          </a:p>
-          <a:p>
-            <a:pPr marL="285750" indent="-285750">
-              <a:spcBef>
-                <a:spcPts val="0"/>
-              </a:spcBef>
-              <a:spcAft>
-                <a:spcPts val="500"/>
-              </a:spcAft>
-              <a:buFont typeface="Arial" panose="020B0604020202020204" pitchFamily="34" charset="0"/>
+              <a:rPr lang="it-IT" sz="2400" dirty="0"/>
+              <a:t>Libreria per controllare le transizioni del lifecycle, per permettere un testing più approfondito delle applicazioni</a:t>
+            </a:r>
+          </a:p>
+          <a:p>
+            <a:pPr marL="742950" lvl="1" indent="-285750">
+              <a:buFont typeface="Arial"/>
               <a:buChar char="•"/>
             </a:pPr>
             <a:r>
-              <a:rPr lang="it-IT" sz="1600" dirty="0"/>
-              <a:t>Risultato4</a:t>
-            </a:r>
-          </a:p>
-        </p:txBody>
-      </p:sp>
-      <p:sp useBgFill="1">
-        <p:nvSpPr>
-          <p:cNvPr id="9" name="CasellaDiTesto 8"/>
-          <p:cNvSpPr txBox="1"/>
-          <p:nvPr/>
-        </p:nvSpPr>
-        <p:spPr>
-          <a:xfrm>
-            <a:off x="3326538" y="1103225"/>
-            <a:ext cx="2490925" cy="400110"/>
-          </a:xfrm>
-          <a:prstGeom prst="rect">
-            <a:avLst/>
-          </a:prstGeom>
-        </p:spPr>
-        <p:style>
-          <a:lnRef idx="2">
-            <a:schemeClr val="accent1"/>
-          </a:lnRef>
-          <a:fillRef idx="1">
-            <a:schemeClr val="lt1"/>
-          </a:fillRef>
-          <a:effectRef idx="0">
-            <a:schemeClr val="accent1"/>
-          </a:effectRef>
-          <a:fontRef idx="minor">
-            <a:schemeClr val="dk1"/>
-          </a:fontRef>
-        </p:style>
-        <p:txBody>
-          <a:bodyPr wrap="square" rtlCol="0">
-            <a:spAutoFit/>
-          </a:bodyPr>
-          <a:lstStyle/>
-          <a:p>
-            <a:pPr algn="ctr"/>
-            <a:r>
-              <a:rPr lang="it-IT" sz="2000" dirty="0"/>
-              <a:t>Risultati Scientifici</a:t>
-            </a:r>
-          </a:p>
-        </p:txBody>
-      </p:sp>
-      <p:sp>
-        <p:nvSpPr>
-          <p:cNvPr id="10" name="CasellaDiTesto 9"/>
-          <p:cNvSpPr txBox="1"/>
-          <p:nvPr/>
-        </p:nvSpPr>
-        <p:spPr>
-          <a:xfrm>
-            <a:off x="1649008" y="4854818"/>
-            <a:ext cx="2490925" cy="707886"/>
-          </a:xfrm>
-          <a:prstGeom prst="rect">
-            <a:avLst/>
-          </a:prstGeom>
-        </p:spPr>
-        <p:style>
-          <a:lnRef idx="2">
-            <a:schemeClr val="accent1"/>
-          </a:lnRef>
-          <a:fillRef idx="1">
-            <a:schemeClr val="lt1"/>
-          </a:fillRef>
-          <a:effectRef idx="0">
-            <a:schemeClr val="accent1"/>
-          </a:effectRef>
-          <a:fontRef idx="minor">
-            <a:schemeClr val="dk1"/>
-          </a:fontRef>
-        </p:style>
-        <p:txBody>
-          <a:bodyPr wrap="square" rtlCol="0">
-            <a:spAutoFit/>
-          </a:bodyPr>
-          <a:lstStyle/>
-          <a:p>
-            <a:pPr algn="ctr"/>
-            <a:r>
-              <a:rPr lang="it-IT" sz="2000" dirty="0"/>
-              <a:t>Risultati Industriali</a:t>
-            </a:r>
-          </a:p>
-          <a:p>
-            <a:pPr algn="ctr"/>
-            <a:r>
-              <a:rPr lang="it-IT" sz="2000" dirty="0"/>
-              <a:t>e/o Sviluppi Futuri</a:t>
-            </a:r>
-          </a:p>
-        </p:txBody>
-      </p:sp>
-      <p:sp>
-        <p:nvSpPr>
-          <p:cNvPr id="16" name="CasellaDiTesto 15"/>
-          <p:cNvSpPr txBox="1"/>
-          <p:nvPr/>
-        </p:nvSpPr>
-        <p:spPr>
-          <a:xfrm rot="21433596">
-            <a:off x="4498471" y="4124244"/>
-            <a:ext cx="2465271" cy="1933863"/>
-          </a:xfrm>
-          <a:prstGeom prst="rect">
-            <a:avLst/>
-          </a:prstGeom>
-          <a:noFill/>
-        </p:spPr>
-        <p:txBody>
-          <a:bodyPr wrap="square" rtlCol="0">
-            <a:spAutoFit/>
-          </a:bodyPr>
-          <a:lstStyle/>
+              <a:rPr lang="it-IT" sz="2400" dirty="0"/>
+              <a:t>Libreria che permette di esprimere asserzioni temporali sul flusso di eventi generato durante un test</a:t>
+            </a:r>
+          </a:p>
           <a:p>
             <a:pPr marL="285750" indent="-285750">
-              <a:spcBef>
-                <a:spcPts val="0"/>
-              </a:spcBef>
-              <a:spcAft>
-                <a:spcPts val="1000"/>
-              </a:spcAft>
-              <a:buFont typeface="Arial" panose="020B0604020202020204" pitchFamily="34" charset="0"/>
+              <a:buFont typeface="Arial"/>
               <a:buChar char="•"/>
             </a:pPr>
             <a:r>
-              <a:rPr lang="it-IT" sz="1600" dirty="0"/>
-              <a:t>Risultato1</a:t>
-            </a:r>
-          </a:p>
-          <a:p>
-            <a:pPr>
-              <a:spcBef>
-                <a:spcPts val="0"/>
-              </a:spcBef>
-              <a:spcAft>
-                <a:spcPts val="1000"/>
-              </a:spcAft>
-            </a:pPr>
-            <a:endParaRPr lang="it-IT" sz="1000" dirty="0"/>
+              <a:rPr lang="it-IT" sz="2400" dirty="0"/>
+              <a:t>Possibilità di usare i tre </a:t>
+            </a:r>
+            <a:r>
+              <a:rPr lang="it-IT" sz="2400" dirty="0" err="1"/>
+              <a:t>tool</a:t>
+            </a:r>
+            <a:r>
+              <a:rPr lang="it-IT" sz="2400" dirty="0"/>
+              <a:t> in contemporanea, per una verifica ancora più approfondita</a:t>
+            </a:r>
           </a:p>
           <a:p>
             <a:pPr marL="285750" indent="-285750">
-              <a:spcBef>
-                <a:spcPts val="0"/>
-              </a:spcBef>
-              <a:spcAft>
-                <a:spcPts val="1000"/>
-              </a:spcAft>
-              <a:buFont typeface="Arial" panose="020B0604020202020204" pitchFamily="34" charset="0"/>
+              <a:buFont typeface="Arial"/>
               <a:buChar char="•"/>
             </a:pPr>
-            <a:r>
-              <a:rPr lang="it-IT" sz="1600" dirty="0"/>
-              <a:t>Risultato2</a:t>
-            </a:r>
-          </a:p>
-          <a:p>
-            <a:pPr>
-              <a:spcBef>
-                <a:spcPts val="0"/>
-              </a:spcBef>
-              <a:spcAft>
-                <a:spcPts val="1000"/>
-              </a:spcAft>
-            </a:pPr>
-            <a:endParaRPr lang="it-IT" sz="1000" dirty="0"/>
-          </a:p>
-          <a:p>
-            <a:pPr marL="285750" indent="-285750">
-              <a:spcBef>
-                <a:spcPts val="0"/>
-              </a:spcBef>
-              <a:spcAft>
-                <a:spcPts val="1000"/>
-              </a:spcAft>
-              <a:buFont typeface="Arial" panose="020B0604020202020204" pitchFamily="34" charset="0"/>
-              <a:buChar char="•"/>
-            </a:pPr>
-            <a:r>
-              <a:rPr lang="it-IT" sz="1600" dirty="0"/>
-              <a:t>Risultato3</a:t>
-            </a:r>
-          </a:p>
-          <a:p>
-            <a:pPr>
-              <a:spcBef>
-                <a:spcPts val="0"/>
-              </a:spcBef>
-              <a:spcAft>
-                <a:spcPts val="1000"/>
-              </a:spcAft>
-            </a:pPr>
-            <a:endParaRPr lang="it-IT" sz="1000" dirty="0"/>
+            <a:endParaRPr lang="it-IT" sz="2400" dirty="0"/>
           </a:p>
         </p:txBody>
       </p:sp>
@@ -9980,139 +8974,6 @@
       <p:transition xmlns:p14="http://schemas.microsoft.com/office/powerpoint/2010/main" spd="slow" advTm="9545"/>
     </mc:Fallback>
   </mc:AlternateContent>
-  <p:timing>
-    <p:tnLst>
-      <p:par>
-        <p:cTn id="1" dur="indefinite" restart="never" nodeType="tmRoot">
-          <p:childTnLst>
-            <p:seq concurrent="1" nextAc="seek">
-              <p:cTn id="2" dur="indefinite" nodeType="mainSeq">
-                <p:childTnLst>
-                  <p:par>
-                    <p:cTn id="3" fill="hold">
-                      <p:stCondLst>
-                        <p:cond delay="indefinite"/>
-                      </p:stCondLst>
-                      <p:childTnLst>
-                        <p:par>
-                          <p:cTn id="4" fill="hold">
-                            <p:stCondLst>
-                              <p:cond delay="0"/>
-                            </p:stCondLst>
-                            <p:childTnLst>
-                              <p:par>
-                                <p:cTn id="5" presetID="1" presetClass="entr" presetSubtype="0" fill="hold" grpId="0" nodeType="clickEffect">
-                                  <p:stCondLst>
-                                    <p:cond delay="0"/>
-                                  </p:stCondLst>
-                                  <p:childTnLst>
-                                    <p:set>
-                                      <p:cBhvr>
-                                        <p:cTn id="6" dur="1" fill="hold">
-                                          <p:stCondLst>
-                                            <p:cond delay="0"/>
-                                          </p:stCondLst>
-                                        </p:cTn>
-                                        <p:tgtEl>
-                                          <p:spTgt spid="16"/>
-                                        </p:tgtEl>
-                                        <p:attrNameLst>
-                                          <p:attrName>style.visibility</p:attrName>
-                                        </p:attrNameLst>
-                                      </p:cBhvr>
-                                      <p:to>
-                                        <p:strVal val="visible"/>
-                                      </p:to>
-                                    </p:set>
-                                  </p:childTnLst>
-                                </p:cTn>
-                              </p:par>
-                              <p:par>
-                                <p:cTn id="7" presetID="1" presetClass="entr" presetSubtype="0" fill="hold" nodeType="withEffect">
-                                  <p:stCondLst>
-                                    <p:cond delay="0"/>
-                                  </p:stCondLst>
-                                  <p:childTnLst>
-                                    <p:set>
-                                      <p:cBhvr>
-                                        <p:cTn id="8" dur="1" fill="hold">
-                                          <p:stCondLst>
-                                            <p:cond delay="0"/>
-                                          </p:stCondLst>
-                                        </p:cTn>
-                                        <p:tgtEl>
-                                          <p:spTgt spid="4"/>
-                                        </p:tgtEl>
-                                        <p:attrNameLst>
-                                          <p:attrName>style.visibility</p:attrName>
-                                        </p:attrNameLst>
-                                      </p:cBhvr>
-                                      <p:to>
-                                        <p:strVal val="visible"/>
-                                      </p:to>
-                                    </p:set>
-                                  </p:childTnLst>
-                                </p:cTn>
-                              </p:par>
-                              <p:par>
-                                <p:cTn id="9" presetID="1" presetClass="entr" presetSubtype="0" fill="hold" grpId="0" nodeType="withEffect">
-                                  <p:stCondLst>
-                                    <p:cond delay="0"/>
-                                  </p:stCondLst>
-                                  <p:childTnLst>
-                                    <p:set>
-                                      <p:cBhvr>
-                                        <p:cTn id="10" dur="1" fill="hold">
-                                          <p:stCondLst>
-                                            <p:cond delay="0"/>
-                                          </p:stCondLst>
-                                        </p:cTn>
-                                        <p:tgtEl>
-                                          <p:spTgt spid="10"/>
-                                        </p:tgtEl>
-                                        <p:attrNameLst>
-                                          <p:attrName>style.visibility</p:attrName>
-                                        </p:attrNameLst>
-                                      </p:cBhvr>
-                                      <p:to>
-                                        <p:strVal val="visible"/>
-                                      </p:to>
-                                    </p:set>
-                                  </p:childTnLst>
-                                </p:cTn>
-                              </p:par>
-                            </p:childTnLst>
-                          </p:cTn>
-                        </p:par>
-                      </p:childTnLst>
-                    </p:cTn>
-                  </p:par>
-                </p:childTnLst>
-              </p:cTn>
-              <p:prevCondLst>
-                <p:cond evt="onPrev" delay="0">
-                  <p:tgtEl>
-                    <p:sldTgt/>
-                  </p:tgtEl>
-                </p:cond>
-              </p:prevCondLst>
-              <p:nextCondLst>
-                <p:cond evt="onNext" delay="0">
-                  <p:tgtEl>
-                    <p:sldTgt/>
-                  </p:tgtEl>
-                </p:cond>
-              </p:nextCondLst>
-            </p:seq>
-          </p:childTnLst>
-        </p:cTn>
-      </p:par>
-    </p:tnLst>
-    <p:bldLst>
-      <p:bldP spid="10" grpId="0" animBg="1"/>
-      <p:bldP spid="16" grpId="0"/>
-    </p:bldLst>
-  </p:timing>
 </p:sld>
 </file>
 
@@ -10180,7 +9041,7 @@
           <a:p>
             <a:r>
               <a:rPr lang="it-IT" dirty="0"/>
-              <a:t>FINE</a:t>
+              <a:t>Fine</a:t>
             </a:r>
           </a:p>
         </p:txBody>

</xml_diff>

<commit_message>
Presentation: better lifecycle part
</commit_message>
<xml_diff>
--- a/Presentation/Presentation.pptx
+++ b/Presentation/Presentation.pptx
@@ -260,7 +260,7 @@
           <a:p>
             <a:fld id="{0A055084-1CB9-CF40-93F3-663EB9ADEB9C}" type="datetimeFigureOut">
               <a:rPr lang="it-IT" smtClean="0"/>
-              <a:t>07/09/2016</a:t>
+              <a:t>08/09/2016</a:t>
             </a:fld>
             <a:endParaRPr lang="it-IT"/>
           </a:p>
@@ -3793,14 +3793,14 @@
           </a:ln>
           <a:extLst>
             <a:ext uri="{909E8E84-426E-40dd-AFC4-6F175D3DCCD1}">
-              <a14:hiddenFill xmlns:a14="http://schemas.microsoft.com/office/drawing/2010/main" xmlns="">
+              <a14:hiddenFill xmlns="" xmlns:a14="http://schemas.microsoft.com/office/drawing/2010/main">
                 <a:solidFill>
                   <a:srgbClr val="FFFFFF"/>
                 </a:solidFill>
               </a14:hiddenFill>
             </a:ext>
             <a:ext uri="{91240B29-F687-4f45-9708-019B960494DF}">
-              <a14:hiddenLine xmlns:a14="http://schemas.microsoft.com/office/drawing/2010/main" xmlns="" w="9525">
+              <a14:hiddenLine xmlns="" xmlns:a14="http://schemas.microsoft.com/office/drawing/2010/main" w="9525">
                 <a:solidFill>
                   <a:srgbClr val="000000"/>
                 </a:solidFill>
@@ -3878,14 +3878,14 @@
           </a:ln>
           <a:extLst>
             <a:ext uri="{909E8E84-426E-40dd-AFC4-6F175D3DCCD1}">
-              <a14:hiddenFill xmlns:a14="http://schemas.microsoft.com/office/drawing/2010/main" xmlns="">
+              <a14:hiddenFill xmlns="" xmlns:a14="http://schemas.microsoft.com/office/drawing/2010/main">
                 <a:solidFill>
                   <a:srgbClr val="FFFFFF"/>
                 </a:solidFill>
               </a14:hiddenFill>
             </a:ext>
             <a:ext uri="{91240B29-F687-4f45-9708-019B960494DF}">
-              <a14:hiddenLine xmlns:a14="http://schemas.microsoft.com/office/drawing/2010/main" xmlns="" w="9525">
+              <a14:hiddenLine xmlns="" xmlns:a14="http://schemas.microsoft.com/office/drawing/2010/main" w="9525">
                 <a:solidFill>
                   <a:srgbClr val="000000"/>
                 </a:solidFill>
@@ -3895,7 +3895,7 @@
               </a14:hiddenLine>
             </a:ext>
             <a:ext uri="{FAA26D3D-D897-4be2-8F04-BA451C77F1D7}">
-              <ma14:placeholderFlag xmlns:ma14="http://schemas.microsoft.com/office/mac/drawingml/2011/main" xmlns="" val="1"/>
+              <ma14:placeholderFlag xmlns="" xmlns:ma14="http://schemas.microsoft.com/office/mac/drawingml/2011/main" val="1"/>
             </a:ext>
           </a:extLst>
         </p:spPr>
@@ -3939,14 +3939,14 @@
           </a:ln>
           <a:extLst>
             <a:ext uri="{909E8E84-426E-40dd-AFC4-6F175D3DCCD1}">
-              <a14:hiddenFill xmlns:a14="http://schemas.microsoft.com/office/drawing/2010/main" xmlns="">
+              <a14:hiddenFill xmlns="" xmlns:a14="http://schemas.microsoft.com/office/drawing/2010/main">
                 <a:solidFill>
                   <a:srgbClr val="FFFFFF"/>
                 </a:solidFill>
               </a14:hiddenFill>
             </a:ext>
             <a:ext uri="{91240B29-F687-4f45-9708-019B960494DF}">
-              <a14:hiddenLine xmlns:a14="http://schemas.microsoft.com/office/drawing/2010/main" xmlns="" w="9525">
+              <a14:hiddenLine xmlns="" xmlns:a14="http://schemas.microsoft.com/office/drawing/2010/main" w="9525">
                 <a:solidFill>
                   <a:srgbClr val="000000"/>
                 </a:solidFill>
@@ -3956,7 +3956,7 @@
               </a14:hiddenLine>
             </a:ext>
             <a:ext uri="{FAA26D3D-D897-4be2-8F04-BA451C77F1D7}">
-              <ma14:placeholderFlag xmlns:ma14="http://schemas.microsoft.com/office/mac/drawingml/2011/main" xmlns="" val="1"/>
+              <ma14:placeholderFlag xmlns="" xmlns:ma14="http://schemas.microsoft.com/office/mac/drawingml/2011/main" val="1"/>
             </a:ext>
           </a:extLst>
         </p:spPr>
@@ -4451,14 +4451,14 @@
           <a:effectLst/>
           <a:extLst>
             <a:ext uri="{909E8E84-426E-40dd-AFC4-6F175D3DCCD1}">
-              <a14:hiddenFill xmlns:a14="http://schemas.microsoft.com/office/drawing/2010/main" xmlns="">
+              <a14:hiddenFill xmlns="" xmlns:a14="http://schemas.microsoft.com/office/drawing/2010/main">
                 <a:solidFill>
                   <a:schemeClr val="accent1"/>
                 </a:solidFill>
               </a14:hiddenFill>
             </a:ext>
             <a:ext uri="{91240B29-F687-4f45-9708-019B960494DF}">
-              <a14:hiddenLine xmlns:a14="http://schemas.microsoft.com/office/drawing/2010/main" xmlns="" w="9525">
+              <a14:hiddenLine xmlns="" xmlns:a14="http://schemas.microsoft.com/office/drawing/2010/main" w="9525">
                 <a:solidFill>
                   <a:srgbClr val="FF6600"/>
                 </a:solidFill>
@@ -4468,7 +4468,7 @@
               </a14:hiddenLine>
             </a:ext>
             <a:ext uri="{AF507438-7753-43e0-B8FC-AC1667EBCBE1}">
-              <a14:hiddenEffects xmlns:a14="http://schemas.microsoft.com/office/drawing/2010/main" xmlns="">
+              <a14:hiddenEffects xmlns="" xmlns:a14="http://schemas.microsoft.com/office/drawing/2010/main">
                 <a:effectLst>
                   <a:outerShdw blurRad="63500" dist="38099" dir="2700000" algn="ctr" rotWithShape="0">
                     <a:schemeClr val="bg2">
@@ -5036,14 +5036,14 @@
           </a:ln>
           <a:extLst>
             <a:ext uri="{909E8E84-426E-40dd-AFC4-6F175D3DCCD1}">
-              <a14:hiddenFill xmlns:a14="http://schemas.microsoft.com/office/drawing/2010/main" xmlns="">
+              <a14:hiddenFill xmlns="" xmlns:a14="http://schemas.microsoft.com/office/drawing/2010/main">
                 <a:solidFill>
                   <a:srgbClr val="FFFFFF"/>
                 </a:solidFill>
               </a14:hiddenFill>
             </a:ext>
             <a:ext uri="{91240B29-F687-4f45-9708-019B960494DF}">
-              <a14:hiddenLine xmlns:a14="http://schemas.microsoft.com/office/drawing/2010/main" xmlns="" w="9525">
+              <a14:hiddenLine xmlns="" xmlns:a14="http://schemas.microsoft.com/office/drawing/2010/main" w="9525">
                 <a:solidFill>
                   <a:srgbClr val="000000"/>
                 </a:solidFill>
@@ -5121,14 +5121,14 @@
           </a:ln>
           <a:extLst>
             <a:ext uri="{909E8E84-426E-40dd-AFC4-6F175D3DCCD1}">
-              <a14:hiddenFill xmlns:a14="http://schemas.microsoft.com/office/drawing/2010/main" xmlns="">
+              <a14:hiddenFill xmlns="" xmlns:a14="http://schemas.microsoft.com/office/drawing/2010/main">
                 <a:solidFill>
                   <a:srgbClr val="FFFFFF"/>
                 </a:solidFill>
               </a14:hiddenFill>
             </a:ext>
             <a:ext uri="{91240B29-F687-4f45-9708-019B960494DF}">
-              <a14:hiddenLine xmlns:a14="http://schemas.microsoft.com/office/drawing/2010/main" xmlns="" w="9525">
+              <a14:hiddenLine xmlns="" xmlns:a14="http://schemas.microsoft.com/office/drawing/2010/main" w="9525">
                 <a:solidFill>
                   <a:srgbClr val="000000"/>
                 </a:solidFill>
@@ -5138,7 +5138,7 @@
               </a14:hiddenLine>
             </a:ext>
             <a:ext uri="{FAA26D3D-D897-4be2-8F04-BA451C77F1D7}">
-              <ma14:placeholderFlag xmlns:ma14="http://schemas.microsoft.com/office/mac/drawingml/2011/main" xmlns="" val="1"/>
+              <ma14:placeholderFlag xmlns="" xmlns:ma14="http://schemas.microsoft.com/office/mac/drawingml/2011/main" val="1"/>
             </a:ext>
           </a:extLst>
         </p:spPr>
@@ -5182,14 +5182,14 @@
           </a:ln>
           <a:extLst>
             <a:ext uri="{909E8E84-426E-40dd-AFC4-6F175D3DCCD1}">
-              <a14:hiddenFill xmlns:a14="http://schemas.microsoft.com/office/drawing/2010/main" xmlns="">
+              <a14:hiddenFill xmlns="" xmlns:a14="http://schemas.microsoft.com/office/drawing/2010/main">
                 <a:solidFill>
                   <a:srgbClr val="FFFFFF"/>
                 </a:solidFill>
               </a14:hiddenFill>
             </a:ext>
             <a:ext uri="{91240B29-F687-4f45-9708-019B960494DF}">
-              <a14:hiddenLine xmlns:a14="http://schemas.microsoft.com/office/drawing/2010/main" xmlns="" w="9525">
+              <a14:hiddenLine xmlns="" xmlns:a14="http://schemas.microsoft.com/office/drawing/2010/main" w="9525">
                 <a:solidFill>
                   <a:srgbClr val="000000"/>
                 </a:solidFill>
@@ -5199,7 +5199,7 @@
               </a14:hiddenLine>
             </a:ext>
             <a:ext uri="{FAA26D3D-D897-4be2-8F04-BA451C77F1D7}">
-              <ma14:placeholderFlag xmlns:ma14="http://schemas.microsoft.com/office/mac/drawingml/2011/main" xmlns="" val="1"/>
+              <ma14:placeholderFlag xmlns="" xmlns:ma14="http://schemas.microsoft.com/office/mac/drawingml/2011/main" val="1"/>
             </a:ext>
           </a:extLst>
         </p:spPr>
@@ -6124,7 +6124,7 @@
         <p:spPr>
           <a:xfrm>
             <a:off x="299798" y="1185506"/>
-            <a:ext cx="7642125" cy="3416320"/>
+            <a:ext cx="8515429" cy="3046988"/>
           </a:xfrm>
           <a:prstGeom prst="rect">
             <a:avLst/>
@@ -6288,7 +6288,7 @@
         <p:spPr>
           <a:xfrm>
             <a:off x="299798" y="1185506"/>
-            <a:ext cx="7642125" cy="5262979"/>
+            <a:ext cx="8566800" cy="4893647"/>
           </a:xfrm>
           <a:prstGeom prst="rect">
             <a:avLst/>
@@ -6468,7 +6468,7 @@
         <p:spPr>
           <a:xfrm>
             <a:off x="299798" y="1185506"/>
-            <a:ext cx="7642125" cy="830997"/>
+            <a:ext cx="8444366" cy="830997"/>
           </a:xfrm>
           <a:prstGeom prst="rect">
             <a:avLst/>
@@ -6601,7 +6601,7 @@
         <p:spPr>
           <a:xfrm>
             <a:off x="299798" y="1185506"/>
-            <a:ext cx="7642125" cy="830997"/>
+            <a:ext cx="8447541" cy="830997"/>
           </a:xfrm>
           <a:prstGeom prst="rect">
             <a:avLst/>
@@ -7327,7 +7327,7 @@
         <p:spPr>
           <a:xfrm>
             <a:off x="266699" y="1328484"/>
-            <a:ext cx="8731186" cy="1569660"/>
+            <a:ext cx="8630721" cy="1569660"/>
           </a:xfrm>
           <a:prstGeom prst="rect">
             <a:avLst/>
@@ -8711,7 +8711,7 @@
         <p:spPr>
           <a:xfrm>
             <a:off x="299798" y="1185506"/>
-            <a:ext cx="7642125" cy="4893647"/>
+            <a:ext cx="8443510" cy="4893647"/>
           </a:xfrm>
           <a:prstGeom prst="rect">
             <a:avLst/>
@@ -8874,7 +8874,7 @@
         <p:spPr>
           <a:xfrm>
             <a:off x="299798" y="1185506"/>
-            <a:ext cx="7642125" cy="4524315"/>
+            <a:ext cx="8546251" cy="3785652"/>
           </a:xfrm>
           <a:prstGeom prst="rect">
             <a:avLst/>
@@ -9250,7 +9250,7 @@
           <a:p>
             <a:r>
               <a:rPr lang="it-IT" dirty="0"/>
-              <a:t>Lifecycle</a:t>
+              <a:t>Lifecycle (Ciclo di Vita)</a:t>
             </a:r>
           </a:p>
         </p:txBody>
@@ -9277,7 +9277,7 @@
         </p:blipFill>
         <p:spPr>
           <a:xfrm>
-            <a:off x="834765" y="2537717"/>
+            <a:off x="670381" y="2845938"/>
             <a:ext cx="7885118" cy="3513762"/>
           </a:xfrm>
           <a:prstGeom prst="rect">
@@ -9293,8 +9293,8 @@
         </p:nvSpPr>
         <p:spPr>
           <a:xfrm>
-            <a:off x="299798" y="1185506"/>
-            <a:ext cx="7642125" cy="1200329"/>
+            <a:off x="299798" y="1010848"/>
+            <a:ext cx="8420085" cy="1508105"/>
           </a:xfrm>
           <a:prstGeom prst="rect">
             <a:avLst/>
@@ -9308,12 +9308,15 @@
           <a:lstStyle/>
           <a:p>
             <a:pPr marL="285750" indent="-285750">
+              <a:spcAft>
+                <a:spcPts val="1200"/>
+              </a:spcAft>
               <a:buFont typeface="Arial"/>
               <a:buChar char="•"/>
             </a:pPr>
             <a:r>
               <a:rPr lang="it-IT" sz="2400" dirty="0"/>
-              <a:t>Activity e </a:t>
+              <a:t>Componenti dell’applicazione come Activity e </a:t>
             </a:r>
             <a:r>
               <a:rPr lang="it-IT" sz="2400" dirty="0" err="1"/>
@@ -9323,6 +9326,9 @@
           </a:p>
           <a:p>
             <a:pPr marL="285750" indent="-285750">
+              <a:spcAft>
+                <a:spcPts val="1200"/>
+              </a:spcAft>
               <a:buFont typeface="Arial"/>
               <a:buChar char="•"/>
             </a:pPr>
@@ -9333,10 +9339,16 @@
           </a:p>
           <a:p>
             <a:pPr marL="285750" indent="-285750">
+              <a:spcAft>
+                <a:spcPts val="1200"/>
+              </a:spcAft>
               <a:buFont typeface="Arial"/>
               <a:buChar char="•"/>
             </a:pPr>
-            <a:endParaRPr lang="it-IT" sz="2400" dirty="0"/>
+            <a:r>
+              <a:rPr lang="it-IT" sz="2400" dirty="0"/>
+              <a:t>Sviluppatore definisce le azioni ad ogni transizione</a:t>
+            </a:r>
           </a:p>
         </p:txBody>
       </p:sp>
@@ -9412,7 +9424,7 @@
         <p:spPr>
           <a:xfrm>
             <a:off x="299798" y="1185506"/>
-            <a:ext cx="7642125" cy="3416320"/>
+            <a:ext cx="8535977" cy="4124206"/>
           </a:xfrm>
           <a:prstGeom prst="rect">
             <a:avLst/>
@@ -9426,6 +9438,9 @@
           <a:lstStyle/>
           <a:p>
             <a:pPr marL="285750" indent="-285750">
+              <a:spcAft>
+                <a:spcPts val="1200"/>
+              </a:spcAft>
               <a:buFont typeface="Arial"/>
               <a:buChar char="•"/>
             </a:pPr>
@@ -9436,16 +9451,22 @@
           </a:p>
           <a:p>
             <a:pPr marL="742950" lvl="1" indent="-285750">
+              <a:spcAft>
+                <a:spcPts val="1200"/>
+              </a:spcAft>
               <a:buFont typeface="Arial"/>
               <a:buChar char="•"/>
             </a:pPr>
             <a:r>
               <a:rPr lang="it-IT" sz="2400" dirty="0"/>
-              <a:t>es. sensori</a:t>
+              <a:t>es. rilascio sensori quando in background</a:t>
             </a:r>
           </a:p>
           <a:p>
             <a:pPr marL="285750" indent="-285750">
+              <a:spcAft>
+                <a:spcPts val="1200"/>
+              </a:spcAft>
               <a:buFont typeface="Arial"/>
               <a:buChar char="•"/>
             </a:pPr>
@@ -9456,6 +9477,9 @@
           </a:p>
           <a:p>
             <a:pPr marL="742950" lvl="1" indent="-285750">
+              <a:spcAft>
+                <a:spcPts val="1200"/>
+              </a:spcAft>
               <a:buFont typeface="Arial"/>
               <a:buChar char="•"/>
             </a:pPr>
@@ -9466,6 +9490,9 @@
           </a:p>
           <a:p>
             <a:pPr marL="285750" indent="-285750">
+              <a:spcAft>
+                <a:spcPts val="1200"/>
+              </a:spcAft>
               <a:buFont typeface="Arial"/>
               <a:buChar char="•"/>
             </a:pPr>
@@ -9476,6 +9503,9 @@
           </a:p>
           <a:p>
             <a:pPr marL="742950" lvl="1" indent="-285750">
+              <a:spcAft>
+                <a:spcPts val="1200"/>
+              </a:spcAft>
               <a:buFont typeface="Arial"/>
               <a:buChar char="•"/>
             </a:pPr>
@@ -9486,6 +9516,9 @@
           </a:p>
           <a:p>
             <a:pPr marL="285750" indent="-285750">
+              <a:spcAft>
+                <a:spcPts val="1200"/>
+              </a:spcAft>
               <a:buFont typeface="Arial"/>
               <a:buChar char="•"/>
             </a:pPr>
@@ -9496,12 +9529,56 @@
           </a:p>
           <a:p>
             <a:pPr marL="742950" lvl="1" indent="-285750">
+              <a:spcAft>
+                <a:spcPts val="1200"/>
+              </a:spcAft>
               <a:buFont typeface="Arial"/>
               <a:buChar char="•"/>
             </a:pPr>
             <a:r>
               <a:rPr lang="it-IT" sz="2400" dirty="0"/>
               <a:t>es. rotazione</a:t>
+            </a:r>
+          </a:p>
+        </p:txBody>
+      </p:sp>
+      <p:sp>
+        <p:nvSpPr>
+          <p:cNvPr id="3" name="TextBox 2"/>
+          <p:cNvSpPr txBox="1"/>
+          <p:nvPr/>
+        </p:nvSpPr>
+        <p:spPr>
+          <a:xfrm>
+            <a:off x="585182" y="5864078"/>
+            <a:ext cx="8558818" cy="369332"/>
+          </a:xfrm>
+          <a:prstGeom prst="rect">
+            <a:avLst/>
+          </a:prstGeom>
+          <a:noFill/>
+        </p:spPr>
+        <p:txBody>
+          <a:bodyPr wrap="none" rtlCol="0">
+            <a:spAutoFit/>
+          </a:bodyPr>
+          <a:lstStyle/>
+          <a:p>
+            <a:r>
+              <a:rPr lang="it-IT" b="1" dirty="0" err="1">
+                <a:solidFill>
+                  <a:srgbClr val="FF0000"/>
+                </a:solidFill>
+              </a:rPr>
+              <a:t>TODO</a:t>
+            </a:r>
+            <a:r>
+              <a:rPr lang="it-IT" b="1" dirty="0">
+                <a:solidFill>
+                  <a:srgbClr val="FF0000"/>
+                </a:solidFill>
+              </a:rPr>
+              <a:t>: C’E’ TEMPO PER QUESTA SLIDE? IN CASO SOLO BREVE ACCENNO</a:t>
             </a:r>
           </a:p>
         </p:txBody>
@@ -9577,8 +9654,8 @@
         </p:nvSpPr>
         <p:spPr>
           <a:xfrm>
-            <a:off x="299798" y="1185506"/>
-            <a:ext cx="7642125" cy="4154984"/>
+            <a:off x="299798" y="1123864"/>
+            <a:ext cx="8484606" cy="5078313"/>
           </a:xfrm>
           <a:prstGeom prst="rect">
             <a:avLst/>
@@ -9592,6 +9669,12 @@
           <a:lstStyle/>
           <a:p>
             <a:pPr marL="285750" indent="-285750">
+              <a:spcBef>
+                <a:spcPts val="0"/>
+              </a:spcBef>
+              <a:spcAft>
+                <a:spcPts val="1200"/>
+              </a:spcAft>
               <a:buFont typeface="Arial"/>
               <a:buChar char="•"/>
             </a:pPr>
@@ -9602,102 +9685,82 @@
           </a:p>
           <a:p>
             <a:pPr marL="285750" indent="-285750">
+              <a:spcBef>
+                <a:spcPts val="0"/>
+              </a:spcBef>
+              <a:spcAft>
+                <a:spcPts val="1200"/>
+              </a:spcAft>
               <a:buFont typeface="Arial"/>
               <a:buChar char="•"/>
             </a:pPr>
             <a:r>
               <a:rPr lang="it-IT" sz="2400" dirty="0"/>
-              <a:t>Esempio: Broadcast </a:t>
+              <a:t>Controllo di rilascio, best </a:t>
             </a:r>
             <a:r>
               <a:rPr lang="it-IT" sz="2400" dirty="0" err="1"/>
-              <a:t>Receiver</a:t>
-            </a:r>
-            <a:endParaRPr lang="it-IT" sz="2400" dirty="0"/>
-          </a:p>
-          <a:p>
-            <a:pPr marL="742950" lvl="1" indent="-285750">
+              <a:t>practices</a:t>
+            </a:r>
+            <a:r>
+              <a:rPr lang="it-IT" sz="2400" dirty="0"/>
+              <a:t> e doppia acquisizione</a:t>
+            </a:r>
+          </a:p>
+          <a:p>
+            <a:pPr marL="285750" indent="-285750">
+              <a:spcAft>
+                <a:spcPts val="1200"/>
+              </a:spcAft>
               <a:buFont typeface="Arial"/>
               <a:buChar char="•"/>
             </a:pPr>
             <a:r>
               <a:rPr lang="it-IT" sz="2400" dirty="0"/>
-              <a:t>Rilascio: il metodo </a:t>
-            </a:r>
-            <a:r>
-              <a:rPr lang="it-IT" sz="2400" dirty="0" err="1">
-                <a:latin typeface="Courier New" panose="02070309020205020404" pitchFamily="49" charset="0"/>
-                <a:cs typeface="Courier New" panose="02070309020205020404" pitchFamily="49" charset="0"/>
-              </a:rPr>
-              <a:t>unregisterReceiver</a:t>
-            </a:r>
-            <a:r>
-              <a:rPr lang="it-IT" sz="2400" dirty="0">
-                <a:latin typeface="Courier New" panose="02070309020205020404" pitchFamily="49" charset="0"/>
-                <a:cs typeface="Courier New" panose="02070309020205020404" pitchFamily="49" charset="0"/>
-              </a:rPr>
-              <a:t>()</a:t>
-            </a:r>
-            <a:r>
-              <a:rPr lang="it-IT" sz="2400" dirty="0"/>
-              <a:t> è da chiamare sempre dopo </a:t>
-            </a:r>
-            <a:r>
-              <a:rPr lang="it-IT" sz="2400" dirty="0" err="1">
-                <a:latin typeface="Courier New" panose="02070309020205020404" pitchFamily="49" charset="0"/>
-                <a:cs typeface="Courier New" panose="02070309020205020404" pitchFamily="49" charset="0"/>
-              </a:rPr>
-              <a:t>registerReceiver</a:t>
-            </a:r>
-            <a:r>
-              <a:rPr lang="it-IT" sz="2400" dirty="0">
-                <a:latin typeface="Courier New" panose="02070309020205020404" pitchFamily="49" charset="0"/>
-                <a:cs typeface="Courier New" panose="02070309020205020404" pitchFamily="49" charset="0"/>
-              </a:rPr>
-              <a:t>()</a:t>
-            </a:r>
-            <a:r>
-              <a:rPr lang="it-IT" sz="2400" dirty="0"/>
-              <a:t>, ma non durante </a:t>
-            </a:r>
-            <a:r>
-              <a:rPr lang="it-IT" sz="2400" dirty="0" err="1">
-                <a:latin typeface="Courier New" panose="02070309020205020404" pitchFamily="49" charset="0"/>
-                <a:cs typeface="Courier New" panose="02070309020205020404" pitchFamily="49" charset="0"/>
-              </a:rPr>
-              <a:t>onSaveInstanceState</a:t>
-            </a:r>
-            <a:r>
-              <a:rPr lang="it-IT" sz="2400" dirty="0">
-                <a:latin typeface="Courier New" panose="02070309020205020404" pitchFamily="49" charset="0"/>
-                <a:cs typeface="Courier New" panose="02070309020205020404" pitchFamily="49" charset="0"/>
-              </a:rPr>
-              <a:t>()</a:t>
-            </a:r>
+              <a:t>Esempio: Broadcast </a:t>
+            </a:r>
+            <a:r>
+              <a:rPr lang="it-IT" sz="2400" dirty="0" err="1"/>
+              <a:t>Receiver</a:t>
+            </a:r>
+            <a:endParaRPr lang="it-IT" sz="2400" dirty="0"/>
           </a:p>
           <a:p>
             <a:pPr marL="742950" lvl="1" indent="-285750">
+              <a:spcAft>
+                <a:spcPts val="1200"/>
+              </a:spcAft>
               <a:buFont typeface="Arial"/>
               <a:buChar char="•"/>
             </a:pPr>
             <a:r>
               <a:rPr lang="it-IT" sz="2400" dirty="0"/>
-              <a:t>Best </a:t>
-            </a:r>
-            <a:r>
-              <a:rPr lang="it-IT" sz="2400" dirty="0" err="1"/>
-              <a:t>Practice</a:t>
+              <a:t>Rilascio: il metodo </a:t>
+            </a:r>
+            <a:r>
+              <a:rPr lang="it-IT" sz="2400" dirty="0" err="1">
+                <a:latin typeface="Courier New" panose="02070309020205020404" pitchFamily="49" charset="0"/>
+                <a:cs typeface="Courier New" panose="02070309020205020404" pitchFamily="49" charset="0"/>
+              </a:rPr>
+              <a:t>unregisterReceiver</a:t>
+            </a:r>
+            <a:r>
+              <a:rPr lang="it-IT" sz="2400" dirty="0">
+                <a:latin typeface="Courier New" panose="02070309020205020404" pitchFamily="49" charset="0"/>
+                <a:cs typeface="Courier New" panose="02070309020205020404" pitchFamily="49" charset="0"/>
+              </a:rPr>
+              <a:t>()</a:t>
             </a:r>
             <a:r>
               <a:rPr lang="it-IT" sz="2400" dirty="0"/>
-              <a:t>: durante </a:t>
+              <a:t> è da chiamare sempre dopo </a:t>
             </a:r>
             <a:r>
               <a:rPr lang="it-IT" sz="2400" dirty="0" err="1">
                 <a:latin typeface="Courier New" panose="02070309020205020404" pitchFamily="49" charset="0"/>
                 <a:cs typeface="Courier New" panose="02070309020205020404" pitchFamily="49" charset="0"/>
               </a:rPr>
-              <a:t>onStart</a:t>
+              <a:t>registerReceiver</a:t>
             </a:r>
             <a:r>
               <a:rPr lang="it-IT" sz="2400" dirty="0">
@@ -9708,14 +9771,14 @@
             </a:r>
             <a:r>
               <a:rPr lang="it-IT" sz="2400" dirty="0"/>
-              <a:t> e </a:t>
+              <a:t>, ma non durante </a:t>
             </a:r>
             <a:r>
               <a:rPr lang="it-IT" sz="2400" dirty="0" err="1">
                 <a:latin typeface="Courier New" panose="02070309020205020404" pitchFamily="49" charset="0"/>
                 <a:cs typeface="Courier New" panose="02070309020205020404" pitchFamily="49" charset="0"/>
               </a:rPr>
-              <a:t>onStop</a:t>
+              <a:t>onSaveInstanceState</a:t>
             </a:r>
             <a:r>
               <a:rPr lang="it-IT" sz="2400" dirty="0">
@@ -9727,16 +9790,75 @@
           </a:p>
           <a:p>
             <a:pPr marL="742950" lvl="1" indent="-285750">
+              <a:spcAft>
+                <a:spcPts val="1200"/>
+              </a:spcAft>
               <a:buFont typeface="Arial"/>
               <a:buChar char="•"/>
             </a:pPr>
             <a:r>
               <a:rPr lang="it-IT" sz="2400" dirty="0"/>
+              <a:t>Best </a:t>
+            </a:r>
+            <a:r>
+              <a:rPr lang="it-IT" sz="2400" dirty="0" err="1"/>
+              <a:t>Practices</a:t>
+            </a:r>
+            <a:r>
+              <a:rPr lang="it-IT" sz="2400" dirty="0"/>
+              <a:t>: durante </a:t>
+            </a:r>
+            <a:r>
+              <a:rPr lang="it-IT" sz="2400" dirty="0" err="1">
+                <a:latin typeface="Courier New" panose="02070309020205020404" pitchFamily="49" charset="0"/>
+                <a:cs typeface="Courier New" panose="02070309020205020404" pitchFamily="49" charset="0"/>
+              </a:rPr>
+              <a:t>onStart</a:t>
+            </a:r>
+            <a:r>
+              <a:rPr lang="it-IT" sz="2400" dirty="0">
+                <a:latin typeface="Courier New" panose="02070309020205020404" pitchFamily="49" charset="0"/>
+                <a:cs typeface="Courier New" panose="02070309020205020404" pitchFamily="49" charset="0"/>
+              </a:rPr>
+              <a:t>()</a:t>
+            </a:r>
+            <a:r>
+              <a:rPr lang="it-IT" sz="2400" dirty="0"/>
+              <a:t> e </a:t>
+            </a:r>
+            <a:r>
+              <a:rPr lang="it-IT" sz="2400" dirty="0" err="1">
+                <a:latin typeface="Courier New" panose="02070309020205020404" pitchFamily="49" charset="0"/>
+                <a:cs typeface="Courier New" panose="02070309020205020404" pitchFamily="49" charset="0"/>
+              </a:rPr>
+              <a:t>onStop</a:t>
+            </a:r>
+            <a:r>
+              <a:rPr lang="it-IT" sz="2400" dirty="0">
+                <a:latin typeface="Courier New" panose="02070309020205020404" pitchFamily="49" charset="0"/>
+                <a:cs typeface="Courier New" panose="02070309020205020404" pitchFamily="49" charset="0"/>
+              </a:rPr>
+              <a:t>()</a:t>
+            </a:r>
+          </a:p>
+          <a:p>
+            <a:pPr marL="742950" lvl="1" indent="-285750">
+              <a:spcAft>
+                <a:spcPts val="1200"/>
+              </a:spcAft>
+              <a:buFont typeface="Arial"/>
+              <a:buChar char="•"/>
+            </a:pPr>
+            <a:r>
+              <a:rPr lang="it-IT" sz="2400" dirty="0"/>
               <a:t>Doppia Acquisizione: in questo caso non causa problemi, ma utile controllare il doppio rilascio</a:t>
             </a:r>
           </a:p>
           <a:p>
             <a:pPr marL="285750" indent="-285750">
+              <a:spcAft>
+                <a:spcPts val="1200"/>
+              </a:spcAft>
               <a:buFont typeface="Arial"/>
               <a:buChar char="•"/>
             </a:pPr>
@@ -9880,6 +10002,104 @@
           </a:ln>
         </p:spPr>
       </p:pic>
+      <p:sp>
+        <p:nvSpPr>
+          <p:cNvPr id="3" name="TextBox 2"/>
+          <p:cNvSpPr txBox="1"/>
+          <p:nvPr/>
+        </p:nvSpPr>
+        <p:spPr>
+          <a:xfrm>
+            <a:off x="5715180" y="923248"/>
+            <a:ext cx="2121093" cy="369332"/>
+          </a:xfrm>
+          <a:prstGeom prst="rect">
+            <a:avLst/>
+          </a:prstGeom>
+          <a:noFill/>
+        </p:spPr>
+        <p:txBody>
+          <a:bodyPr wrap="none" rtlCol="0">
+            <a:spAutoFit/>
+          </a:bodyPr>
+          <a:lstStyle/>
+          <a:p>
+            <a:r>
+              <a:rPr lang="en-US" b="1" dirty="0">
+                <a:solidFill>
+                  <a:schemeClr val="bg1"/>
+                </a:solidFill>
+              </a:rPr>
+              <a:t>App “</a:t>
+            </a:r>
+            <a:r>
+              <a:rPr lang="en-US" b="1" dirty="0" err="1">
+                <a:solidFill>
+                  <a:schemeClr val="bg1"/>
+                </a:solidFill>
+              </a:rPr>
+              <a:t>InTheClear</a:t>
+            </a:r>
+            <a:r>
+              <a:rPr lang="en-US" b="1" dirty="0">
+                <a:solidFill>
+                  <a:schemeClr val="bg1"/>
+                </a:solidFill>
+              </a:rPr>
+              <a:t>”</a:t>
+            </a:r>
+          </a:p>
+        </p:txBody>
+      </p:sp>
+      <p:sp>
+        <p:nvSpPr>
+          <p:cNvPr id="6" name="TextBox 5"/>
+          <p:cNvSpPr txBox="1"/>
+          <p:nvPr/>
+        </p:nvSpPr>
+        <p:spPr>
+          <a:xfrm>
+            <a:off x="6635001" y="3924728"/>
+            <a:ext cx="2249398" cy="369332"/>
+          </a:xfrm>
+          <a:prstGeom prst="rect">
+            <a:avLst/>
+          </a:prstGeom>
+          <a:noFill/>
+        </p:spPr>
+        <p:txBody>
+          <a:bodyPr wrap="none" rtlCol="0">
+            <a:spAutoFit/>
+          </a:bodyPr>
+          <a:lstStyle/>
+          <a:p>
+            <a:r>
+              <a:rPr lang="en-US" b="1" dirty="0">
+                <a:solidFill>
+                  <a:schemeClr val="bg1"/>
+                </a:solidFill>
+              </a:rPr>
+              <a:t>App “</a:t>
+            </a:r>
+            <a:r>
+              <a:rPr lang="en-US" b="1" dirty="0" err="1">
+                <a:solidFill>
+                  <a:schemeClr val="bg1"/>
+                </a:solidFill>
+              </a:rPr>
+              <a:t>TrackBuddy</a:t>
+            </a:r>
+            <a:r>
+              <a:rPr lang="en-US" b="1" dirty="0">
+                <a:solidFill>
+                  <a:schemeClr val="bg1"/>
+                </a:solidFill>
+              </a:rPr>
+              <a:t>”</a:t>
+            </a:r>
+          </a:p>
+        </p:txBody>
+      </p:sp>
     </p:spTree>
     <p:custDataLst>
       <p:tags r:id="rId1"/>
@@ -9951,8 +10171,8 @@
         </p:nvSpPr>
         <p:spPr>
           <a:xfrm>
-            <a:off x="299798" y="1185506"/>
-            <a:ext cx="7642125" cy="3785652"/>
+            <a:off x="299798" y="1144410"/>
+            <a:ext cx="8556526" cy="5232202"/>
           </a:xfrm>
           <a:prstGeom prst="rect">
             <a:avLst/>
@@ -9966,6 +10186,9 @@
           <a:lstStyle/>
           <a:p>
             <a:pPr marL="285750" indent="-285750">
+              <a:spcAft>
+                <a:spcPts val="1200"/>
+              </a:spcAft>
               <a:buFont typeface="Arial"/>
               <a:buChar char="•"/>
             </a:pPr>
@@ -9976,16 +10199,22 @@
           </a:p>
           <a:p>
             <a:pPr marL="285750" indent="-285750">
+              <a:spcAft>
+                <a:spcPts val="1200"/>
+              </a:spcAft>
               <a:buFont typeface="Arial"/>
               <a:buChar char="•"/>
             </a:pPr>
             <a:r>
               <a:rPr lang="it-IT" sz="2400" dirty="0"/>
-              <a:t>Libreria che fornisce test per il lifecycle</a:t>
+              <a:t>Libreria che permette di controllare facilmente le transizioni del lifecycle</a:t>
             </a:r>
           </a:p>
           <a:p>
             <a:pPr marL="285750" indent="-285750">
+              <a:spcAft>
+                <a:spcPts val="1200"/>
+              </a:spcAft>
               <a:buFont typeface="Arial"/>
               <a:buChar char="•"/>
             </a:pPr>
@@ -10003,67 +10232,78 @@
             </a:r>
           </a:p>
           <a:p>
-            <a:pPr marL="285750" indent="-285750">
+            <a:pPr marL="742950" lvl="1" indent="-285750">
+              <a:spcAft>
+                <a:spcPts val="1200"/>
+              </a:spcAft>
               <a:buFont typeface="Arial"/>
               <a:buChar char="•"/>
             </a:pPr>
             <a:r>
               <a:rPr lang="it-IT" sz="2400" dirty="0"/>
-              <a:t>Disponibile per</a:t>
-            </a:r>
-          </a:p>
-          <a:p>
-            <a:pPr marL="742950" lvl="1" indent="-285750">
+              <a:t>es. azioni/controlli prima di mettere in pausa, controlli durante la pausa e azioni/controlli dopo la pausa</a:t>
+            </a:r>
+          </a:p>
+          <a:p>
+            <a:pPr marL="285750" indent="-285750">
+              <a:spcAft>
+                <a:spcPts val="1200"/>
+              </a:spcAft>
               <a:buFont typeface="Arial"/>
               <a:buChar char="•"/>
             </a:pPr>
             <a:r>
               <a:rPr lang="it-IT" sz="2400" dirty="0"/>
-              <a:t>Unit Testing tramite </a:t>
-            </a:r>
-            <a:r>
-              <a:rPr lang="it-IT" sz="2400" dirty="0" err="1"/>
-              <a:t>Instrumentation</a:t>
-            </a:r>
-            <a:endParaRPr lang="it-IT" sz="2400" dirty="0"/>
+              <a:t>Disponibile per</a:t>
+            </a:r>
           </a:p>
           <a:p>
             <a:pPr marL="742950" lvl="1" indent="-285750">
+              <a:spcAft>
+                <a:spcPts val="1200"/>
+              </a:spcAft>
               <a:buFont typeface="Arial"/>
               <a:buChar char="•"/>
             </a:pPr>
             <a:r>
               <a:rPr lang="it-IT" sz="2400" dirty="0"/>
-              <a:t>UI Testing con Android Espresso</a:t>
-            </a:r>
+              <a:t>Unit Testing tramite </a:t>
+            </a:r>
+            <a:r>
+              <a:rPr lang="it-IT" sz="2400" dirty="0" err="1"/>
+              <a:t>Instrumentation</a:t>
+            </a:r>
+            <a:endParaRPr lang="it-IT" sz="2400" dirty="0"/>
           </a:p>
           <a:p>
             <a:pPr marL="742950" lvl="1" indent="-285750">
+              <a:spcAft>
+                <a:spcPts val="1200"/>
+              </a:spcAft>
               <a:buFont typeface="Arial"/>
               <a:buChar char="•"/>
             </a:pPr>
             <a:r>
               <a:rPr lang="it-IT" sz="2400" dirty="0"/>
-              <a:t>Unit Testing tramite </a:t>
-            </a:r>
-            <a:r>
-              <a:rPr lang="it-IT" sz="2400" dirty="0" err="1"/>
-              <a:t>Robolectric</a:t>
-            </a:r>
-            <a:endParaRPr lang="it-IT" sz="2400" dirty="0"/>
+              <a:t>UI Testing con Android Espresso</a:t>
+            </a:r>
           </a:p>
           <a:p>
             <a:pPr marL="742950" lvl="1" indent="-285750">
+              <a:spcAft>
+                <a:spcPts val="1200"/>
+              </a:spcAft>
               <a:buFont typeface="Arial"/>
               <a:buChar char="•"/>
             </a:pPr>
-            <a:endParaRPr lang="it-IT" sz="2400" dirty="0"/>
-          </a:p>
-          <a:p>
-            <a:pPr marL="742950" lvl="1" indent="-285750">
-              <a:buFont typeface="Arial"/>
-              <a:buChar char="•"/>
-            </a:pPr>
+            <a:r>
+              <a:rPr lang="it-IT" sz="2400" dirty="0"/>
+              <a:t>Unit Testing tramite </a:t>
+            </a:r>
+            <a:r>
+              <a:rPr lang="it-IT" sz="2400" dirty="0" err="1"/>
+              <a:t>Robolectric</a:t>
+            </a:r>
             <a:endParaRPr lang="it-IT" sz="2400" dirty="0"/>
           </a:p>
         </p:txBody>
@@ -10111,6 +10351,2153 @@
       </p:grpSpPr>
       <p:sp>
         <p:nvSpPr>
+          <p:cNvPr id="6" name="Rectangle 2"/>
+          <p:cNvSpPr>
+            <a:spLocks noChangeArrowheads="1"/>
+          </p:cNvSpPr>
+          <p:nvPr/>
+        </p:nvSpPr>
+        <p:spPr bwMode="auto">
+          <a:xfrm>
+            <a:off x="534256" y="1294958"/>
+            <a:ext cx="7359275" cy="5447645"/>
+          </a:xfrm>
+          <a:prstGeom prst="rect">
+            <a:avLst/>
+          </a:prstGeom>
+          <a:noFill/>
+          <a:ln>
+            <a:noFill/>
+          </a:ln>
+          <a:effectLst/>
+        </p:spPr>
+        <p:txBody>
+          <a:bodyPr vert="horz" wrap="square" lIns="91440" tIns="45720" rIns="91440" bIns="45720" numCol="1" anchor="ctr" anchorCtr="0" compatLnSpc="1">
+            <a:prstTxWarp prst="textNoShape">
+              <a:avLst/>
+            </a:prstTxWarp>
+            <a:spAutoFit/>
+          </a:bodyPr>
+          <a:lstStyle/>
+          <a:p>
+            <a:pPr marL="0" marR="0" lvl="0" indent="0" algn="l" defTabSz="914400" rtl="0" eaLnBrk="0" fontAlgn="base" latinLnBrk="0" hangingPunct="0">
+              <a:lnSpc>
+                <a:spcPct val="100000"/>
+              </a:lnSpc>
+              <a:spcBef>
+                <a:spcPct val="0"/>
+              </a:spcBef>
+              <a:spcAft>
+                <a:spcPct val="0"/>
+              </a:spcAft>
+              <a:buClrTx/>
+              <a:buSzTx/>
+              <a:buFontTx/>
+              <a:buNone/>
+              <a:tabLst/>
+            </a:pPr>
+            <a:r>
+              <a:rPr kumimoji="0" lang="en-US" altLang="en-US" sz="1200" b="1" i="0" u="none" strike="noStrike" cap="none" normalizeH="0" baseline="0" dirty="0">
+                <a:ln>
+                  <a:noFill/>
+                </a:ln>
+                <a:solidFill>
+                  <a:srgbClr val="000080"/>
+                </a:solidFill>
+                <a:effectLst/>
+                <a:latin typeface="Courier New" panose="02070309020205020404" pitchFamily="49" charset="0"/>
+                <a:cs typeface="Courier New" panose="02070309020205020404" pitchFamily="49" charset="0"/>
+              </a:rPr>
+              <a:t>public </a:t>
+            </a:r>
+            <a:r>
+              <a:rPr kumimoji="0" lang="en-US" altLang="en-US" sz="1200" b="0" i="0" u="none" strike="noStrike" cap="none" normalizeH="0" baseline="0" dirty="0" err="1">
+                <a:ln>
+                  <a:noFill/>
+                </a:ln>
+                <a:solidFill>
+                  <a:srgbClr val="000000"/>
+                </a:solidFill>
+                <a:effectLst/>
+                <a:latin typeface="Courier New" panose="02070309020205020404" pitchFamily="49" charset="0"/>
+                <a:cs typeface="Courier New" panose="02070309020205020404" pitchFamily="49" charset="0"/>
+              </a:rPr>
+              <a:t>RotationCallback</a:t>
+            </a:r>
+            <a:r>
+              <a:rPr kumimoji="0" lang="en-US" altLang="en-US" sz="1200" b="0" i="0" u="none" strike="noStrike" cap="none" normalizeH="0" baseline="0" dirty="0">
+                <a:ln>
+                  <a:noFill/>
+                </a:ln>
+                <a:solidFill>
+                  <a:srgbClr val="000000"/>
+                </a:solidFill>
+                <a:effectLst/>
+                <a:latin typeface="Courier New" panose="02070309020205020404" pitchFamily="49" charset="0"/>
+                <a:cs typeface="Courier New" panose="02070309020205020404" pitchFamily="49" charset="0"/>
+              </a:rPr>
+              <a:t> </a:t>
+            </a:r>
+            <a:r>
+              <a:rPr kumimoji="0" lang="en-US" altLang="en-US" sz="1200" b="0" i="0" u="none" strike="noStrike" cap="none" normalizeH="0" baseline="0" dirty="0" err="1">
+                <a:ln>
+                  <a:noFill/>
+                </a:ln>
+                <a:solidFill>
+                  <a:srgbClr val="000000"/>
+                </a:solidFill>
+                <a:effectLst/>
+                <a:latin typeface="Courier New" panose="02070309020205020404" pitchFamily="49" charset="0"/>
+                <a:cs typeface="Courier New" panose="02070309020205020404" pitchFamily="49" charset="0"/>
+              </a:rPr>
+              <a:t>testRotation</a:t>
+            </a:r>
+            <a:r>
+              <a:rPr kumimoji="0" lang="en-US" altLang="en-US" sz="1200" b="0" i="0" u="none" strike="noStrike" cap="none" normalizeH="0" baseline="0" dirty="0">
+                <a:ln>
+                  <a:noFill/>
+                </a:ln>
+                <a:solidFill>
+                  <a:srgbClr val="000000"/>
+                </a:solidFill>
+                <a:effectLst/>
+                <a:latin typeface="Courier New" panose="02070309020205020404" pitchFamily="49" charset="0"/>
+                <a:cs typeface="Courier New" panose="02070309020205020404" pitchFamily="49" charset="0"/>
+              </a:rPr>
+              <a:t>() {</a:t>
+            </a:r>
+            <a:br>
+              <a:rPr kumimoji="0" lang="en-US" altLang="en-US" sz="1200" b="0" i="0" u="none" strike="noStrike" cap="none" normalizeH="0" baseline="0" dirty="0">
+                <a:ln>
+                  <a:noFill/>
+                </a:ln>
+                <a:solidFill>
+                  <a:srgbClr val="000000"/>
+                </a:solidFill>
+                <a:effectLst/>
+                <a:latin typeface="Courier New" panose="02070309020205020404" pitchFamily="49" charset="0"/>
+                <a:cs typeface="Courier New" panose="02070309020205020404" pitchFamily="49" charset="0"/>
+              </a:rPr>
+            </a:br>
+            <a:r>
+              <a:rPr kumimoji="0" lang="en-US" altLang="en-US" sz="1200" b="0" i="0" u="none" strike="noStrike" cap="none" normalizeH="0" baseline="0" dirty="0">
+                <a:ln>
+                  <a:noFill/>
+                </a:ln>
+                <a:solidFill>
+                  <a:srgbClr val="000000"/>
+                </a:solidFill>
+                <a:effectLst/>
+                <a:latin typeface="Courier New" panose="02070309020205020404" pitchFamily="49" charset="0"/>
+                <a:cs typeface="Courier New" panose="02070309020205020404" pitchFamily="49" charset="0"/>
+              </a:rPr>
+              <a:t>    </a:t>
+            </a:r>
+            <a:r>
+              <a:rPr kumimoji="0" lang="en-US" altLang="en-US" sz="1200" b="1" i="0" u="none" strike="noStrike" cap="none" normalizeH="0" baseline="0" dirty="0">
+                <a:ln>
+                  <a:noFill/>
+                </a:ln>
+                <a:solidFill>
+                  <a:srgbClr val="000080"/>
+                </a:solidFill>
+                <a:effectLst/>
+                <a:latin typeface="Courier New" panose="02070309020205020404" pitchFamily="49" charset="0"/>
+                <a:cs typeface="Courier New" panose="02070309020205020404" pitchFamily="49" charset="0"/>
+              </a:rPr>
+              <a:t>return new </a:t>
+            </a:r>
+            <a:r>
+              <a:rPr kumimoji="0" lang="en-US" altLang="en-US" sz="1200" b="0" i="0" u="none" strike="noStrike" cap="none" normalizeH="0" baseline="0" dirty="0" err="1">
+                <a:ln>
+                  <a:noFill/>
+                </a:ln>
+                <a:solidFill>
+                  <a:srgbClr val="000000"/>
+                </a:solidFill>
+                <a:effectLst/>
+                <a:latin typeface="Courier New" panose="02070309020205020404" pitchFamily="49" charset="0"/>
+                <a:cs typeface="Courier New" panose="02070309020205020404" pitchFamily="49" charset="0"/>
+              </a:rPr>
+              <a:t>RotationCallback</a:t>
+            </a:r>
+            <a:r>
+              <a:rPr kumimoji="0" lang="en-US" altLang="en-US" sz="1200" b="0" i="0" u="none" strike="noStrike" cap="none" normalizeH="0" baseline="0" dirty="0">
+                <a:ln>
+                  <a:noFill/>
+                </a:ln>
+                <a:solidFill>
+                  <a:srgbClr val="000000"/>
+                </a:solidFill>
+                <a:effectLst/>
+                <a:latin typeface="Courier New" panose="02070309020205020404" pitchFamily="49" charset="0"/>
+                <a:cs typeface="Courier New" panose="02070309020205020404" pitchFamily="49" charset="0"/>
+              </a:rPr>
+              <a:t>() {</a:t>
+            </a:r>
+            <a:br>
+              <a:rPr kumimoji="0" lang="en-US" altLang="en-US" sz="1200" b="0" i="0" u="none" strike="noStrike" cap="none" normalizeH="0" baseline="0" dirty="0">
+                <a:ln>
+                  <a:noFill/>
+                </a:ln>
+                <a:solidFill>
+                  <a:srgbClr val="000000"/>
+                </a:solidFill>
+                <a:effectLst/>
+                <a:latin typeface="Courier New" panose="02070309020205020404" pitchFamily="49" charset="0"/>
+                <a:cs typeface="Courier New" panose="02070309020205020404" pitchFamily="49" charset="0"/>
+              </a:rPr>
+            </a:br>
+            <a:r>
+              <a:rPr kumimoji="0" lang="en-US" altLang="en-US" sz="1200" b="0" i="0" u="none" strike="noStrike" cap="none" normalizeH="0" baseline="0" dirty="0">
+                <a:ln>
+                  <a:noFill/>
+                </a:ln>
+                <a:solidFill>
+                  <a:srgbClr val="000000"/>
+                </a:solidFill>
+                <a:effectLst/>
+                <a:latin typeface="Courier New" panose="02070309020205020404" pitchFamily="49" charset="0"/>
+                <a:cs typeface="Courier New" panose="02070309020205020404" pitchFamily="49" charset="0"/>
+              </a:rPr>
+              <a:t>        </a:t>
+            </a:r>
+            <a:r>
+              <a:rPr kumimoji="0" lang="en-US" altLang="en-US" sz="1200" b="1" i="0" u="none" strike="noStrike" cap="none" normalizeH="0" baseline="0" dirty="0">
+                <a:ln>
+                  <a:noFill/>
+                </a:ln>
+                <a:solidFill>
+                  <a:srgbClr val="000080"/>
+                </a:solidFill>
+                <a:effectLst/>
+                <a:latin typeface="Courier New" panose="02070309020205020404" pitchFamily="49" charset="0"/>
+                <a:cs typeface="Courier New" panose="02070309020205020404" pitchFamily="49" charset="0"/>
+              </a:rPr>
+              <a:t>private </a:t>
+            </a:r>
+            <a:r>
+              <a:rPr kumimoji="0" lang="en-US" altLang="en-US" sz="1200" b="0" i="0" u="none" strike="noStrike" cap="none" normalizeH="0" baseline="0" dirty="0">
+                <a:ln>
+                  <a:noFill/>
+                </a:ln>
+                <a:solidFill>
+                  <a:srgbClr val="000000"/>
+                </a:solidFill>
+                <a:effectLst/>
+                <a:latin typeface="Courier New" panose="02070309020205020404" pitchFamily="49" charset="0"/>
+                <a:cs typeface="Courier New" panose="02070309020205020404" pitchFamily="49" charset="0"/>
+              </a:rPr>
+              <a:t>String </a:t>
+            </a:r>
+            <a:r>
+              <a:rPr kumimoji="0" lang="en-US" altLang="en-US" sz="1200" b="1" i="0" u="none" strike="noStrike" cap="none" normalizeH="0" baseline="0" dirty="0">
+                <a:ln>
+                  <a:noFill/>
+                </a:ln>
+                <a:solidFill>
+                  <a:srgbClr val="660E7A"/>
+                </a:solidFill>
+                <a:effectLst/>
+                <a:latin typeface="Courier New" panose="02070309020205020404" pitchFamily="49" charset="0"/>
+                <a:cs typeface="Courier New" panose="02070309020205020404" pitchFamily="49" charset="0"/>
+              </a:rPr>
+              <a:t>name</a:t>
+            </a:r>
+            <a:r>
+              <a:rPr kumimoji="0" lang="en-US" altLang="en-US" sz="1200" b="0" i="0" u="none" strike="noStrike" cap="none" normalizeH="0" baseline="0" dirty="0">
+                <a:ln>
+                  <a:noFill/>
+                </a:ln>
+                <a:solidFill>
+                  <a:srgbClr val="000000"/>
+                </a:solidFill>
+                <a:effectLst/>
+                <a:latin typeface="Courier New" panose="02070309020205020404" pitchFamily="49" charset="0"/>
+                <a:cs typeface="Courier New" panose="02070309020205020404" pitchFamily="49" charset="0"/>
+              </a:rPr>
+              <a:t>;</a:t>
+            </a:r>
+            <a:br>
+              <a:rPr kumimoji="0" lang="en-US" altLang="en-US" sz="1200" b="0" i="0" u="none" strike="noStrike" cap="none" normalizeH="0" baseline="0" dirty="0">
+                <a:ln>
+                  <a:noFill/>
+                </a:ln>
+                <a:solidFill>
+                  <a:srgbClr val="000000"/>
+                </a:solidFill>
+                <a:effectLst/>
+                <a:latin typeface="Courier New" panose="02070309020205020404" pitchFamily="49" charset="0"/>
+                <a:cs typeface="Courier New" panose="02070309020205020404" pitchFamily="49" charset="0"/>
+              </a:rPr>
+            </a:br>
+            <a:br>
+              <a:rPr kumimoji="0" lang="en-US" altLang="en-US" sz="1200" b="0" i="0" u="none" strike="noStrike" cap="none" normalizeH="0" baseline="0" dirty="0">
+                <a:ln>
+                  <a:noFill/>
+                </a:ln>
+                <a:solidFill>
+                  <a:srgbClr val="000000"/>
+                </a:solidFill>
+                <a:effectLst/>
+                <a:latin typeface="Courier New" panose="02070309020205020404" pitchFamily="49" charset="0"/>
+                <a:cs typeface="Courier New" panose="02070309020205020404" pitchFamily="49" charset="0"/>
+              </a:rPr>
+            </a:br>
+            <a:r>
+              <a:rPr kumimoji="0" lang="en-US" altLang="en-US" sz="1200" b="0" i="0" u="none" strike="noStrike" cap="none" normalizeH="0" baseline="0" dirty="0">
+                <a:ln>
+                  <a:noFill/>
+                </a:ln>
+                <a:solidFill>
+                  <a:srgbClr val="000000"/>
+                </a:solidFill>
+                <a:effectLst/>
+                <a:latin typeface="Courier New" panose="02070309020205020404" pitchFamily="49" charset="0"/>
+                <a:cs typeface="Courier New" panose="02070309020205020404" pitchFamily="49" charset="0"/>
+              </a:rPr>
+              <a:t>        </a:t>
+            </a:r>
+            <a:r>
+              <a:rPr kumimoji="0" lang="en-US" altLang="en-US" sz="1200" b="0" i="0" u="none" strike="noStrike" cap="none" normalizeH="0" baseline="0" dirty="0">
+                <a:ln>
+                  <a:noFill/>
+                </a:ln>
+                <a:solidFill>
+                  <a:srgbClr val="808000"/>
+                </a:solidFill>
+                <a:effectLst/>
+                <a:latin typeface="Courier New" panose="02070309020205020404" pitchFamily="49" charset="0"/>
+                <a:cs typeface="Courier New" panose="02070309020205020404" pitchFamily="49" charset="0"/>
+              </a:rPr>
+              <a:t>@Override</a:t>
+            </a:r>
+            <a:br>
+              <a:rPr kumimoji="0" lang="en-US" altLang="en-US" sz="1200" b="0" i="0" u="none" strike="noStrike" cap="none" normalizeH="0" baseline="0" dirty="0">
+                <a:ln>
+                  <a:noFill/>
+                </a:ln>
+                <a:solidFill>
+                  <a:srgbClr val="808000"/>
+                </a:solidFill>
+                <a:effectLst/>
+                <a:latin typeface="Courier New" panose="02070309020205020404" pitchFamily="49" charset="0"/>
+                <a:cs typeface="Courier New" panose="02070309020205020404" pitchFamily="49" charset="0"/>
+              </a:rPr>
+            </a:br>
+            <a:r>
+              <a:rPr kumimoji="0" lang="en-US" altLang="en-US" sz="1200" b="0" i="0" u="none" strike="noStrike" cap="none" normalizeH="0" baseline="0" dirty="0">
+                <a:ln>
+                  <a:noFill/>
+                </a:ln>
+                <a:solidFill>
+                  <a:srgbClr val="808000"/>
+                </a:solidFill>
+                <a:effectLst/>
+                <a:latin typeface="Courier New" panose="02070309020205020404" pitchFamily="49" charset="0"/>
+                <a:cs typeface="Courier New" panose="02070309020205020404" pitchFamily="49" charset="0"/>
+              </a:rPr>
+              <a:t>        </a:t>
+            </a:r>
+            <a:r>
+              <a:rPr kumimoji="0" lang="en-US" altLang="en-US" sz="1200" b="1" i="0" u="none" strike="noStrike" cap="none" normalizeH="0" baseline="0" dirty="0">
+                <a:ln>
+                  <a:noFill/>
+                </a:ln>
+                <a:solidFill>
+                  <a:srgbClr val="000080"/>
+                </a:solidFill>
+                <a:effectLst/>
+                <a:latin typeface="Courier New" panose="02070309020205020404" pitchFamily="49" charset="0"/>
+                <a:cs typeface="Courier New" panose="02070309020205020404" pitchFamily="49" charset="0"/>
+              </a:rPr>
+              <a:t>public void </a:t>
+            </a:r>
+            <a:r>
+              <a:rPr kumimoji="0" lang="en-US" altLang="en-US" sz="1200" b="0" i="0" u="none" strike="noStrike" cap="none" normalizeH="0" baseline="0" dirty="0" err="1">
+                <a:ln>
+                  <a:noFill/>
+                </a:ln>
+                <a:solidFill>
+                  <a:srgbClr val="000000"/>
+                </a:solidFill>
+                <a:effectLst/>
+                <a:latin typeface="Courier New" panose="02070309020205020404" pitchFamily="49" charset="0"/>
+                <a:cs typeface="Courier New" panose="02070309020205020404" pitchFamily="49" charset="0"/>
+              </a:rPr>
+              <a:t>beforeRotation</a:t>
+            </a:r>
+            <a:r>
+              <a:rPr kumimoji="0" lang="en-US" altLang="en-US" sz="1200" b="0" i="0" u="none" strike="noStrike" cap="none" normalizeH="0" baseline="0" dirty="0">
+                <a:ln>
+                  <a:noFill/>
+                </a:ln>
+                <a:solidFill>
+                  <a:srgbClr val="000000"/>
+                </a:solidFill>
+                <a:effectLst/>
+                <a:latin typeface="Courier New" panose="02070309020205020404" pitchFamily="49" charset="0"/>
+                <a:cs typeface="Courier New" panose="02070309020205020404" pitchFamily="49" charset="0"/>
+              </a:rPr>
+              <a:t>() {</a:t>
+            </a:r>
+            <a:br>
+              <a:rPr kumimoji="0" lang="en-US" altLang="en-US" sz="1200" b="0" i="0" u="none" strike="noStrike" cap="none" normalizeH="0" baseline="0" dirty="0">
+                <a:ln>
+                  <a:noFill/>
+                </a:ln>
+                <a:solidFill>
+                  <a:srgbClr val="000000"/>
+                </a:solidFill>
+                <a:effectLst/>
+                <a:latin typeface="Courier New" panose="02070309020205020404" pitchFamily="49" charset="0"/>
+                <a:cs typeface="Courier New" panose="02070309020205020404" pitchFamily="49" charset="0"/>
+              </a:rPr>
+            </a:br>
+            <a:r>
+              <a:rPr kumimoji="0" lang="en-US" altLang="en-US" sz="1200" b="0" i="0" u="none" strike="noStrike" cap="none" normalizeH="0" baseline="0" dirty="0">
+                <a:ln>
+                  <a:noFill/>
+                </a:ln>
+                <a:solidFill>
+                  <a:srgbClr val="000000"/>
+                </a:solidFill>
+                <a:effectLst/>
+                <a:latin typeface="Courier New" panose="02070309020205020404" pitchFamily="49" charset="0"/>
+                <a:cs typeface="Courier New" panose="02070309020205020404" pitchFamily="49" charset="0"/>
+              </a:rPr>
+              <a:t>            </a:t>
+            </a:r>
+            <a:r>
+              <a:rPr kumimoji="0" lang="en-US" altLang="en-US" sz="1200" b="0" i="1" u="none" strike="noStrike" cap="none" normalizeH="0" baseline="0" dirty="0" err="1">
+                <a:ln>
+                  <a:noFill/>
+                </a:ln>
+                <a:solidFill>
+                  <a:srgbClr val="000000"/>
+                </a:solidFill>
+                <a:effectLst/>
+                <a:latin typeface="Courier New" panose="02070309020205020404" pitchFamily="49" charset="0"/>
+                <a:cs typeface="Courier New" panose="02070309020205020404" pitchFamily="49" charset="0"/>
+              </a:rPr>
+              <a:t>onView</a:t>
+            </a:r>
+            <a:r>
+              <a:rPr kumimoji="0" lang="en-US" altLang="en-US" sz="1200" b="0" i="0" u="none" strike="noStrike" cap="none" normalizeH="0" baseline="0" dirty="0">
+                <a:ln>
+                  <a:noFill/>
+                </a:ln>
+                <a:solidFill>
+                  <a:srgbClr val="000000"/>
+                </a:solidFill>
+                <a:effectLst/>
+                <a:latin typeface="Courier New" panose="02070309020205020404" pitchFamily="49" charset="0"/>
+                <a:cs typeface="Courier New" panose="02070309020205020404" pitchFamily="49" charset="0"/>
+              </a:rPr>
+              <a:t>(</a:t>
+            </a:r>
+            <a:r>
+              <a:rPr kumimoji="0" lang="en-US" altLang="en-US" sz="1200" b="0" i="1" u="none" strike="noStrike" cap="none" normalizeH="0" baseline="0" dirty="0" err="1">
+                <a:ln>
+                  <a:noFill/>
+                </a:ln>
+                <a:solidFill>
+                  <a:srgbClr val="000000"/>
+                </a:solidFill>
+                <a:effectLst/>
+                <a:latin typeface="Courier New" panose="02070309020205020404" pitchFamily="49" charset="0"/>
+                <a:cs typeface="Courier New" panose="02070309020205020404" pitchFamily="49" charset="0"/>
+              </a:rPr>
+              <a:t>withId</a:t>
+            </a:r>
+            <a:r>
+              <a:rPr kumimoji="0" lang="en-US" altLang="en-US" sz="1200" b="0" i="0" u="none" strike="noStrike" cap="none" normalizeH="0" baseline="0" dirty="0">
+                <a:ln>
+                  <a:noFill/>
+                </a:ln>
+                <a:solidFill>
+                  <a:srgbClr val="000000"/>
+                </a:solidFill>
+                <a:effectLst/>
+                <a:latin typeface="Courier New" panose="02070309020205020404" pitchFamily="49" charset="0"/>
+                <a:cs typeface="Courier New" panose="02070309020205020404" pitchFamily="49" charset="0"/>
+              </a:rPr>
+              <a:t>(</a:t>
+            </a:r>
+            <a:r>
+              <a:rPr kumimoji="0" lang="en-US" altLang="en-US" sz="1200" b="0" i="0" u="none" strike="noStrike" cap="none" normalizeH="0" baseline="0" dirty="0" err="1">
+                <a:ln>
+                  <a:noFill/>
+                </a:ln>
+                <a:solidFill>
+                  <a:srgbClr val="000000"/>
+                </a:solidFill>
+                <a:effectLst/>
+                <a:latin typeface="Courier New" panose="02070309020205020404" pitchFamily="49" charset="0"/>
+                <a:cs typeface="Courier New" panose="02070309020205020404" pitchFamily="49" charset="0"/>
+              </a:rPr>
+              <a:t>R.id.</a:t>
+            </a:r>
+            <a:r>
+              <a:rPr kumimoji="0" lang="en-US" altLang="en-US" sz="1200" b="1" i="1" u="none" strike="noStrike" cap="none" normalizeH="0" baseline="0" dirty="0" err="1">
+                <a:ln>
+                  <a:noFill/>
+                </a:ln>
+                <a:solidFill>
+                  <a:srgbClr val="660E7A"/>
+                </a:solidFill>
+                <a:effectLst/>
+                <a:latin typeface="Courier New" panose="02070309020205020404" pitchFamily="49" charset="0"/>
+                <a:cs typeface="Courier New" panose="02070309020205020404" pitchFamily="49" charset="0"/>
+              </a:rPr>
+              <a:t>first_name_row</a:t>
+            </a:r>
+            <a:r>
+              <a:rPr kumimoji="0" lang="en-US" altLang="en-US" sz="1200" b="0" i="0" u="none" strike="noStrike" cap="none" normalizeH="0" baseline="0" dirty="0">
+                <a:ln>
+                  <a:noFill/>
+                </a:ln>
+                <a:solidFill>
+                  <a:srgbClr val="000000"/>
+                </a:solidFill>
+                <a:effectLst/>
+                <a:latin typeface="Courier New" panose="02070309020205020404" pitchFamily="49" charset="0"/>
+                <a:cs typeface="Courier New" panose="02070309020205020404" pitchFamily="49" charset="0"/>
+              </a:rPr>
+              <a:t>))</a:t>
+            </a:r>
+            <a:br>
+              <a:rPr kumimoji="0" lang="en-US" altLang="en-US" sz="1200" b="0" i="0" u="none" strike="noStrike" cap="none" normalizeH="0" baseline="0" dirty="0">
+                <a:ln>
+                  <a:noFill/>
+                </a:ln>
+                <a:solidFill>
+                  <a:srgbClr val="000000"/>
+                </a:solidFill>
+                <a:effectLst/>
+                <a:latin typeface="Courier New" panose="02070309020205020404" pitchFamily="49" charset="0"/>
+                <a:cs typeface="Courier New" panose="02070309020205020404" pitchFamily="49" charset="0"/>
+              </a:rPr>
+            </a:br>
+            <a:r>
+              <a:rPr kumimoji="0" lang="en-US" altLang="en-US" sz="1200" b="0" i="0" u="none" strike="noStrike" cap="none" normalizeH="0" baseline="0" dirty="0">
+                <a:ln>
+                  <a:noFill/>
+                </a:ln>
+                <a:solidFill>
+                  <a:srgbClr val="000000"/>
+                </a:solidFill>
+                <a:effectLst/>
+                <a:latin typeface="Courier New" panose="02070309020205020404" pitchFamily="49" charset="0"/>
+                <a:cs typeface="Courier New" panose="02070309020205020404" pitchFamily="49" charset="0"/>
+              </a:rPr>
+              <a:t>                    .check(</a:t>
+            </a:r>
+            <a:r>
+              <a:rPr kumimoji="0" lang="en-US" altLang="en-US" sz="1200" b="0" i="1" u="none" strike="noStrike" cap="none" normalizeH="0" baseline="0" dirty="0">
+                <a:ln>
+                  <a:noFill/>
+                </a:ln>
+                <a:solidFill>
+                  <a:srgbClr val="000000"/>
+                </a:solidFill>
+                <a:effectLst/>
+                <a:latin typeface="Courier New" panose="02070309020205020404" pitchFamily="49" charset="0"/>
+                <a:cs typeface="Courier New" panose="02070309020205020404" pitchFamily="49" charset="0"/>
+              </a:rPr>
+              <a:t>matches</a:t>
+            </a:r>
+            <a:r>
+              <a:rPr kumimoji="0" lang="en-US" altLang="en-US" sz="1200" b="0" i="0" u="none" strike="noStrike" cap="none" normalizeH="0" baseline="0" dirty="0">
+                <a:ln>
+                  <a:noFill/>
+                </a:ln>
+                <a:solidFill>
+                  <a:srgbClr val="000000"/>
+                </a:solidFill>
+                <a:effectLst/>
+                <a:latin typeface="Courier New" panose="02070309020205020404" pitchFamily="49" charset="0"/>
+                <a:cs typeface="Courier New" panose="02070309020205020404" pitchFamily="49" charset="0"/>
+              </a:rPr>
+              <a:t>(</a:t>
+            </a:r>
+            <a:r>
+              <a:rPr kumimoji="0" lang="en-US" altLang="en-US" sz="1200" b="0" i="1" u="none" strike="noStrike" cap="none" normalizeH="0" baseline="0" dirty="0" err="1">
+                <a:ln>
+                  <a:noFill/>
+                </a:ln>
+                <a:solidFill>
+                  <a:srgbClr val="000000"/>
+                </a:solidFill>
+                <a:effectLst/>
+                <a:latin typeface="Courier New" panose="02070309020205020404" pitchFamily="49" charset="0"/>
+                <a:cs typeface="Courier New" panose="02070309020205020404" pitchFamily="49" charset="0"/>
+              </a:rPr>
+              <a:t>isDisplayed</a:t>
+            </a:r>
+            <a:r>
+              <a:rPr kumimoji="0" lang="en-US" altLang="en-US" sz="1200" b="0" i="0" u="none" strike="noStrike" cap="none" normalizeH="0" baseline="0" dirty="0">
+                <a:ln>
+                  <a:noFill/>
+                </a:ln>
+                <a:solidFill>
+                  <a:srgbClr val="000000"/>
+                </a:solidFill>
+                <a:effectLst/>
+                <a:latin typeface="Courier New" panose="02070309020205020404" pitchFamily="49" charset="0"/>
+                <a:cs typeface="Courier New" panose="02070309020205020404" pitchFamily="49" charset="0"/>
+              </a:rPr>
+              <a:t>()))</a:t>
+            </a:r>
+            <a:br>
+              <a:rPr kumimoji="0" lang="en-US" altLang="en-US" sz="1200" b="0" i="0" u="none" strike="noStrike" cap="none" normalizeH="0" baseline="0" dirty="0">
+                <a:ln>
+                  <a:noFill/>
+                </a:ln>
+                <a:solidFill>
+                  <a:srgbClr val="000000"/>
+                </a:solidFill>
+                <a:effectLst/>
+                <a:latin typeface="Courier New" panose="02070309020205020404" pitchFamily="49" charset="0"/>
+                <a:cs typeface="Courier New" panose="02070309020205020404" pitchFamily="49" charset="0"/>
+              </a:rPr>
+            </a:br>
+            <a:r>
+              <a:rPr kumimoji="0" lang="en-US" altLang="en-US" sz="1200" b="0" i="0" u="none" strike="noStrike" cap="none" normalizeH="0" baseline="0" dirty="0">
+                <a:ln>
+                  <a:noFill/>
+                </a:ln>
+                <a:solidFill>
+                  <a:srgbClr val="000000"/>
+                </a:solidFill>
+                <a:effectLst/>
+                <a:latin typeface="Courier New" panose="02070309020205020404" pitchFamily="49" charset="0"/>
+                <a:cs typeface="Courier New" panose="02070309020205020404" pitchFamily="49" charset="0"/>
+              </a:rPr>
+              <a:t>                    .perform(</a:t>
+            </a:r>
+            <a:r>
+              <a:rPr kumimoji="0" lang="en-US" altLang="en-US" sz="1200" b="0" i="1" u="none" strike="noStrike" cap="none" normalizeH="0" baseline="0" dirty="0">
+                <a:ln>
+                  <a:noFill/>
+                </a:ln>
+                <a:solidFill>
+                  <a:srgbClr val="000000"/>
+                </a:solidFill>
+                <a:effectLst/>
+                <a:latin typeface="Courier New" panose="02070309020205020404" pitchFamily="49" charset="0"/>
+                <a:cs typeface="Courier New" panose="02070309020205020404" pitchFamily="49" charset="0"/>
+              </a:rPr>
+              <a:t>click</a:t>
+            </a:r>
+            <a:r>
+              <a:rPr kumimoji="0" lang="en-US" altLang="en-US" sz="1200" b="0" i="0" u="none" strike="noStrike" cap="none" normalizeH="0" baseline="0" dirty="0">
+                <a:ln>
+                  <a:noFill/>
+                </a:ln>
+                <a:solidFill>
+                  <a:srgbClr val="000000"/>
+                </a:solidFill>
+                <a:effectLst/>
+                <a:latin typeface="Courier New" panose="02070309020205020404" pitchFamily="49" charset="0"/>
+                <a:cs typeface="Courier New" panose="02070309020205020404" pitchFamily="49" charset="0"/>
+              </a:rPr>
+              <a:t>());</a:t>
+            </a:r>
+            <a:br>
+              <a:rPr kumimoji="0" lang="en-US" altLang="en-US" sz="1200" b="0" i="0" u="none" strike="noStrike" cap="none" normalizeH="0" baseline="0" dirty="0">
+                <a:ln>
+                  <a:noFill/>
+                </a:ln>
+                <a:solidFill>
+                  <a:srgbClr val="000000"/>
+                </a:solidFill>
+                <a:effectLst/>
+                <a:latin typeface="Courier New" panose="02070309020205020404" pitchFamily="49" charset="0"/>
+                <a:cs typeface="Courier New" panose="02070309020205020404" pitchFamily="49" charset="0"/>
+              </a:rPr>
+            </a:br>
+            <a:br>
+              <a:rPr kumimoji="0" lang="en-US" altLang="en-US" sz="1200" b="0" i="0" u="none" strike="noStrike" cap="none" normalizeH="0" baseline="0" dirty="0">
+                <a:ln>
+                  <a:noFill/>
+                </a:ln>
+                <a:solidFill>
+                  <a:srgbClr val="000000"/>
+                </a:solidFill>
+                <a:effectLst/>
+                <a:latin typeface="Courier New" panose="02070309020205020404" pitchFamily="49" charset="0"/>
+                <a:cs typeface="Courier New" panose="02070309020205020404" pitchFamily="49" charset="0"/>
+              </a:rPr>
+            </a:br>
+            <a:r>
+              <a:rPr kumimoji="0" lang="en-US" altLang="en-US" sz="1200" b="0" i="0" u="none" strike="noStrike" cap="none" normalizeH="0" baseline="0" dirty="0">
+                <a:ln>
+                  <a:noFill/>
+                </a:ln>
+                <a:solidFill>
+                  <a:srgbClr val="000000"/>
+                </a:solidFill>
+                <a:effectLst/>
+                <a:latin typeface="Courier New" panose="02070309020205020404" pitchFamily="49" charset="0"/>
+                <a:cs typeface="Courier New" panose="02070309020205020404" pitchFamily="49" charset="0"/>
+              </a:rPr>
+              <a:t>            </a:t>
+            </a:r>
+            <a:r>
+              <a:rPr kumimoji="0" lang="en-US" altLang="en-US" sz="1200" b="1" i="0" u="none" strike="noStrike" cap="none" normalizeH="0" baseline="0" dirty="0">
+                <a:ln>
+                  <a:noFill/>
+                </a:ln>
+                <a:solidFill>
+                  <a:srgbClr val="660E7A"/>
+                </a:solidFill>
+                <a:effectLst/>
+                <a:latin typeface="Courier New" panose="02070309020205020404" pitchFamily="49" charset="0"/>
+                <a:cs typeface="Courier New" panose="02070309020205020404" pitchFamily="49" charset="0"/>
+              </a:rPr>
+              <a:t>name </a:t>
+            </a:r>
+            <a:r>
+              <a:rPr kumimoji="0" lang="en-US" altLang="en-US" sz="1200" b="0" i="0" u="none" strike="noStrike" cap="none" normalizeH="0" baseline="0" dirty="0">
+                <a:ln>
+                  <a:noFill/>
+                </a:ln>
+                <a:solidFill>
+                  <a:srgbClr val="000000"/>
+                </a:solidFill>
+                <a:effectLst/>
+                <a:latin typeface="Courier New" panose="02070309020205020404" pitchFamily="49" charset="0"/>
+                <a:cs typeface="Courier New" panose="02070309020205020404" pitchFamily="49" charset="0"/>
+              </a:rPr>
+              <a:t>= </a:t>
+            </a:r>
+            <a:r>
+              <a:rPr kumimoji="0" lang="en-US" altLang="en-US" sz="1200" b="1" i="0" u="none" strike="noStrike" cap="none" normalizeH="0" baseline="0" dirty="0">
+                <a:ln>
+                  <a:noFill/>
+                </a:ln>
+                <a:solidFill>
+                  <a:srgbClr val="008000"/>
+                </a:solidFill>
+                <a:effectLst/>
+                <a:latin typeface="Courier New" panose="02070309020205020404" pitchFamily="49" charset="0"/>
+                <a:cs typeface="Courier New" panose="02070309020205020404" pitchFamily="49" charset="0"/>
+              </a:rPr>
+              <a:t>"</a:t>
+            </a:r>
+            <a:r>
+              <a:rPr kumimoji="0" lang="en-US" altLang="en-US" sz="1200" b="1" i="0" u="none" strike="noStrike" cap="none" normalizeH="0" baseline="0" dirty="0" err="1">
+                <a:ln>
+                  <a:noFill/>
+                </a:ln>
+                <a:solidFill>
+                  <a:srgbClr val="008000"/>
+                </a:solidFill>
+                <a:effectLst/>
+                <a:latin typeface="Courier New" panose="02070309020205020404" pitchFamily="49" charset="0"/>
+                <a:cs typeface="Courier New" panose="02070309020205020404" pitchFamily="49" charset="0"/>
+              </a:rPr>
+              <a:t>MyFirstName</a:t>
+            </a:r>
+            <a:r>
+              <a:rPr kumimoji="0" lang="en-US" altLang="en-US" sz="1200" b="1" i="0" u="none" strike="noStrike" cap="none" normalizeH="0" baseline="0" dirty="0">
+                <a:ln>
+                  <a:noFill/>
+                </a:ln>
+                <a:solidFill>
+                  <a:srgbClr val="008000"/>
+                </a:solidFill>
+                <a:effectLst/>
+                <a:latin typeface="Courier New" panose="02070309020205020404" pitchFamily="49" charset="0"/>
+                <a:cs typeface="Courier New" panose="02070309020205020404" pitchFamily="49" charset="0"/>
+              </a:rPr>
+              <a:t>" </a:t>
+            </a:r>
+            <a:r>
+              <a:rPr kumimoji="0" lang="en-US" altLang="en-US" sz="1200" b="0" i="0" u="none" strike="noStrike" cap="none" normalizeH="0" baseline="0" dirty="0">
+                <a:ln>
+                  <a:noFill/>
+                </a:ln>
+                <a:solidFill>
+                  <a:srgbClr val="000000"/>
+                </a:solidFill>
+                <a:effectLst/>
+                <a:latin typeface="Courier New" panose="02070309020205020404" pitchFamily="49" charset="0"/>
+                <a:cs typeface="Courier New" panose="02070309020205020404" pitchFamily="49" charset="0"/>
+              </a:rPr>
+              <a:t>+ (</a:t>
+            </a:r>
+            <a:r>
+              <a:rPr kumimoji="0" lang="en-US" altLang="en-US" sz="1200" b="1" i="0" u="none" strike="noStrike" cap="none" normalizeH="0" baseline="0" dirty="0">
+                <a:ln>
+                  <a:noFill/>
+                </a:ln>
+                <a:solidFill>
+                  <a:srgbClr val="000080"/>
+                </a:solidFill>
+                <a:effectLst/>
+                <a:latin typeface="Courier New" panose="02070309020205020404" pitchFamily="49" charset="0"/>
+                <a:cs typeface="Courier New" panose="02070309020205020404" pitchFamily="49" charset="0"/>
+              </a:rPr>
+              <a:t>new </a:t>
+            </a:r>
+            <a:r>
+              <a:rPr kumimoji="0" lang="en-US" altLang="en-US" sz="1200" b="0" i="0" u="none" strike="noStrike" cap="none" normalizeH="0" baseline="0" dirty="0">
+                <a:ln>
+                  <a:noFill/>
+                </a:ln>
+                <a:solidFill>
+                  <a:srgbClr val="000000"/>
+                </a:solidFill>
+                <a:effectLst/>
+                <a:latin typeface="Courier New" panose="02070309020205020404" pitchFamily="49" charset="0"/>
+                <a:cs typeface="Courier New" panose="02070309020205020404" pitchFamily="49" charset="0"/>
+              </a:rPr>
+              <a:t>Random().</a:t>
+            </a:r>
+            <a:r>
+              <a:rPr kumimoji="0" lang="en-US" altLang="en-US" sz="1200" b="0" i="0" u="none" strike="noStrike" cap="none" normalizeH="0" baseline="0" dirty="0" err="1">
+                <a:ln>
+                  <a:noFill/>
+                </a:ln>
+                <a:solidFill>
+                  <a:srgbClr val="000000"/>
+                </a:solidFill>
+                <a:effectLst/>
+                <a:latin typeface="Courier New" panose="02070309020205020404" pitchFamily="49" charset="0"/>
+                <a:cs typeface="Courier New" panose="02070309020205020404" pitchFamily="49" charset="0"/>
+              </a:rPr>
+              <a:t>nextInt</a:t>
+            </a:r>
+            <a:r>
+              <a:rPr kumimoji="0" lang="en-US" altLang="en-US" sz="1200" b="0" i="0" u="none" strike="noStrike" cap="none" normalizeH="0" baseline="0" dirty="0">
+                <a:ln>
+                  <a:noFill/>
+                </a:ln>
+                <a:solidFill>
+                  <a:srgbClr val="000000"/>
+                </a:solidFill>
+                <a:effectLst/>
+                <a:latin typeface="Courier New" panose="02070309020205020404" pitchFamily="49" charset="0"/>
+                <a:cs typeface="Courier New" panose="02070309020205020404" pitchFamily="49" charset="0"/>
+              </a:rPr>
+              <a:t>(</a:t>
+            </a:r>
+            <a:r>
+              <a:rPr kumimoji="0" lang="en-US" altLang="en-US" sz="1200" b="0" i="0" u="none" strike="noStrike" cap="none" normalizeH="0" baseline="0" dirty="0">
+                <a:ln>
+                  <a:noFill/>
+                </a:ln>
+                <a:solidFill>
+                  <a:srgbClr val="0000FF"/>
+                </a:solidFill>
+                <a:effectLst/>
+                <a:latin typeface="Courier New" panose="02070309020205020404" pitchFamily="49" charset="0"/>
+                <a:cs typeface="Courier New" panose="02070309020205020404" pitchFamily="49" charset="0"/>
+              </a:rPr>
+              <a:t>100</a:t>
+            </a:r>
+            <a:r>
+              <a:rPr kumimoji="0" lang="en-US" altLang="en-US" sz="1200" b="0" i="0" u="none" strike="noStrike" cap="none" normalizeH="0" baseline="0" dirty="0">
+                <a:ln>
+                  <a:noFill/>
+                </a:ln>
+                <a:solidFill>
+                  <a:srgbClr val="000000"/>
+                </a:solidFill>
+                <a:effectLst/>
+                <a:latin typeface="Courier New" panose="02070309020205020404" pitchFamily="49" charset="0"/>
+                <a:cs typeface="Courier New" panose="02070309020205020404" pitchFamily="49" charset="0"/>
+              </a:rPr>
+              <a:t>));</a:t>
+            </a:r>
+            <a:br>
+              <a:rPr kumimoji="0" lang="en-US" altLang="en-US" sz="1200" b="0" i="0" u="none" strike="noStrike" cap="none" normalizeH="0" baseline="0" dirty="0">
+                <a:ln>
+                  <a:noFill/>
+                </a:ln>
+                <a:solidFill>
+                  <a:srgbClr val="000000"/>
+                </a:solidFill>
+                <a:effectLst/>
+                <a:latin typeface="Courier New" panose="02070309020205020404" pitchFamily="49" charset="0"/>
+                <a:cs typeface="Courier New" panose="02070309020205020404" pitchFamily="49" charset="0"/>
+              </a:rPr>
+            </a:br>
+            <a:r>
+              <a:rPr kumimoji="0" lang="en-US" altLang="en-US" sz="1200" b="0" i="0" u="none" strike="noStrike" cap="none" normalizeH="0" baseline="0" dirty="0">
+                <a:ln>
+                  <a:noFill/>
+                </a:ln>
+                <a:solidFill>
+                  <a:srgbClr val="000000"/>
+                </a:solidFill>
+                <a:effectLst/>
+                <a:latin typeface="Courier New" panose="02070309020205020404" pitchFamily="49" charset="0"/>
+                <a:cs typeface="Courier New" panose="02070309020205020404" pitchFamily="49" charset="0"/>
+              </a:rPr>
+              <a:t>            </a:t>
+            </a:r>
+            <a:r>
+              <a:rPr kumimoji="0" lang="en-US" altLang="en-US" sz="1200" b="0" i="1" u="none" strike="noStrike" cap="none" normalizeH="0" baseline="0" dirty="0" err="1">
+                <a:ln>
+                  <a:noFill/>
+                </a:ln>
+                <a:solidFill>
+                  <a:srgbClr val="000000"/>
+                </a:solidFill>
+                <a:effectLst/>
+                <a:latin typeface="Courier New" panose="02070309020205020404" pitchFamily="49" charset="0"/>
+                <a:cs typeface="Courier New" panose="02070309020205020404" pitchFamily="49" charset="0"/>
+              </a:rPr>
+              <a:t>onView</a:t>
+            </a:r>
+            <a:r>
+              <a:rPr kumimoji="0" lang="en-US" altLang="en-US" sz="1200" b="0" i="0" u="none" strike="noStrike" cap="none" normalizeH="0" baseline="0" dirty="0">
+                <a:ln>
+                  <a:noFill/>
+                </a:ln>
+                <a:solidFill>
+                  <a:srgbClr val="000000"/>
+                </a:solidFill>
+                <a:effectLst/>
+                <a:latin typeface="Courier New" panose="02070309020205020404" pitchFamily="49" charset="0"/>
+                <a:cs typeface="Courier New" panose="02070309020205020404" pitchFamily="49" charset="0"/>
+              </a:rPr>
+              <a:t>(</a:t>
+            </a:r>
+            <a:r>
+              <a:rPr kumimoji="0" lang="en-US" altLang="en-US" sz="1200" b="0" i="1" u="none" strike="noStrike" cap="none" normalizeH="0" baseline="0" dirty="0" err="1">
+                <a:ln>
+                  <a:noFill/>
+                </a:ln>
+                <a:solidFill>
+                  <a:srgbClr val="000000"/>
+                </a:solidFill>
+                <a:effectLst/>
+                <a:latin typeface="Courier New" panose="02070309020205020404" pitchFamily="49" charset="0"/>
+                <a:cs typeface="Courier New" panose="02070309020205020404" pitchFamily="49" charset="0"/>
+              </a:rPr>
+              <a:t>withId</a:t>
+            </a:r>
+            <a:r>
+              <a:rPr kumimoji="0" lang="en-US" altLang="en-US" sz="1200" b="0" i="0" u="none" strike="noStrike" cap="none" normalizeH="0" baseline="0" dirty="0">
+                <a:ln>
+                  <a:noFill/>
+                </a:ln>
+                <a:solidFill>
+                  <a:srgbClr val="000000"/>
+                </a:solidFill>
+                <a:effectLst/>
+                <a:latin typeface="Courier New" panose="02070309020205020404" pitchFamily="49" charset="0"/>
+                <a:cs typeface="Courier New" panose="02070309020205020404" pitchFamily="49" charset="0"/>
+              </a:rPr>
+              <a:t>(</a:t>
+            </a:r>
+            <a:r>
+              <a:rPr kumimoji="0" lang="en-US" altLang="en-US" sz="1200" b="0" i="0" u="none" strike="noStrike" cap="none" normalizeH="0" baseline="0" dirty="0" err="1">
+                <a:ln>
+                  <a:noFill/>
+                </a:ln>
+                <a:solidFill>
+                  <a:srgbClr val="000000"/>
+                </a:solidFill>
+                <a:effectLst/>
+                <a:latin typeface="Courier New" panose="02070309020205020404" pitchFamily="49" charset="0"/>
+                <a:cs typeface="Courier New" panose="02070309020205020404" pitchFamily="49" charset="0"/>
+              </a:rPr>
+              <a:t>R.id.</a:t>
+            </a:r>
+            <a:r>
+              <a:rPr kumimoji="0" lang="en-US" altLang="en-US" sz="1200" b="1" i="1" u="none" strike="noStrike" cap="none" normalizeH="0" baseline="0" dirty="0" err="1">
+                <a:ln>
+                  <a:noFill/>
+                </a:ln>
+                <a:solidFill>
+                  <a:srgbClr val="660E7A"/>
+                </a:solidFill>
+                <a:effectLst/>
+                <a:latin typeface="Courier New" panose="02070309020205020404" pitchFamily="49" charset="0"/>
+                <a:cs typeface="Courier New" panose="02070309020205020404" pitchFamily="49" charset="0"/>
+              </a:rPr>
+              <a:t>my_profile_dialog_input</a:t>
+            </a:r>
+            <a:r>
+              <a:rPr kumimoji="0" lang="en-US" altLang="en-US" sz="1200" b="0" i="0" u="none" strike="noStrike" cap="none" normalizeH="0" baseline="0" dirty="0">
+                <a:ln>
+                  <a:noFill/>
+                </a:ln>
+                <a:solidFill>
+                  <a:srgbClr val="000000"/>
+                </a:solidFill>
+                <a:effectLst/>
+                <a:latin typeface="Courier New" panose="02070309020205020404" pitchFamily="49" charset="0"/>
+                <a:cs typeface="Courier New" panose="02070309020205020404" pitchFamily="49" charset="0"/>
+              </a:rPr>
+              <a:t>))</a:t>
+            </a:r>
+            <a:br>
+              <a:rPr kumimoji="0" lang="en-US" altLang="en-US" sz="1200" b="0" i="0" u="none" strike="noStrike" cap="none" normalizeH="0" baseline="0" dirty="0">
+                <a:ln>
+                  <a:noFill/>
+                </a:ln>
+                <a:solidFill>
+                  <a:srgbClr val="000000"/>
+                </a:solidFill>
+                <a:effectLst/>
+                <a:latin typeface="Courier New" panose="02070309020205020404" pitchFamily="49" charset="0"/>
+                <a:cs typeface="Courier New" panose="02070309020205020404" pitchFamily="49" charset="0"/>
+              </a:rPr>
+            </a:br>
+            <a:r>
+              <a:rPr kumimoji="0" lang="en-US" altLang="en-US" sz="1200" b="0" i="0" u="none" strike="noStrike" cap="none" normalizeH="0" baseline="0" dirty="0">
+                <a:ln>
+                  <a:noFill/>
+                </a:ln>
+                <a:solidFill>
+                  <a:srgbClr val="000000"/>
+                </a:solidFill>
+                <a:effectLst/>
+                <a:latin typeface="Courier New" panose="02070309020205020404" pitchFamily="49" charset="0"/>
+                <a:cs typeface="Courier New" panose="02070309020205020404" pitchFamily="49" charset="0"/>
+              </a:rPr>
+              <a:t>                    .check(</a:t>
+            </a:r>
+            <a:r>
+              <a:rPr kumimoji="0" lang="en-US" altLang="en-US" sz="1200" b="0" i="1" u="none" strike="noStrike" cap="none" normalizeH="0" baseline="0" dirty="0">
+                <a:ln>
+                  <a:noFill/>
+                </a:ln>
+                <a:solidFill>
+                  <a:srgbClr val="000000"/>
+                </a:solidFill>
+                <a:effectLst/>
+                <a:latin typeface="Courier New" panose="02070309020205020404" pitchFamily="49" charset="0"/>
+                <a:cs typeface="Courier New" panose="02070309020205020404" pitchFamily="49" charset="0"/>
+              </a:rPr>
+              <a:t>matches</a:t>
+            </a:r>
+            <a:r>
+              <a:rPr kumimoji="0" lang="en-US" altLang="en-US" sz="1200" b="0" i="0" u="none" strike="noStrike" cap="none" normalizeH="0" baseline="0" dirty="0">
+                <a:ln>
+                  <a:noFill/>
+                </a:ln>
+                <a:solidFill>
+                  <a:srgbClr val="000000"/>
+                </a:solidFill>
+                <a:effectLst/>
+                <a:latin typeface="Courier New" panose="02070309020205020404" pitchFamily="49" charset="0"/>
+                <a:cs typeface="Courier New" panose="02070309020205020404" pitchFamily="49" charset="0"/>
+              </a:rPr>
+              <a:t>(</a:t>
+            </a:r>
+            <a:r>
+              <a:rPr kumimoji="0" lang="en-US" altLang="en-US" sz="1200" b="0" i="1" u="none" strike="noStrike" cap="none" normalizeH="0" baseline="0" dirty="0" err="1">
+                <a:ln>
+                  <a:noFill/>
+                </a:ln>
+                <a:solidFill>
+                  <a:srgbClr val="000000"/>
+                </a:solidFill>
+                <a:effectLst/>
+                <a:latin typeface="Courier New" panose="02070309020205020404" pitchFamily="49" charset="0"/>
+                <a:cs typeface="Courier New" panose="02070309020205020404" pitchFamily="49" charset="0"/>
+              </a:rPr>
+              <a:t>isDisplayed</a:t>
+            </a:r>
+            <a:r>
+              <a:rPr kumimoji="0" lang="en-US" altLang="en-US" sz="1200" b="0" i="0" u="none" strike="noStrike" cap="none" normalizeH="0" baseline="0" dirty="0">
+                <a:ln>
+                  <a:noFill/>
+                </a:ln>
+                <a:solidFill>
+                  <a:srgbClr val="000000"/>
+                </a:solidFill>
+                <a:effectLst/>
+                <a:latin typeface="Courier New" panose="02070309020205020404" pitchFamily="49" charset="0"/>
+                <a:cs typeface="Courier New" panose="02070309020205020404" pitchFamily="49" charset="0"/>
+              </a:rPr>
+              <a:t>()))</a:t>
+            </a:r>
+            <a:br>
+              <a:rPr kumimoji="0" lang="en-US" altLang="en-US" sz="1200" b="0" i="0" u="none" strike="noStrike" cap="none" normalizeH="0" baseline="0" dirty="0">
+                <a:ln>
+                  <a:noFill/>
+                </a:ln>
+                <a:solidFill>
+                  <a:srgbClr val="000000"/>
+                </a:solidFill>
+                <a:effectLst/>
+                <a:latin typeface="Courier New" panose="02070309020205020404" pitchFamily="49" charset="0"/>
+                <a:cs typeface="Courier New" panose="02070309020205020404" pitchFamily="49" charset="0"/>
+              </a:rPr>
+            </a:br>
+            <a:r>
+              <a:rPr kumimoji="0" lang="en-US" altLang="en-US" sz="1200" b="0" i="0" u="none" strike="noStrike" cap="none" normalizeH="0" baseline="0" dirty="0">
+                <a:ln>
+                  <a:noFill/>
+                </a:ln>
+                <a:solidFill>
+                  <a:srgbClr val="000000"/>
+                </a:solidFill>
+                <a:effectLst/>
+                <a:latin typeface="Courier New" panose="02070309020205020404" pitchFamily="49" charset="0"/>
+                <a:cs typeface="Courier New" panose="02070309020205020404" pitchFamily="49" charset="0"/>
+              </a:rPr>
+              <a:t>                    .perform(</a:t>
+            </a:r>
+            <a:r>
+              <a:rPr kumimoji="0" lang="en-US" altLang="en-US" sz="1200" b="0" i="1" u="none" strike="noStrike" cap="none" normalizeH="0" baseline="0" dirty="0" err="1">
+                <a:ln>
+                  <a:noFill/>
+                </a:ln>
+                <a:solidFill>
+                  <a:srgbClr val="000000"/>
+                </a:solidFill>
+                <a:effectLst/>
+                <a:latin typeface="Courier New" panose="02070309020205020404" pitchFamily="49" charset="0"/>
+                <a:cs typeface="Courier New" panose="02070309020205020404" pitchFamily="49" charset="0"/>
+              </a:rPr>
+              <a:t>replaceText</a:t>
+            </a:r>
+            <a:r>
+              <a:rPr kumimoji="0" lang="en-US" altLang="en-US" sz="1200" b="0" i="0" u="none" strike="noStrike" cap="none" normalizeH="0" baseline="0" dirty="0">
+                <a:ln>
+                  <a:noFill/>
+                </a:ln>
+                <a:solidFill>
+                  <a:srgbClr val="000000"/>
+                </a:solidFill>
+                <a:effectLst/>
+                <a:latin typeface="Courier New" panose="02070309020205020404" pitchFamily="49" charset="0"/>
+                <a:cs typeface="Courier New" panose="02070309020205020404" pitchFamily="49" charset="0"/>
+              </a:rPr>
+              <a:t>(</a:t>
+            </a:r>
+            <a:r>
+              <a:rPr kumimoji="0" lang="en-US" altLang="en-US" sz="1200" b="1" i="0" u="none" strike="noStrike" cap="none" normalizeH="0" baseline="0" dirty="0">
+                <a:ln>
+                  <a:noFill/>
+                </a:ln>
+                <a:solidFill>
+                  <a:srgbClr val="660E7A"/>
+                </a:solidFill>
+                <a:effectLst/>
+                <a:latin typeface="Courier New" panose="02070309020205020404" pitchFamily="49" charset="0"/>
+                <a:cs typeface="Courier New" panose="02070309020205020404" pitchFamily="49" charset="0"/>
+              </a:rPr>
+              <a:t>name</a:t>
+            </a:r>
+            <a:r>
+              <a:rPr kumimoji="0" lang="en-US" altLang="en-US" sz="1200" b="0" i="0" u="none" strike="noStrike" cap="none" normalizeH="0" baseline="0" dirty="0">
+                <a:ln>
+                  <a:noFill/>
+                </a:ln>
+                <a:solidFill>
+                  <a:srgbClr val="000000"/>
+                </a:solidFill>
+                <a:effectLst/>
+                <a:latin typeface="Courier New" panose="02070309020205020404" pitchFamily="49" charset="0"/>
+                <a:cs typeface="Courier New" panose="02070309020205020404" pitchFamily="49" charset="0"/>
+              </a:rPr>
+              <a:t>));</a:t>
+            </a:r>
+            <a:br>
+              <a:rPr kumimoji="0" lang="en-US" altLang="en-US" sz="1200" b="0" i="0" u="none" strike="noStrike" cap="none" normalizeH="0" baseline="0" dirty="0">
+                <a:ln>
+                  <a:noFill/>
+                </a:ln>
+                <a:solidFill>
+                  <a:srgbClr val="000000"/>
+                </a:solidFill>
+                <a:effectLst/>
+                <a:latin typeface="Courier New" panose="02070309020205020404" pitchFamily="49" charset="0"/>
+                <a:cs typeface="Courier New" panose="02070309020205020404" pitchFamily="49" charset="0"/>
+              </a:rPr>
+            </a:br>
+            <a:br>
+              <a:rPr kumimoji="0" lang="en-US" altLang="en-US" sz="1200" b="0" i="0" u="none" strike="noStrike" cap="none" normalizeH="0" baseline="0" dirty="0">
+                <a:ln>
+                  <a:noFill/>
+                </a:ln>
+                <a:solidFill>
+                  <a:srgbClr val="000000"/>
+                </a:solidFill>
+                <a:effectLst/>
+                <a:latin typeface="Courier New" panose="02070309020205020404" pitchFamily="49" charset="0"/>
+                <a:cs typeface="Courier New" panose="02070309020205020404" pitchFamily="49" charset="0"/>
+              </a:rPr>
+            </a:br>
+            <a:r>
+              <a:rPr kumimoji="0" lang="en-US" altLang="en-US" sz="1200" b="0" i="0" u="none" strike="noStrike" cap="none" normalizeH="0" baseline="0" dirty="0">
+                <a:ln>
+                  <a:noFill/>
+                </a:ln>
+                <a:solidFill>
+                  <a:srgbClr val="000000"/>
+                </a:solidFill>
+                <a:effectLst/>
+                <a:latin typeface="Courier New" panose="02070309020205020404" pitchFamily="49" charset="0"/>
+                <a:cs typeface="Courier New" panose="02070309020205020404" pitchFamily="49" charset="0"/>
+              </a:rPr>
+              <a:t>            </a:t>
+            </a:r>
+            <a:r>
+              <a:rPr kumimoji="0" lang="en-US" altLang="en-US" sz="1200" b="0" i="1" u="none" strike="noStrike" cap="none" normalizeH="0" baseline="0" dirty="0" err="1">
+                <a:ln>
+                  <a:noFill/>
+                </a:ln>
+                <a:solidFill>
+                  <a:srgbClr val="000000"/>
+                </a:solidFill>
+                <a:effectLst/>
+                <a:latin typeface="Courier New" panose="02070309020205020404" pitchFamily="49" charset="0"/>
+                <a:cs typeface="Courier New" panose="02070309020205020404" pitchFamily="49" charset="0"/>
+              </a:rPr>
+              <a:t>onView</a:t>
+            </a:r>
+            <a:r>
+              <a:rPr kumimoji="0" lang="en-US" altLang="en-US" sz="1200" b="0" i="0" u="none" strike="noStrike" cap="none" normalizeH="0" baseline="0" dirty="0">
+                <a:ln>
+                  <a:noFill/>
+                </a:ln>
+                <a:solidFill>
+                  <a:srgbClr val="000000"/>
+                </a:solidFill>
+                <a:effectLst/>
+                <a:latin typeface="Courier New" panose="02070309020205020404" pitchFamily="49" charset="0"/>
+                <a:cs typeface="Courier New" panose="02070309020205020404" pitchFamily="49" charset="0"/>
+              </a:rPr>
+              <a:t>(</a:t>
+            </a:r>
+            <a:r>
+              <a:rPr kumimoji="0" lang="en-US" altLang="en-US" sz="1200" b="0" i="1" u="none" strike="noStrike" cap="none" normalizeH="0" baseline="0" dirty="0" err="1">
+                <a:ln>
+                  <a:noFill/>
+                </a:ln>
+                <a:solidFill>
+                  <a:srgbClr val="000000"/>
+                </a:solidFill>
+                <a:effectLst/>
+                <a:latin typeface="Courier New" panose="02070309020205020404" pitchFamily="49" charset="0"/>
+                <a:cs typeface="Courier New" panose="02070309020205020404" pitchFamily="49" charset="0"/>
+              </a:rPr>
+              <a:t>withText</a:t>
+            </a:r>
+            <a:r>
+              <a:rPr kumimoji="0" lang="en-US" altLang="en-US" sz="1200" b="0" i="0" u="none" strike="noStrike" cap="none" normalizeH="0" baseline="0" dirty="0">
+                <a:ln>
+                  <a:noFill/>
+                </a:ln>
+                <a:solidFill>
+                  <a:srgbClr val="000000"/>
+                </a:solidFill>
+                <a:effectLst/>
+                <a:latin typeface="Courier New" panose="02070309020205020404" pitchFamily="49" charset="0"/>
+                <a:cs typeface="Courier New" panose="02070309020205020404" pitchFamily="49" charset="0"/>
+              </a:rPr>
+              <a:t>(</a:t>
+            </a:r>
+            <a:r>
+              <a:rPr kumimoji="0" lang="en-US" altLang="en-US" sz="1200" b="1" i="0" u="none" strike="noStrike" cap="none" normalizeH="0" baseline="0" dirty="0">
+                <a:ln>
+                  <a:noFill/>
+                </a:ln>
+                <a:solidFill>
+                  <a:srgbClr val="008000"/>
+                </a:solidFill>
+                <a:effectLst/>
+                <a:latin typeface="Courier New" panose="02070309020205020404" pitchFamily="49" charset="0"/>
+                <a:cs typeface="Courier New" panose="02070309020205020404" pitchFamily="49" charset="0"/>
+              </a:rPr>
+              <a:t>"OK"</a:t>
+            </a:r>
+            <a:r>
+              <a:rPr kumimoji="0" lang="en-US" altLang="en-US" sz="1200" b="0" i="0" u="none" strike="noStrike" cap="none" normalizeH="0" baseline="0" dirty="0">
+                <a:ln>
+                  <a:noFill/>
+                </a:ln>
+                <a:solidFill>
+                  <a:srgbClr val="000000"/>
+                </a:solidFill>
+                <a:effectLst/>
+                <a:latin typeface="Courier New" panose="02070309020205020404" pitchFamily="49" charset="0"/>
+                <a:cs typeface="Courier New" panose="02070309020205020404" pitchFamily="49" charset="0"/>
+              </a:rPr>
+              <a:t>))</a:t>
+            </a:r>
+            <a:br>
+              <a:rPr kumimoji="0" lang="en-US" altLang="en-US" sz="1200" b="0" i="0" u="none" strike="noStrike" cap="none" normalizeH="0" baseline="0" dirty="0">
+                <a:ln>
+                  <a:noFill/>
+                </a:ln>
+                <a:solidFill>
+                  <a:srgbClr val="000000"/>
+                </a:solidFill>
+                <a:effectLst/>
+                <a:latin typeface="Courier New" panose="02070309020205020404" pitchFamily="49" charset="0"/>
+                <a:cs typeface="Courier New" panose="02070309020205020404" pitchFamily="49" charset="0"/>
+              </a:rPr>
+            </a:br>
+            <a:r>
+              <a:rPr kumimoji="0" lang="en-US" altLang="en-US" sz="1200" b="0" i="0" u="none" strike="noStrike" cap="none" normalizeH="0" baseline="0" dirty="0">
+                <a:ln>
+                  <a:noFill/>
+                </a:ln>
+                <a:solidFill>
+                  <a:srgbClr val="000000"/>
+                </a:solidFill>
+                <a:effectLst/>
+                <a:latin typeface="Courier New" panose="02070309020205020404" pitchFamily="49" charset="0"/>
+                <a:cs typeface="Courier New" panose="02070309020205020404" pitchFamily="49" charset="0"/>
+              </a:rPr>
+              <a:t>                    .perform(</a:t>
+            </a:r>
+            <a:r>
+              <a:rPr kumimoji="0" lang="en-US" altLang="en-US" sz="1200" b="0" i="1" u="none" strike="noStrike" cap="none" normalizeH="0" baseline="0" dirty="0">
+                <a:ln>
+                  <a:noFill/>
+                </a:ln>
+                <a:solidFill>
+                  <a:srgbClr val="000000"/>
+                </a:solidFill>
+                <a:effectLst/>
+                <a:latin typeface="Courier New" panose="02070309020205020404" pitchFamily="49" charset="0"/>
+                <a:cs typeface="Courier New" panose="02070309020205020404" pitchFamily="49" charset="0"/>
+              </a:rPr>
+              <a:t>click</a:t>
+            </a:r>
+            <a:r>
+              <a:rPr kumimoji="0" lang="en-US" altLang="en-US" sz="1200" b="0" i="0" u="none" strike="noStrike" cap="none" normalizeH="0" baseline="0" dirty="0">
+                <a:ln>
+                  <a:noFill/>
+                </a:ln>
+                <a:solidFill>
+                  <a:srgbClr val="000000"/>
+                </a:solidFill>
+                <a:effectLst/>
+                <a:latin typeface="Courier New" panose="02070309020205020404" pitchFamily="49" charset="0"/>
+                <a:cs typeface="Courier New" panose="02070309020205020404" pitchFamily="49" charset="0"/>
+              </a:rPr>
+              <a:t>());</a:t>
+            </a:r>
+            <a:br>
+              <a:rPr kumimoji="0" lang="en-US" altLang="en-US" sz="1200" b="0" i="0" u="none" strike="noStrike" cap="none" normalizeH="0" baseline="0" dirty="0">
+                <a:ln>
+                  <a:noFill/>
+                </a:ln>
+                <a:solidFill>
+                  <a:srgbClr val="000000"/>
+                </a:solidFill>
+                <a:effectLst/>
+                <a:latin typeface="Courier New" panose="02070309020205020404" pitchFamily="49" charset="0"/>
+                <a:cs typeface="Courier New" panose="02070309020205020404" pitchFamily="49" charset="0"/>
+              </a:rPr>
+            </a:br>
+            <a:br>
+              <a:rPr kumimoji="0" lang="en-US" altLang="en-US" sz="1200" b="0" i="0" u="none" strike="noStrike" cap="none" normalizeH="0" baseline="0" dirty="0">
+                <a:ln>
+                  <a:noFill/>
+                </a:ln>
+                <a:solidFill>
+                  <a:srgbClr val="000000"/>
+                </a:solidFill>
+                <a:effectLst/>
+                <a:latin typeface="Courier New" panose="02070309020205020404" pitchFamily="49" charset="0"/>
+                <a:cs typeface="Courier New" panose="02070309020205020404" pitchFamily="49" charset="0"/>
+              </a:rPr>
+            </a:br>
+            <a:r>
+              <a:rPr kumimoji="0" lang="en-US" altLang="en-US" sz="1200" b="0" i="0" u="none" strike="noStrike" cap="none" normalizeH="0" baseline="0" dirty="0">
+                <a:ln>
+                  <a:noFill/>
+                </a:ln>
+                <a:solidFill>
+                  <a:srgbClr val="000000"/>
+                </a:solidFill>
+                <a:effectLst/>
+                <a:latin typeface="Courier New" panose="02070309020205020404" pitchFamily="49" charset="0"/>
+                <a:cs typeface="Courier New" panose="02070309020205020404" pitchFamily="49" charset="0"/>
+              </a:rPr>
+              <a:t>            </a:t>
+            </a:r>
+            <a:r>
+              <a:rPr kumimoji="0" lang="en-US" altLang="en-US" sz="1200" b="0" i="1" u="none" strike="noStrike" cap="none" normalizeH="0" baseline="0" dirty="0" err="1">
+                <a:ln>
+                  <a:noFill/>
+                </a:ln>
+                <a:solidFill>
+                  <a:srgbClr val="000000"/>
+                </a:solidFill>
+                <a:effectLst/>
+                <a:latin typeface="Courier New" panose="02070309020205020404" pitchFamily="49" charset="0"/>
+                <a:cs typeface="Courier New" panose="02070309020205020404" pitchFamily="49" charset="0"/>
+              </a:rPr>
+              <a:t>onView</a:t>
+            </a:r>
+            <a:r>
+              <a:rPr kumimoji="0" lang="en-US" altLang="en-US" sz="1200" b="0" i="0" u="none" strike="noStrike" cap="none" normalizeH="0" baseline="0" dirty="0">
+                <a:ln>
+                  <a:noFill/>
+                </a:ln>
+                <a:solidFill>
+                  <a:srgbClr val="000000"/>
+                </a:solidFill>
+                <a:effectLst/>
+                <a:latin typeface="Courier New" panose="02070309020205020404" pitchFamily="49" charset="0"/>
+                <a:cs typeface="Courier New" panose="02070309020205020404" pitchFamily="49" charset="0"/>
+              </a:rPr>
+              <a:t>(</a:t>
+            </a:r>
+            <a:r>
+              <a:rPr kumimoji="0" lang="en-US" altLang="en-US" sz="1200" b="0" i="1" u="none" strike="noStrike" cap="none" normalizeH="0" baseline="0" dirty="0" err="1">
+                <a:ln>
+                  <a:noFill/>
+                </a:ln>
+                <a:solidFill>
+                  <a:srgbClr val="000000"/>
+                </a:solidFill>
+                <a:effectLst/>
+                <a:latin typeface="Courier New" panose="02070309020205020404" pitchFamily="49" charset="0"/>
+                <a:cs typeface="Courier New" panose="02070309020205020404" pitchFamily="49" charset="0"/>
+              </a:rPr>
+              <a:t>withId</a:t>
+            </a:r>
+            <a:r>
+              <a:rPr kumimoji="0" lang="en-US" altLang="en-US" sz="1200" b="0" i="0" u="none" strike="noStrike" cap="none" normalizeH="0" baseline="0" dirty="0">
+                <a:ln>
+                  <a:noFill/>
+                </a:ln>
+                <a:solidFill>
+                  <a:srgbClr val="000000"/>
+                </a:solidFill>
+                <a:effectLst/>
+                <a:latin typeface="Courier New" panose="02070309020205020404" pitchFamily="49" charset="0"/>
+                <a:cs typeface="Courier New" panose="02070309020205020404" pitchFamily="49" charset="0"/>
+              </a:rPr>
+              <a:t>(</a:t>
+            </a:r>
+            <a:r>
+              <a:rPr kumimoji="0" lang="en-US" altLang="en-US" sz="1200" b="0" i="0" u="none" strike="noStrike" cap="none" normalizeH="0" baseline="0" dirty="0" err="1">
+                <a:ln>
+                  <a:noFill/>
+                </a:ln>
+                <a:solidFill>
+                  <a:srgbClr val="000000"/>
+                </a:solidFill>
+                <a:effectLst/>
+                <a:latin typeface="Courier New" panose="02070309020205020404" pitchFamily="49" charset="0"/>
+                <a:cs typeface="Courier New" panose="02070309020205020404" pitchFamily="49" charset="0"/>
+              </a:rPr>
+              <a:t>R.id.</a:t>
+            </a:r>
+            <a:r>
+              <a:rPr kumimoji="0" lang="en-US" altLang="en-US" sz="1200" b="1" i="1" u="none" strike="noStrike" cap="none" normalizeH="0" baseline="0" dirty="0" err="1">
+                <a:ln>
+                  <a:noFill/>
+                </a:ln>
+                <a:solidFill>
+                  <a:srgbClr val="660E7A"/>
+                </a:solidFill>
+                <a:effectLst/>
+                <a:latin typeface="Courier New" panose="02070309020205020404" pitchFamily="49" charset="0"/>
+                <a:cs typeface="Courier New" panose="02070309020205020404" pitchFamily="49" charset="0"/>
+              </a:rPr>
+              <a:t>first_name</a:t>
+            </a:r>
+            <a:r>
+              <a:rPr kumimoji="0" lang="en-US" altLang="en-US" sz="1200" b="0" i="0" u="none" strike="noStrike" cap="none" normalizeH="0" baseline="0" dirty="0">
+                <a:ln>
+                  <a:noFill/>
+                </a:ln>
+                <a:solidFill>
+                  <a:srgbClr val="000000"/>
+                </a:solidFill>
+                <a:effectLst/>
+                <a:latin typeface="Courier New" panose="02070309020205020404" pitchFamily="49" charset="0"/>
+                <a:cs typeface="Courier New" panose="02070309020205020404" pitchFamily="49" charset="0"/>
+              </a:rPr>
+              <a:t>))</a:t>
+            </a:r>
+            <a:br>
+              <a:rPr kumimoji="0" lang="en-US" altLang="en-US" sz="1200" b="0" i="0" u="none" strike="noStrike" cap="none" normalizeH="0" baseline="0" dirty="0">
+                <a:ln>
+                  <a:noFill/>
+                </a:ln>
+                <a:solidFill>
+                  <a:srgbClr val="000000"/>
+                </a:solidFill>
+                <a:effectLst/>
+                <a:latin typeface="Courier New" panose="02070309020205020404" pitchFamily="49" charset="0"/>
+                <a:cs typeface="Courier New" panose="02070309020205020404" pitchFamily="49" charset="0"/>
+              </a:rPr>
+            </a:br>
+            <a:r>
+              <a:rPr kumimoji="0" lang="en-US" altLang="en-US" sz="1200" b="0" i="0" u="none" strike="noStrike" cap="none" normalizeH="0" baseline="0" dirty="0">
+                <a:ln>
+                  <a:noFill/>
+                </a:ln>
+                <a:solidFill>
+                  <a:srgbClr val="000000"/>
+                </a:solidFill>
+                <a:effectLst/>
+                <a:latin typeface="Courier New" panose="02070309020205020404" pitchFamily="49" charset="0"/>
+                <a:cs typeface="Courier New" panose="02070309020205020404" pitchFamily="49" charset="0"/>
+              </a:rPr>
+              <a:t>                    .check(</a:t>
+            </a:r>
+            <a:r>
+              <a:rPr kumimoji="0" lang="en-US" altLang="en-US" sz="1200" b="0" i="1" u="none" strike="noStrike" cap="none" normalizeH="0" baseline="0" dirty="0">
+                <a:ln>
+                  <a:noFill/>
+                </a:ln>
+                <a:solidFill>
+                  <a:srgbClr val="000000"/>
+                </a:solidFill>
+                <a:effectLst/>
+                <a:latin typeface="Courier New" panose="02070309020205020404" pitchFamily="49" charset="0"/>
+                <a:cs typeface="Courier New" panose="02070309020205020404" pitchFamily="49" charset="0"/>
+              </a:rPr>
+              <a:t>matches</a:t>
+            </a:r>
+            <a:r>
+              <a:rPr kumimoji="0" lang="en-US" altLang="en-US" sz="1200" b="0" i="0" u="none" strike="noStrike" cap="none" normalizeH="0" baseline="0" dirty="0">
+                <a:ln>
+                  <a:noFill/>
+                </a:ln>
+                <a:solidFill>
+                  <a:srgbClr val="000000"/>
+                </a:solidFill>
+                <a:effectLst/>
+                <a:latin typeface="Courier New" panose="02070309020205020404" pitchFamily="49" charset="0"/>
+                <a:cs typeface="Courier New" panose="02070309020205020404" pitchFamily="49" charset="0"/>
+              </a:rPr>
+              <a:t>(</a:t>
+            </a:r>
+            <a:r>
+              <a:rPr kumimoji="0" lang="en-US" altLang="en-US" sz="1200" b="0" i="1" u="none" strike="noStrike" cap="none" normalizeH="0" baseline="0" dirty="0" err="1">
+                <a:ln>
+                  <a:noFill/>
+                </a:ln>
+                <a:solidFill>
+                  <a:srgbClr val="000000"/>
+                </a:solidFill>
+                <a:effectLst/>
+                <a:latin typeface="Courier New" panose="02070309020205020404" pitchFamily="49" charset="0"/>
+                <a:cs typeface="Courier New" panose="02070309020205020404" pitchFamily="49" charset="0"/>
+              </a:rPr>
+              <a:t>allOf</a:t>
+            </a:r>
+            <a:r>
+              <a:rPr kumimoji="0" lang="en-US" altLang="en-US" sz="1200" b="0" i="0" u="none" strike="noStrike" cap="none" normalizeH="0" baseline="0" dirty="0">
+                <a:ln>
+                  <a:noFill/>
+                </a:ln>
+                <a:solidFill>
+                  <a:srgbClr val="000000"/>
+                </a:solidFill>
+                <a:effectLst/>
+                <a:latin typeface="Courier New" panose="02070309020205020404" pitchFamily="49" charset="0"/>
+                <a:cs typeface="Courier New" panose="02070309020205020404" pitchFamily="49" charset="0"/>
+              </a:rPr>
+              <a:t>(</a:t>
+            </a:r>
+            <a:r>
+              <a:rPr kumimoji="0" lang="en-US" altLang="en-US" sz="1200" b="0" i="1" u="none" strike="noStrike" cap="none" normalizeH="0" baseline="0" dirty="0" err="1">
+                <a:ln>
+                  <a:noFill/>
+                </a:ln>
+                <a:solidFill>
+                  <a:srgbClr val="000000"/>
+                </a:solidFill>
+                <a:effectLst/>
+                <a:latin typeface="Courier New" panose="02070309020205020404" pitchFamily="49" charset="0"/>
+                <a:cs typeface="Courier New" panose="02070309020205020404" pitchFamily="49" charset="0"/>
+              </a:rPr>
+              <a:t>isDisplayed</a:t>
+            </a:r>
+            <a:r>
+              <a:rPr kumimoji="0" lang="en-US" altLang="en-US" sz="1200" b="0" i="0" u="none" strike="noStrike" cap="none" normalizeH="0" baseline="0" dirty="0">
+                <a:ln>
+                  <a:noFill/>
+                </a:ln>
+                <a:solidFill>
+                  <a:srgbClr val="000000"/>
+                </a:solidFill>
+                <a:effectLst/>
+                <a:latin typeface="Courier New" panose="02070309020205020404" pitchFamily="49" charset="0"/>
+                <a:cs typeface="Courier New" panose="02070309020205020404" pitchFamily="49" charset="0"/>
+              </a:rPr>
+              <a:t>(), </a:t>
+            </a:r>
+            <a:r>
+              <a:rPr kumimoji="0" lang="en-US" altLang="en-US" sz="1200" b="0" i="1" u="none" strike="noStrike" cap="none" normalizeH="0" baseline="0" dirty="0" err="1">
+                <a:ln>
+                  <a:noFill/>
+                </a:ln>
+                <a:solidFill>
+                  <a:srgbClr val="000000"/>
+                </a:solidFill>
+                <a:effectLst/>
+                <a:latin typeface="Courier New" panose="02070309020205020404" pitchFamily="49" charset="0"/>
+                <a:cs typeface="Courier New" panose="02070309020205020404" pitchFamily="49" charset="0"/>
+              </a:rPr>
+              <a:t>withText</a:t>
+            </a:r>
+            <a:r>
+              <a:rPr kumimoji="0" lang="en-US" altLang="en-US" sz="1200" b="0" i="0" u="none" strike="noStrike" cap="none" normalizeH="0" baseline="0" dirty="0">
+                <a:ln>
+                  <a:noFill/>
+                </a:ln>
+                <a:solidFill>
+                  <a:srgbClr val="000000"/>
+                </a:solidFill>
+                <a:effectLst/>
+                <a:latin typeface="Courier New" panose="02070309020205020404" pitchFamily="49" charset="0"/>
+                <a:cs typeface="Courier New" panose="02070309020205020404" pitchFamily="49" charset="0"/>
+              </a:rPr>
+              <a:t>(</a:t>
+            </a:r>
+            <a:r>
+              <a:rPr kumimoji="0" lang="en-US" altLang="en-US" sz="1200" b="1" i="0" u="none" strike="noStrike" cap="none" normalizeH="0" baseline="0" dirty="0">
+                <a:ln>
+                  <a:noFill/>
+                </a:ln>
+                <a:solidFill>
+                  <a:srgbClr val="660E7A"/>
+                </a:solidFill>
+                <a:effectLst/>
+                <a:latin typeface="Courier New" panose="02070309020205020404" pitchFamily="49" charset="0"/>
+                <a:cs typeface="Courier New" panose="02070309020205020404" pitchFamily="49" charset="0"/>
+              </a:rPr>
+              <a:t>name</a:t>
+            </a:r>
+            <a:r>
+              <a:rPr kumimoji="0" lang="en-US" altLang="en-US" sz="1200" b="0" i="0" u="none" strike="noStrike" cap="none" normalizeH="0" baseline="0" dirty="0">
+                <a:ln>
+                  <a:noFill/>
+                </a:ln>
+                <a:solidFill>
+                  <a:srgbClr val="000000"/>
+                </a:solidFill>
+                <a:effectLst/>
+                <a:latin typeface="Courier New" panose="02070309020205020404" pitchFamily="49" charset="0"/>
+                <a:cs typeface="Courier New" panose="02070309020205020404" pitchFamily="49" charset="0"/>
+              </a:rPr>
+              <a:t>))));</a:t>
+            </a:r>
+            <a:br>
+              <a:rPr kumimoji="0" lang="en-US" altLang="en-US" sz="1200" b="0" i="0" u="none" strike="noStrike" cap="none" normalizeH="0" baseline="0" dirty="0">
+                <a:ln>
+                  <a:noFill/>
+                </a:ln>
+                <a:solidFill>
+                  <a:srgbClr val="000000"/>
+                </a:solidFill>
+                <a:effectLst/>
+                <a:latin typeface="Courier New" panose="02070309020205020404" pitchFamily="49" charset="0"/>
+                <a:cs typeface="Courier New" panose="02070309020205020404" pitchFamily="49" charset="0"/>
+              </a:rPr>
+            </a:br>
+            <a:r>
+              <a:rPr kumimoji="0" lang="en-US" altLang="en-US" sz="1200" b="0" i="0" u="none" strike="noStrike" cap="none" normalizeH="0" baseline="0" dirty="0">
+                <a:ln>
+                  <a:noFill/>
+                </a:ln>
+                <a:solidFill>
+                  <a:srgbClr val="000000"/>
+                </a:solidFill>
+                <a:effectLst/>
+                <a:latin typeface="Courier New" panose="02070309020205020404" pitchFamily="49" charset="0"/>
+                <a:cs typeface="Courier New" panose="02070309020205020404" pitchFamily="49" charset="0"/>
+              </a:rPr>
+              <a:t>        }</a:t>
+            </a:r>
+            <a:br>
+              <a:rPr kumimoji="0" lang="en-US" altLang="en-US" sz="1200" b="0" i="0" u="none" strike="noStrike" cap="none" normalizeH="0" baseline="0" dirty="0">
+                <a:ln>
+                  <a:noFill/>
+                </a:ln>
+                <a:solidFill>
+                  <a:srgbClr val="000000"/>
+                </a:solidFill>
+                <a:effectLst/>
+                <a:latin typeface="Courier New" panose="02070309020205020404" pitchFamily="49" charset="0"/>
+                <a:cs typeface="Courier New" panose="02070309020205020404" pitchFamily="49" charset="0"/>
+              </a:rPr>
+            </a:br>
+            <a:br>
+              <a:rPr kumimoji="0" lang="en-US" altLang="en-US" sz="1200" b="0" i="0" u="none" strike="noStrike" cap="none" normalizeH="0" baseline="0" dirty="0">
+                <a:ln>
+                  <a:noFill/>
+                </a:ln>
+                <a:solidFill>
+                  <a:srgbClr val="000000"/>
+                </a:solidFill>
+                <a:effectLst/>
+                <a:latin typeface="Courier New" panose="02070309020205020404" pitchFamily="49" charset="0"/>
+                <a:cs typeface="Courier New" panose="02070309020205020404" pitchFamily="49" charset="0"/>
+              </a:rPr>
+            </a:br>
+            <a:r>
+              <a:rPr kumimoji="0" lang="en-US" altLang="en-US" sz="1200" b="0" i="0" u="none" strike="noStrike" cap="none" normalizeH="0" baseline="0" dirty="0">
+                <a:ln>
+                  <a:noFill/>
+                </a:ln>
+                <a:solidFill>
+                  <a:srgbClr val="000000"/>
+                </a:solidFill>
+                <a:effectLst/>
+                <a:latin typeface="Courier New" panose="02070309020205020404" pitchFamily="49" charset="0"/>
+                <a:cs typeface="Courier New" panose="02070309020205020404" pitchFamily="49" charset="0"/>
+              </a:rPr>
+              <a:t>        </a:t>
+            </a:r>
+            <a:r>
+              <a:rPr kumimoji="0" lang="en-US" altLang="en-US" sz="1200" b="0" i="0" u="none" strike="noStrike" cap="none" normalizeH="0" baseline="0" dirty="0">
+                <a:ln>
+                  <a:noFill/>
+                </a:ln>
+                <a:solidFill>
+                  <a:srgbClr val="808000"/>
+                </a:solidFill>
+                <a:effectLst/>
+                <a:latin typeface="Courier New" panose="02070309020205020404" pitchFamily="49" charset="0"/>
+                <a:cs typeface="Courier New" panose="02070309020205020404" pitchFamily="49" charset="0"/>
+              </a:rPr>
+              <a:t>@Override</a:t>
+            </a:r>
+            <a:br>
+              <a:rPr kumimoji="0" lang="en-US" altLang="en-US" sz="1200" b="0" i="0" u="none" strike="noStrike" cap="none" normalizeH="0" baseline="0" dirty="0">
+                <a:ln>
+                  <a:noFill/>
+                </a:ln>
+                <a:solidFill>
+                  <a:srgbClr val="808000"/>
+                </a:solidFill>
+                <a:effectLst/>
+                <a:latin typeface="Courier New" panose="02070309020205020404" pitchFamily="49" charset="0"/>
+                <a:cs typeface="Courier New" panose="02070309020205020404" pitchFamily="49" charset="0"/>
+              </a:rPr>
+            </a:br>
+            <a:r>
+              <a:rPr kumimoji="0" lang="en-US" altLang="en-US" sz="1200" b="0" i="0" u="none" strike="noStrike" cap="none" normalizeH="0" baseline="0" dirty="0">
+                <a:ln>
+                  <a:noFill/>
+                </a:ln>
+                <a:solidFill>
+                  <a:srgbClr val="808000"/>
+                </a:solidFill>
+                <a:effectLst/>
+                <a:latin typeface="Courier New" panose="02070309020205020404" pitchFamily="49" charset="0"/>
+                <a:cs typeface="Courier New" panose="02070309020205020404" pitchFamily="49" charset="0"/>
+              </a:rPr>
+              <a:t>        </a:t>
+            </a:r>
+            <a:r>
+              <a:rPr kumimoji="0" lang="en-US" altLang="en-US" sz="1200" b="1" i="0" u="none" strike="noStrike" cap="none" normalizeH="0" baseline="0" dirty="0">
+                <a:ln>
+                  <a:noFill/>
+                </a:ln>
+                <a:solidFill>
+                  <a:srgbClr val="000080"/>
+                </a:solidFill>
+                <a:effectLst/>
+                <a:latin typeface="Courier New" panose="02070309020205020404" pitchFamily="49" charset="0"/>
+                <a:cs typeface="Courier New" panose="02070309020205020404" pitchFamily="49" charset="0"/>
+              </a:rPr>
+              <a:t>public void </a:t>
+            </a:r>
+            <a:r>
+              <a:rPr kumimoji="0" lang="en-US" altLang="en-US" sz="1200" b="0" i="0" u="none" strike="noStrike" cap="none" normalizeH="0" baseline="0" dirty="0" err="1">
+                <a:ln>
+                  <a:noFill/>
+                </a:ln>
+                <a:solidFill>
+                  <a:srgbClr val="000000"/>
+                </a:solidFill>
+                <a:effectLst/>
+                <a:latin typeface="Courier New" panose="02070309020205020404" pitchFamily="49" charset="0"/>
+                <a:cs typeface="Courier New" panose="02070309020205020404" pitchFamily="49" charset="0"/>
+              </a:rPr>
+              <a:t>afterRotation</a:t>
+            </a:r>
+            <a:r>
+              <a:rPr kumimoji="0" lang="en-US" altLang="en-US" sz="1200" b="0" i="0" u="none" strike="noStrike" cap="none" normalizeH="0" baseline="0" dirty="0">
+                <a:ln>
+                  <a:noFill/>
+                </a:ln>
+                <a:solidFill>
+                  <a:srgbClr val="000000"/>
+                </a:solidFill>
+                <a:effectLst/>
+                <a:latin typeface="Courier New" panose="02070309020205020404" pitchFamily="49" charset="0"/>
+                <a:cs typeface="Courier New" panose="02070309020205020404" pitchFamily="49" charset="0"/>
+              </a:rPr>
+              <a:t>() {</a:t>
+            </a:r>
+            <a:br>
+              <a:rPr kumimoji="0" lang="en-US" altLang="en-US" sz="1200" b="0" i="0" u="none" strike="noStrike" cap="none" normalizeH="0" baseline="0" dirty="0">
+                <a:ln>
+                  <a:noFill/>
+                </a:ln>
+                <a:solidFill>
+                  <a:srgbClr val="000000"/>
+                </a:solidFill>
+                <a:effectLst/>
+                <a:latin typeface="Courier New" panose="02070309020205020404" pitchFamily="49" charset="0"/>
+                <a:cs typeface="Courier New" panose="02070309020205020404" pitchFamily="49" charset="0"/>
+              </a:rPr>
+            </a:br>
+            <a:r>
+              <a:rPr kumimoji="0" lang="en-US" altLang="en-US" sz="1200" b="0" i="0" u="none" strike="noStrike" cap="none" normalizeH="0" baseline="0" dirty="0">
+                <a:ln>
+                  <a:noFill/>
+                </a:ln>
+                <a:solidFill>
+                  <a:srgbClr val="000000"/>
+                </a:solidFill>
+                <a:effectLst/>
+                <a:latin typeface="Courier New" panose="02070309020205020404" pitchFamily="49" charset="0"/>
+                <a:cs typeface="Courier New" panose="02070309020205020404" pitchFamily="49" charset="0"/>
+              </a:rPr>
+              <a:t>            </a:t>
+            </a:r>
+            <a:r>
+              <a:rPr kumimoji="0" lang="en-US" altLang="en-US" sz="1200" b="0" i="1" u="none" strike="noStrike" cap="none" normalizeH="0" baseline="0" dirty="0" err="1">
+                <a:ln>
+                  <a:noFill/>
+                </a:ln>
+                <a:solidFill>
+                  <a:srgbClr val="000000"/>
+                </a:solidFill>
+                <a:effectLst/>
+                <a:latin typeface="Courier New" panose="02070309020205020404" pitchFamily="49" charset="0"/>
+                <a:cs typeface="Courier New" panose="02070309020205020404" pitchFamily="49" charset="0"/>
+              </a:rPr>
+              <a:t>onView</a:t>
+            </a:r>
+            <a:r>
+              <a:rPr kumimoji="0" lang="en-US" altLang="en-US" sz="1200" b="0" i="0" u="none" strike="noStrike" cap="none" normalizeH="0" baseline="0" dirty="0">
+                <a:ln>
+                  <a:noFill/>
+                </a:ln>
+                <a:solidFill>
+                  <a:srgbClr val="000000"/>
+                </a:solidFill>
+                <a:effectLst/>
+                <a:latin typeface="Courier New" panose="02070309020205020404" pitchFamily="49" charset="0"/>
+                <a:cs typeface="Courier New" panose="02070309020205020404" pitchFamily="49" charset="0"/>
+              </a:rPr>
+              <a:t>(</a:t>
+            </a:r>
+            <a:r>
+              <a:rPr kumimoji="0" lang="en-US" altLang="en-US" sz="1200" b="0" i="1" u="none" strike="noStrike" cap="none" normalizeH="0" baseline="0" dirty="0" err="1">
+                <a:ln>
+                  <a:noFill/>
+                </a:ln>
+                <a:solidFill>
+                  <a:srgbClr val="000000"/>
+                </a:solidFill>
+                <a:effectLst/>
+                <a:latin typeface="Courier New" panose="02070309020205020404" pitchFamily="49" charset="0"/>
+                <a:cs typeface="Courier New" panose="02070309020205020404" pitchFamily="49" charset="0"/>
+              </a:rPr>
+              <a:t>withId</a:t>
+            </a:r>
+            <a:r>
+              <a:rPr kumimoji="0" lang="en-US" altLang="en-US" sz="1200" b="0" i="0" u="none" strike="noStrike" cap="none" normalizeH="0" baseline="0" dirty="0">
+                <a:ln>
+                  <a:noFill/>
+                </a:ln>
+                <a:solidFill>
+                  <a:srgbClr val="000000"/>
+                </a:solidFill>
+                <a:effectLst/>
+                <a:latin typeface="Courier New" panose="02070309020205020404" pitchFamily="49" charset="0"/>
+                <a:cs typeface="Courier New" panose="02070309020205020404" pitchFamily="49" charset="0"/>
+              </a:rPr>
+              <a:t>(</a:t>
+            </a:r>
+            <a:r>
+              <a:rPr kumimoji="0" lang="en-US" altLang="en-US" sz="1200" b="0" i="0" u="none" strike="noStrike" cap="none" normalizeH="0" baseline="0" dirty="0" err="1">
+                <a:ln>
+                  <a:noFill/>
+                </a:ln>
+                <a:solidFill>
+                  <a:srgbClr val="000000"/>
+                </a:solidFill>
+                <a:effectLst/>
+                <a:latin typeface="Courier New" panose="02070309020205020404" pitchFamily="49" charset="0"/>
+                <a:cs typeface="Courier New" panose="02070309020205020404" pitchFamily="49" charset="0"/>
+              </a:rPr>
+              <a:t>R.id.</a:t>
+            </a:r>
+            <a:r>
+              <a:rPr kumimoji="0" lang="en-US" altLang="en-US" sz="1200" b="1" i="1" u="none" strike="noStrike" cap="none" normalizeH="0" baseline="0" dirty="0" err="1">
+                <a:ln>
+                  <a:noFill/>
+                </a:ln>
+                <a:solidFill>
+                  <a:srgbClr val="660E7A"/>
+                </a:solidFill>
+                <a:effectLst/>
+                <a:latin typeface="Courier New" panose="02070309020205020404" pitchFamily="49" charset="0"/>
+                <a:cs typeface="Courier New" panose="02070309020205020404" pitchFamily="49" charset="0"/>
+              </a:rPr>
+              <a:t>first_name</a:t>
+            </a:r>
+            <a:r>
+              <a:rPr kumimoji="0" lang="en-US" altLang="en-US" sz="1200" b="0" i="0" u="none" strike="noStrike" cap="none" normalizeH="0" baseline="0" dirty="0">
+                <a:ln>
+                  <a:noFill/>
+                </a:ln>
+                <a:solidFill>
+                  <a:srgbClr val="000000"/>
+                </a:solidFill>
+                <a:effectLst/>
+                <a:latin typeface="Courier New" panose="02070309020205020404" pitchFamily="49" charset="0"/>
+                <a:cs typeface="Courier New" panose="02070309020205020404" pitchFamily="49" charset="0"/>
+              </a:rPr>
+              <a:t>))</a:t>
+            </a:r>
+            <a:br>
+              <a:rPr kumimoji="0" lang="en-US" altLang="en-US" sz="1200" b="0" i="0" u="none" strike="noStrike" cap="none" normalizeH="0" baseline="0" dirty="0">
+                <a:ln>
+                  <a:noFill/>
+                </a:ln>
+                <a:solidFill>
+                  <a:srgbClr val="000000"/>
+                </a:solidFill>
+                <a:effectLst/>
+                <a:latin typeface="Courier New" panose="02070309020205020404" pitchFamily="49" charset="0"/>
+                <a:cs typeface="Courier New" panose="02070309020205020404" pitchFamily="49" charset="0"/>
+              </a:rPr>
+            </a:br>
+            <a:r>
+              <a:rPr kumimoji="0" lang="en-US" altLang="en-US" sz="1200" b="0" i="0" u="none" strike="noStrike" cap="none" normalizeH="0" baseline="0" dirty="0">
+                <a:ln>
+                  <a:noFill/>
+                </a:ln>
+                <a:solidFill>
+                  <a:srgbClr val="000000"/>
+                </a:solidFill>
+                <a:effectLst/>
+                <a:latin typeface="Courier New" panose="02070309020205020404" pitchFamily="49" charset="0"/>
+                <a:cs typeface="Courier New" panose="02070309020205020404" pitchFamily="49" charset="0"/>
+              </a:rPr>
+              <a:t>                    .check(</a:t>
+            </a:r>
+            <a:r>
+              <a:rPr kumimoji="0" lang="en-US" altLang="en-US" sz="1200" b="0" i="1" u="none" strike="noStrike" cap="none" normalizeH="0" baseline="0" dirty="0">
+                <a:ln>
+                  <a:noFill/>
+                </a:ln>
+                <a:solidFill>
+                  <a:srgbClr val="000000"/>
+                </a:solidFill>
+                <a:effectLst/>
+                <a:latin typeface="Courier New" panose="02070309020205020404" pitchFamily="49" charset="0"/>
+                <a:cs typeface="Courier New" panose="02070309020205020404" pitchFamily="49" charset="0"/>
+              </a:rPr>
+              <a:t>matches</a:t>
+            </a:r>
+            <a:r>
+              <a:rPr kumimoji="0" lang="en-US" altLang="en-US" sz="1200" b="0" i="0" u="none" strike="noStrike" cap="none" normalizeH="0" baseline="0" dirty="0">
+                <a:ln>
+                  <a:noFill/>
+                </a:ln>
+                <a:solidFill>
+                  <a:srgbClr val="000000"/>
+                </a:solidFill>
+                <a:effectLst/>
+                <a:latin typeface="Courier New" panose="02070309020205020404" pitchFamily="49" charset="0"/>
+                <a:cs typeface="Courier New" panose="02070309020205020404" pitchFamily="49" charset="0"/>
+              </a:rPr>
+              <a:t>(</a:t>
+            </a:r>
+            <a:r>
+              <a:rPr kumimoji="0" lang="en-US" altLang="en-US" sz="1200" b="0" i="1" u="none" strike="noStrike" cap="none" normalizeH="0" baseline="0" dirty="0" err="1">
+                <a:ln>
+                  <a:noFill/>
+                </a:ln>
+                <a:solidFill>
+                  <a:srgbClr val="000000"/>
+                </a:solidFill>
+                <a:effectLst/>
+                <a:latin typeface="Courier New" panose="02070309020205020404" pitchFamily="49" charset="0"/>
+                <a:cs typeface="Courier New" panose="02070309020205020404" pitchFamily="49" charset="0"/>
+              </a:rPr>
+              <a:t>allOf</a:t>
+            </a:r>
+            <a:r>
+              <a:rPr kumimoji="0" lang="en-US" altLang="en-US" sz="1200" b="0" i="0" u="none" strike="noStrike" cap="none" normalizeH="0" baseline="0" dirty="0">
+                <a:ln>
+                  <a:noFill/>
+                </a:ln>
+                <a:solidFill>
+                  <a:srgbClr val="000000"/>
+                </a:solidFill>
+                <a:effectLst/>
+                <a:latin typeface="Courier New" panose="02070309020205020404" pitchFamily="49" charset="0"/>
+                <a:cs typeface="Courier New" panose="02070309020205020404" pitchFamily="49" charset="0"/>
+              </a:rPr>
+              <a:t>(</a:t>
+            </a:r>
+            <a:r>
+              <a:rPr kumimoji="0" lang="en-US" altLang="en-US" sz="1200" b="0" i="1" u="none" strike="noStrike" cap="none" normalizeH="0" baseline="0" dirty="0" err="1">
+                <a:ln>
+                  <a:noFill/>
+                </a:ln>
+                <a:solidFill>
+                  <a:srgbClr val="000000"/>
+                </a:solidFill>
+                <a:effectLst/>
+                <a:latin typeface="Courier New" panose="02070309020205020404" pitchFamily="49" charset="0"/>
+                <a:cs typeface="Courier New" panose="02070309020205020404" pitchFamily="49" charset="0"/>
+              </a:rPr>
+              <a:t>isDisplayed</a:t>
+            </a:r>
+            <a:r>
+              <a:rPr kumimoji="0" lang="en-US" altLang="en-US" sz="1200" b="0" i="0" u="none" strike="noStrike" cap="none" normalizeH="0" baseline="0" dirty="0">
+                <a:ln>
+                  <a:noFill/>
+                </a:ln>
+                <a:solidFill>
+                  <a:srgbClr val="000000"/>
+                </a:solidFill>
+                <a:effectLst/>
+                <a:latin typeface="Courier New" panose="02070309020205020404" pitchFamily="49" charset="0"/>
+                <a:cs typeface="Courier New" panose="02070309020205020404" pitchFamily="49" charset="0"/>
+              </a:rPr>
+              <a:t>(), </a:t>
+            </a:r>
+            <a:r>
+              <a:rPr kumimoji="0" lang="en-US" altLang="en-US" sz="1200" b="0" i="1" u="none" strike="noStrike" cap="none" normalizeH="0" baseline="0" dirty="0" err="1">
+                <a:ln>
+                  <a:noFill/>
+                </a:ln>
+                <a:solidFill>
+                  <a:srgbClr val="000000"/>
+                </a:solidFill>
+                <a:effectLst/>
+                <a:latin typeface="Courier New" panose="02070309020205020404" pitchFamily="49" charset="0"/>
+                <a:cs typeface="Courier New" panose="02070309020205020404" pitchFamily="49" charset="0"/>
+              </a:rPr>
+              <a:t>withText</a:t>
+            </a:r>
+            <a:r>
+              <a:rPr kumimoji="0" lang="en-US" altLang="en-US" sz="1200" b="0" i="0" u="none" strike="noStrike" cap="none" normalizeH="0" baseline="0" dirty="0">
+                <a:ln>
+                  <a:noFill/>
+                </a:ln>
+                <a:solidFill>
+                  <a:srgbClr val="000000"/>
+                </a:solidFill>
+                <a:effectLst/>
+                <a:latin typeface="Courier New" panose="02070309020205020404" pitchFamily="49" charset="0"/>
+                <a:cs typeface="Courier New" panose="02070309020205020404" pitchFamily="49" charset="0"/>
+              </a:rPr>
+              <a:t>(</a:t>
+            </a:r>
+            <a:r>
+              <a:rPr kumimoji="0" lang="en-US" altLang="en-US" sz="1200" b="1" i="0" u="none" strike="noStrike" cap="none" normalizeH="0" baseline="0" dirty="0">
+                <a:ln>
+                  <a:noFill/>
+                </a:ln>
+                <a:solidFill>
+                  <a:srgbClr val="660E7A"/>
+                </a:solidFill>
+                <a:effectLst/>
+                <a:latin typeface="Courier New" panose="02070309020205020404" pitchFamily="49" charset="0"/>
+                <a:cs typeface="Courier New" panose="02070309020205020404" pitchFamily="49" charset="0"/>
+              </a:rPr>
+              <a:t>name</a:t>
+            </a:r>
+            <a:r>
+              <a:rPr kumimoji="0" lang="en-US" altLang="en-US" sz="1200" b="0" i="0" u="none" strike="noStrike" cap="none" normalizeH="0" baseline="0" dirty="0">
+                <a:ln>
+                  <a:noFill/>
+                </a:ln>
+                <a:solidFill>
+                  <a:srgbClr val="000000"/>
+                </a:solidFill>
+                <a:effectLst/>
+                <a:latin typeface="Courier New" panose="02070309020205020404" pitchFamily="49" charset="0"/>
+                <a:cs typeface="Courier New" panose="02070309020205020404" pitchFamily="49" charset="0"/>
+              </a:rPr>
+              <a:t>))));</a:t>
+            </a:r>
+            <a:br>
+              <a:rPr kumimoji="0" lang="en-US" altLang="en-US" sz="1200" b="0" i="0" u="none" strike="noStrike" cap="none" normalizeH="0" baseline="0" dirty="0">
+                <a:ln>
+                  <a:noFill/>
+                </a:ln>
+                <a:solidFill>
+                  <a:srgbClr val="000000"/>
+                </a:solidFill>
+                <a:effectLst/>
+                <a:latin typeface="Courier New" panose="02070309020205020404" pitchFamily="49" charset="0"/>
+                <a:cs typeface="Courier New" panose="02070309020205020404" pitchFamily="49" charset="0"/>
+              </a:rPr>
+            </a:br>
+            <a:r>
+              <a:rPr kumimoji="0" lang="en-US" altLang="en-US" sz="1200" b="0" i="0" u="none" strike="noStrike" cap="none" normalizeH="0" baseline="0" dirty="0">
+                <a:ln>
+                  <a:noFill/>
+                </a:ln>
+                <a:solidFill>
+                  <a:srgbClr val="000000"/>
+                </a:solidFill>
+                <a:effectLst/>
+                <a:latin typeface="Courier New" panose="02070309020205020404" pitchFamily="49" charset="0"/>
+                <a:cs typeface="Courier New" panose="02070309020205020404" pitchFamily="49" charset="0"/>
+              </a:rPr>
+              <a:t>        }</a:t>
+            </a:r>
+            <a:br>
+              <a:rPr kumimoji="0" lang="en-US" altLang="en-US" sz="1200" b="0" i="0" u="none" strike="noStrike" cap="none" normalizeH="0" baseline="0" dirty="0">
+                <a:ln>
+                  <a:noFill/>
+                </a:ln>
+                <a:solidFill>
+                  <a:srgbClr val="000000"/>
+                </a:solidFill>
+                <a:effectLst/>
+                <a:latin typeface="Courier New" panose="02070309020205020404" pitchFamily="49" charset="0"/>
+                <a:cs typeface="Courier New" panose="02070309020205020404" pitchFamily="49" charset="0"/>
+              </a:rPr>
+            </a:br>
+            <a:r>
+              <a:rPr kumimoji="0" lang="en-US" altLang="en-US" sz="1200" b="0" i="0" u="none" strike="noStrike" cap="none" normalizeH="0" baseline="0" dirty="0">
+                <a:ln>
+                  <a:noFill/>
+                </a:ln>
+                <a:solidFill>
+                  <a:srgbClr val="000000"/>
+                </a:solidFill>
+                <a:effectLst/>
+                <a:latin typeface="Courier New" panose="02070309020205020404" pitchFamily="49" charset="0"/>
+                <a:cs typeface="Courier New" panose="02070309020205020404" pitchFamily="49" charset="0"/>
+              </a:rPr>
+              <a:t>    };}</a:t>
+            </a:r>
+            <a:endParaRPr kumimoji="0" lang="en-US" altLang="en-US" sz="3200" b="0" i="0" u="none" strike="noStrike" cap="none" normalizeH="0" baseline="0" dirty="0">
+              <a:ln>
+                <a:noFill/>
+              </a:ln>
+              <a:solidFill>
+                <a:schemeClr val="tx1"/>
+              </a:solidFill>
+              <a:effectLst/>
+              <a:latin typeface="Arial" panose="020B0604020202020204" pitchFamily="34" charset="0"/>
+            </a:endParaRPr>
+          </a:p>
+        </p:txBody>
+      </p:sp>
+      <p:sp>
+        <p:nvSpPr>
           <p:cNvPr id="2" name="Segnaposto testo 1"/>
           <p:cNvSpPr>
             <a:spLocks noGrp="1"/>
@@ -10127,67 +12514,6 @@
             <a:r>
               <a:rPr lang="it-IT" dirty="0"/>
               <a:t>Test Dinamici per Lifecycle - Valutazione</a:t>
-            </a:r>
-          </a:p>
-        </p:txBody>
-      </p:sp>
-      <p:pic>
-        <p:nvPicPr>
-          <p:cNvPr id="3" name="Picture 2"/>
-          <p:cNvPicPr>
-            <a:picLocks noChangeAspect="1"/>
-          </p:cNvPicPr>
-          <p:nvPr/>
-        </p:nvPicPr>
-        <p:blipFill>
-          <a:blip r:embed="rId4"/>
-          <a:stretch>
-            <a:fillRect/>
-          </a:stretch>
-        </p:blipFill>
-        <p:spPr>
-          <a:xfrm>
-            <a:off x="82085" y="924407"/>
-            <a:ext cx="6386265" cy="5507215"/>
-          </a:xfrm>
-          <a:prstGeom prst="rect">
-            <a:avLst/>
-          </a:prstGeom>
-        </p:spPr>
-      </p:pic>
-      <p:sp>
-        <p:nvSpPr>
-          <p:cNvPr id="8" name="CasellaDiTesto 7"/>
-          <p:cNvSpPr txBox="1"/>
-          <p:nvPr/>
-        </p:nvSpPr>
-        <p:spPr>
-          <a:xfrm>
-            <a:off x="6707149" y="1245044"/>
-            <a:ext cx="2105102" cy="830997"/>
-          </a:xfrm>
-          <a:prstGeom prst="rect">
-            <a:avLst/>
-          </a:prstGeom>
-          <a:noFill/>
-        </p:spPr>
-        <p:txBody>
-          <a:bodyPr wrap="square" rtlCol="0">
-            <a:spAutoFit/>
-          </a:bodyPr>
-          <a:lstStyle/>
-          <a:p>
-            <a:r>
-              <a:rPr lang="it-IT" sz="1600" b="1" dirty="0"/>
-              <a:t>Test per </a:t>
-            </a:r>
-            <a:r>
-              <a:rPr lang="it-IT" sz="1600" b="1" dirty="0" err="1"/>
-              <a:t>WordPress</a:t>
-            </a:r>
-            <a:r>
-              <a:rPr lang="it-IT" sz="1600" b="1" dirty="0"/>
-              <a:t> definito in Espresso</a:t>
             </a:r>
           </a:p>
         </p:txBody>
@@ -10200,18 +12526,15 @@
         </p:nvCxnSpPr>
         <p:spPr>
           <a:xfrm flipH="1" flipV="1">
-            <a:off x="3637052" y="1077277"/>
-            <a:ext cx="3070097" cy="335534"/>
+            <a:off x="4213893" y="1756623"/>
+            <a:ext cx="2820257" cy="286855"/>
           </a:xfrm>
           <a:prstGeom prst="straightConnector1">
             <a:avLst/>
           </a:prstGeom>
-          <a:ln>
+          <a:ln w="12700">
             <a:solidFill>
-              <a:schemeClr val="accent1">
-                <a:lumMod val="40000"/>
-                <a:lumOff val="60000"/>
-              </a:schemeClr>
+              <a:schemeClr val="tx1"/>
             </a:solidFill>
             <a:tailEnd type="arrow"/>
           </a:ln>
@@ -10239,8 +12562,8 @@
         </p:nvSpPr>
         <p:spPr>
           <a:xfrm>
-            <a:off x="6769644" y="4214305"/>
-            <a:ext cx="2105102" cy="830997"/>
+            <a:off x="6760396" y="3335106"/>
+            <a:ext cx="2383604" cy="646331"/>
           </a:xfrm>
           <a:prstGeom prst="rect">
             <a:avLst/>
@@ -10254,7 +12577,7 @@
           <a:lstStyle/>
           <a:p>
             <a:r>
-              <a:rPr lang="it-IT" sz="1600" b="1" dirty="0"/>
+              <a:rPr lang="it-IT" dirty="0"/>
               <a:t>Azioni e controlli standard di Espresso</a:t>
             </a:r>
           </a:p>
@@ -10267,19 +12590,16 @@
           <p:nvPr/>
         </p:nvCxnSpPr>
         <p:spPr>
-          <a:xfrm flipH="1" flipV="1">
-            <a:off x="5825447" y="4214305"/>
-            <a:ext cx="944197" cy="121390"/>
+          <a:xfrm flipH="1">
+            <a:off x="5455578" y="3791164"/>
+            <a:ext cx="1304818" cy="238936"/>
           </a:xfrm>
           <a:prstGeom prst="straightConnector1">
             <a:avLst/>
           </a:prstGeom>
-          <a:ln>
+          <a:ln w="12700">
             <a:solidFill>
-              <a:schemeClr val="accent1">
-                <a:lumMod val="40000"/>
-                <a:lumOff val="60000"/>
-              </a:schemeClr>
+              <a:schemeClr val="tx1"/>
             </a:solidFill>
             <a:tailEnd type="arrow"/>
           </a:ln>
@@ -10307,18 +12627,15 @@
         </p:nvCxnSpPr>
         <p:spPr>
           <a:xfrm flipH="1">
-            <a:off x="6234060" y="4799080"/>
-            <a:ext cx="535584" cy="868405"/>
+            <a:off x="7541231" y="4030100"/>
+            <a:ext cx="490437" cy="1799579"/>
           </a:xfrm>
           <a:prstGeom prst="straightConnector1">
             <a:avLst/>
           </a:prstGeom>
-          <a:ln>
+          <a:ln w="12700">
             <a:solidFill>
-              <a:schemeClr val="accent1">
-                <a:lumMod val="40000"/>
-                <a:lumOff val="60000"/>
-              </a:schemeClr>
+              <a:schemeClr val="tx1"/>
             </a:solidFill>
             <a:tailEnd type="arrow"/>
           </a:ln>
@@ -10346,8 +12663,8 @@
         </p:nvSpPr>
         <p:spPr>
           <a:xfrm>
-            <a:off x="6707149" y="2514903"/>
-            <a:ext cx="2105102" cy="830997"/>
+            <a:off x="7038898" y="1581813"/>
+            <a:ext cx="2105102" cy="923330"/>
           </a:xfrm>
           <a:prstGeom prst="rect">
             <a:avLst/>
@@ -10361,56 +12678,61 @@
           <a:lstStyle/>
           <a:p>
             <a:r>
-              <a:rPr lang="it-IT" sz="1600" b="1" dirty="0"/>
+              <a:rPr lang="it-IT" dirty="0"/>
               <a:t>Lo sviluppatore deve solo definire un </a:t>
             </a:r>
             <a:r>
-              <a:rPr lang="it-IT" sz="1600" b="1" dirty="0" err="1"/>
+              <a:rPr lang="it-IT" dirty="0" err="1"/>
               <a:t>callback</a:t>
             </a:r>
-            <a:endParaRPr lang="it-IT" sz="1600" b="1" dirty="0"/>
+            <a:endParaRPr lang="it-IT" dirty="0"/>
           </a:p>
         </p:txBody>
       </p:sp>
-      <p:cxnSp>
-        <p:nvCxnSpPr>
-          <p:cNvPr id="21" name="Connettore 2 5"/>
-          <p:cNvCxnSpPr/>
+      <p:sp>
+        <p:nvSpPr>
+          <p:cNvPr id="24" name="CasellaDiTesto 9"/>
+          <p:cNvSpPr txBox="1"/>
           <p:nvPr/>
-        </p:nvCxnSpPr>
+        </p:nvSpPr>
         <p:spPr>
-          <a:xfrm flipH="1" flipV="1">
-            <a:off x="3548899" y="1802537"/>
-            <a:ext cx="3070098" cy="756529"/>
+          <a:xfrm>
+            <a:off x="132436" y="950266"/>
+            <a:ext cx="8556526" cy="461665"/>
           </a:xfrm>
-          <a:prstGeom prst="straightConnector1">
+          <a:prstGeom prst="rect">
             <a:avLst/>
           </a:prstGeom>
-          <a:ln>
-            <a:solidFill>
-              <a:schemeClr val="accent1">
-                <a:lumMod val="40000"/>
-                <a:lumOff val="60000"/>
-              </a:schemeClr>
-            </a:solidFill>
-            <a:tailEnd type="arrow"/>
-          </a:ln>
+          <a:noFill/>
         </p:spPr>
-        <p:style>
-          <a:lnRef idx="2">
-            <a:schemeClr val="accent1"/>
-          </a:lnRef>
-          <a:fillRef idx="0">
-            <a:schemeClr val="accent1"/>
-          </a:fillRef>
-          <a:effectRef idx="1">
-            <a:schemeClr val="accent1"/>
-          </a:effectRef>
-          <a:fontRef idx="minor">
-            <a:schemeClr val="tx1"/>
-          </a:fontRef>
-        </p:style>
-      </p:cxnSp>
+        <p:txBody>
+          <a:bodyPr wrap="square" rtlCol="0">
+            <a:spAutoFit/>
+          </a:bodyPr>
+          <a:lstStyle/>
+          <a:p>
+            <a:pPr marL="285750" indent="-285750">
+              <a:spcAft>
+                <a:spcPts val="1200"/>
+              </a:spcAft>
+              <a:buFont typeface="Arial"/>
+              <a:buChar char="•"/>
+            </a:pPr>
+            <a:r>
+              <a:rPr lang="it-IT" sz="2400" dirty="0"/>
+              <a:t>Test per </a:t>
+            </a:r>
+            <a:r>
+              <a:rPr lang="it-IT" sz="2400" dirty="0" err="1"/>
+              <a:t>WordPress</a:t>
+            </a:r>
+            <a:r>
+              <a:rPr lang="it-IT" sz="2400" dirty="0"/>
+              <a:t> definito in Espresso</a:t>
+            </a:r>
+          </a:p>
+        </p:txBody>
+      </p:sp>
     </p:spTree>
     <p:custDataLst>
       <p:tags r:id="rId1"/>

</xml_diff>

<commit_message>
Presentation: better events part
</commit_message>
<xml_diff>
--- a/Presentation/Presentation.pptx
+++ b/Presentation/Presentation.pptx
@@ -3793,14 +3793,14 @@
           </a:ln>
           <a:extLst>
             <a:ext uri="{909E8E84-426E-40dd-AFC4-6F175D3DCCD1}">
-              <a14:hiddenFill xmlns="" xmlns:a14="http://schemas.microsoft.com/office/drawing/2010/main">
+              <a14:hiddenFill xmlns:a14="http://schemas.microsoft.com/office/drawing/2010/main" xmlns="">
                 <a:solidFill>
                   <a:srgbClr val="FFFFFF"/>
                 </a:solidFill>
               </a14:hiddenFill>
             </a:ext>
             <a:ext uri="{91240B29-F687-4f45-9708-019B960494DF}">
-              <a14:hiddenLine xmlns="" xmlns:a14="http://schemas.microsoft.com/office/drawing/2010/main" w="9525">
+              <a14:hiddenLine xmlns:a14="http://schemas.microsoft.com/office/drawing/2010/main" xmlns="" w="9525">
                 <a:solidFill>
                   <a:srgbClr val="000000"/>
                 </a:solidFill>
@@ -3878,14 +3878,14 @@
           </a:ln>
           <a:extLst>
             <a:ext uri="{909E8E84-426E-40dd-AFC4-6F175D3DCCD1}">
-              <a14:hiddenFill xmlns="" xmlns:a14="http://schemas.microsoft.com/office/drawing/2010/main">
+              <a14:hiddenFill xmlns:a14="http://schemas.microsoft.com/office/drawing/2010/main" xmlns="">
                 <a:solidFill>
                   <a:srgbClr val="FFFFFF"/>
                 </a:solidFill>
               </a14:hiddenFill>
             </a:ext>
             <a:ext uri="{91240B29-F687-4f45-9708-019B960494DF}">
-              <a14:hiddenLine xmlns="" xmlns:a14="http://schemas.microsoft.com/office/drawing/2010/main" w="9525">
+              <a14:hiddenLine xmlns:a14="http://schemas.microsoft.com/office/drawing/2010/main" xmlns="" w="9525">
                 <a:solidFill>
                   <a:srgbClr val="000000"/>
                 </a:solidFill>
@@ -3895,7 +3895,7 @@
               </a14:hiddenLine>
             </a:ext>
             <a:ext uri="{FAA26D3D-D897-4be2-8F04-BA451C77F1D7}">
-              <ma14:placeholderFlag xmlns="" xmlns:ma14="http://schemas.microsoft.com/office/mac/drawingml/2011/main" val="1"/>
+              <ma14:placeholderFlag xmlns:ma14="http://schemas.microsoft.com/office/mac/drawingml/2011/main" xmlns="" val="1"/>
             </a:ext>
           </a:extLst>
         </p:spPr>
@@ -3939,14 +3939,14 @@
           </a:ln>
           <a:extLst>
             <a:ext uri="{909E8E84-426E-40dd-AFC4-6F175D3DCCD1}">
-              <a14:hiddenFill xmlns="" xmlns:a14="http://schemas.microsoft.com/office/drawing/2010/main">
+              <a14:hiddenFill xmlns:a14="http://schemas.microsoft.com/office/drawing/2010/main" xmlns="">
                 <a:solidFill>
                   <a:srgbClr val="FFFFFF"/>
                 </a:solidFill>
               </a14:hiddenFill>
             </a:ext>
             <a:ext uri="{91240B29-F687-4f45-9708-019B960494DF}">
-              <a14:hiddenLine xmlns="" xmlns:a14="http://schemas.microsoft.com/office/drawing/2010/main" w="9525">
+              <a14:hiddenLine xmlns:a14="http://schemas.microsoft.com/office/drawing/2010/main" xmlns="" w="9525">
                 <a:solidFill>
                   <a:srgbClr val="000000"/>
                 </a:solidFill>
@@ -3956,7 +3956,7 @@
               </a14:hiddenLine>
             </a:ext>
             <a:ext uri="{FAA26D3D-D897-4be2-8F04-BA451C77F1D7}">
-              <ma14:placeholderFlag xmlns="" xmlns:ma14="http://schemas.microsoft.com/office/mac/drawingml/2011/main" val="1"/>
+              <ma14:placeholderFlag xmlns:ma14="http://schemas.microsoft.com/office/mac/drawingml/2011/main" xmlns="" val="1"/>
             </a:ext>
           </a:extLst>
         </p:spPr>
@@ -4451,14 +4451,14 @@
           <a:effectLst/>
           <a:extLst>
             <a:ext uri="{909E8E84-426E-40dd-AFC4-6F175D3DCCD1}">
-              <a14:hiddenFill xmlns="" xmlns:a14="http://schemas.microsoft.com/office/drawing/2010/main">
+              <a14:hiddenFill xmlns:a14="http://schemas.microsoft.com/office/drawing/2010/main" xmlns="">
                 <a:solidFill>
                   <a:schemeClr val="accent1"/>
                 </a:solidFill>
               </a14:hiddenFill>
             </a:ext>
             <a:ext uri="{91240B29-F687-4f45-9708-019B960494DF}">
-              <a14:hiddenLine xmlns="" xmlns:a14="http://schemas.microsoft.com/office/drawing/2010/main" w="9525">
+              <a14:hiddenLine xmlns:a14="http://schemas.microsoft.com/office/drawing/2010/main" xmlns="" w="9525">
                 <a:solidFill>
                   <a:srgbClr val="FF6600"/>
                 </a:solidFill>
@@ -4468,7 +4468,7 @@
               </a14:hiddenLine>
             </a:ext>
             <a:ext uri="{AF507438-7753-43e0-B8FC-AC1667EBCBE1}">
-              <a14:hiddenEffects xmlns="" xmlns:a14="http://schemas.microsoft.com/office/drawing/2010/main">
+              <a14:hiddenEffects xmlns:a14="http://schemas.microsoft.com/office/drawing/2010/main" xmlns="">
                 <a:effectLst>
                   <a:outerShdw blurRad="63500" dist="38099" dir="2700000" algn="ctr" rotWithShape="0">
                     <a:schemeClr val="bg2">
@@ -5036,14 +5036,14 @@
           </a:ln>
           <a:extLst>
             <a:ext uri="{909E8E84-426E-40dd-AFC4-6F175D3DCCD1}">
-              <a14:hiddenFill xmlns="" xmlns:a14="http://schemas.microsoft.com/office/drawing/2010/main">
+              <a14:hiddenFill xmlns:a14="http://schemas.microsoft.com/office/drawing/2010/main" xmlns="">
                 <a:solidFill>
                   <a:srgbClr val="FFFFFF"/>
                 </a:solidFill>
               </a14:hiddenFill>
             </a:ext>
             <a:ext uri="{91240B29-F687-4f45-9708-019B960494DF}">
-              <a14:hiddenLine xmlns="" xmlns:a14="http://schemas.microsoft.com/office/drawing/2010/main" w="9525">
+              <a14:hiddenLine xmlns:a14="http://schemas.microsoft.com/office/drawing/2010/main" xmlns="" w="9525">
                 <a:solidFill>
                   <a:srgbClr val="000000"/>
                 </a:solidFill>
@@ -5121,14 +5121,14 @@
           </a:ln>
           <a:extLst>
             <a:ext uri="{909E8E84-426E-40dd-AFC4-6F175D3DCCD1}">
-              <a14:hiddenFill xmlns="" xmlns:a14="http://schemas.microsoft.com/office/drawing/2010/main">
+              <a14:hiddenFill xmlns:a14="http://schemas.microsoft.com/office/drawing/2010/main" xmlns="">
                 <a:solidFill>
                   <a:srgbClr val="FFFFFF"/>
                 </a:solidFill>
               </a14:hiddenFill>
             </a:ext>
             <a:ext uri="{91240B29-F687-4f45-9708-019B960494DF}">
-              <a14:hiddenLine xmlns="" xmlns:a14="http://schemas.microsoft.com/office/drawing/2010/main" w="9525">
+              <a14:hiddenLine xmlns:a14="http://schemas.microsoft.com/office/drawing/2010/main" xmlns="" w="9525">
                 <a:solidFill>
                   <a:srgbClr val="000000"/>
                 </a:solidFill>
@@ -5138,7 +5138,7 @@
               </a14:hiddenLine>
             </a:ext>
             <a:ext uri="{FAA26D3D-D897-4be2-8F04-BA451C77F1D7}">
-              <ma14:placeholderFlag xmlns="" xmlns:ma14="http://schemas.microsoft.com/office/mac/drawingml/2011/main" val="1"/>
+              <ma14:placeholderFlag xmlns:ma14="http://schemas.microsoft.com/office/mac/drawingml/2011/main" xmlns="" val="1"/>
             </a:ext>
           </a:extLst>
         </p:spPr>
@@ -5182,14 +5182,14 @@
           </a:ln>
           <a:extLst>
             <a:ext uri="{909E8E84-426E-40dd-AFC4-6F175D3DCCD1}">
-              <a14:hiddenFill xmlns="" xmlns:a14="http://schemas.microsoft.com/office/drawing/2010/main">
+              <a14:hiddenFill xmlns:a14="http://schemas.microsoft.com/office/drawing/2010/main" xmlns="">
                 <a:solidFill>
                   <a:srgbClr val="FFFFFF"/>
                 </a:solidFill>
               </a14:hiddenFill>
             </a:ext>
             <a:ext uri="{91240B29-F687-4f45-9708-019B960494DF}">
-              <a14:hiddenLine xmlns="" xmlns:a14="http://schemas.microsoft.com/office/drawing/2010/main" w="9525">
+              <a14:hiddenLine xmlns:a14="http://schemas.microsoft.com/office/drawing/2010/main" xmlns="" w="9525">
                 <a:solidFill>
                   <a:srgbClr val="000000"/>
                 </a:solidFill>
@@ -5199,7 +5199,7 @@
               </a14:hiddenLine>
             </a:ext>
             <a:ext uri="{FAA26D3D-D897-4be2-8F04-BA451C77F1D7}">
-              <ma14:placeholderFlag xmlns="" xmlns:ma14="http://schemas.microsoft.com/office/mac/drawingml/2011/main" val="1"/>
+              <ma14:placeholderFlag xmlns:ma14="http://schemas.microsoft.com/office/mac/drawingml/2011/main" xmlns="" val="1"/>
             </a:ext>
           </a:extLst>
         </p:spPr>
@@ -6124,7 +6124,7 @@
         <p:spPr>
           <a:xfrm>
             <a:off x="299798" y="1185506"/>
-            <a:ext cx="8515429" cy="3046988"/>
+            <a:ext cx="8515429" cy="5078313"/>
           </a:xfrm>
           <a:prstGeom prst="rect">
             <a:avLst/>
@@ -6138,16 +6138,26 @@
           <a:lstStyle/>
           <a:p>
             <a:pPr marL="285750" indent="-285750">
+              <a:spcAft>
+                <a:spcPts val="1200"/>
+              </a:spcAft>
               <a:buFont typeface="Arial"/>
               <a:buChar char="•"/>
             </a:pPr>
             <a:r>
+              <a:rPr lang="it-IT" sz="2400" dirty="0" err="1"/>
+              <a:t>App</a:t>
+            </a:r>
+            <a:r>
               <a:rPr lang="it-IT" sz="2400" dirty="0"/>
-              <a:t>Applicazioni mobili caratterizzate da centinaia di eventi</a:t>
+              <a:t> possono registrare anche centinaia di eventi al secondo</a:t>
             </a:r>
           </a:p>
           <a:p>
             <a:pPr marL="742950" lvl="1" indent="-285750">
+              <a:spcAft>
+                <a:spcPts val="1200"/>
+              </a:spcAft>
               <a:buFont typeface="Arial"/>
               <a:buChar char="•"/>
             </a:pPr>
@@ -6166,6 +6176,9 @@
           </a:p>
           <a:p>
             <a:pPr marL="285750" indent="-285750">
+              <a:spcAft>
+                <a:spcPts val="1200"/>
+              </a:spcAft>
               <a:buFont typeface="Arial"/>
               <a:buChar char="•"/>
             </a:pPr>
@@ -6184,22 +6197,28 @@
           </a:p>
           <a:p>
             <a:pPr marL="285750" indent="-285750">
+              <a:spcAft>
+                <a:spcPts val="1200"/>
+              </a:spcAft>
               <a:buFont typeface="Arial"/>
               <a:buChar char="•"/>
             </a:pPr>
             <a:r>
               <a:rPr lang="it-IT" sz="2400" dirty="0"/>
-              <a:t>Se registrati in un ordine inaspettato, possono causare problemi</a:t>
+              <a:t>Se registrati in ordine o quantità inaspettati dal programmatore, possono causare problemi</a:t>
             </a:r>
           </a:p>
           <a:p>
             <a:pPr marL="285750" indent="-285750">
+              <a:spcAft>
+                <a:spcPts val="1200"/>
+              </a:spcAft>
               <a:buFont typeface="Arial"/>
               <a:buChar char="•"/>
             </a:pPr>
             <a:r>
               <a:rPr lang="it-IT" sz="2400" dirty="0"/>
-              <a:t>Race </a:t>
+              <a:t>Esempio: Race </a:t>
             </a:r>
             <a:r>
               <a:rPr lang="it-IT" sz="2400" dirty="0" err="1"/>
@@ -6208,10 +6227,38 @@
             <a:endParaRPr lang="it-IT" sz="2400" dirty="0"/>
           </a:p>
           <a:p>
-            <a:pPr marL="285750" indent="-285750">
+            <a:pPr marL="742950" lvl="1" indent="-285750">
+              <a:spcAft>
+                <a:spcPts val="1200"/>
+              </a:spcAft>
               <a:buFont typeface="Arial"/>
               <a:buChar char="•"/>
             </a:pPr>
+            <a:r>
+              <a:rPr lang="it-IT" sz="2400" dirty="0"/>
+              <a:t>Lo sviluppatore assume la causalità E1 </a:t>
+            </a:r>
+            <a:r>
+              <a:rPr lang="it-IT" sz="2400" dirty="0">
+                <a:sym typeface="Wingdings" panose="05000000000000000000" pitchFamily="2" charset="2"/>
+              </a:rPr>
+              <a:t> E2 tra due eventi, ma il sistema genera E2 prima di E1</a:t>
+            </a:r>
+          </a:p>
+          <a:p>
+            <a:pPr marL="742950" lvl="1" indent="-285750">
+              <a:spcAft>
+                <a:spcPts val="1200"/>
+              </a:spcAft>
+              <a:buFont typeface="Arial"/>
+              <a:buChar char="•"/>
+            </a:pPr>
+            <a:r>
+              <a:rPr lang="it-IT" sz="2400" dirty="0">
+                <a:sym typeface="Wingdings" panose="05000000000000000000" pitchFamily="2" charset="2"/>
+              </a:rPr>
+              <a:t>Possibili crash o comportamenti inaspettati</a:t>
+            </a:r>
             <a:endParaRPr lang="it-IT" sz="2400" dirty="0"/>
           </a:p>
         </p:txBody>
@@ -6287,8 +6334,8 @@
         </p:nvSpPr>
         <p:spPr>
           <a:xfrm>
-            <a:off x="299798" y="1185506"/>
-            <a:ext cx="8566800" cy="4893647"/>
+            <a:off x="299798" y="1154684"/>
+            <a:ext cx="8566800" cy="5232202"/>
           </a:xfrm>
           <a:prstGeom prst="rect">
             <a:avLst/>
@@ -6302,16 +6349,22 @@
           <a:lstStyle/>
           <a:p>
             <a:pPr marL="285750" indent="-285750">
+              <a:spcAft>
+                <a:spcPts val="1200"/>
+              </a:spcAft>
               <a:buFont typeface="Arial"/>
               <a:buChar char="•"/>
             </a:pPr>
             <a:r>
               <a:rPr lang="it-IT" sz="2400" dirty="0"/>
-              <a:t>Eventi sono complessi da testare con le tecnologie disponibili al momento</a:t>
+              <a:t>In Android, gli eventi sono complessi da testare con le tecnologie disponibili al momento</a:t>
             </a:r>
           </a:p>
           <a:p>
             <a:pPr marL="285750" indent="-285750">
+              <a:spcAft>
+                <a:spcPts val="1200"/>
+              </a:spcAft>
               <a:buFont typeface="Arial"/>
               <a:buChar char="•"/>
             </a:pPr>
@@ -6322,6 +6375,9 @@
           </a:p>
           <a:p>
             <a:pPr marL="285750" indent="-285750">
+              <a:spcAft>
+                <a:spcPts val="1200"/>
+              </a:spcAft>
               <a:buFont typeface="Arial"/>
               <a:buChar char="•"/>
             </a:pPr>
@@ -6332,6 +6388,9 @@
           </a:p>
           <a:p>
             <a:pPr marL="742950" lvl="1" indent="-285750">
+              <a:spcAft>
+                <a:spcPts val="1200"/>
+              </a:spcAft>
               <a:buFont typeface="Arial"/>
               <a:buChar char="•"/>
             </a:pPr>
@@ -6342,6 +6401,9 @@
           </a:p>
           <a:p>
             <a:pPr marL="742950" lvl="1" indent="-285750">
+              <a:spcAft>
+                <a:spcPts val="1200"/>
+              </a:spcAft>
               <a:buFont typeface="Arial"/>
               <a:buChar char="•"/>
             </a:pPr>
@@ -6352,6 +6414,9 @@
           </a:p>
           <a:p>
             <a:pPr marL="742950" lvl="1" indent="-285750">
+              <a:spcAft>
+                <a:spcPts val="1200"/>
+              </a:spcAft>
               <a:buFont typeface="Arial"/>
               <a:buChar char="•"/>
             </a:pPr>
@@ -6362,6 +6427,9 @@
           </a:p>
           <a:p>
             <a:pPr marL="742950" lvl="1" indent="-285750">
+              <a:spcAft>
+                <a:spcPts val="1200"/>
+              </a:spcAft>
               <a:buFont typeface="Arial"/>
               <a:buChar char="•"/>
             </a:pPr>
@@ -6372,6 +6440,9 @@
           </a:p>
           <a:p>
             <a:pPr marL="285750" indent="-285750">
+              <a:spcAft>
+                <a:spcPts val="1200"/>
+              </a:spcAft>
               <a:buFont typeface="Arial"/>
               <a:buChar char="•"/>
             </a:pPr>
@@ -6379,20 +6450,6 @@
               <a:rPr lang="it-IT" sz="2400" dirty="0"/>
               <a:t>Possibilità di correlare più condizioni tramite connettivi logici</a:t>
             </a:r>
-          </a:p>
-          <a:p>
-            <a:pPr marL="285750" indent="-285750">
-              <a:buFont typeface="Arial"/>
-              <a:buChar char="•"/>
-            </a:pPr>
-            <a:endParaRPr lang="it-IT" sz="2400" dirty="0"/>
-          </a:p>
-          <a:p>
-            <a:pPr marL="285750" indent="-285750">
-              <a:buFont typeface="Arial"/>
-              <a:buChar char="•"/>
-            </a:pPr>
-            <a:endParaRPr lang="it-IT" sz="2400" dirty="0"/>
           </a:p>
         </p:txBody>
       </p:sp>
@@ -6487,7 +6544,7 @@
             </a:pPr>
             <a:r>
               <a:rPr lang="it-IT" sz="2400" dirty="0"/>
-              <a:t>Causalità tra eventi</a:t>
+              <a:t>Esempio: causalità tra eventi</a:t>
             </a:r>
           </a:p>
           <a:p>
@@ -6521,7 +6578,7 @@
         </p:blipFill>
         <p:spPr>
           <a:xfrm>
-            <a:off x="399835" y="2016503"/>
+            <a:off x="399835" y="2088418"/>
             <a:ext cx="8344329" cy="3937202"/>
           </a:xfrm>
           <a:prstGeom prst="rect">
@@ -6620,7 +6677,7 @@
             </a:pPr>
             <a:r>
               <a:rPr lang="it-IT" sz="2400" dirty="0"/>
-              <a:t>Ordinamento di eventi di un determinato tipo</a:t>
+              <a:t>Esempio: ordinamento di eventi di un determinato tipo</a:t>
             </a:r>
           </a:p>
           <a:p>
@@ -6720,7 +6777,7 @@
           <a:p>
             <a:r>
               <a:rPr lang="it-IT" dirty="0"/>
-              <a:t>Design e Implementazione</a:t>
+              <a:t>Libreria per Testing basato sugli Eventi</a:t>
             </a:r>
           </a:p>
         </p:txBody>
@@ -6733,8 +6790,8 @@
         </p:nvSpPr>
         <p:spPr>
           <a:xfrm>
-            <a:off x="101448" y="1226599"/>
-            <a:ext cx="5539064" cy="4893647"/>
+            <a:off x="390418" y="1185503"/>
+            <a:ext cx="5100771" cy="4924425"/>
           </a:xfrm>
           <a:prstGeom prst="rect">
             <a:avLst/>
@@ -6748,6 +6805,9 @@
           <a:lstStyle/>
           <a:p>
             <a:pPr marL="285750" indent="-285750">
+              <a:spcAft>
+                <a:spcPts val="1200"/>
+              </a:spcAft>
               <a:buFont typeface="Arial"/>
               <a:buChar char="•"/>
             </a:pPr>
@@ -6766,6 +6826,9 @@
           </a:p>
           <a:p>
             <a:pPr marL="742950" lvl="1" indent="-285750">
+              <a:spcAft>
+                <a:spcPts val="1200"/>
+              </a:spcAft>
               <a:buFont typeface="Arial"/>
               <a:buChar char="•"/>
             </a:pPr>
@@ -6776,6 +6839,9 @@
           </a:p>
           <a:p>
             <a:pPr marL="742950" lvl="1" indent="-285750">
+              <a:spcAft>
+                <a:spcPts val="1200"/>
+              </a:spcAft>
               <a:buFont typeface="Arial"/>
               <a:buChar char="•"/>
             </a:pPr>
@@ -6786,6 +6852,9 @@
           </a:p>
           <a:p>
             <a:pPr marL="742950" lvl="1" indent="-285750">
+              <a:spcAft>
+                <a:spcPts val="1200"/>
+              </a:spcAft>
               <a:buFont typeface="Arial"/>
               <a:buChar char="•"/>
             </a:pPr>
@@ -6796,75 +6865,60 @@
           </a:p>
           <a:p>
             <a:pPr marL="285750" indent="-285750">
+              <a:spcAft>
+                <a:spcPts val="1200"/>
+              </a:spcAft>
               <a:buFont typeface="Arial"/>
               <a:buChar char="•"/>
             </a:pPr>
             <a:r>
+              <a:rPr lang="it-IT" sz="2400" dirty="0" err="1"/>
+              <a:t>Tool</a:t>
+            </a:r>
+            <a:r>
               <a:rPr lang="it-IT" sz="2400" dirty="0"/>
-              <a:t>Ogni </a:t>
-            </a:r>
-            <a:r>
-              <a:rPr lang="it-IT" sz="2400" dirty="0" err="1"/>
-              <a:t>Observable</a:t>
-            </a:r>
-            <a:r>
-              <a:rPr lang="it-IT" sz="2400" dirty="0"/>
-              <a:t> produce uno o più eventi durante l’esecuzione</a:t>
+              <a:t> implementato con la libreria ReactiveX: RxJava e RxAndroid</a:t>
             </a:r>
           </a:p>
           <a:p>
             <a:pPr marL="285750" indent="-285750">
+              <a:spcAft>
+                <a:spcPts val="1200"/>
+              </a:spcAft>
               <a:buFont typeface="Arial"/>
               <a:buChar char="•"/>
             </a:pPr>
             <a:r>
               <a:rPr lang="it-IT" sz="2400" dirty="0"/>
-              <a:t>Ogni </a:t>
+              <a:t>Utilizzabile in ogni </a:t>
             </a:r>
             <a:r>
               <a:rPr lang="it-IT" sz="2400" dirty="0" err="1"/>
-              <a:t>Check</a:t>
+              <a:t>framework</a:t>
             </a:r>
             <a:r>
               <a:rPr lang="it-IT" sz="2400" dirty="0"/>
-              <a:t> specifica un’asserzione temporale e produce un risultato finale</a:t>
-            </a:r>
-          </a:p>
-          <a:p>
-            <a:pPr marL="285750" indent="-285750">
-              <a:buFont typeface="Arial"/>
-              <a:buChar char="•"/>
-            </a:pPr>
-            <a:r>
-              <a:rPr lang="it-IT" sz="2400" dirty="0" err="1"/>
-              <a:t>Tool</a:t>
-            </a:r>
-            <a:r>
-              <a:rPr lang="it-IT" sz="2400" dirty="0"/>
-              <a:t> implementato con la libreria ReactiveX: RxJava e RxAndroid</a:t>
+              <a:t> di test</a:t>
             </a:r>
           </a:p>
         </p:txBody>
       </p:sp>
       <p:sp>
         <p:nvSpPr>
-          <p:cNvPr id="5" name="Rounded Rectangle 4"/>
+          <p:cNvPr id="15" name="Rounded Rectangle 14"/>
           <p:cNvSpPr/>
           <p:nvPr/>
         </p:nvSpPr>
         <p:spPr>
           <a:xfrm>
-            <a:off x="6670637" y="1582225"/>
+            <a:off x="6670637" y="1695239"/>
             <a:ext cx="1280160" cy="640080"/>
           </a:xfrm>
           <a:prstGeom prst="roundRect">
             <a:avLst/>
           </a:prstGeom>
           <a:solidFill>
-            <a:schemeClr val="accent1">
-              <a:lumMod val="60000"/>
-              <a:lumOff val="40000"/>
-            </a:schemeClr>
+            <a:schemeClr val="bg1"/>
           </a:solidFill>
         </p:spPr>
         <p:style>
@@ -6901,23 +6955,20 @@
       </p:sp>
       <p:sp>
         <p:nvSpPr>
-          <p:cNvPr id="7" name="Rounded Rectangle 6"/>
+          <p:cNvPr id="16" name="Rounded Rectangle 15"/>
           <p:cNvSpPr/>
           <p:nvPr/>
         </p:nvSpPr>
         <p:spPr>
           <a:xfrm>
-            <a:off x="7582615" y="2988069"/>
+            <a:off x="7582615" y="3101083"/>
             <a:ext cx="1280160" cy="640080"/>
           </a:xfrm>
           <a:prstGeom prst="roundRect">
             <a:avLst/>
           </a:prstGeom>
           <a:solidFill>
-            <a:schemeClr val="accent1">
-              <a:lumMod val="60000"/>
-              <a:lumOff val="40000"/>
-            </a:schemeClr>
+            <a:schemeClr val="bg1"/>
           </a:solidFill>
         </p:spPr>
         <p:style>
@@ -6954,23 +7005,20 @@
       </p:sp>
       <p:sp>
         <p:nvSpPr>
-          <p:cNvPr id="8" name="Rounded Rectangle 7"/>
+          <p:cNvPr id="17" name="Rounded Rectangle 16"/>
           <p:cNvSpPr/>
           <p:nvPr/>
         </p:nvSpPr>
         <p:spPr>
           <a:xfrm>
-            <a:off x="7582615" y="4416286"/>
+            <a:off x="7582615" y="4529300"/>
             <a:ext cx="1280160" cy="640080"/>
           </a:xfrm>
           <a:prstGeom prst="roundRect">
             <a:avLst/>
           </a:prstGeom>
           <a:solidFill>
-            <a:schemeClr val="accent1">
-              <a:lumMod val="60000"/>
-              <a:lumOff val="40000"/>
-            </a:schemeClr>
+            <a:schemeClr val="bg1"/>
           </a:solidFill>
         </p:spPr>
         <p:style>
@@ -7007,23 +7055,20 @@
       </p:sp>
       <p:sp>
         <p:nvSpPr>
-          <p:cNvPr id="9" name="Rounded Rectangle 8"/>
+          <p:cNvPr id="18" name="Rounded Rectangle 17"/>
           <p:cNvSpPr/>
           <p:nvPr/>
         </p:nvSpPr>
         <p:spPr>
           <a:xfrm>
-            <a:off x="5783636" y="2988069"/>
+            <a:off x="5783636" y="3101083"/>
             <a:ext cx="1280160" cy="640080"/>
           </a:xfrm>
           <a:prstGeom prst="roundRect">
             <a:avLst/>
           </a:prstGeom>
           <a:solidFill>
-            <a:schemeClr val="accent1">
-              <a:lumMod val="60000"/>
-              <a:lumOff val="40000"/>
-            </a:schemeClr>
+            <a:schemeClr val="bg1"/>
           </a:solidFill>
         </p:spPr>
         <p:style>
@@ -7060,23 +7105,20 @@
       </p:sp>
       <p:sp>
         <p:nvSpPr>
-          <p:cNvPr id="10" name="Rounded Rectangle 9"/>
+          <p:cNvPr id="19" name="Rounded Rectangle 18"/>
           <p:cNvSpPr/>
           <p:nvPr/>
         </p:nvSpPr>
         <p:spPr>
           <a:xfrm>
-            <a:off x="5783636" y="4416286"/>
+            <a:off x="5783636" y="4529300"/>
             <a:ext cx="1280160" cy="640080"/>
           </a:xfrm>
           <a:prstGeom prst="roundRect">
             <a:avLst/>
           </a:prstGeom>
           <a:solidFill>
-            <a:schemeClr val="accent1">
-              <a:lumMod val="60000"/>
-              <a:lumOff val="40000"/>
-            </a:schemeClr>
+            <a:schemeClr val="bg1"/>
           </a:solidFill>
         </p:spPr>
         <p:style>
@@ -7113,16 +7155,16 @@
       </p:sp>
       <p:cxnSp>
         <p:nvCxnSpPr>
-          <p:cNvPr id="11" name="Curved Connector 10"/>
+          <p:cNvPr id="20" name="Curved Connector 19"/>
           <p:cNvCxnSpPr>
-            <a:stCxn id="9" idx="0"/>
-            <a:endCxn id="5" idx="1"/>
+            <a:stCxn id="18" idx="0"/>
+            <a:endCxn id="15" idx="1"/>
           </p:cNvCxnSpPr>
           <p:nvPr/>
         </p:nvCxnSpPr>
         <p:spPr>
           <a:xfrm rot="5400000" flipH="1" flipV="1">
-            <a:off x="6004274" y="2321707"/>
+            <a:off x="6004274" y="2434721"/>
             <a:ext cx="1085804" cy="246921"/>
           </a:xfrm>
           <a:prstGeom prst="curvedConnector2">
@@ -7149,16 +7191,16 @@
       </p:cxnSp>
       <p:cxnSp>
         <p:nvCxnSpPr>
-          <p:cNvPr id="12" name="Curved Connector 11"/>
+          <p:cNvPr id="21" name="Curved Connector 20"/>
           <p:cNvCxnSpPr>
-            <a:stCxn id="5" idx="3"/>
-            <a:endCxn id="7" idx="0"/>
+            <a:stCxn id="15" idx="3"/>
+            <a:endCxn id="16" idx="0"/>
           </p:cNvCxnSpPr>
           <p:nvPr/>
         </p:nvCxnSpPr>
         <p:spPr>
           <a:xfrm>
-            <a:off x="7950797" y="1902265"/>
+            <a:off x="7950797" y="2015279"/>
             <a:ext cx="271898" cy="1085804"/>
           </a:xfrm>
           <a:prstGeom prst="curvedConnector2">
@@ -7185,16 +7227,16 @@
       </p:cxnSp>
       <p:cxnSp>
         <p:nvCxnSpPr>
-          <p:cNvPr id="13" name="Straight Arrow Connector 12"/>
+          <p:cNvPr id="22" name="Straight Arrow Connector 21"/>
           <p:cNvCxnSpPr>
-            <a:stCxn id="10" idx="0"/>
-            <a:endCxn id="9" idx="2"/>
+            <a:stCxn id="19" idx="0"/>
+            <a:endCxn id="18" idx="2"/>
           </p:cNvCxnSpPr>
           <p:nvPr/>
         </p:nvCxnSpPr>
         <p:spPr>
           <a:xfrm flipV="1">
-            <a:off x="6423716" y="3628149"/>
+            <a:off x="6423716" y="3741163"/>
             <a:ext cx="0" cy="788137"/>
           </a:xfrm>
           <a:prstGeom prst="straightConnector1">
@@ -7221,16 +7263,16 @@
       </p:cxnSp>
       <p:cxnSp>
         <p:nvCxnSpPr>
-          <p:cNvPr id="14" name="Straight Arrow Connector 13"/>
+          <p:cNvPr id="23" name="Straight Arrow Connector 22"/>
           <p:cNvCxnSpPr>
-            <a:stCxn id="7" idx="2"/>
-            <a:endCxn id="8" idx="0"/>
+            <a:stCxn id="16" idx="2"/>
+            <a:endCxn id="17" idx="0"/>
           </p:cNvCxnSpPr>
           <p:nvPr/>
         </p:nvCxnSpPr>
         <p:spPr>
           <a:xfrm>
-            <a:off x="8222695" y="3628149"/>
+            <a:off x="8222695" y="3741163"/>
             <a:ext cx="0" cy="788137"/>
           </a:xfrm>
           <a:prstGeom prst="straightConnector1">
@@ -7326,8 +7368,8 @@
         </p:nvSpPr>
         <p:spPr>
           <a:xfrm>
-            <a:off x="266699" y="1328484"/>
-            <a:ext cx="8630721" cy="1569660"/>
+            <a:off x="266699" y="1236018"/>
+            <a:ext cx="8630721" cy="4924425"/>
           </a:xfrm>
           <a:prstGeom prst="rect">
             <a:avLst/>
@@ -7341,43 +7383,97 @@
           <a:lstStyle/>
           <a:p>
             <a:pPr marL="285750" indent="-285750">
+              <a:spcAft>
+                <a:spcPts val="1200"/>
+              </a:spcAft>
               <a:buFont typeface="Arial"/>
               <a:buChar char="•"/>
             </a:pPr>
             <a:r>
               <a:rPr lang="it-IT" sz="2400" dirty="0"/>
-              <a:t>Valutazione della libreria sull’applicazione </a:t>
+              <a:t>Utilizzo della libreria nell’applicazione </a:t>
             </a:r>
             <a:r>
               <a:rPr lang="it-IT" sz="2400" dirty="0" err="1"/>
               <a:t>WordPress</a:t>
             </a:r>
-            <a:endParaRPr lang="it-IT" sz="2400" dirty="0"/>
+            <a:r>
+              <a:rPr lang="it-IT" sz="2400" dirty="0"/>
+              <a:t>, per mostrarne il funzionamento in un contesto reale</a:t>
+            </a:r>
           </a:p>
           <a:p>
             <a:pPr marL="285750" indent="-285750">
+              <a:spcAft>
+                <a:spcPts val="1200"/>
+              </a:spcAft>
               <a:buFont typeface="Arial"/>
               <a:buChar char="•"/>
             </a:pPr>
             <a:r>
               <a:rPr lang="it-IT" sz="2400" dirty="0"/>
-              <a:t>Test definiti in Espresso, con l’</a:t>
+              <a:t>Sezione dell’</a:t>
             </a:r>
             <a:r>
               <a:rPr lang="it-IT" sz="2400" dirty="0" err="1"/>
-              <a:t>Event</a:t>
+              <a:t>app</a:t>
             </a:r>
             <a:r>
               <a:rPr lang="it-IT" sz="2400" dirty="0"/>
-              <a:t> Monitor eseguito in background</a:t>
+              <a:t> che permette di scrivere un post all’interno del blog e pubblicarlo</a:t>
             </a:r>
           </a:p>
           <a:p>
             <a:pPr marL="285750" indent="-285750">
+              <a:spcAft>
+                <a:spcPts val="1200"/>
+              </a:spcAft>
               <a:buFont typeface="Arial"/>
               <a:buChar char="•"/>
             </a:pPr>
-            <a:endParaRPr lang="it-IT" sz="2400" dirty="0"/>
+            <a:r>
+              <a:rPr lang="it-IT" sz="2400" dirty="0"/>
+              <a:t>Esempi di asserzioni temporali:</a:t>
+            </a:r>
+          </a:p>
+          <a:p>
+            <a:pPr marL="742950" lvl="1" indent="-285750">
+              <a:spcAft>
+                <a:spcPts val="1200"/>
+              </a:spcAft>
+              <a:buFont typeface="Arial"/>
+              <a:buChar char="•"/>
+            </a:pPr>
+            <a:r>
+              <a:rPr lang="it-IT" sz="2400" dirty="0"/>
+              <a:t>Contenuto del post non può cambiare dopo l’inizio della procedura di pubblicazione</a:t>
+            </a:r>
+          </a:p>
+          <a:p>
+            <a:pPr marL="742950" lvl="1" indent="-285750">
+              <a:spcAft>
+                <a:spcPts val="1200"/>
+              </a:spcAft>
+              <a:buFont typeface="Arial"/>
+              <a:buChar char="•"/>
+            </a:pPr>
+            <a:r>
+              <a:rPr lang="it-IT" sz="2400" dirty="0"/>
+              <a:t>Click su "Pubblica" genera sempre o un messaggio di errore o l’inizio della procedura di pubblicazione</a:t>
+            </a:r>
+          </a:p>
+          <a:p>
+            <a:pPr marL="742950" lvl="1" indent="-285750">
+              <a:spcAft>
+                <a:spcPts val="1200"/>
+              </a:spcAft>
+              <a:buFont typeface="Arial"/>
+              <a:buChar char="•"/>
+            </a:pPr>
+            <a:r>
+              <a:rPr lang="it-IT" sz="2400" dirty="0"/>
+              <a:t>Gli aggiornamenti sul progresso dell’upload di immagini devono essere inviati in ordine crescente</a:t>
+            </a:r>
           </a:p>
         </p:txBody>
       </p:sp>
@@ -7454,8 +7550,8 @@
         </p:nvSpPr>
         <p:spPr bwMode="auto">
           <a:xfrm>
-            <a:off x="266699" y="4123907"/>
-            <a:ext cx="8932333" cy="2308324"/>
+            <a:off x="698499" y="4123907"/>
+            <a:ext cx="8291387" cy="2308324"/>
           </a:xfrm>
           <a:prstGeom prst="rect">
             <a:avLst/>
@@ -7925,8 +8021,8 @@
         </p:nvSpPr>
         <p:spPr bwMode="auto">
           <a:xfrm>
-            <a:off x="266699" y="2073089"/>
-            <a:ext cx="8462434" cy="923330"/>
+            <a:off x="698499" y="2073089"/>
+            <a:ext cx="8188647" cy="923330"/>
           </a:xfrm>
           <a:prstGeom prst="rect">
             <a:avLst/>
@@ -8072,14 +8168,10 @@
                 <a:latin typeface="Courier New" panose="02070309020205020404" pitchFamily="49" charset="0"/>
                 <a:cs typeface="Courier New" panose="02070309020205020404" pitchFamily="49" charset="0"/>
               </a:rPr>
-              <a:t>, 						</a:t>
-            </a:r>
-            <a:r>
-              <a:rPr kumimoji="0" lang="en-US" altLang="en-US" b="0" i="0" u="none" strike="noStrike" cap="none" normalizeH="0" dirty="0">
-                <a:ln>
-                  <a:noFill/>
-                </a:ln>
-                <a:effectLst/>
+              <a:t>, 					</a:t>
+            </a:r>
+            <a:r>
+              <a:rPr lang="en-US" altLang="en-US" dirty="0">
                 <a:latin typeface="Courier New" panose="02070309020205020404" pitchFamily="49" charset="0"/>
                 <a:cs typeface="Courier New" panose="02070309020205020404" pitchFamily="49" charset="0"/>
               </a:rPr>
@@ -8262,7 +8354,7 @@
         </p:nvSpPr>
         <p:spPr bwMode="auto">
           <a:xfrm>
-            <a:off x="698499" y="2040043"/>
+            <a:off x="698499" y="1906481"/>
             <a:ext cx="8001855" cy="1477328"/>
           </a:xfrm>
           <a:prstGeom prst="rect">
@@ -8340,7 +8432,7 @@
         </p:nvSpPr>
         <p:spPr>
           <a:xfrm>
-            <a:off x="698499" y="4373355"/>
+            <a:off x="698499" y="4239793"/>
             <a:ext cx="8001855" cy="1754326"/>
           </a:xfrm>
           <a:prstGeom prst="rect">
@@ -8427,7 +8519,7 @@
         </p:nvSpPr>
         <p:spPr>
           <a:xfrm>
-            <a:off x="237921" y="1485123"/>
+            <a:off x="237921" y="1351561"/>
             <a:ext cx="8731186" cy="461665"/>
           </a:xfrm>
           <a:prstGeom prst="rect">
@@ -8460,7 +8552,7 @@
         </p:nvSpPr>
         <p:spPr>
           <a:xfrm>
-            <a:off x="237921" y="3793371"/>
+            <a:off x="237921" y="3659809"/>
             <a:ext cx="8731186" cy="461665"/>
           </a:xfrm>
           <a:prstGeom prst="rect">

</xml_diff>